<commit_message>
Additions to slides for Assignment 01
</commit_message>
<xml_diff>
--- a/Assignments/Townes_POLS6310_Spring2019_Assignment01.pptx
+++ b/Assignments/Townes_POLS6310_Spring2019_Assignment01.pptx
@@ -8,6 +8,7 @@
     <p:sldId id="256" r:id="rId2"/>
     <p:sldId id="257" r:id="rId3"/>
     <p:sldId id="258" r:id="rId4"/>
+    <p:sldId id="259" r:id="rId5"/>
   </p:sldIdLst>
   <p:sldSz cx="9144000" cy="5715000" type="screen16x10"/>
   <p:notesSz cx="6858000" cy="9144000"/>
@@ -1618,17 +1619,17 @@
       </dgm:t>
     </dgm:pt>
     <dgm:pt modelId="{6B0EF60D-A0B1-46C5-9677-4BEA810977D2}">
-      <dgm:prSet phldrT="[Text]"/>
+      <dgm:prSet phldrT="[Text]" custT="1"/>
       <dgm:spPr/>
       <dgm:t>
         <a:bodyPr/>
         <a:lstStyle/>
         <a:p>
           <a:r>
-            <a:rPr lang="en-US" dirty="0" smtClean="0"/>
+            <a:rPr lang="en-US" sz="1000" dirty="0" smtClean="0"/>
             <a:t>Change Narrative</a:t>
           </a:r>
-          <a:endParaRPr lang="en-US" dirty="0"/>
+          <a:endParaRPr lang="en-US" sz="1000" dirty="0"/>
         </a:p>
       </dgm:t>
     </dgm:pt>
@@ -1662,10 +1663,10 @@
         <a:lstStyle/>
         <a:p>
           <a:r>
-            <a:rPr lang="en-US" sz="900" dirty="0" smtClean="0"/>
+            <a:rPr lang="en-US" sz="1000" dirty="0" smtClean="0"/>
             <a:t>America used to have a growing economy and unquestioned global dominance.</a:t>
           </a:r>
-          <a:endParaRPr lang="en-US" sz="900" dirty="0"/>
+          <a:endParaRPr lang="en-US" sz="1000" dirty="0"/>
         </a:p>
       </dgm:t>
     </dgm:pt>
@@ -1699,10 +1700,10 @@
         <a:lstStyle/>
         <a:p>
           <a:r>
-            <a:rPr lang="en-US" sz="900" dirty="0" smtClean="0"/>
+            <a:rPr lang="en-US" sz="1000" dirty="0" smtClean="0"/>
             <a:t>Small business owners</a:t>
           </a:r>
-          <a:endParaRPr lang="en-US" sz="900" dirty="0"/>
+          <a:endParaRPr lang="en-US" sz="1000" dirty="0"/>
         </a:p>
       </dgm:t>
     </dgm:pt>
@@ -1729,17 +1730,17 @@
       </dgm:t>
     </dgm:pt>
     <dgm:pt modelId="{DCB77698-D8A7-43AE-8C12-88D22546D4E0}">
-      <dgm:prSet phldrT="[Text]"/>
+      <dgm:prSet phldrT="[Text]" custT="1"/>
       <dgm:spPr/>
       <dgm:t>
         <a:bodyPr/>
         <a:lstStyle/>
         <a:p>
           <a:r>
-            <a:rPr lang="en-US" dirty="0" smtClean="0"/>
+            <a:rPr lang="en-US" sz="1000" dirty="0" smtClean="0"/>
             <a:t>Efficiency Narrative</a:t>
           </a:r>
-          <a:endParaRPr lang="en-US" dirty="0"/>
+          <a:endParaRPr lang="en-US" sz="1000" dirty="0"/>
         </a:p>
       </dgm:t>
     </dgm:pt>
@@ -1773,10 +1774,10 @@
         <a:lstStyle/>
         <a:p>
           <a:r>
-            <a:rPr lang="en-US" sz="900" dirty="0" smtClean="0"/>
+            <a:rPr lang="en-US" sz="1000" dirty="0" smtClean="0"/>
             <a:t>Small businesses are much more efficient innovators than large businesses.</a:t>
           </a:r>
-          <a:endParaRPr lang="en-US" sz="900" dirty="0"/>
+          <a:endParaRPr lang="en-US" sz="1000" dirty="0"/>
         </a:p>
       </dgm:t>
     </dgm:pt>
@@ -1810,10 +1811,10 @@
         <a:lstStyle/>
         <a:p>
           <a:r>
-            <a:rPr lang="en-US" sz="900" dirty="0" smtClean="0"/>
+            <a:rPr lang="en-US" sz="1000" dirty="0" smtClean="0"/>
             <a:t>Small business owners</a:t>
           </a:r>
-          <a:endParaRPr lang="en-US" sz="900" dirty="0"/>
+          <a:endParaRPr lang="en-US" sz="1000" dirty="0"/>
         </a:p>
       </dgm:t>
     </dgm:pt>
@@ -1840,17 +1841,21 @@
       </dgm:t>
     </dgm:pt>
     <dgm:pt modelId="{2F4105CE-F831-4489-A38E-EA308F965E1A}">
-      <dgm:prSet phldrT="[Text]"/>
+      <dgm:prSet phldrT="[Text]" custT="1"/>
       <dgm:spPr/>
       <dgm:t>
         <a:bodyPr/>
         <a:lstStyle/>
         <a:p>
           <a:r>
-            <a:rPr lang="en-US" dirty="0" smtClean="0"/>
-            <a:t>Mob at the Gates</a:t>
+            <a:rPr lang="en-US" sz="900" dirty="0" smtClean="0"/>
+            <a:t>Mob at </a:t>
           </a:r>
-          <a:endParaRPr lang="en-US" dirty="0"/>
+          <a:r>
+            <a:rPr lang="en-US" sz="1000" dirty="0" smtClean="0"/>
+            <a:t>the Gates</a:t>
+          </a:r>
+          <a:endParaRPr lang="en-US" sz="1000" dirty="0"/>
         </a:p>
       </dgm:t>
     </dgm:pt>
@@ -1884,10 +1889,10 @@
         <a:lstStyle/>
         <a:p>
           <a:r>
-            <a:rPr lang="en-US" sz="900" dirty="0" smtClean="0"/>
+            <a:rPr lang="en-US" sz="1000" dirty="0" smtClean="0"/>
             <a:t>America’s enemies will take advantage of this situation and eradicate our way of life.</a:t>
           </a:r>
-          <a:endParaRPr lang="en-US" sz="900" dirty="0"/>
+          <a:endParaRPr lang="en-US" sz="1000" dirty="0"/>
         </a:p>
       </dgm:t>
     </dgm:pt>
@@ -1921,10 +1926,10 @@
         <a:lstStyle/>
         <a:p>
           <a:r>
-            <a:rPr lang="en-US" sz="900" dirty="0" smtClean="0"/>
+            <a:rPr lang="en-US" sz="1000" dirty="0" smtClean="0"/>
             <a:t>Stakeholder</a:t>
           </a:r>
-          <a:endParaRPr lang="en-US" sz="900" dirty="0"/>
+          <a:endParaRPr lang="en-US" sz="1000" dirty="0"/>
         </a:p>
       </dgm:t>
     </dgm:pt>
@@ -1958,10 +1963,10 @@
         <a:lstStyle/>
         <a:p>
           <a:r>
-            <a:rPr lang="en-US" sz="900" dirty="0" smtClean="0"/>
+            <a:rPr lang="en-US" sz="1000" dirty="0" smtClean="0"/>
             <a:t>Stakeholder</a:t>
           </a:r>
-          <a:endParaRPr lang="en-US" sz="900" dirty="0"/>
+          <a:endParaRPr lang="en-US" sz="1000" dirty="0"/>
         </a:p>
       </dgm:t>
     </dgm:pt>
@@ -1995,10 +2000,10 @@
         <a:lstStyle/>
         <a:p>
           <a:r>
-            <a:rPr lang="en-US" sz="900" dirty="0" smtClean="0"/>
+            <a:rPr lang="en-US" sz="1000" dirty="0" smtClean="0"/>
             <a:t>Stakeholder</a:t>
           </a:r>
-          <a:endParaRPr lang="en-US" sz="900" dirty="0"/>
+          <a:endParaRPr lang="en-US" sz="1000" dirty="0"/>
         </a:p>
       </dgm:t>
     </dgm:pt>
@@ -2032,10 +2037,10 @@
         <a:lstStyle/>
         <a:p>
           <a:r>
-            <a:rPr lang="en-US" sz="900" dirty="0" smtClean="0"/>
+            <a:rPr lang="en-US" sz="1000" dirty="0" smtClean="0"/>
             <a:t>Stakeholder</a:t>
           </a:r>
-          <a:endParaRPr lang="en-US" sz="900" dirty="0"/>
+          <a:endParaRPr lang="en-US" sz="1000" dirty="0"/>
         </a:p>
       </dgm:t>
     </dgm:pt>
@@ -2062,17 +2067,17 @@
       </dgm:t>
     </dgm:pt>
     <dgm:pt modelId="{19EF64AF-D0D9-429E-86D3-4CE7A62D9930}">
-      <dgm:prSet phldrT="[Text]"/>
+      <dgm:prSet phldrT="[Text]" custT="1"/>
       <dgm:spPr/>
       <dgm:t>
         <a:bodyPr/>
         <a:lstStyle/>
         <a:p>
           <a:r>
-            <a:rPr lang="en-US" dirty="0" smtClean="0"/>
+            <a:rPr lang="en-US" sz="1000" dirty="0" smtClean="0"/>
             <a:t>Rot at the Top</a:t>
           </a:r>
-          <a:endParaRPr lang="en-US" dirty="0"/>
+          <a:endParaRPr lang="en-US" sz="1000" dirty="0"/>
         </a:p>
       </dgm:t>
     </dgm:pt>
@@ -2106,10 +2111,10 @@
         <a:lstStyle/>
         <a:p>
           <a:r>
-            <a:rPr lang="en-US" sz="900" dirty="0" smtClean="0"/>
+            <a:rPr lang="en-US" sz="1000" dirty="0" smtClean="0"/>
             <a:t>Contract specialists are  making things as easy as possible for themselves by discriminating against small businesses.</a:t>
           </a:r>
-          <a:endParaRPr lang="en-US" sz="900" dirty="0"/>
+          <a:endParaRPr lang="en-US" sz="1000" dirty="0"/>
         </a:p>
       </dgm:t>
     </dgm:pt>
@@ -2143,10 +2148,10 @@
         <a:lstStyle/>
         <a:p>
           <a:r>
-            <a:rPr lang="en-US" sz="900" dirty="0" smtClean="0"/>
+            <a:rPr lang="en-US" sz="1000" dirty="0" smtClean="0"/>
             <a:t>Small business owners</a:t>
           </a:r>
-          <a:endParaRPr lang="en-US" sz="900" dirty="0"/>
+          <a:endParaRPr lang="en-US" sz="1000" dirty="0"/>
         </a:p>
       </dgm:t>
     </dgm:pt>
@@ -2180,10 +2185,10 @@
         <a:lstStyle/>
         <a:p>
           <a:r>
-            <a:rPr lang="en-US" sz="900" dirty="0" smtClean="0"/>
+            <a:rPr lang="en-US" sz="1000" dirty="0" smtClean="0"/>
             <a:t>Stakeholder</a:t>
           </a:r>
-          <a:endParaRPr lang="en-US" sz="900" dirty="0"/>
+          <a:endParaRPr lang="en-US" sz="1000" dirty="0"/>
         </a:p>
       </dgm:t>
     </dgm:pt>
@@ -2220,6 +2225,13 @@
         </dgm:presLayoutVars>
       </dgm:prSet>
       <dgm:spPr/>
+      <dgm:t>
+        <a:bodyPr/>
+        <a:lstStyle/>
+        <a:p>
+          <a:endParaRPr lang="en-US"/>
+        </a:p>
+      </dgm:t>
     </dgm:pt>
     <dgm:pt modelId="{1CC84F79-29AC-420D-9AF4-700F19FD984E}" type="pres">
       <dgm:prSet presAssocID="{2F4105CE-F831-4489-A38E-EA308F965E1A}" presName="composite" presStyleCnt="0"/>
@@ -2377,6 +2389,13 @@
         </dgm:presLayoutVars>
       </dgm:prSet>
       <dgm:spPr/>
+      <dgm:t>
+        <a:bodyPr/>
+        <a:lstStyle/>
+        <a:p>
+          <a:endParaRPr lang="en-US"/>
+        </a:p>
+      </dgm:t>
     </dgm:pt>
     <dgm:pt modelId="{89E8214A-F2AE-427F-8EB5-50916B7E6B44}" type="pres">
       <dgm:prSet presAssocID="{6B0EF60D-A0B1-46C5-9677-4BEA810977D2}" presName="Accent" presStyleLbl="parChTrans1D1" presStyleIdx="2" presStyleCnt="4"/>
@@ -2469,8 +2488,8 @@
     <dgm:cxn modelId="{E50B4537-4222-4FA6-86D6-900B232A905B}" srcId="{84789903-61AF-4F8F-9430-490306DDBEA0}" destId="{DCB77698-D8A7-43AE-8C12-88D22546D4E0}" srcOrd="3" destOrd="0" parTransId="{0256383B-FBF2-49F0-935C-E17EB2C4D7C4}" sibTransId="{866D160B-DB4E-4FF6-BF8A-FD0216203DA1}"/>
     <dgm:cxn modelId="{B0EC7BCC-A43F-44E9-812F-46898A32FCCB}" type="presOf" srcId="{84789903-61AF-4F8F-9430-490306DDBEA0}" destId="{8937854E-C94A-470E-AB4D-2D1BF4D6EC0A}" srcOrd="0" destOrd="0" presId="urn:microsoft.com/office/officeart/2011/layout/TabList"/>
     <dgm:cxn modelId="{5B81B842-285D-4C21-BC2F-2555AB323F47}" srcId="{19EF64AF-D0D9-429E-86D3-4CE7A62D9930}" destId="{14D29AC4-9FA0-444D-8EE4-E85DEB5E57A2}" srcOrd="2" destOrd="0" parTransId="{8F845681-B05B-4E32-AD5D-21295FC02A07}" sibTransId="{EE9BAB10-D308-456A-ADB5-78C6FFFB97E6}"/>
+    <dgm:cxn modelId="{B5E64274-24E3-4CD1-9F45-A1AFC9369C77}" type="presOf" srcId="{C9FC25FD-4E5C-4A64-AFF0-7D16F6FBC7AA}" destId="{ABD9F4AA-584A-4C32-8AC6-1F842D5E3471}" srcOrd="0" destOrd="1" presId="urn:microsoft.com/office/officeart/2011/layout/TabList"/>
     <dgm:cxn modelId="{96A20728-4B71-426D-8207-8D974A3F5B06}" srcId="{84789903-61AF-4F8F-9430-490306DDBEA0}" destId="{6B0EF60D-A0B1-46C5-9677-4BEA810977D2}" srcOrd="2" destOrd="0" parTransId="{DF3844A8-4E17-463F-BAAD-4ACB2C215D90}" sibTransId="{9DADB796-DA90-4478-BCA3-5929CA4ED0C6}"/>
-    <dgm:cxn modelId="{B5E64274-24E3-4CD1-9F45-A1AFC9369C77}" type="presOf" srcId="{C9FC25FD-4E5C-4A64-AFF0-7D16F6FBC7AA}" destId="{ABD9F4AA-584A-4C32-8AC6-1F842D5E3471}" srcOrd="0" destOrd="1" presId="urn:microsoft.com/office/officeart/2011/layout/TabList"/>
     <dgm:cxn modelId="{6207E934-C0CE-47B8-95DE-554217624972}" type="presOf" srcId="{F6CCDE68-20A3-48C9-9929-36D9326E50C7}" destId="{269C0782-BA35-4C3A-B295-D76ACD031E2B}" srcOrd="0" destOrd="0" presId="urn:microsoft.com/office/officeart/2011/layout/TabList"/>
     <dgm:cxn modelId="{5F094A65-8D03-4DE2-90BC-845E0B1DF3F3}" srcId="{2F4105CE-F831-4489-A38E-EA308F965E1A}" destId="{8B2750EB-B434-41DC-A189-8424894B839C}" srcOrd="0" destOrd="0" parTransId="{FFC1F60D-411F-463B-80BE-8626FCEE6E20}" sibTransId="{1C68FAD9-F9C9-4D4A-9B81-2E6FECE526EB}"/>
     <dgm:cxn modelId="{B2DBAA2D-6016-42DE-9EDF-062547F8B621}" type="presOf" srcId="{14D29AC4-9FA0-444D-8EE4-E85DEB5E57A2}" destId="{2874E84B-9605-494F-B813-85A702BFCF0F}" srcOrd="0" destOrd="1" presId="urn:microsoft.com/office/officeart/2011/layout/TabList"/>
@@ -2546,17 +2565,17 @@
       </dgm:t>
     </dgm:pt>
     <dgm:pt modelId="{6B0EF60D-A0B1-46C5-9677-4BEA810977D2}">
-      <dgm:prSet phldrT="[Text]"/>
+      <dgm:prSet phldrT="[Text]" custT="1"/>
       <dgm:spPr/>
       <dgm:t>
         <a:bodyPr/>
         <a:lstStyle/>
         <a:p>
           <a:r>
-            <a:rPr lang="en-US" dirty="0" smtClean="0"/>
+            <a:rPr lang="en-US" sz="1000" dirty="0" smtClean="0"/>
             <a:t>Change Narrative</a:t>
           </a:r>
-          <a:endParaRPr lang="en-US" dirty="0"/>
+          <a:endParaRPr lang="en-US" sz="1000" dirty="0"/>
         </a:p>
       </dgm:t>
     </dgm:pt>
@@ -2590,10 +2609,10 @@
         <a:lstStyle/>
         <a:p>
           <a:r>
-            <a:rPr lang="en-US" sz="900" dirty="0" smtClean="0"/>
+            <a:rPr lang="en-US" sz="1000" dirty="0" smtClean="0"/>
             <a:t>This policy will take the nation on a path towards to sub-par research and development.</a:t>
           </a:r>
-          <a:endParaRPr lang="en-US" sz="900" dirty="0"/>
+          <a:endParaRPr lang="en-US" sz="1000" dirty="0"/>
         </a:p>
       </dgm:t>
     </dgm:pt>
@@ -2627,10 +2646,10 @@
         <a:lstStyle/>
         <a:p>
           <a:r>
-            <a:rPr lang="en-US" sz="900" dirty="0" smtClean="0"/>
+            <a:rPr lang="en-US" sz="1000" dirty="0" smtClean="0"/>
             <a:t>Stakeholder</a:t>
           </a:r>
-          <a:endParaRPr lang="en-US" sz="900" dirty="0"/>
+          <a:endParaRPr lang="en-US" sz="1000" dirty="0"/>
         </a:p>
       </dgm:t>
     </dgm:pt>
@@ -2657,17 +2676,17 @@
       </dgm:t>
     </dgm:pt>
     <dgm:pt modelId="{DCB77698-D8A7-43AE-8C12-88D22546D4E0}">
-      <dgm:prSet phldrT="[Text]"/>
+      <dgm:prSet phldrT="[Text]" custT="1"/>
       <dgm:spPr/>
       <dgm:t>
         <a:bodyPr/>
         <a:lstStyle/>
         <a:p>
           <a:r>
-            <a:rPr lang="en-US" dirty="0" smtClean="0"/>
+            <a:rPr lang="en-US" sz="1000" dirty="0" smtClean="0"/>
             <a:t>Equity Narrative</a:t>
           </a:r>
-          <a:endParaRPr lang="en-US" dirty="0"/>
+          <a:endParaRPr lang="en-US" sz="1000" dirty="0"/>
         </a:p>
       </dgm:t>
     </dgm:pt>
@@ -2701,10 +2720,10 @@
         <a:lstStyle/>
         <a:p>
           <a:r>
-            <a:rPr lang="en-US" sz="900" dirty="0" smtClean="0"/>
+            <a:rPr lang="en-US" sz="1000" dirty="0" smtClean="0"/>
             <a:t>This policy will unfairly take away opportunities from highly talented and deserving researchers simply because of where they work.</a:t>
           </a:r>
-          <a:endParaRPr lang="en-US" sz="900" dirty="0"/>
+          <a:endParaRPr lang="en-US" sz="1000" dirty="0"/>
         </a:p>
       </dgm:t>
     </dgm:pt>
@@ -2738,10 +2757,10 @@
         <a:lstStyle/>
         <a:p>
           <a:r>
-            <a:rPr lang="en-US" sz="900" dirty="0" smtClean="0"/>
+            <a:rPr lang="en-US" sz="1000" dirty="0" smtClean="0"/>
             <a:t>Stakeholder</a:t>
           </a:r>
-          <a:endParaRPr lang="en-US" sz="900" dirty="0"/>
+          <a:endParaRPr lang="en-US" sz="1000" dirty="0"/>
         </a:p>
       </dgm:t>
     </dgm:pt>
@@ -2768,17 +2787,17 @@
       </dgm:t>
     </dgm:pt>
     <dgm:pt modelId="{2F4105CE-F831-4489-A38E-EA308F965E1A}">
-      <dgm:prSet phldrT="[Text]"/>
+      <dgm:prSet phldrT="[Text]" custT="1"/>
       <dgm:spPr/>
       <dgm:t>
         <a:bodyPr/>
         <a:lstStyle/>
         <a:p>
           <a:r>
-            <a:rPr lang="en-US" dirty="0" smtClean="0"/>
+            <a:rPr lang="en-US" sz="1000" dirty="0" smtClean="0"/>
             <a:t>Change Narrative</a:t>
           </a:r>
-          <a:endParaRPr lang="en-US" dirty="0"/>
+          <a:endParaRPr lang="en-US" sz="1000" dirty="0"/>
         </a:p>
       </dgm:t>
     </dgm:pt>
@@ -2812,10 +2831,10 @@
         <a:lstStyle/>
         <a:p>
           <a:r>
-            <a:rPr lang="en-US" sz="900" dirty="0" smtClean="0"/>
+            <a:rPr lang="en-US" sz="1000" dirty="0" smtClean="0"/>
             <a:t>This policy changes the selection process from a research excellence criteria to a privilege criteria.</a:t>
           </a:r>
-          <a:endParaRPr lang="en-US" sz="900" dirty="0"/>
+          <a:endParaRPr lang="en-US" sz="1000" dirty="0"/>
         </a:p>
       </dgm:t>
     </dgm:pt>
@@ -2849,10 +2868,10 @@
         <a:lstStyle/>
         <a:p>
           <a:r>
-            <a:rPr lang="en-US" sz="900" dirty="0" smtClean="0"/>
+            <a:rPr lang="en-US" sz="1000" dirty="0" smtClean="0"/>
             <a:t>Stakeholder</a:t>
           </a:r>
-          <a:endParaRPr lang="en-US" sz="900" dirty="0"/>
+          <a:endParaRPr lang="en-US" sz="1000" dirty="0"/>
         </a:p>
       </dgm:t>
     </dgm:pt>
@@ -2886,10 +2905,10 @@
         <a:lstStyle/>
         <a:p>
           <a:r>
-            <a:rPr lang="en-US" sz="900" dirty="0" smtClean="0"/>
+            <a:rPr lang="en-US" sz="1000" dirty="0" smtClean="0"/>
             <a:t>Stakeholder</a:t>
           </a:r>
-          <a:endParaRPr lang="en-US" sz="900" dirty="0"/>
+          <a:endParaRPr lang="en-US" sz="1000" dirty="0"/>
         </a:p>
       </dgm:t>
     </dgm:pt>
@@ -2923,10 +2942,10 @@
         <a:lstStyle/>
         <a:p>
           <a:r>
-            <a:rPr lang="en-US" sz="900" dirty="0" smtClean="0"/>
+            <a:rPr lang="en-US" sz="1000" dirty="0" smtClean="0"/>
             <a:t>Stakeholder</a:t>
           </a:r>
-          <a:endParaRPr lang="en-US" sz="900" dirty="0"/>
+          <a:endParaRPr lang="en-US" sz="1000" dirty="0"/>
         </a:p>
       </dgm:t>
     </dgm:pt>
@@ -2960,10 +2979,10 @@
         <a:lstStyle/>
         <a:p>
           <a:r>
-            <a:rPr lang="en-US" sz="900" dirty="0" smtClean="0"/>
+            <a:rPr lang="en-US" sz="1000" dirty="0" smtClean="0"/>
             <a:t>Stakeholder</a:t>
           </a:r>
-          <a:endParaRPr lang="en-US" sz="900" dirty="0"/>
+          <a:endParaRPr lang="en-US" sz="1000" dirty="0"/>
         </a:p>
       </dgm:t>
     </dgm:pt>
@@ -2990,17 +3009,17 @@
       </dgm:t>
     </dgm:pt>
     <dgm:pt modelId="{19EF64AF-D0D9-429E-86D3-4CE7A62D9930}">
-      <dgm:prSet phldrT="[Text]"/>
+      <dgm:prSet phldrT="[Text]" custT="1"/>
       <dgm:spPr/>
       <dgm:t>
         <a:bodyPr/>
         <a:lstStyle/>
         <a:p>
           <a:r>
-            <a:rPr lang="en-US" dirty="0" smtClean="0"/>
+            <a:rPr lang="en-US" sz="1000" dirty="0" smtClean="0"/>
             <a:t>Benevolent Community</a:t>
           </a:r>
-          <a:endParaRPr lang="en-US" dirty="0"/>
+          <a:endParaRPr lang="en-US" sz="1000" dirty="0"/>
         </a:p>
       </dgm:t>
     </dgm:pt>
@@ -3034,10 +3053,10 @@
         <a:lstStyle/>
         <a:p>
           <a:r>
-            <a:rPr lang="en-US" sz="900" dirty="0" smtClean="0"/>
+            <a:rPr lang="en-US" sz="1000" dirty="0" smtClean="0"/>
             <a:t>America is guided by the aspirational principle of treating everyone fairly and not showing favoritism to any one group over other groups.</a:t>
           </a:r>
-          <a:endParaRPr lang="en-US" sz="900" dirty="0"/>
+          <a:endParaRPr lang="en-US" sz="1000" dirty="0"/>
         </a:p>
       </dgm:t>
     </dgm:pt>
@@ -3071,10 +3090,10 @@
         <a:lstStyle/>
         <a:p>
           <a:r>
-            <a:rPr lang="en-US" sz="900" dirty="0" smtClean="0"/>
+            <a:rPr lang="en-US" sz="1000" dirty="0" smtClean="0"/>
             <a:t>Stakeholder</a:t>
           </a:r>
-          <a:endParaRPr lang="en-US" sz="900" dirty="0"/>
+          <a:endParaRPr lang="en-US" sz="1000" dirty="0"/>
         </a:p>
       </dgm:t>
     </dgm:pt>
@@ -3108,10 +3127,10 @@
         <a:lstStyle/>
         <a:p>
           <a:r>
-            <a:rPr lang="en-US" sz="900" dirty="0" smtClean="0"/>
+            <a:rPr lang="en-US" sz="1000" dirty="0" smtClean="0"/>
             <a:t>Stakeholder</a:t>
           </a:r>
-          <a:endParaRPr lang="en-US" sz="900" dirty="0"/>
+          <a:endParaRPr lang="en-US" sz="1000" dirty="0"/>
         </a:p>
       </dgm:t>
     </dgm:pt>
@@ -3148,6 +3167,13 @@
         </dgm:presLayoutVars>
       </dgm:prSet>
       <dgm:spPr/>
+      <dgm:t>
+        <a:bodyPr/>
+        <a:lstStyle/>
+        <a:p>
+          <a:endParaRPr lang="en-US"/>
+        </a:p>
+      </dgm:t>
     </dgm:pt>
     <dgm:pt modelId="{63CF07DF-294E-4215-9B6C-5C3BCCC45688}" type="pres">
       <dgm:prSet presAssocID="{19EF64AF-D0D9-429E-86D3-4CE7A62D9930}" presName="composite" presStyleCnt="0"/>
@@ -3305,6 +3331,13 @@
         </dgm:presLayoutVars>
       </dgm:prSet>
       <dgm:spPr/>
+      <dgm:t>
+        <a:bodyPr/>
+        <a:lstStyle/>
+        <a:p>
+          <a:endParaRPr lang="en-US"/>
+        </a:p>
+      </dgm:t>
     </dgm:pt>
     <dgm:pt modelId="{89E8214A-F2AE-427F-8EB5-50916B7E6B44}" type="pres">
       <dgm:prSet presAssocID="{6B0EF60D-A0B1-46C5-9677-4BEA810977D2}" presName="Accent" presStyleLbl="parChTrans1D1" presStyleIdx="2" presStyleCnt="4"/>
@@ -3394,9 +3427,9 @@
   <dgm:cxnLst>
     <dgm:cxn modelId="{E35350BB-BDDC-40B8-8B06-6BD0C23E1079}" srcId="{DCB77698-D8A7-43AE-8C12-88D22546D4E0}" destId="{DF89817A-F481-4972-86A6-4FC93177785A}" srcOrd="2" destOrd="0" parTransId="{87806EBA-732D-4B48-A8D1-FFAEC4A46986}" sibTransId="{06202192-C6B3-4A73-B569-80A15FAB58D4}"/>
     <dgm:cxn modelId="{B2124052-34AB-4435-8CBA-D34AF146A189}" type="presOf" srcId="{14D29AC4-9FA0-444D-8EE4-E85DEB5E57A2}" destId="{2874E84B-9605-494F-B813-85A702BFCF0F}" srcOrd="0" destOrd="1" presId="urn:microsoft.com/office/officeart/2011/layout/TabList"/>
-    <dgm:cxn modelId="{E50B4537-4222-4FA6-86D6-900B232A905B}" srcId="{84789903-61AF-4F8F-9430-490306DDBEA0}" destId="{DCB77698-D8A7-43AE-8C12-88D22546D4E0}" srcOrd="3" destOrd="0" parTransId="{0256383B-FBF2-49F0-935C-E17EB2C4D7C4}" sibTransId="{866D160B-DB4E-4FF6-BF8A-FD0216203DA1}"/>
     <dgm:cxn modelId="{9139EE07-F69A-425D-9FD3-917AD48F4A26}" type="presOf" srcId="{FCB9211A-ECAF-4092-9AF3-4A80464FEEEF}" destId="{76F4CE38-89D0-4EAB-9E94-FD08C47879E4}" srcOrd="0" destOrd="0" presId="urn:microsoft.com/office/officeart/2011/layout/TabList"/>
     <dgm:cxn modelId="{3ED3457C-8F8C-48E4-8B93-70F0D5B68315}" type="presOf" srcId="{C9FC25FD-4E5C-4A64-AFF0-7D16F6FBC7AA}" destId="{ABD9F4AA-584A-4C32-8AC6-1F842D5E3471}" srcOrd="0" destOrd="1" presId="urn:microsoft.com/office/officeart/2011/layout/TabList"/>
+    <dgm:cxn modelId="{E50B4537-4222-4FA6-86D6-900B232A905B}" srcId="{84789903-61AF-4F8F-9430-490306DDBEA0}" destId="{DCB77698-D8A7-43AE-8C12-88D22546D4E0}" srcOrd="3" destOrd="0" parTransId="{0256383B-FBF2-49F0-935C-E17EB2C4D7C4}" sibTransId="{866D160B-DB4E-4FF6-BF8A-FD0216203DA1}"/>
     <dgm:cxn modelId="{F1C43613-B926-4646-87FA-D992BF0A7796}" type="presOf" srcId="{8B2750EB-B434-41DC-A189-8424894B839C}" destId="{89B6103A-0012-428D-9057-99CB1F4B4519}" srcOrd="0" destOrd="0" presId="urn:microsoft.com/office/officeart/2011/layout/TabList"/>
     <dgm:cxn modelId="{5B81B842-285D-4C21-BC2F-2555AB323F47}" srcId="{19EF64AF-D0D9-429E-86D3-4CE7A62D9930}" destId="{14D29AC4-9FA0-444D-8EE4-E85DEB5E57A2}" srcOrd="2" destOrd="0" parTransId="{8F845681-B05B-4E32-AD5D-21295FC02A07}" sibTransId="{EE9BAB10-D308-456A-ADB5-78C6FFFB97E6}"/>
     <dgm:cxn modelId="{96A20728-4B71-426D-8207-8D974A3F5B06}" srcId="{84789903-61AF-4F8F-9430-490306DDBEA0}" destId="{6B0EF60D-A0B1-46C5-9677-4BEA810977D2}" srcOrd="2" destOrd="0" parTransId="{DF3844A8-4E17-463F-BAAD-4ACB2C215D90}" sibTransId="{9DADB796-DA90-4478-BCA3-5929CA4ED0C6}"/>
@@ -3407,8 +3440,8 @@
     <dgm:cxn modelId="{EC26D4FA-8D0A-4965-860E-E576DA3FE7C2}" srcId="{84789903-61AF-4F8F-9430-490306DDBEA0}" destId="{2F4105CE-F831-4489-A38E-EA308F965E1A}" srcOrd="1" destOrd="0" parTransId="{B2367E5B-DF6B-423A-8C73-6C51AA905F42}" sibTransId="{42FAF69B-DD6C-4C4C-A008-7959F807FCD6}"/>
     <dgm:cxn modelId="{08D37855-A906-4ED9-B03D-BFDBE60EF8C7}" srcId="{6B0EF60D-A0B1-46C5-9677-4BEA810977D2}" destId="{FCB9211A-ECAF-4092-9AF3-4A80464FEEEF}" srcOrd="0" destOrd="0" parTransId="{96E2E2CF-28EB-47BD-B8D8-43FB5B4BBC76}" sibTransId="{80A46D5D-E138-4619-973A-52836DB4B626}"/>
     <dgm:cxn modelId="{A993A3EF-AF47-4DBB-90D8-CF06FBF70E61}" srcId="{19EF64AF-D0D9-429E-86D3-4CE7A62D9930}" destId="{D4A5DE5E-27AD-4B23-B1EC-53CFB1739A11}" srcOrd="1" destOrd="0" parTransId="{C42F195C-72E6-4357-8789-A7DF85FC0BFF}" sibTransId="{D861C33F-DAAB-4018-91B9-D602CB0B9349}"/>
+    <dgm:cxn modelId="{2367FF4F-D248-4F58-A0D9-784D3549B7D2}" type="presOf" srcId="{F6CCDE68-20A3-48C9-9929-36D9326E50C7}" destId="{269C0782-BA35-4C3A-B295-D76ACD031E2B}" srcOrd="0" destOrd="0" presId="urn:microsoft.com/office/officeart/2011/layout/TabList"/>
     <dgm:cxn modelId="{42EE89B5-C132-45F6-89DF-FAA355D8AB66}" type="presOf" srcId="{84789903-61AF-4F8F-9430-490306DDBEA0}" destId="{8937854E-C94A-470E-AB4D-2D1BF4D6EC0A}" srcOrd="0" destOrd="0" presId="urn:microsoft.com/office/officeart/2011/layout/TabList"/>
-    <dgm:cxn modelId="{2367FF4F-D248-4F58-A0D9-784D3549B7D2}" type="presOf" srcId="{F6CCDE68-20A3-48C9-9929-36D9326E50C7}" destId="{269C0782-BA35-4C3A-B295-D76ACD031E2B}" srcOrd="0" destOrd="0" presId="urn:microsoft.com/office/officeart/2011/layout/TabList"/>
     <dgm:cxn modelId="{7D69F646-A998-4599-B542-8A82E0A16C62}" type="presOf" srcId="{07DB5E9F-F9E2-4866-A92E-0046A90428A8}" destId="{F2E5F12B-CEBA-404F-BC59-D0A75B115C1F}" srcOrd="0" destOrd="1" presId="urn:microsoft.com/office/officeart/2011/layout/TabList"/>
     <dgm:cxn modelId="{BC8D3C2F-C842-4AEF-9163-91FCF0A63C32}" srcId="{84789903-61AF-4F8F-9430-490306DDBEA0}" destId="{19EF64AF-D0D9-429E-86D3-4CE7A62D9930}" srcOrd="0" destOrd="0" parTransId="{65F72764-603C-4BEA-9757-C2D922CDE6E7}" sibTransId="{A59A006A-971D-4A33-AB31-4CEE6264B4C5}"/>
     <dgm:cxn modelId="{D1EABC93-08A9-4A6F-84B0-B428BA9969D7}" type="presOf" srcId="{D4A5DE5E-27AD-4B23-B1EC-53CFB1739A11}" destId="{2874E84B-9605-494F-B813-85A702BFCF0F}" srcOrd="0" destOrd="0" presId="urn:microsoft.com/office/officeart/2011/layout/TabList"/>
@@ -3417,14 +3450,14 @@
     <dgm:cxn modelId="{272F4F47-B6F0-44E6-BE53-1E568010F73F}" srcId="{6B0EF60D-A0B1-46C5-9677-4BEA810977D2}" destId="{432382F3-03DD-4963-A6A5-C32D1C07F990}" srcOrd="1" destOrd="0" parTransId="{428261C4-B743-4CC1-8298-2B59764B7274}" sibTransId="{19522E25-3C1D-4596-9D61-BE8AA7854562}"/>
     <dgm:cxn modelId="{6AEA36B3-723E-4C26-991B-32293EC4977D}" srcId="{DCB77698-D8A7-43AE-8C12-88D22546D4E0}" destId="{F6CCDE68-20A3-48C9-9929-36D9326E50C7}" srcOrd="1" destOrd="0" parTransId="{6D777BDB-A14B-4CB9-848E-609F2B89797D}" sibTransId="{E73E6EC1-A77B-4806-AF59-F300788A17A6}"/>
     <dgm:cxn modelId="{6FBD327E-F3DD-4D5F-892E-365E295EB833}" type="presOf" srcId="{DCB77698-D8A7-43AE-8C12-88D22546D4E0}" destId="{9059B661-BA02-491A-9141-4597C2088440}" srcOrd="0" destOrd="0" presId="urn:microsoft.com/office/officeart/2011/layout/TabList"/>
+    <dgm:cxn modelId="{A9F942E9-1197-421A-8955-236A83F08879}" type="presOf" srcId="{6B0EF60D-A0B1-46C5-9677-4BEA810977D2}" destId="{79569B4D-C26F-4F14-9A58-54D0240E4532}" srcOrd="0" destOrd="0" presId="urn:microsoft.com/office/officeart/2011/layout/TabList"/>
     <dgm:cxn modelId="{2896DAC6-E607-42B4-9D8E-740D71F49BEA}" srcId="{DCB77698-D8A7-43AE-8C12-88D22546D4E0}" destId="{54C77FC2-06D5-494F-88FF-639A9A2ADF2B}" srcOrd="0" destOrd="0" parTransId="{59058AE7-0BCA-42FD-8DA7-9E303C2F3598}" sibTransId="{DD5B0AF5-4F1F-4F54-9327-3F9C5FD2ADF5}"/>
-    <dgm:cxn modelId="{A9F942E9-1197-421A-8955-236A83F08879}" type="presOf" srcId="{6B0EF60D-A0B1-46C5-9677-4BEA810977D2}" destId="{79569B4D-C26F-4F14-9A58-54D0240E4532}" srcOrd="0" destOrd="0" presId="urn:microsoft.com/office/officeart/2011/layout/TabList"/>
     <dgm:cxn modelId="{64A82602-28B8-46E2-8A9C-588C292914B6}" type="presOf" srcId="{2F4105CE-F831-4489-A38E-EA308F965E1A}" destId="{8DF5D93B-DC31-4D2E-91E9-BD58313DDF36}" srcOrd="0" destOrd="0" presId="urn:microsoft.com/office/officeart/2011/layout/TabList"/>
+    <dgm:cxn modelId="{EA29C83E-1DCA-4FBB-975D-0E40E46D2194}" type="presOf" srcId="{432382F3-03DD-4963-A6A5-C32D1C07F990}" destId="{F2E5F12B-CEBA-404F-BC59-D0A75B115C1F}" srcOrd="0" destOrd="0" presId="urn:microsoft.com/office/officeart/2011/layout/TabList"/>
     <dgm:cxn modelId="{C40B86E0-D802-4C2B-9B30-FF087E46B20A}" srcId="{2F4105CE-F831-4489-A38E-EA308F965E1A}" destId="{A990AE2A-665D-4A90-91E6-8CAE69B9C799}" srcOrd="1" destOrd="0" parTransId="{C4D8ABC1-84E3-45E5-AE1D-9D540D360E76}" sibTransId="{6B7AAB65-DFF8-472A-BB24-DFEC163070BA}"/>
-    <dgm:cxn modelId="{EA29C83E-1DCA-4FBB-975D-0E40E46D2194}" type="presOf" srcId="{432382F3-03DD-4963-A6A5-C32D1C07F990}" destId="{F2E5F12B-CEBA-404F-BC59-D0A75B115C1F}" srcOrd="0" destOrd="0" presId="urn:microsoft.com/office/officeart/2011/layout/TabList"/>
     <dgm:cxn modelId="{092A9CEB-5EFE-4BCC-90CE-2FB92ECEC62E}" srcId="{2F4105CE-F831-4489-A38E-EA308F965E1A}" destId="{C9FC25FD-4E5C-4A64-AFF0-7D16F6FBC7AA}" srcOrd="2" destOrd="0" parTransId="{F9793D06-E836-466C-83D6-58F72B9C8CB4}" sibTransId="{ED1FB57D-D2B1-48EC-8B8D-C19F6680A4CF}"/>
+    <dgm:cxn modelId="{D9904F38-9A5D-48F4-991F-91A4A57053FD}" type="presOf" srcId="{19EF64AF-D0D9-429E-86D3-4CE7A62D9930}" destId="{B06197F1-B041-4747-A702-99E72A52C66D}" srcOrd="0" destOrd="0" presId="urn:microsoft.com/office/officeart/2011/layout/TabList"/>
     <dgm:cxn modelId="{2694D95A-2CBA-4FD2-B966-932CA25C4405}" srcId="{6B0EF60D-A0B1-46C5-9677-4BEA810977D2}" destId="{07DB5E9F-F9E2-4866-A92E-0046A90428A8}" srcOrd="2" destOrd="0" parTransId="{5F3A5809-A99D-4946-9529-2713AD09E5EA}" sibTransId="{9CAE03CD-36E6-4523-A376-CDA7F2B72A17}"/>
-    <dgm:cxn modelId="{D9904F38-9A5D-48F4-991F-91A4A57053FD}" type="presOf" srcId="{19EF64AF-D0D9-429E-86D3-4CE7A62D9930}" destId="{B06197F1-B041-4747-A702-99E72A52C66D}" srcOrd="0" destOrd="0" presId="urn:microsoft.com/office/officeart/2011/layout/TabList"/>
     <dgm:cxn modelId="{2F47F51D-5D99-460D-A41A-7BA1B38FCB61}" type="presParOf" srcId="{8937854E-C94A-470E-AB4D-2D1BF4D6EC0A}" destId="{63CF07DF-294E-4215-9B6C-5C3BCCC45688}" srcOrd="0" destOrd="0" presId="urn:microsoft.com/office/officeart/2011/layout/TabList"/>
     <dgm:cxn modelId="{01393574-0C7D-4580-B867-B93CADED6C7E}" type="presParOf" srcId="{63CF07DF-294E-4215-9B6C-5C3BCCC45688}" destId="{F82F5449-D542-4810-B467-43A5C2614DD5}" srcOrd="0" destOrd="0" presId="urn:microsoft.com/office/officeart/2011/layout/TabList"/>
     <dgm:cxn modelId="{2A2C2DA9-9F74-4E94-9167-80C01FF3DC10}" type="presParOf" srcId="{63CF07DF-294E-4215-9B6C-5C3BCCC45688}" destId="{B06197F1-B041-4747-A702-99E72A52C66D}" srcOrd="1" destOrd="0" presId="urn:microsoft.com/office/officeart/2011/layout/TabList"/>
@@ -3663,12 +3696,12 @@
         <a:fontRef idx="minor"/>
       </dsp:style>
       <dsp:txBody>
-        <a:bodyPr spcFirstLastPara="0" vert="horz" wrap="square" lIns="17145" tIns="17145" rIns="17145" bIns="17145" numCol="1" spcCol="1270" anchor="b" anchorCtr="0">
+        <a:bodyPr spcFirstLastPara="0" vert="horz" wrap="square" lIns="19050" tIns="19050" rIns="19050" bIns="19050" numCol="1" spcCol="1270" anchor="b" anchorCtr="0">
           <a:noAutofit/>
         </a:bodyPr>
         <a:lstStyle/>
         <a:p>
-          <a:pPr lvl="0" algn="l" defTabSz="400050">
+          <a:pPr lvl="0" algn="l" defTabSz="444500">
             <a:lnSpc>
               <a:spcPct val="90000"/>
             </a:lnSpc>
@@ -3680,10 +3713,10 @@
             </a:spcAft>
           </a:pPr>
           <a:r>
-            <a:rPr lang="en-US" sz="900" kern="1200" dirty="0" smtClean="0"/>
+            <a:rPr lang="en-US" sz="1000" kern="1200" dirty="0" smtClean="0"/>
             <a:t>America’s enemies will take advantage of this situation and eradicate our way of life.</a:t>
           </a:r>
-          <a:endParaRPr lang="en-US" sz="900" kern="1200" dirty="0"/>
+          <a:endParaRPr lang="en-US" sz="1000" kern="1200" dirty="0"/>
         </a:p>
       </dsp:txBody>
       <dsp:txXfrm>
@@ -3761,9 +3794,13 @@
           </a:pPr>
           <a:r>
             <a:rPr lang="en-US" sz="900" kern="1200" dirty="0" smtClean="0"/>
-            <a:t>Mob at the Gates</a:t>
+            <a:t>Mob at </a:t>
           </a:r>
-          <a:endParaRPr lang="en-US" sz="900" kern="1200" dirty="0"/>
+          <a:r>
+            <a:rPr lang="en-US" sz="1000" kern="1200" dirty="0" smtClean="0"/>
+            <a:t>the Gates</a:t>
+          </a:r>
+          <a:endParaRPr lang="en-US" sz="1000" kern="1200" dirty="0"/>
         </a:p>
       </dsp:txBody>
       <dsp:txXfrm>
@@ -3803,12 +3840,12 @@
         <a:fontRef idx="minor"/>
       </dsp:style>
       <dsp:txBody>
-        <a:bodyPr spcFirstLastPara="0" vert="horz" wrap="square" lIns="17145" tIns="17145" rIns="17145" bIns="17145" numCol="1" spcCol="1270" anchor="t" anchorCtr="0">
+        <a:bodyPr spcFirstLastPara="0" vert="horz" wrap="square" lIns="19050" tIns="19050" rIns="19050" bIns="19050" numCol="1" spcCol="1270" anchor="t" anchorCtr="0">
           <a:noAutofit/>
         </a:bodyPr>
         <a:lstStyle/>
         <a:p>
-          <a:pPr marL="57150" lvl="1" indent="-57150" algn="l" defTabSz="400050">
+          <a:pPr marL="57150" lvl="1" indent="-57150" algn="l" defTabSz="444500">
             <a:lnSpc>
               <a:spcPct val="90000"/>
             </a:lnSpc>
@@ -3821,13 +3858,13 @@
             <a:buChar char="••"/>
           </a:pPr>
           <a:r>
-            <a:rPr lang="en-US" sz="900" kern="1200" dirty="0" smtClean="0"/>
+            <a:rPr lang="en-US" sz="1000" kern="1200" dirty="0" smtClean="0"/>
             <a:t>Stakeholder</a:t>
           </a:r>
-          <a:endParaRPr lang="en-US" sz="900" kern="1200" dirty="0"/>
+          <a:endParaRPr lang="en-US" sz="1000" kern="1200" dirty="0"/>
         </a:p>
         <a:p>
-          <a:pPr marL="57150" lvl="1" indent="-57150" algn="l" defTabSz="400050">
+          <a:pPr marL="57150" lvl="1" indent="-57150" algn="l" defTabSz="444500">
             <a:lnSpc>
               <a:spcPct val="90000"/>
             </a:lnSpc>
@@ -3840,10 +3877,10 @@
             <a:buChar char="••"/>
           </a:pPr>
           <a:r>
-            <a:rPr lang="en-US" sz="900" kern="1200" dirty="0" smtClean="0"/>
+            <a:rPr lang="en-US" sz="1000" kern="1200" dirty="0" smtClean="0"/>
             <a:t>Stakeholder</a:t>
           </a:r>
-          <a:endParaRPr lang="en-US" sz="900" kern="1200" dirty="0"/>
+          <a:endParaRPr lang="en-US" sz="1000" kern="1200" dirty="0"/>
         </a:p>
       </dsp:txBody>
       <dsp:txXfrm>
@@ -3883,12 +3920,12 @@
         <a:fontRef idx="minor"/>
       </dsp:style>
       <dsp:txBody>
-        <a:bodyPr spcFirstLastPara="0" vert="horz" wrap="square" lIns="17145" tIns="17145" rIns="17145" bIns="17145" numCol="1" spcCol="1270" anchor="b" anchorCtr="0">
+        <a:bodyPr spcFirstLastPara="0" vert="horz" wrap="square" lIns="19050" tIns="19050" rIns="19050" bIns="19050" numCol="1" spcCol="1270" anchor="b" anchorCtr="0">
           <a:noAutofit/>
         </a:bodyPr>
         <a:lstStyle/>
         <a:p>
-          <a:pPr lvl="0" algn="l" defTabSz="400050">
+          <a:pPr lvl="0" algn="l" defTabSz="444500">
             <a:lnSpc>
               <a:spcPct val="90000"/>
             </a:lnSpc>
@@ -3900,10 +3937,10 @@
             </a:spcAft>
           </a:pPr>
           <a:r>
-            <a:rPr lang="en-US" sz="900" kern="1200" dirty="0" smtClean="0"/>
+            <a:rPr lang="en-US" sz="1000" kern="1200" dirty="0" smtClean="0"/>
             <a:t>Contract specialists are  making things as easy as possible for themselves by discriminating against small businesses.</a:t>
           </a:r>
-          <a:endParaRPr lang="en-US" sz="900" kern="1200" dirty="0"/>
+          <a:endParaRPr lang="en-US" sz="1000" kern="1200" dirty="0"/>
         </a:p>
       </dsp:txBody>
       <dsp:txXfrm>
@@ -3963,12 +4000,12 @@
         </a:fontRef>
       </dsp:style>
       <dsp:txBody>
-        <a:bodyPr spcFirstLastPara="0" vert="horz" wrap="square" lIns="17145" tIns="17145" rIns="17145" bIns="17145" numCol="1" spcCol="1270" anchor="ctr" anchorCtr="0">
+        <a:bodyPr spcFirstLastPara="0" vert="horz" wrap="square" lIns="19050" tIns="19050" rIns="19050" bIns="19050" numCol="1" spcCol="1270" anchor="ctr" anchorCtr="0">
           <a:noAutofit/>
         </a:bodyPr>
         <a:lstStyle/>
         <a:p>
-          <a:pPr lvl="0" algn="ctr" defTabSz="400050">
+          <a:pPr lvl="0" algn="ctr" defTabSz="444500">
             <a:lnSpc>
               <a:spcPct val="90000"/>
             </a:lnSpc>
@@ -3980,10 +4017,10 @@
             </a:spcAft>
           </a:pPr>
           <a:r>
-            <a:rPr lang="en-US" sz="900" kern="1200" dirty="0" smtClean="0"/>
+            <a:rPr lang="en-US" sz="1000" kern="1200" dirty="0" smtClean="0"/>
             <a:t>Rot at the Top</a:t>
           </a:r>
-          <a:endParaRPr lang="en-US" sz="900" kern="1200" dirty="0"/>
+          <a:endParaRPr lang="en-US" sz="1000" kern="1200" dirty="0"/>
         </a:p>
       </dsp:txBody>
       <dsp:txXfrm>
@@ -4023,12 +4060,12 @@
         <a:fontRef idx="minor"/>
       </dsp:style>
       <dsp:txBody>
-        <a:bodyPr spcFirstLastPara="0" vert="horz" wrap="square" lIns="17145" tIns="17145" rIns="17145" bIns="17145" numCol="1" spcCol="1270" anchor="t" anchorCtr="0">
+        <a:bodyPr spcFirstLastPara="0" vert="horz" wrap="square" lIns="19050" tIns="19050" rIns="19050" bIns="19050" numCol="1" spcCol="1270" anchor="t" anchorCtr="0">
           <a:noAutofit/>
         </a:bodyPr>
         <a:lstStyle/>
         <a:p>
-          <a:pPr marL="57150" lvl="1" indent="-57150" algn="l" defTabSz="400050">
+          <a:pPr marL="57150" lvl="1" indent="-57150" algn="l" defTabSz="444500">
             <a:lnSpc>
               <a:spcPct val="90000"/>
             </a:lnSpc>
@@ -4041,13 +4078,13 @@
             <a:buChar char="••"/>
           </a:pPr>
           <a:r>
-            <a:rPr lang="en-US" sz="900" kern="1200" dirty="0" smtClean="0"/>
+            <a:rPr lang="en-US" sz="1000" kern="1200" dirty="0" smtClean="0"/>
             <a:t>Small business owners</a:t>
           </a:r>
-          <a:endParaRPr lang="en-US" sz="900" kern="1200" dirty="0"/>
+          <a:endParaRPr lang="en-US" sz="1000" kern="1200" dirty="0"/>
         </a:p>
         <a:p>
-          <a:pPr marL="57150" lvl="1" indent="-57150" algn="l" defTabSz="400050">
+          <a:pPr marL="57150" lvl="1" indent="-57150" algn="l" defTabSz="444500">
             <a:lnSpc>
               <a:spcPct val="90000"/>
             </a:lnSpc>
@@ -4060,10 +4097,10 @@
             <a:buChar char="••"/>
           </a:pPr>
           <a:r>
-            <a:rPr lang="en-US" sz="900" kern="1200" dirty="0" smtClean="0"/>
+            <a:rPr lang="en-US" sz="1000" kern="1200" dirty="0" smtClean="0"/>
             <a:t>Stakeholder</a:t>
           </a:r>
-          <a:endParaRPr lang="en-US" sz="900" kern="1200" dirty="0"/>
+          <a:endParaRPr lang="en-US" sz="1000" kern="1200" dirty="0"/>
         </a:p>
       </dsp:txBody>
       <dsp:txXfrm>
@@ -4103,12 +4140,12 @@
         <a:fontRef idx="minor"/>
       </dsp:style>
       <dsp:txBody>
-        <a:bodyPr spcFirstLastPara="0" vert="horz" wrap="square" lIns="17145" tIns="17145" rIns="17145" bIns="17145" numCol="1" spcCol="1270" anchor="b" anchorCtr="0">
+        <a:bodyPr spcFirstLastPara="0" vert="horz" wrap="square" lIns="19050" tIns="19050" rIns="19050" bIns="19050" numCol="1" spcCol="1270" anchor="b" anchorCtr="0">
           <a:noAutofit/>
         </a:bodyPr>
         <a:lstStyle/>
         <a:p>
-          <a:pPr lvl="0" algn="l" defTabSz="400050">
+          <a:pPr lvl="0" algn="l" defTabSz="444500">
             <a:lnSpc>
               <a:spcPct val="90000"/>
             </a:lnSpc>
@@ -4120,10 +4157,10 @@
             </a:spcAft>
           </a:pPr>
           <a:r>
-            <a:rPr lang="en-US" sz="900" kern="1200" dirty="0" smtClean="0"/>
+            <a:rPr lang="en-US" sz="1000" kern="1200" dirty="0" smtClean="0"/>
             <a:t>America used to have a growing economy and unquestioned global dominance.</a:t>
           </a:r>
-          <a:endParaRPr lang="en-US" sz="900" kern="1200" dirty="0"/>
+          <a:endParaRPr lang="en-US" sz="1000" kern="1200" dirty="0"/>
         </a:p>
       </dsp:txBody>
       <dsp:txXfrm>
@@ -4183,12 +4220,12 @@
         </a:fontRef>
       </dsp:style>
       <dsp:txBody>
-        <a:bodyPr spcFirstLastPara="0" vert="horz" wrap="square" lIns="17145" tIns="17145" rIns="17145" bIns="17145" numCol="1" spcCol="1270" anchor="ctr" anchorCtr="0">
+        <a:bodyPr spcFirstLastPara="0" vert="horz" wrap="square" lIns="19050" tIns="19050" rIns="19050" bIns="19050" numCol="1" spcCol="1270" anchor="ctr" anchorCtr="0">
           <a:noAutofit/>
         </a:bodyPr>
         <a:lstStyle/>
         <a:p>
-          <a:pPr lvl="0" algn="ctr" defTabSz="400050">
+          <a:pPr lvl="0" algn="ctr" defTabSz="444500">
             <a:lnSpc>
               <a:spcPct val="90000"/>
             </a:lnSpc>
@@ -4200,10 +4237,10 @@
             </a:spcAft>
           </a:pPr>
           <a:r>
-            <a:rPr lang="en-US" sz="900" kern="1200" dirty="0" smtClean="0"/>
+            <a:rPr lang="en-US" sz="1000" kern="1200" dirty="0" smtClean="0"/>
             <a:t>Change Narrative</a:t>
           </a:r>
-          <a:endParaRPr lang="en-US" sz="900" kern="1200" dirty="0"/>
+          <a:endParaRPr lang="en-US" sz="1000" kern="1200" dirty="0"/>
         </a:p>
       </dsp:txBody>
       <dsp:txXfrm>
@@ -4243,12 +4280,12 @@
         <a:fontRef idx="minor"/>
       </dsp:style>
       <dsp:txBody>
-        <a:bodyPr spcFirstLastPara="0" vert="horz" wrap="square" lIns="17145" tIns="17145" rIns="17145" bIns="17145" numCol="1" spcCol="1270" anchor="t" anchorCtr="0">
+        <a:bodyPr spcFirstLastPara="0" vert="horz" wrap="square" lIns="19050" tIns="19050" rIns="19050" bIns="19050" numCol="1" spcCol="1270" anchor="t" anchorCtr="0">
           <a:noAutofit/>
         </a:bodyPr>
         <a:lstStyle/>
         <a:p>
-          <a:pPr marL="57150" lvl="1" indent="-57150" algn="l" defTabSz="400050">
+          <a:pPr marL="57150" lvl="1" indent="-57150" algn="l" defTabSz="444500">
             <a:lnSpc>
               <a:spcPct val="90000"/>
             </a:lnSpc>
@@ -4261,13 +4298,13 @@
             <a:buChar char="••"/>
           </a:pPr>
           <a:r>
-            <a:rPr lang="en-US" sz="900" kern="1200" dirty="0" smtClean="0"/>
+            <a:rPr lang="en-US" sz="1000" kern="1200" dirty="0" smtClean="0"/>
             <a:t>Small business owners</a:t>
           </a:r>
-          <a:endParaRPr lang="en-US" sz="900" kern="1200" dirty="0"/>
+          <a:endParaRPr lang="en-US" sz="1000" kern="1200" dirty="0"/>
         </a:p>
         <a:p>
-          <a:pPr marL="57150" lvl="1" indent="-57150" algn="l" defTabSz="400050">
+          <a:pPr marL="57150" lvl="1" indent="-57150" algn="l" defTabSz="444500">
             <a:lnSpc>
               <a:spcPct val="90000"/>
             </a:lnSpc>
@@ -4280,10 +4317,10 @@
             <a:buChar char="••"/>
           </a:pPr>
           <a:r>
-            <a:rPr lang="en-US" sz="900" kern="1200" dirty="0" smtClean="0"/>
+            <a:rPr lang="en-US" sz="1000" kern="1200" dirty="0" smtClean="0"/>
             <a:t>Stakeholder</a:t>
           </a:r>
-          <a:endParaRPr lang="en-US" sz="900" kern="1200" dirty="0"/>
+          <a:endParaRPr lang="en-US" sz="1000" kern="1200" dirty="0"/>
         </a:p>
       </dsp:txBody>
       <dsp:txXfrm>
@@ -4323,12 +4360,12 @@
         <a:fontRef idx="minor"/>
       </dsp:style>
       <dsp:txBody>
-        <a:bodyPr spcFirstLastPara="0" vert="horz" wrap="square" lIns="17145" tIns="17145" rIns="17145" bIns="17145" numCol="1" spcCol="1270" anchor="b" anchorCtr="0">
+        <a:bodyPr spcFirstLastPara="0" vert="horz" wrap="square" lIns="19050" tIns="19050" rIns="19050" bIns="19050" numCol="1" spcCol="1270" anchor="b" anchorCtr="0">
           <a:noAutofit/>
         </a:bodyPr>
         <a:lstStyle/>
         <a:p>
-          <a:pPr lvl="0" algn="l" defTabSz="400050">
+          <a:pPr lvl="0" algn="l" defTabSz="444500">
             <a:lnSpc>
               <a:spcPct val="90000"/>
             </a:lnSpc>
@@ -4340,10 +4377,10 @@
             </a:spcAft>
           </a:pPr>
           <a:r>
-            <a:rPr lang="en-US" sz="900" kern="1200" dirty="0" smtClean="0"/>
+            <a:rPr lang="en-US" sz="1000" kern="1200" dirty="0" smtClean="0"/>
             <a:t>Small businesses are much more efficient innovators than large businesses.</a:t>
           </a:r>
-          <a:endParaRPr lang="en-US" sz="900" kern="1200" dirty="0"/>
+          <a:endParaRPr lang="en-US" sz="1000" kern="1200" dirty="0"/>
         </a:p>
       </dsp:txBody>
       <dsp:txXfrm>
@@ -4403,12 +4440,12 @@
         </a:fontRef>
       </dsp:style>
       <dsp:txBody>
-        <a:bodyPr spcFirstLastPara="0" vert="horz" wrap="square" lIns="17145" tIns="17145" rIns="17145" bIns="17145" numCol="1" spcCol="1270" anchor="ctr" anchorCtr="0">
+        <a:bodyPr spcFirstLastPara="0" vert="horz" wrap="square" lIns="19050" tIns="19050" rIns="19050" bIns="19050" numCol="1" spcCol="1270" anchor="ctr" anchorCtr="0">
           <a:noAutofit/>
         </a:bodyPr>
         <a:lstStyle/>
         <a:p>
-          <a:pPr lvl="0" algn="ctr" defTabSz="400050">
+          <a:pPr lvl="0" algn="ctr" defTabSz="444500">
             <a:lnSpc>
               <a:spcPct val="90000"/>
             </a:lnSpc>
@@ -4420,10 +4457,10 @@
             </a:spcAft>
           </a:pPr>
           <a:r>
-            <a:rPr lang="en-US" sz="900" kern="1200" dirty="0" smtClean="0"/>
+            <a:rPr lang="en-US" sz="1000" kern="1200" dirty="0" smtClean="0"/>
             <a:t>Efficiency Narrative</a:t>
           </a:r>
-          <a:endParaRPr lang="en-US" sz="900" kern="1200" dirty="0"/>
+          <a:endParaRPr lang="en-US" sz="1000" kern="1200" dirty="0"/>
         </a:p>
       </dsp:txBody>
       <dsp:txXfrm>
@@ -4463,12 +4500,12 @@
         <a:fontRef idx="minor"/>
       </dsp:style>
       <dsp:txBody>
-        <a:bodyPr spcFirstLastPara="0" vert="horz" wrap="square" lIns="17145" tIns="17145" rIns="17145" bIns="17145" numCol="1" spcCol="1270" anchor="t" anchorCtr="0">
+        <a:bodyPr spcFirstLastPara="0" vert="horz" wrap="square" lIns="19050" tIns="19050" rIns="19050" bIns="19050" numCol="1" spcCol="1270" anchor="t" anchorCtr="0">
           <a:noAutofit/>
         </a:bodyPr>
         <a:lstStyle/>
         <a:p>
-          <a:pPr marL="57150" lvl="1" indent="-57150" algn="l" defTabSz="400050">
+          <a:pPr marL="57150" lvl="1" indent="-57150" algn="l" defTabSz="444500">
             <a:lnSpc>
               <a:spcPct val="90000"/>
             </a:lnSpc>
@@ -4481,13 +4518,13 @@
             <a:buChar char="••"/>
           </a:pPr>
           <a:r>
-            <a:rPr lang="en-US" sz="900" kern="1200" dirty="0" smtClean="0"/>
+            <a:rPr lang="en-US" sz="1000" kern="1200" dirty="0" smtClean="0"/>
             <a:t>Small business owners</a:t>
           </a:r>
-          <a:endParaRPr lang="en-US" sz="900" kern="1200" dirty="0"/>
+          <a:endParaRPr lang="en-US" sz="1000" kern="1200" dirty="0"/>
         </a:p>
         <a:p>
-          <a:pPr marL="57150" lvl="1" indent="-57150" algn="l" defTabSz="400050">
+          <a:pPr marL="57150" lvl="1" indent="-57150" algn="l" defTabSz="444500">
             <a:lnSpc>
               <a:spcPct val="90000"/>
             </a:lnSpc>
@@ -4500,10 +4537,10 @@
             <a:buChar char="••"/>
           </a:pPr>
           <a:r>
-            <a:rPr lang="en-US" sz="900" kern="1200" dirty="0" smtClean="0"/>
+            <a:rPr lang="en-US" sz="1000" kern="1200" dirty="0" smtClean="0"/>
             <a:t>Stakeholder</a:t>
           </a:r>
-          <a:endParaRPr lang="en-US" sz="900" kern="1200" dirty="0"/>
+          <a:endParaRPr lang="en-US" sz="1000" kern="1200" dirty="0"/>
         </a:p>
       </dsp:txBody>
       <dsp:txXfrm>
@@ -4719,12 +4756,12 @@
         <a:fontRef idx="minor"/>
       </dsp:style>
       <dsp:txBody>
-        <a:bodyPr spcFirstLastPara="0" vert="horz" wrap="square" lIns="17145" tIns="17145" rIns="17145" bIns="17145" numCol="1" spcCol="1270" anchor="b" anchorCtr="0">
+        <a:bodyPr spcFirstLastPara="0" vert="horz" wrap="square" lIns="19050" tIns="19050" rIns="19050" bIns="19050" numCol="1" spcCol="1270" anchor="b" anchorCtr="0">
           <a:noAutofit/>
         </a:bodyPr>
         <a:lstStyle/>
         <a:p>
-          <a:pPr lvl="0" algn="l" defTabSz="400050">
+          <a:pPr lvl="0" algn="l" defTabSz="444500">
             <a:lnSpc>
               <a:spcPct val="90000"/>
             </a:lnSpc>
@@ -4736,10 +4773,10 @@
             </a:spcAft>
           </a:pPr>
           <a:r>
-            <a:rPr lang="en-US" sz="900" kern="1200" dirty="0" smtClean="0"/>
+            <a:rPr lang="en-US" sz="1000" kern="1200" dirty="0" smtClean="0"/>
             <a:t>America is guided by the aspirational principle of treating everyone fairly and not showing favoritism to any one group over other groups.</a:t>
           </a:r>
-          <a:endParaRPr lang="en-US" sz="900" kern="1200" dirty="0"/>
+          <a:endParaRPr lang="en-US" sz="1000" kern="1200" dirty="0"/>
         </a:p>
       </dsp:txBody>
       <dsp:txXfrm>
@@ -4799,12 +4836,12 @@
         </a:fontRef>
       </dsp:style>
       <dsp:txBody>
-        <a:bodyPr spcFirstLastPara="0" vert="horz" wrap="square" lIns="17145" tIns="17145" rIns="17145" bIns="17145" numCol="1" spcCol="1270" anchor="ctr" anchorCtr="0">
+        <a:bodyPr spcFirstLastPara="0" vert="horz" wrap="square" lIns="19050" tIns="19050" rIns="19050" bIns="19050" numCol="1" spcCol="1270" anchor="ctr" anchorCtr="0">
           <a:noAutofit/>
         </a:bodyPr>
         <a:lstStyle/>
         <a:p>
-          <a:pPr lvl="0" algn="ctr" defTabSz="400050">
+          <a:pPr lvl="0" algn="ctr" defTabSz="444500">
             <a:lnSpc>
               <a:spcPct val="90000"/>
             </a:lnSpc>
@@ -4816,10 +4853,10 @@
             </a:spcAft>
           </a:pPr>
           <a:r>
-            <a:rPr lang="en-US" sz="900" kern="1200" dirty="0" smtClean="0"/>
+            <a:rPr lang="en-US" sz="1000" kern="1200" dirty="0" smtClean="0"/>
             <a:t>Benevolent Community</a:t>
           </a:r>
-          <a:endParaRPr lang="en-US" sz="900" kern="1200" dirty="0"/>
+          <a:endParaRPr lang="en-US" sz="1000" kern="1200" dirty="0"/>
         </a:p>
       </dsp:txBody>
       <dsp:txXfrm>
@@ -4859,12 +4896,12 @@
         <a:fontRef idx="minor"/>
       </dsp:style>
       <dsp:txBody>
-        <a:bodyPr spcFirstLastPara="0" vert="horz" wrap="square" lIns="17145" tIns="17145" rIns="17145" bIns="17145" numCol="1" spcCol="1270" anchor="t" anchorCtr="0">
+        <a:bodyPr spcFirstLastPara="0" vert="horz" wrap="square" lIns="19050" tIns="19050" rIns="19050" bIns="19050" numCol="1" spcCol="1270" anchor="t" anchorCtr="0">
           <a:noAutofit/>
         </a:bodyPr>
         <a:lstStyle/>
         <a:p>
-          <a:pPr marL="57150" lvl="1" indent="-57150" algn="l" defTabSz="400050">
+          <a:pPr marL="57150" lvl="1" indent="-57150" algn="l" defTabSz="444500">
             <a:lnSpc>
               <a:spcPct val="90000"/>
             </a:lnSpc>
@@ -4877,13 +4914,13 @@
             <a:buChar char="••"/>
           </a:pPr>
           <a:r>
-            <a:rPr lang="en-US" sz="900" kern="1200" dirty="0" smtClean="0"/>
+            <a:rPr lang="en-US" sz="1000" kern="1200" dirty="0" smtClean="0"/>
             <a:t>Stakeholder</a:t>
           </a:r>
-          <a:endParaRPr lang="en-US" sz="900" kern="1200" dirty="0"/>
+          <a:endParaRPr lang="en-US" sz="1000" kern="1200" dirty="0"/>
         </a:p>
         <a:p>
-          <a:pPr marL="57150" lvl="1" indent="-57150" algn="l" defTabSz="400050">
+          <a:pPr marL="57150" lvl="1" indent="-57150" algn="l" defTabSz="444500">
             <a:lnSpc>
               <a:spcPct val="90000"/>
             </a:lnSpc>
@@ -4896,10 +4933,10 @@
             <a:buChar char="••"/>
           </a:pPr>
           <a:r>
-            <a:rPr lang="en-US" sz="900" kern="1200" dirty="0" smtClean="0"/>
+            <a:rPr lang="en-US" sz="1000" kern="1200" dirty="0" smtClean="0"/>
             <a:t>Stakeholder</a:t>
           </a:r>
-          <a:endParaRPr lang="en-US" sz="900" kern="1200" dirty="0"/>
+          <a:endParaRPr lang="en-US" sz="1000" kern="1200" dirty="0"/>
         </a:p>
       </dsp:txBody>
       <dsp:txXfrm>
@@ -4939,12 +4976,12 @@
         <a:fontRef idx="minor"/>
       </dsp:style>
       <dsp:txBody>
-        <a:bodyPr spcFirstLastPara="0" vert="horz" wrap="square" lIns="17145" tIns="17145" rIns="17145" bIns="17145" numCol="1" spcCol="1270" anchor="b" anchorCtr="0">
+        <a:bodyPr spcFirstLastPara="0" vert="horz" wrap="square" lIns="19050" tIns="19050" rIns="19050" bIns="19050" numCol="1" spcCol="1270" anchor="b" anchorCtr="0">
           <a:noAutofit/>
         </a:bodyPr>
         <a:lstStyle/>
         <a:p>
-          <a:pPr lvl="0" algn="l" defTabSz="400050">
+          <a:pPr lvl="0" algn="l" defTabSz="444500">
             <a:lnSpc>
               <a:spcPct val="90000"/>
             </a:lnSpc>
@@ -4956,10 +4993,10 @@
             </a:spcAft>
           </a:pPr>
           <a:r>
-            <a:rPr lang="en-US" sz="900" kern="1200" dirty="0" smtClean="0"/>
+            <a:rPr lang="en-US" sz="1000" kern="1200" dirty="0" smtClean="0"/>
             <a:t>This policy changes the selection process from a research excellence criteria to a privilege criteria.</a:t>
           </a:r>
-          <a:endParaRPr lang="en-US" sz="900" kern="1200" dirty="0"/>
+          <a:endParaRPr lang="en-US" sz="1000" kern="1200" dirty="0"/>
         </a:p>
       </dsp:txBody>
       <dsp:txXfrm>
@@ -5019,12 +5056,12 @@
         </a:fontRef>
       </dsp:style>
       <dsp:txBody>
-        <a:bodyPr spcFirstLastPara="0" vert="horz" wrap="square" lIns="17145" tIns="17145" rIns="17145" bIns="17145" numCol="1" spcCol="1270" anchor="ctr" anchorCtr="0">
+        <a:bodyPr spcFirstLastPara="0" vert="horz" wrap="square" lIns="19050" tIns="19050" rIns="19050" bIns="19050" numCol="1" spcCol="1270" anchor="ctr" anchorCtr="0">
           <a:noAutofit/>
         </a:bodyPr>
         <a:lstStyle/>
         <a:p>
-          <a:pPr lvl="0" algn="ctr" defTabSz="400050">
+          <a:pPr lvl="0" algn="ctr" defTabSz="444500">
             <a:lnSpc>
               <a:spcPct val="90000"/>
             </a:lnSpc>
@@ -5036,10 +5073,10 @@
             </a:spcAft>
           </a:pPr>
           <a:r>
-            <a:rPr lang="en-US" sz="900" kern="1200" dirty="0" smtClean="0"/>
+            <a:rPr lang="en-US" sz="1000" kern="1200" dirty="0" smtClean="0"/>
             <a:t>Change Narrative</a:t>
           </a:r>
-          <a:endParaRPr lang="en-US" sz="900" kern="1200" dirty="0"/>
+          <a:endParaRPr lang="en-US" sz="1000" kern="1200" dirty="0"/>
         </a:p>
       </dsp:txBody>
       <dsp:txXfrm>
@@ -5079,12 +5116,12 @@
         <a:fontRef idx="minor"/>
       </dsp:style>
       <dsp:txBody>
-        <a:bodyPr spcFirstLastPara="0" vert="horz" wrap="square" lIns="17145" tIns="17145" rIns="17145" bIns="17145" numCol="1" spcCol="1270" anchor="t" anchorCtr="0">
+        <a:bodyPr spcFirstLastPara="0" vert="horz" wrap="square" lIns="19050" tIns="19050" rIns="19050" bIns="19050" numCol="1" spcCol="1270" anchor="t" anchorCtr="0">
           <a:noAutofit/>
         </a:bodyPr>
         <a:lstStyle/>
         <a:p>
-          <a:pPr marL="57150" lvl="1" indent="-57150" algn="l" defTabSz="400050">
+          <a:pPr marL="57150" lvl="1" indent="-57150" algn="l" defTabSz="444500">
             <a:lnSpc>
               <a:spcPct val="90000"/>
             </a:lnSpc>
@@ -5097,13 +5134,13 @@
             <a:buChar char="••"/>
           </a:pPr>
           <a:r>
-            <a:rPr lang="en-US" sz="900" kern="1200" dirty="0" smtClean="0"/>
+            <a:rPr lang="en-US" sz="1000" kern="1200" dirty="0" smtClean="0"/>
             <a:t>Stakeholder</a:t>
           </a:r>
-          <a:endParaRPr lang="en-US" sz="900" kern="1200" dirty="0"/>
+          <a:endParaRPr lang="en-US" sz="1000" kern="1200" dirty="0"/>
         </a:p>
         <a:p>
-          <a:pPr marL="57150" lvl="1" indent="-57150" algn="l" defTabSz="400050">
+          <a:pPr marL="57150" lvl="1" indent="-57150" algn="l" defTabSz="444500">
             <a:lnSpc>
               <a:spcPct val="90000"/>
             </a:lnSpc>
@@ -5116,10 +5153,10 @@
             <a:buChar char="••"/>
           </a:pPr>
           <a:r>
-            <a:rPr lang="en-US" sz="900" kern="1200" dirty="0" smtClean="0"/>
+            <a:rPr lang="en-US" sz="1000" kern="1200" dirty="0" smtClean="0"/>
             <a:t>Stakeholder</a:t>
           </a:r>
-          <a:endParaRPr lang="en-US" sz="900" kern="1200" dirty="0"/>
+          <a:endParaRPr lang="en-US" sz="1000" kern="1200" dirty="0"/>
         </a:p>
       </dsp:txBody>
       <dsp:txXfrm>
@@ -5159,12 +5196,12 @@
         <a:fontRef idx="minor"/>
       </dsp:style>
       <dsp:txBody>
-        <a:bodyPr spcFirstLastPara="0" vert="horz" wrap="square" lIns="17145" tIns="17145" rIns="17145" bIns="17145" numCol="1" spcCol="1270" anchor="b" anchorCtr="0">
+        <a:bodyPr spcFirstLastPara="0" vert="horz" wrap="square" lIns="19050" tIns="19050" rIns="19050" bIns="19050" numCol="1" spcCol="1270" anchor="b" anchorCtr="0">
           <a:noAutofit/>
         </a:bodyPr>
         <a:lstStyle/>
         <a:p>
-          <a:pPr lvl="0" algn="l" defTabSz="400050">
+          <a:pPr lvl="0" algn="l" defTabSz="444500">
             <a:lnSpc>
               <a:spcPct val="90000"/>
             </a:lnSpc>
@@ -5176,10 +5213,10 @@
             </a:spcAft>
           </a:pPr>
           <a:r>
-            <a:rPr lang="en-US" sz="900" kern="1200" dirty="0" smtClean="0"/>
+            <a:rPr lang="en-US" sz="1000" kern="1200" dirty="0" smtClean="0"/>
             <a:t>This policy will take the nation on a path towards to sub-par research and development.</a:t>
           </a:r>
-          <a:endParaRPr lang="en-US" sz="900" kern="1200" dirty="0"/>
+          <a:endParaRPr lang="en-US" sz="1000" kern="1200" dirty="0"/>
         </a:p>
       </dsp:txBody>
       <dsp:txXfrm>
@@ -5239,12 +5276,12 @@
         </a:fontRef>
       </dsp:style>
       <dsp:txBody>
-        <a:bodyPr spcFirstLastPara="0" vert="horz" wrap="square" lIns="17145" tIns="17145" rIns="17145" bIns="17145" numCol="1" spcCol="1270" anchor="ctr" anchorCtr="0">
+        <a:bodyPr spcFirstLastPara="0" vert="horz" wrap="square" lIns="19050" tIns="19050" rIns="19050" bIns="19050" numCol="1" spcCol="1270" anchor="ctr" anchorCtr="0">
           <a:noAutofit/>
         </a:bodyPr>
         <a:lstStyle/>
         <a:p>
-          <a:pPr lvl="0" algn="ctr" defTabSz="400050">
+          <a:pPr lvl="0" algn="ctr" defTabSz="444500">
             <a:lnSpc>
               <a:spcPct val="90000"/>
             </a:lnSpc>
@@ -5256,10 +5293,10 @@
             </a:spcAft>
           </a:pPr>
           <a:r>
-            <a:rPr lang="en-US" sz="900" kern="1200" dirty="0" smtClean="0"/>
+            <a:rPr lang="en-US" sz="1000" kern="1200" dirty="0" smtClean="0"/>
             <a:t>Change Narrative</a:t>
           </a:r>
-          <a:endParaRPr lang="en-US" sz="900" kern="1200" dirty="0"/>
+          <a:endParaRPr lang="en-US" sz="1000" kern="1200" dirty="0"/>
         </a:p>
       </dsp:txBody>
       <dsp:txXfrm>
@@ -5299,12 +5336,12 @@
         <a:fontRef idx="minor"/>
       </dsp:style>
       <dsp:txBody>
-        <a:bodyPr spcFirstLastPara="0" vert="horz" wrap="square" lIns="17145" tIns="17145" rIns="17145" bIns="17145" numCol="1" spcCol="1270" anchor="t" anchorCtr="0">
+        <a:bodyPr spcFirstLastPara="0" vert="horz" wrap="square" lIns="19050" tIns="19050" rIns="19050" bIns="19050" numCol="1" spcCol="1270" anchor="t" anchorCtr="0">
           <a:noAutofit/>
         </a:bodyPr>
         <a:lstStyle/>
         <a:p>
-          <a:pPr marL="57150" lvl="1" indent="-57150" algn="l" defTabSz="400050">
+          <a:pPr marL="57150" lvl="1" indent="-57150" algn="l" defTabSz="444500">
             <a:lnSpc>
               <a:spcPct val="90000"/>
             </a:lnSpc>
@@ -5317,13 +5354,13 @@
             <a:buChar char="••"/>
           </a:pPr>
           <a:r>
-            <a:rPr lang="en-US" sz="900" kern="1200" dirty="0" smtClean="0"/>
+            <a:rPr lang="en-US" sz="1000" kern="1200" dirty="0" smtClean="0"/>
             <a:t>Stakeholder</a:t>
           </a:r>
-          <a:endParaRPr lang="en-US" sz="900" kern="1200" dirty="0"/>
+          <a:endParaRPr lang="en-US" sz="1000" kern="1200" dirty="0"/>
         </a:p>
         <a:p>
-          <a:pPr marL="57150" lvl="1" indent="-57150" algn="l" defTabSz="400050">
+          <a:pPr marL="57150" lvl="1" indent="-57150" algn="l" defTabSz="444500">
             <a:lnSpc>
               <a:spcPct val="90000"/>
             </a:lnSpc>
@@ -5336,10 +5373,10 @@
             <a:buChar char="••"/>
           </a:pPr>
           <a:r>
-            <a:rPr lang="en-US" sz="900" kern="1200" dirty="0" smtClean="0"/>
+            <a:rPr lang="en-US" sz="1000" kern="1200" dirty="0" smtClean="0"/>
             <a:t>Stakeholder</a:t>
           </a:r>
-          <a:endParaRPr lang="en-US" sz="900" kern="1200" dirty="0"/>
+          <a:endParaRPr lang="en-US" sz="1000" kern="1200" dirty="0"/>
         </a:p>
       </dsp:txBody>
       <dsp:txXfrm>
@@ -5379,12 +5416,12 @@
         <a:fontRef idx="minor"/>
       </dsp:style>
       <dsp:txBody>
-        <a:bodyPr spcFirstLastPara="0" vert="horz" wrap="square" lIns="17145" tIns="17145" rIns="17145" bIns="17145" numCol="1" spcCol="1270" anchor="b" anchorCtr="0">
+        <a:bodyPr spcFirstLastPara="0" vert="horz" wrap="square" lIns="19050" tIns="19050" rIns="19050" bIns="19050" numCol="1" spcCol="1270" anchor="b" anchorCtr="0">
           <a:noAutofit/>
         </a:bodyPr>
         <a:lstStyle/>
         <a:p>
-          <a:pPr lvl="0" algn="l" defTabSz="400050">
+          <a:pPr lvl="0" algn="l" defTabSz="444500">
             <a:lnSpc>
               <a:spcPct val="90000"/>
             </a:lnSpc>
@@ -5396,10 +5433,10 @@
             </a:spcAft>
           </a:pPr>
           <a:r>
-            <a:rPr lang="en-US" sz="900" kern="1200" dirty="0" smtClean="0"/>
+            <a:rPr lang="en-US" sz="1000" kern="1200" dirty="0" smtClean="0"/>
             <a:t>This policy will unfairly take away opportunities from highly talented and deserving researchers simply because of where they work.</a:t>
           </a:r>
-          <a:endParaRPr lang="en-US" sz="900" kern="1200" dirty="0"/>
+          <a:endParaRPr lang="en-US" sz="1000" kern="1200" dirty="0"/>
         </a:p>
       </dsp:txBody>
       <dsp:txXfrm>
@@ -5459,12 +5496,12 @@
         </a:fontRef>
       </dsp:style>
       <dsp:txBody>
-        <a:bodyPr spcFirstLastPara="0" vert="horz" wrap="square" lIns="17145" tIns="17145" rIns="17145" bIns="17145" numCol="1" spcCol="1270" anchor="ctr" anchorCtr="0">
+        <a:bodyPr spcFirstLastPara="0" vert="horz" wrap="square" lIns="19050" tIns="19050" rIns="19050" bIns="19050" numCol="1" spcCol="1270" anchor="ctr" anchorCtr="0">
           <a:noAutofit/>
         </a:bodyPr>
         <a:lstStyle/>
         <a:p>
-          <a:pPr lvl="0" algn="ctr" defTabSz="400050">
+          <a:pPr lvl="0" algn="ctr" defTabSz="444500">
             <a:lnSpc>
               <a:spcPct val="90000"/>
             </a:lnSpc>
@@ -5476,10 +5513,10 @@
             </a:spcAft>
           </a:pPr>
           <a:r>
-            <a:rPr lang="en-US" sz="900" kern="1200" dirty="0" smtClean="0"/>
+            <a:rPr lang="en-US" sz="1000" kern="1200" dirty="0" smtClean="0"/>
             <a:t>Equity Narrative</a:t>
           </a:r>
-          <a:endParaRPr lang="en-US" sz="900" kern="1200" dirty="0"/>
+          <a:endParaRPr lang="en-US" sz="1000" kern="1200" dirty="0"/>
         </a:p>
       </dsp:txBody>
       <dsp:txXfrm>
@@ -5519,12 +5556,12 @@
         <a:fontRef idx="minor"/>
       </dsp:style>
       <dsp:txBody>
-        <a:bodyPr spcFirstLastPara="0" vert="horz" wrap="square" lIns="17145" tIns="17145" rIns="17145" bIns="17145" numCol="1" spcCol="1270" anchor="t" anchorCtr="0">
+        <a:bodyPr spcFirstLastPara="0" vert="horz" wrap="square" lIns="19050" tIns="19050" rIns="19050" bIns="19050" numCol="1" spcCol="1270" anchor="t" anchorCtr="0">
           <a:noAutofit/>
         </a:bodyPr>
         <a:lstStyle/>
         <a:p>
-          <a:pPr marL="57150" lvl="1" indent="-57150" algn="l" defTabSz="400050">
+          <a:pPr marL="57150" lvl="1" indent="-57150" algn="l" defTabSz="444500">
             <a:lnSpc>
               <a:spcPct val="90000"/>
             </a:lnSpc>
@@ -5537,13 +5574,13 @@
             <a:buChar char="••"/>
           </a:pPr>
           <a:r>
-            <a:rPr lang="en-US" sz="900" kern="1200" dirty="0" smtClean="0"/>
+            <a:rPr lang="en-US" sz="1000" kern="1200" dirty="0" smtClean="0"/>
             <a:t>Stakeholder</a:t>
           </a:r>
-          <a:endParaRPr lang="en-US" sz="900" kern="1200" dirty="0"/>
+          <a:endParaRPr lang="en-US" sz="1000" kern="1200" dirty="0"/>
         </a:p>
         <a:p>
-          <a:pPr marL="57150" lvl="1" indent="-57150" algn="l" defTabSz="400050">
+          <a:pPr marL="57150" lvl="1" indent="-57150" algn="l" defTabSz="444500">
             <a:lnSpc>
               <a:spcPct val="90000"/>
             </a:lnSpc>
@@ -5556,10 +5593,10 @@
             <a:buChar char="••"/>
           </a:pPr>
           <a:r>
-            <a:rPr lang="en-US" sz="900" kern="1200" dirty="0" smtClean="0"/>
+            <a:rPr lang="en-US" sz="1000" kern="1200" dirty="0" smtClean="0"/>
             <a:t>Stakeholder</a:t>
           </a:r>
-          <a:endParaRPr lang="en-US" sz="900" kern="1200" dirty="0"/>
+          <a:endParaRPr lang="en-US" sz="1000" kern="1200" dirty="0"/>
         </a:p>
       </dsp:txBody>
       <dsp:txXfrm>
@@ -8436,7 +8473,7 @@
           <a:p>
             <a:fld id="{38350BF8-A4DA-458D-AEA8-6A7F2699BE48}" type="datetimeFigureOut">
               <a:rPr lang="en-US" smtClean="0"/>
-              <a:t>02/27/2019</a:t>
+              <a:t>02/28/2019</a:t>
             </a:fld>
             <a:endParaRPr lang="en-US"/>
           </a:p>
@@ -8606,7 +8643,7 @@
           <a:p>
             <a:fld id="{38350BF8-A4DA-458D-AEA8-6A7F2699BE48}" type="datetimeFigureOut">
               <a:rPr lang="en-US" smtClean="0"/>
-              <a:t>02/27/2019</a:t>
+              <a:t>02/28/2019</a:t>
             </a:fld>
             <a:endParaRPr lang="en-US"/>
           </a:p>
@@ -8786,7 +8823,7 @@
           <a:p>
             <a:fld id="{38350BF8-A4DA-458D-AEA8-6A7F2699BE48}" type="datetimeFigureOut">
               <a:rPr lang="en-US" smtClean="0"/>
-              <a:t>02/27/2019</a:t>
+              <a:t>02/28/2019</a:t>
             </a:fld>
             <a:endParaRPr lang="en-US"/>
           </a:p>
@@ -8956,7 +8993,7 @@
           <a:p>
             <a:fld id="{38350BF8-A4DA-458D-AEA8-6A7F2699BE48}" type="datetimeFigureOut">
               <a:rPr lang="en-US" smtClean="0"/>
-              <a:t>02/27/2019</a:t>
+              <a:t>02/28/2019</a:t>
             </a:fld>
             <a:endParaRPr lang="en-US"/>
           </a:p>
@@ -9202,7 +9239,7 @@
           <a:p>
             <a:fld id="{38350BF8-A4DA-458D-AEA8-6A7F2699BE48}" type="datetimeFigureOut">
               <a:rPr lang="en-US" smtClean="0"/>
-              <a:t>02/27/2019</a:t>
+              <a:t>02/28/2019</a:t>
             </a:fld>
             <a:endParaRPr lang="en-US"/>
           </a:p>
@@ -9490,7 +9527,7 @@
           <a:p>
             <a:fld id="{38350BF8-A4DA-458D-AEA8-6A7F2699BE48}" type="datetimeFigureOut">
               <a:rPr lang="en-US" smtClean="0"/>
-              <a:t>02/27/2019</a:t>
+              <a:t>02/28/2019</a:t>
             </a:fld>
             <a:endParaRPr lang="en-US"/>
           </a:p>
@@ -9912,7 +9949,7 @@
           <a:p>
             <a:fld id="{38350BF8-A4DA-458D-AEA8-6A7F2699BE48}" type="datetimeFigureOut">
               <a:rPr lang="en-US" smtClean="0"/>
-              <a:t>02/27/2019</a:t>
+              <a:t>02/28/2019</a:t>
             </a:fld>
             <a:endParaRPr lang="en-US"/>
           </a:p>
@@ -10030,7 +10067,7 @@
           <a:p>
             <a:fld id="{38350BF8-A4DA-458D-AEA8-6A7F2699BE48}" type="datetimeFigureOut">
               <a:rPr lang="en-US" smtClean="0"/>
-              <a:t>02/27/2019</a:t>
+              <a:t>02/28/2019</a:t>
             </a:fld>
             <a:endParaRPr lang="en-US"/>
           </a:p>
@@ -10125,7 +10162,7 @@
           <a:p>
             <a:fld id="{38350BF8-A4DA-458D-AEA8-6A7F2699BE48}" type="datetimeFigureOut">
               <a:rPr lang="en-US" smtClean="0"/>
-              <a:t>02/27/2019</a:t>
+              <a:t>02/28/2019</a:t>
             </a:fld>
             <a:endParaRPr lang="en-US"/>
           </a:p>
@@ -10402,7 +10439,7 @@
           <a:p>
             <a:fld id="{38350BF8-A4DA-458D-AEA8-6A7F2699BE48}" type="datetimeFigureOut">
               <a:rPr lang="en-US" smtClean="0"/>
-              <a:t>02/27/2019</a:t>
+              <a:t>02/28/2019</a:t>
             </a:fld>
             <a:endParaRPr lang="en-US"/>
           </a:p>
@@ -10655,7 +10692,7 @@
           <a:p>
             <a:fld id="{38350BF8-A4DA-458D-AEA8-6A7F2699BE48}" type="datetimeFigureOut">
               <a:rPr lang="en-US" smtClean="0"/>
-              <a:t>02/27/2019</a:t>
+              <a:t>02/28/2019</a:t>
             </a:fld>
             <a:endParaRPr lang="en-US"/>
           </a:p>
@@ -10868,7 +10905,7 @@
           <a:p>
             <a:fld id="{38350BF8-A4DA-458D-AEA8-6A7F2699BE48}" type="datetimeFigureOut">
               <a:rPr lang="en-US" smtClean="0"/>
-              <a:t>02/27/2019</a:t>
+              <a:t>02/28/2019</a:t>
             </a:fld>
             <a:endParaRPr lang="en-US"/>
           </a:p>
@@ -11654,11 +11691,7 @@
             <a:pPr algn="ctr"/>
             <a:r>
               <a:rPr lang="en-US" sz="1000" dirty="0" smtClean="0"/>
-              <a:t>Owners of s</a:t>
-            </a:r>
-            <a:r>
-              <a:rPr lang="en-US" sz="1000" dirty="0" smtClean="0"/>
-              <a:t>mall businesses (i.e.,</a:t>
+              <a:t>Owners of small businesses (i.e.,</a:t>
             </a:r>
           </a:p>
           <a:p>
@@ -11950,52 +11983,6 @@
               <a:t>Opponents</a:t>
             </a:r>
             <a:endParaRPr lang="en-US" i="1" u="sng" dirty="0"/>
-          </a:p>
-        </p:txBody>
-      </p:sp>
-      <p:sp>
-        <p:nvSpPr>
-          <p:cNvPr id="21" name="Up-Down Arrow 20"/>
-          <p:cNvSpPr/>
-          <p:nvPr/>
-        </p:nvSpPr>
-        <p:spPr>
-          <a:xfrm>
-            <a:off x="4518660" y="3052764"/>
-            <a:ext cx="137160" cy="274320"/>
-          </a:xfrm>
-          <a:prstGeom prst="upDownArrow">
-            <a:avLst/>
-          </a:prstGeom>
-          <a:solidFill>
-            <a:schemeClr val="tx1"/>
-          </a:solidFill>
-          <a:ln>
-            <a:noFill/>
-          </a:ln>
-        </p:spPr>
-        <p:style>
-          <a:lnRef idx="2">
-            <a:schemeClr val="accent1">
-              <a:shade val="50000"/>
-            </a:schemeClr>
-          </a:lnRef>
-          <a:fillRef idx="1">
-            <a:schemeClr val="accent1"/>
-          </a:fillRef>
-          <a:effectRef idx="0">
-            <a:schemeClr val="accent1"/>
-          </a:effectRef>
-          <a:fontRef idx="minor">
-            <a:schemeClr val="lt1"/>
-          </a:fontRef>
-        </p:style>
-        <p:txBody>
-          <a:bodyPr rtlCol="0" anchor="ctr"/>
-          <a:lstStyle/>
-          <a:p>
-            <a:pPr algn="ctr"/>
-            <a:endParaRPr lang="en-US"/>
           </a:p>
         </p:txBody>
       </p:sp>
@@ -12484,6 +12471,46 @@
           </a:p>
         </p:txBody>
       </p:sp>
+      <p:cxnSp>
+        <p:nvCxnSpPr>
+          <p:cNvPr id="3" name="Straight Arrow Connector 2"/>
+          <p:cNvCxnSpPr>
+            <a:stCxn id="7" idx="0"/>
+            <a:endCxn id="6" idx="4"/>
+          </p:cNvCxnSpPr>
+          <p:nvPr/>
+        </p:nvCxnSpPr>
+        <p:spPr>
+          <a:xfrm flipV="1">
+            <a:off x="4587240" y="3025140"/>
+            <a:ext cx="0" cy="347192"/>
+          </a:xfrm>
+          <a:prstGeom prst="straightConnector1">
+            <a:avLst/>
+          </a:prstGeom>
+          <a:ln w="44450">
+            <a:solidFill>
+              <a:schemeClr val="tx1"/>
+            </a:solidFill>
+            <a:headEnd type="triangle" w="med" len="med"/>
+            <a:tailEnd type="triangle" w="med" len="med"/>
+          </a:ln>
+        </p:spPr>
+        <p:style>
+          <a:lnRef idx="1">
+            <a:schemeClr val="accent1"/>
+          </a:lnRef>
+          <a:fillRef idx="0">
+            <a:schemeClr val="accent1"/>
+          </a:fillRef>
+          <a:effectRef idx="0">
+            <a:schemeClr val="accent1"/>
+          </a:effectRef>
+          <a:fontRef idx="minor">
+            <a:schemeClr val="tx1"/>
+          </a:fontRef>
+        </p:style>
+      </p:cxnSp>
     </p:spTree>
     <p:extLst>
       <p:ext uri="{BB962C8B-B14F-4D97-AF65-F5344CB8AC3E}">
@@ -12648,7 +12675,7 @@
           <p:nvPr>
             <p:extLst>
               <p:ext uri="{D42A27DB-BD31-4B8C-83A1-F6EECF244321}">
-                <p14:modId xmlns:p14="http://schemas.microsoft.com/office/powerpoint/2010/main" val="878904097"/>
+                <p14:modId xmlns:p14="http://schemas.microsoft.com/office/powerpoint/2010/main" val="1209684022"/>
               </p:ext>
             </p:extLst>
           </p:nvPr>
@@ -12670,7 +12697,7 @@
           <p:nvPr>
             <p:extLst>
               <p:ext uri="{D42A27DB-BD31-4B8C-83A1-F6EECF244321}">
-                <p14:modId xmlns:p14="http://schemas.microsoft.com/office/powerpoint/2010/main" val="1678548902"/>
+                <p14:modId xmlns:p14="http://schemas.microsoft.com/office/powerpoint/2010/main" val="3044711488"/>
               </p:ext>
             </p:extLst>
           </p:nvPr>
@@ -12757,8 +12784,8 @@
         </p:nvSpPr>
         <p:spPr>
           <a:xfrm>
-            <a:off x="2552700" y="419100"/>
-            <a:ext cx="4038600" cy="369332"/>
+            <a:off x="2286000" y="419100"/>
+            <a:ext cx="4572000" cy="369332"/>
           </a:xfrm>
           <a:prstGeom prst="rect">
             <a:avLst/>
@@ -12780,16 +12807,866 @@
           </a:p>
         </p:txBody>
       </p:sp>
+      <p:grpSp>
+        <p:nvGrpSpPr>
+          <p:cNvPr id="61" name="Group 60"/>
+          <p:cNvGrpSpPr/>
+          <p:nvPr/>
+        </p:nvGrpSpPr>
+        <p:grpSpPr>
+          <a:xfrm>
+            <a:off x="107148" y="1214437"/>
+            <a:ext cx="4400528" cy="914400"/>
+            <a:chOff x="107148" y="878669"/>
+            <a:chExt cx="4400528" cy="914400"/>
+          </a:xfrm>
+        </p:grpSpPr>
+        <p:sp>
+          <p:nvSpPr>
+            <p:cNvPr id="4" name="Oval 3"/>
+            <p:cNvSpPr/>
+            <p:nvPr/>
+          </p:nvSpPr>
+          <p:spPr>
+            <a:xfrm>
+              <a:off x="107148" y="878669"/>
+              <a:ext cx="1371600" cy="914400"/>
+            </a:xfrm>
+            <a:prstGeom prst="ellipse">
+              <a:avLst/>
+            </a:prstGeom>
+          </p:spPr>
+          <p:style>
+            <a:lnRef idx="2">
+              <a:schemeClr val="accent2">
+                <a:shade val="50000"/>
+              </a:schemeClr>
+            </a:lnRef>
+            <a:fillRef idx="1">
+              <a:schemeClr val="accent2"/>
+            </a:fillRef>
+            <a:effectRef idx="0">
+              <a:schemeClr val="accent2"/>
+            </a:effectRef>
+            <a:fontRef idx="minor">
+              <a:schemeClr val="lt1"/>
+            </a:fontRef>
+          </p:style>
+          <p:txBody>
+            <a:bodyPr lIns="9144" rIns="9144" rtlCol="0" anchor="ctr"/>
+            <a:lstStyle/>
+            <a:p>
+              <a:pPr algn="ctr"/>
+              <a:r>
+                <a:rPr lang="en-US" sz="1000" dirty="0" smtClean="0"/>
+                <a:t>America’s enemies will use the situation to harm us if current trends persist.</a:t>
+              </a:r>
+              <a:endParaRPr lang="en-US" sz="1000" dirty="0"/>
+            </a:p>
+          </p:txBody>
+        </p:sp>
+        <p:sp>
+          <p:nvSpPr>
+            <p:cNvPr id="5" name="Oval 4"/>
+            <p:cNvSpPr>
+              <a:spLocks/>
+            </p:cNvSpPr>
+            <p:nvPr/>
+          </p:nvSpPr>
+          <p:spPr>
+            <a:xfrm>
+              <a:off x="3593276" y="878669"/>
+              <a:ext cx="914400" cy="914400"/>
+            </a:xfrm>
+            <a:prstGeom prst="ellipse">
+              <a:avLst/>
+            </a:prstGeom>
+          </p:spPr>
+          <p:style>
+            <a:lnRef idx="2">
+              <a:schemeClr val="accent2">
+                <a:shade val="50000"/>
+              </a:schemeClr>
+            </a:lnRef>
+            <a:fillRef idx="1">
+              <a:schemeClr val="accent2"/>
+            </a:fillRef>
+            <a:effectRef idx="0">
+              <a:schemeClr val="accent2"/>
+            </a:effectRef>
+            <a:fontRef idx="minor">
+              <a:schemeClr val="lt1"/>
+            </a:fontRef>
+          </p:style>
+          <p:txBody>
+            <a:bodyPr lIns="9144" rIns="9144" rtlCol="0" anchor="ctr"/>
+            <a:lstStyle/>
+            <a:p>
+              <a:pPr algn="ctr"/>
+              <a:r>
+                <a:rPr lang="en-US" sz="1000" dirty="0" smtClean="0"/>
+                <a:t>Loss of our way of life</a:t>
+              </a:r>
+              <a:endParaRPr lang="en-US" sz="1000" dirty="0"/>
+            </a:p>
+          </p:txBody>
+        </p:sp>
+        <p:sp>
+          <p:nvSpPr>
+            <p:cNvPr id="7" name="Rounded Rectangle 6"/>
+            <p:cNvSpPr/>
+            <p:nvPr/>
+          </p:nvSpPr>
+          <p:spPr>
+            <a:xfrm>
+              <a:off x="1835927" y="878669"/>
+              <a:ext cx="1371600" cy="914400"/>
+            </a:xfrm>
+            <a:prstGeom prst="roundRect">
+              <a:avLst/>
+            </a:prstGeom>
+            <a:solidFill>
+              <a:schemeClr val="bg1">
+                <a:lumMod val="50000"/>
+              </a:schemeClr>
+            </a:solidFill>
+            <a:ln>
+              <a:solidFill>
+                <a:schemeClr val="tx1">
+                  <a:lumMod val="65000"/>
+                  <a:lumOff val="35000"/>
+                </a:schemeClr>
+              </a:solidFill>
+            </a:ln>
+          </p:spPr>
+          <p:style>
+            <a:lnRef idx="2">
+              <a:schemeClr val="accent1">
+                <a:shade val="50000"/>
+              </a:schemeClr>
+            </a:lnRef>
+            <a:fillRef idx="1">
+              <a:schemeClr val="accent1"/>
+            </a:fillRef>
+            <a:effectRef idx="0">
+              <a:schemeClr val="accent1"/>
+            </a:effectRef>
+            <a:fontRef idx="minor">
+              <a:schemeClr val="lt1"/>
+            </a:fontRef>
+          </p:style>
+          <p:txBody>
+            <a:bodyPr rtlCol="0" anchor="ctr"/>
+            <a:lstStyle/>
+            <a:p>
+              <a:pPr algn="ctr"/>
+              <a:r>
+                <a:rPr lang="en-US" sz="1000" dirty="0" smtClean="0"/>
+                <a:t>America is losing it’s technological advantages that helps us protect ourselves from those that would harm us.</a:t>
+              </a:r>
+              <a:endParaRPr lang="en-US" sz="1000" dirty="0"/>
+            </a:p>
+          </p:txBody>
+        </p:sp>
+        <p:cxnSp>
+          <p:nvCxnSpPr>
+            <p:cNvPr id="9" name="Straight Arrow Connector 8"/>
+            <p:cNvCxnSpPr>
+              <a:stCxn id="4" idx="6"/>
+              <a:endCxn id="7" idx="1"/>
+            </p:cNvCxnSpPr>
+            <p:nvPr/>
+          </p:nvCxnSpPr>
+          <p:spPr>
+            <a:xfrm>
+              <a:off x="1478748" y="1335869"/>
+              <a:ext cx="357179" cy="0"/>
+            </a:xfrm>
+            <a:prstGeom prst="straightConnector1">
+              <a:avLst/>
+            </a:prstGeom>
+            <a:ln w="50800">
+              <a:solidFill>
+                <a:schemeClr val="tx1"/>
+              </a:solidFill>
+              <a:tailEnd type="triangle" w="med" len="med"/>
+            </a:ln>
+          </p:spPr>
+          <p:style>
+            <a:lnRef idx="1">
+              <a:schemeClr val="accent1"/>
+            </a:lnRef>
+            <a:fillRef idx="0">
+              <a:schemeClr val="accent1"/>
+            </a:fillRef>
+            <a:effectRef idx="0">
+              <a:schemeClr val="accent1"/>
+            </a:effectRef>
+            <a:fontRef idx="minor">
+              <a:schemeClr val="tx1"/>
+            </a:fontRef>
+          </p:style>
+        </p:cxnSp>
+        <p:cxnSp>
+          <p:nvCxnSpPr>
+            <p:cNvPr id="11" name="Straight Arrow Connector 10"/>
+            <p:cNvCxnSpPr>
+              <a:stCxn id="7" idx="3"/>
+              <a:endCxn id="5" idx="2"/>
+            </p:cNvCxnSpPr>
+            <p:nvPr/>
+          </p:nvCxnSpPr>
+          <p:spPr>
+            <a:xfrm>
+              <a:off x="3207527" y="1335869"/>
+              <a:ext cx="385749" cy="0"/>
+            </a:xfrm>
+            <a:prstGeom prst="straightConnector1">
+              <a:avLst/>
+            </a:prstGeom>
+            <a:ln w="50800">
+              <a:solidFill>
+                <a:schemeClr val="tx1"/>
+              </a:solidFill>
+              <a:tailEnd type="triangle" w="med" len="med"/>
+            </a:ln>
+          </p:spPr>
+          <p:style>
+            <a:lnRef idx="1">
+              <a:schemeClr val="accent1"/>
+            </a:lnRef>
+            <a:fillRef idx="0">
+              <a:schemeClr val="accent1"/>
+            </a:fillRef>
+            <a:effectRef idx="0">
+              <a:schemeClr val="accent1"/>
+            </a:effectRef>
+            <a:fontRef idx="minor">
+              <a:schemeClr val="tx1"/>
+            </a:fontRef>
+          </p:style>
+        </p:cxnSp>
+      </p:grpSp>
+      <p:grpSp>
+        <p:nvGrpSpPr>
+          <p:cNvPr id="62" name="Group 61"/>
+          <p:cNvGrpSpPr/>
+          <p:nvPr/>
+        </p:nvGrpSpPr>
+        <p:grpSpPr>
+          <a:xfrm>
+            <a:off x="107148" y="2497932"/>
+            <a:ext cx="4400528" cy="1896507"/>
+            <a:chOff x="107148" y="1854972"/>
+            <a:chExt cx="4400528" cy="1896507"/>
+          </a:xfrm>
+        </p:grpSpPr>
+        <p:sp>
+          <p:nvSpPr>
+            <p:cNvPr id="12" name="Oval 11"/>
+            <p:cNvSpPr/>
+            <p:nvPr/>
+          </p:nvSpPr>
+          <p:spPr>
+            <a:xfrm>
+              <a:off x="107148" y="2290740"/>
+              <a:ext cx="1371600" cy="914400"/>
+            </a:xfrm>
+            <a:prstGeom prst="ellipse">
+              <a:avLst/>
+            </a:prstGeom>
+          </p:spPr>
+          <p:style>
+            <a:lnRef idx="2">
+              <a:schemeClr val="accent2">
+                <a:shade val="50000"/>
+              </a:schemeClr>
+            </a:lnRef>
+            <a:fillRef idx="1">
+              <a:schemeClr val="accent2"/>
+            </a:fillRef>
+            <a:effectRef idx="0">
+              <a:schemeClr val="accent2"/>
+            </a:effectRef>
+            <a:fontRef idx="minor">
+              <a:schemeClr val="lt1"/>
+            </a:fontRef>
+          </p:style>
+          <p:txBody>
+            <a:bodyPr lIns="9144" rIns="9144" rtlCol="0" anchor="ctr"/>
+            <a:lstStyle/>
+            <a:p>
+              <a:pPr algn="ctr"/>
+              <a:r>
+                <a:rPr lang="en-US" sz="1000" dirty="0" smtClean="0"/>
+                <a:t>Contract administrators are discriminating against small </a:t>
+              </a:r>
+              <a:r>
+                <a:rPr lang="en-US" sz="1000" dirty="0" smtClean="0"/>
+                <a:t>businesses.</a:t>
+              </a:r>
+              <a:endParaRPr lang="en-US" sz="1000" dirty="0"/>
+            </a:p>
+          </p:txBody>
+        </p:sp>
+        <p:sp>
+          <p:nvSpPr>
+            <p:cNvPr id="13" name="Oval 12"/>
+            <p:cNvSpPr/>
+            <p:nvPr/>
+          </p:nvSpPr>
+          <p:spPr>
+            <a:xfrm>
+              <a:off x="3593276" y="1854972"/>
+              <a:ext cx="914400" cy="914400"/>
+            </a:xfrm>
+            <a:prstGeom prst="ellipse">
+              <a:avLst/>
+            </a:prstGeom>
+          </p:spPr>
+          <p:style>
+            <a:lnRef idx="2">
+              <a:schemeClr val="accent2">
+                <a:shade val="50000"/>
+              </a:schemeClr>
+            </a:lnRef>
+            <a:fillRef idx="1">
+              <a:schemeClr val="accent2"/>
+            </a:fillRef>
+            <a:effectRef idx="0">
+              <a:schemeClr val="accent2"/>
+            </a:effectRef>
+            <a:fontRef idx="minor">
+              <a:schemeClr val="lt1"/>
+            </a:fontRef>
+          </p:style>
+          <p:txBody>
+            <a:bodyPr lIns="9144" rIns="9144" rtlCol="0" anchor="ctr"/>
+            <a:lstStyle/>
+            <a:p>
+              <a:pPr algn="ctr"/>
+              <a:r>
+                <a:rPr lang="en-US" sz="1000" dirty="0" smtClean="0"/>
+                <a:t>Loss of global </a:t>
+              </a:r>
+              <a:r>
+                <a:rPr lang="en-US" sz="1000" dirty="0" smtClean="0"/>
+                <a:t>dominance</a:t>
+              </a:r>
+              <a:endParaRPr lang="en-US" sz="1000" dirty="0"/>
+            </a:p>
+          </p:txBody>
+        </p:sp>
+        <p:sp>
+          <p:nvSpPr>
+            <p:cNvPr id="14" name="Rounded Rectangle 13"/>
+            <p:cNvSpPr/>
+            <p:nvPr/>
+          </p:nvSpPr>
+          <p:spPr>
+            <a:xfrm>
+              <a:off x="1835927" y="2290740"/>
+              <a:ext cx="1371600" cy="914400"/>
+            </a:xfrm>
+            <a:prstGeom prst="roundRect">
+              <a:avLst/>
+            </a:prstGeom>
+            <a:solidFill>
+              <a:schemeClr val="bg1">
+                <a:lumMod val="50000"/>
+              </a:schemeClr>
+            </a:solidFill>
+            <a:ln>
+              <a:solidFill>
+                <a:schemeClr val="tx1">
+                  <a:lumMod val="65000"/>
+                  <a:lumOff val="35000"/>
+                </a:schemeClr>
+              </a:solidFill>
+            </a:ln>
+          </p:spPr>
+          <p:style>
+            <a:lnRef idx="2">
+              <a:schemeClr val="accent1">
+                <a:shade val="50000"/>
+              </a:schemeClr>
+            </a:lnRef>
+            <a:fillRef idx="1">
+              <a:schemeClr val="accent1"/>
+            </a:fillRef>
+            <a:effectRef idx="0">
+              <a:schemeClr val="accent1"/>
+            </a:effectRef>
+            <a:fontRef idx="minor">
+              <a:schemeClr val="lt1"/>
+            </a:fontRef>
+          </p:style>
+          <p:txBody>
+            <a:bodyPr rtlCol="0" anchor="ctr"/>
+            <a:lstStyle/>
+            <a:p>
+              <a:pPr algn="ctr"/>
+              <a:r>
+                <a:rPr lang="en-US" sz="1000" dirty="0" smtClean="0"/>
+                <a:t>The country can’t benefit from the innovativeness of small businesses.</a:t>
+              </a:r>
+              <a:endParaRPr lang="en-US" sz="1000" dirty="0"/>
+            </a:p>
+          </p:txBody>
+        </p:sp>
+        <p:cxnSp>
+          <p:nvCxnSpPr>
+            <p:cNvPr id="15" name="Straight Arrow Connector 14"/>
+            <p:cNvCxnSpPr>
+              <a:stCxn id="12" idx="6"/>
+              <a:endCxn id="14" idx="1"/>
+            </p:cNvCxnSpPr>
+            <p:nvPr/>
+          </p:nvCxnSpPr>
+          <p:spPr>
+            <a:xfrm>
+              <a:off x="1478748" y="2747940"/>
+              <a:ext cx="357179" cy="0"/>
+            </a:xfrm>
+            <a:prstGeom prst="straightConnector1">
+              <a:avLst/>
+            </a:prstGeom>
+            <a:ln w="50800">
+              <a:solidFill>
+                <a:schemeClr val="tx1"/>
+              </a:solidFill>
+              <a:tailEnd type="triangle" w="med" len="med"/>
+            </a:ln>
+          </p:spPr>
+          <p:style>
+            <a:lnRef idx="1">
+              <a:schemeClr val="accent1"/>
+            </a:lnRef>
+            <a:fillRef idx="0">
+              <a:schemeClr val="accent1"/>
+            </a:fillRef>
+            <a:effectRef idx="0">
+              <a:schemeClr val="accent1"/>
+            </a:effectRef>
+            <a:fontRef idx="minor">
+              <a:schemeClr val="tx1"/>
+            </a:fontRef>
+          </p:style>
+        </p:cxnSp>
+        <p:cxnSp>
+          <p:nvCxnSpPr>
+            <p:cNvPr id="16" name="Straight Arrow Connector 15"/>
+            <p:cNvCxnSpPr>
+              <a:stCxn id="14" idx="3"/>
+              <a:endCxn id="13" idx="3"/>
+            </p:cNvCxnSpPr>
+            <p:nvPr/>
+          </p:nvCxnSpPr>
+          <p:spPr>
+            <a:xfrm flipV="1">
+              <a:off x="3207527" y="2635461"/>
+              <a:ext cx="519660" cy="112479"/>
+            </a:xfrm>
+            <a:prstGeom prst="straightConnector1">
+              <a:avLst/>
+            </a:prstGeom>
+            <a:ln w="50800">
+              <a:solidFill>
+                <a:schemeClr val="tx1"/>
+              </a:solidFill>
+              <a:tailEnd type="triangle" w="med" len="med"/>
+            </a:ln>
+          </p:spPr>
+          <p:style>
+            <a:lnRef idx="1">
+              <a:schemeClr val="accent1"/>
+            </a:lnRef>
+            <a:fillRef idx="0">
+              <a:schemeClr val="accent1"/>
+            </a:fillRef>
+            <a:effectRef idx="0">
+              <a:schemeClr val="accent1"/>
+            </a:effectRef>
+            <a:fontRef idx="minor">
+              <a:schemeClr val="tx1"/>
+            </a:fontRef>
+          </p:style>
+        </p:cxnSp>
+        <p:sp>
+          <p:nvSpPr>
+            <p:cNvPr id="17" name="Oval 16"/>
+            <p:cNvSpPr/>
+            <p:nvPr/>
+          </p:nvSpPr>
+          <p:spPr>
+            <a:xfrm>
+              <a:off x="3593276" y="2837079"/>
+              <a:ext cx="914400" cy="914400"/>
+            </a:xfrm>
+            <a:prstGeom prst="ellipse">
+              <a:avLst/>
+            </a:prstGeom>
+          </p:spPr>
+          <p:style>
+            <a:lnRef idx="2">
+              <a:schemeClr val="accent2">
+                <a:shade val="50000"/>
+              </a:schemeClr>
+            </a:lnRef>
+            <a:fillRef idx="1">
+              <a:schemeClr val="accent2"/>
+            </a:fillRef>
+            <a:effectRef idx="0">
+              <a:schemeClr val="accent2"/>
+            </a:effectRef>
+            <a:fontRef idx="minor">
+              <a:schemeClr val="lt1"/>
+            </a:fontRef>
+          </p:style>
+          <p:txBody>
+            <a:bodyPr lIns="9144" rIns="9144" rtlCol="0" anchor="ctr"/>
+            <a:lstStyle/>
+            <a:p>
+              <a:pPr algn="ctr"/>
+              <a:r>
+                <a:rPr lang="en-US" sz="1000" dirty="0" smtClean="0"/>
+                <a:t>Loss of </a:t>
+              </a:r>
+              <a:r>
+                <a:rPr lang="en-US" sz="1000" dirty="0" smtClean="0"/>
+                <a:t>economic prosperity</a:t>
+              </a:r>
+              <a:endParaRPr lang="en-US" sz="1000" dirty="0"/>
+            </a:p>
+          </p:txBody>
+        </p:sp>
+        <p:cxnSp>
+          <p:nvCxnSpPr>
+            <p:cNvPr id="22" name="Straight Arrow Connector 21"/>
+            <p:cNvCxnSpPr>
+              <a:stCxn id="14" idx="3"/>
+              <a:endCxn id="17" idx="1"/>
+            </p:cNvCxnSpPr>
+            <p:nvPr/>
+          </p:nvCxnSpPr>
+          <p:spPr>
+            <a:xfrm>
+              <a:off x="3207527" y="2747940"/>
+              <a:ext cx="519660" cy="223050"/>
+            </a:xfrm>
+            <a:prstGeom prst="straightConnector1">
+              <a:avLst/>
+            </a:prstGeom>
+            <a:ln w="50800">
+              <a:solidFill>
+                <a:schemeClr val="tx1"/>
+              </a:solidFill>
+              <a:tailEnd type="triangle" w="med" len="med"/>
+            </a:ln>
+          </p:spPr>
+          <p:style>
+            <a:lnRef idx="1">
+              <a:schemeClr val="accent1"/>
+            </a:lnRef>
+            <a:fillRef idx="0">
+              <a:schemeClr val="accent1"/>
+            </a:fillRef>
+            <a:effectRef idx="0">
+              <a:schemeClr val="accent1"/>
+            </a:effectRef>
+            <a:fontRef idx="minor">
+              <a:schemeClr val="tx1"/>
+            </a:fontRef>
+          </p:style>
+        </p:cxnSp>
+      </p:grpSp>
+      <p:grpSp>
+        <p:nvGrpSpPr>
+          <p:cNvPr id="63" name="Group 62"/>
+          <p:cNvGrpSpPr/>
+          <p:nvPr/>
+        </p:nvGrpSpPr>
+        <p:grpSpPr>
+          <a:xfrm>
+            <a:off x="107148" y="4645827"/>
+            <a:ext cx="4400528" cy="914400"/>
+            <a:chOff x="107148" y="3809979"/>
+            <a:chExt cx="4400528" cy="914400"/>
+          </a:xfrm>
+        </p:grpSpPr>
+        <p:sp>
+          <p:nvSpPr>
+            <p:cNvPr id="27" name="Oval 26"/>
+            <p:cNvSpPr/>
+            <p:nvPr/>
+          </p:nvSpPr>
+          <p:spPr>
+            <a:xfrm>
+              <a:off x="107148" y="3809979"/>
+              <a:ext cx="1371600" cy="914400"/>
+            </a:xfrm>
+            <a:prstGeom prst="ellipse">
+              <a:avLst/>
+            </a:prstGeom>
+          </p:spPr>
+          <p:style>
+            <a:lnRef idx="2">
+              <a:schemeClr val="accent2">
+                <a:shade val="50000"/>
+              </a:schemeClr>
+            </a:lnRef>
+            <a:fillRef idx="1">
+              <a:schemeClr val="accent2"/>
+            </a:fillRef>
+            <a:effectRef idx="0">
+              <a:schemeClr val="accent2"/>
+            </a:effectRef>
+            <a:fontRef idx="minor">
+              <a:schemeClr val="lt1"/>
+            </a:fontRef>
+          </p:style>
+          <p:txBody>
+            <a:bodyPr lIns="9144" rIns="9144" rtlCol="0" anchor="ctr"/>
+            <a:lstStyle/>
+            <a:p>
+              <a:pPr algn="ctr"/>
+              <a:r>
+                <a:rPr lang="en-US" sz="1000" dirty="0" smtClean="0"/>
+                <a:t>America’s used to have a growing economy and global dominance.</a:t>
+              </a:r>
+              <a:endParaRPr lang="en-US" sz="1000" dirty="0"/>
+            </a:p>
+          </p:txBody>
+        </p:sp>
+        <p:sp>
+          <p:nvSpPr>
+            <p:cNvPr id="28" name="Oval 27"/>
+            <p:cNvSpPr>
+              <a:spLocks/>
+            </p:cNvSpPr>
+            <p:nvPr/>
+          </p:nvSpPr>
+          <p:spPr>
+            <a:xfrm>
+              <a:off x="3593276" y="3809979"/>
+              <a:ext cx="914400" cy="914400"/>
+            </a:xfrm>
+            <a:prstGeom prst="ellipse">
+              <a:avLst/>
+            </a:prstGeom>
+          </p:spPr>
+          <p:style>
+            <a:lnRef idx="2">
+              <a:schemeClr val="accent2">
+                <a:shade val="50000"/>
+              </a:schemeClr>
+            </a:lnRef>
+            <a:fillRef idx="1">
+              <a:schemeClr val="accent2"/>
+            </a:fillRef>
+            <a:effectRef idx="0">
+              <a:schemeClr val="accent2"/>
+            </a:effectRef>
+            <a:fontRef idx="minor">
+              <a:schemeClr val="lt1"/>
+            </a:fontRef>
+          </p:style>
+          <p:txBody>
+            <a:bodyPr lIns="9144" rIns="9144" rtlCol="0" anchor="ctr"/>
+            <a:lstStyle/>
+            <a:p>
+              <a:pPr algn="ctr"/>
+              <a:r>
+                <a:rPr lang="en-US" sz="1000" dirty="0" smtClean="0"/>
+                <a:t>Loss of </a:t>
+              </a:r>
+              <a:r>
+                <a:rPr lang="en-US" sz="1000" dirty="0" smtClean="0"/>
+                <a:t>economic prosperity</a:t>
+              </a:r>
+              <a:endParaRPr lang="en-US" sz="1000" dirty="0"/>
+            </a:p>
+          </p:txBody>
+        </p:sp>
+        <p:sp>
+          <p:nvSpPr>
+            <p:cNvPr id="29" name="Rounded Rectangle 28"/>
+            <p:cNvSpPr/>
+            <p:nvPr/>
+          </p:nvSpPr>
+          <p:spPr>
+            <a:xfrm>
+              <a:off x="1835927" y="3809979"/>
+              <a:ext cx="1371600" cy="914400"/>
+            </a:xfrm>
+            <a:prstGeom prst="roundRect">
+              <a:avLst/>
+            </a:prstGeom>
+            <a:solidFill>
+              <a:schemeClr val="bg1">
+                <a:lumMod val="50000"/>
+              </a:schemeClr>
+            </a:solidFill>
+            <a:ln>
+              <a:solidFill>
+                <a:schemeClr val="tx1">
+                  <a:lumMod val="65000"/>
+                  <a:lumOff val="35000"/>
+                </a:schemeClr>
+              </a:solidFill>
+            </a:ln>
+          </p:spPr>
+          <p:style>
+            <a:lnRef idx="2">
+              <a:schemeClr val="accent1">
+                <a:shade val="50000"/>
+              </a:schemeClr>
+            </a:lnRef>
+            <a:fillRef idx="1">
+              <a:schemeClr val="accent1"/>
+            </a:fillRef>
+            <a:effectRef idx="0">
+              <a:schemeClr val="accent1"/>
+            </a:effectRef>
+            <a:fontRef idx="minor">
+              <a:schemeClr val="lt1"/>
+            </a:fontRef>
+          </p:style>
+          <p:txBody>
+            <a:bodyPr rtlCol="0" anchor="ctr"/>
+            <a:lstStyle/>
+            <a:p>
+              <a:pPr algn="ctr"/>
+              <a:r>
+                <a:rPr lang="en-US" sz="1000" dirty="0" smtClean="0"/>
+                <a:t>America is not producing technological innovation necessary to generate economic prosperity.</a:t>
+              </a:r>
+              <a:endParaRPr lang="en-US" sz="1000" dirty="0"/>
+            </a:p>
+          </p:txBody>
+        </p:sp>
+        <p:cxnSp>
+          <p:nvCxnSpPr>
+            <p:cNvPr id="30" name="Straight Arrow Connector 29"/>
+            <p:cNvCxnSpPr>
+              <a:stCxn id="27" idx="6"/>
+              <a:endCxn id="29" idx="1"/>
+            </p:cNvCxnSpPr>
+            <p:nvPr/>
+          </p:nvCxnSpPr>
+          <p:spPr>
+            <a:xfrm>
+              <a:off x="1478748" y="4267179"/>
+              <a:ext cx="357179" cy="0"/>
+            </a:xfrm>
+            <a:prstGeom prst="straightConnector1">
+              <a:avLst/>
+            </a:prstGeom>
+            <a:ln w="50800">
+              <a:solidFill>
+                <a:schemeClr val="tx1"/>
+              </a:solidFill>
+              <a:tailEnd type="triangle" w="med" len="med"/>
+            </a:ln>
+          </p:spPr>
+          <p:style>
+            <a:lnRef idx="1">
+              <a:schemeClr val="accent1"/>
+            </a:lnRef>
+            <a:fillRef idx="0">
+              <a:schemeClr val="accent1"/>
+            </a:fillRef>
+            <a:effectRef idx="0">
+              <a:schemeClr val="accent1"/>
+            </a:effectRef>
+            <a:fontRef idx="minor">
+              <a:schemeClr val="tx1"/>
+            </a:fontRef>
+          </p:style>
+        </p:cxnSp>
+        <p:cxnSp>
+          <p:nvCxnSpPr>
+            <p:cNvPr id="31" name="Straight Arrow Connector 30"/>
+            <p:cNvCxnSpPr>
+              <a:stCxn id="29" idx="3"/>
+              <a:endCxn id="28" idx="2"/>
+            </p:cNvCxnSpPr>
+            <p:nvPr/>
+          </p:nvCxnSpPr>
+          <p:spPr>
+            <a:xfrm>
+              <a:off x="3207527" y="4267179"/>
+              <a:ext cx="385749" cy="0"/>
+            </a:xfrm>
+            <a:prstGeom prst="straightConnector1">
+              <a:avLst/>
+            </a:prstGeom>
+            <a:ln w="50800">
+              <a:solidFill>
+                <a:schemeClr val="tx1"/>
+              </a:solidFill>
+              <a:tailEnd type="triangle" w="med" len="med"/>
+            </a:ln>
+          </p:spPr>
+          <p:style>
+            <a:lnRef idx="1">
+              <a:schemeClr val="accent1"/>
+            </a:lnRef>
+            <a:fillRef idx="0">
+              <a:schemeClr val="accent1"/>
+            </a:fillRef>
+            <a:effectRef idx="0">
+              <a:schemeClr val="accent1"/>
+            </a:effectRef>
+            <a:fontRef idx="minor">
+              <a:schemeClr val="tx1"/>
+            </a:fontRef>
+          </p:style>
+        </p:cxnSp>
+      </p:grpSp>
+      <p:cxnSp>
+        <p:nvCxnSpPr>
+          <p:cNvPr id="42" name="Straight Connector 41"/>
+          <p:cNvCxnSpPr/>
+          <p:nvPr/>
+        </p:nvCxnSpPr>
+        <p:spPr>
+          <a:xfrm>
+            <a:off x="4572000" y="1122599"/>
+            <a:ext cx="0" cy="4572000"/>
+          </a:xfrm>
+          <a:prstGeom prst="line">
+            <a:avLst/>
+          </a:prstGeom>
+          <a:ln w="19050">
+            <a:prstDash val="sysDash"/>
+          </a:ln>
+        </p:spPr>
+        <p:style>
+          <a:lnRef idx="1">
+            <a:schemeClr val="accent1"/>
+          </a:lnRef>
+          <a:fillRef idx="0">
+            <a:schemeClr val="accent1"/>
+          </a:fillRef>
+          <a:effectRef idx="0">
+            <a:schemeClr val="accent1"/>
+          </a:effectRef>
+          <a:fontRef idx="minor">
+            <a:schemeClr val="tx1"/>
+          </a:fontRef>
+        </p:style>
+      </p:cxnSp>
       <p:sp>
         <p:nvSpPr>
-          <p:cNvPr id="4" name="Oval 3"/>
+          <p:cNvPr id="43" name="Oval 42"/>
           <p:cNvSpPr/>
           <p:nvPr/>
         </p:nvSpPr>
         <p:spPr>
           <a:xfrm>
-            <a:off x="357188" y="978685"/>
-            <a:ext cx="1828800" cy="1005840"/>
+            <a:off x="4660076" y="1204426"/>
+            <a:ext cx="1371600" cy="914400"/>
           </a:xfrm>
           <a:prstGeom prst="ellipse">
             <a:avLst/>
@@ -12817,23 +13694,25 @@
           <a:p>
             <a:pPr algn="ctr"/>
             <a:r>
-              <a:rPr lang="en-US" sz="1200" dirty="0" smtClean="0"/>
-              <a:t>America’s way of life is threatened by the mob at the gates</a:t>
+              <a:rPr lang="en-US" sz="1000" dirty="0" smtClean="0"/>
+              <a:t>America is straying from our guiding aspirational principles.</a:t>
             </a:r>
-            <a:endParaRPr lang="en-US" sz="1200" dirty="0"/>
+            <a:endParaRPr lang="en-US" sz="1000" dirty="0"/>
           </a:p>
         </p:txBody>
       </p:sp>
       <p:sp>
         <p:nvSpPr>
-          <p:cNvPr id="5" name="Oval 4"/>
-          <p:cNvSpPr/>
+          <p:cNvPr id="44" name="Oval 43"/>
+          <p:cNvSpPr>
+            <a:spLocks/>
+          </p:cNvSpPr>
           <p:nvPr/>
         </p:nvSpPr>
         <p:spPr>
           <a:xfrm>
-            <a:off x="6743699" y="795805"/>
-            <a:ext cx="1371600" cy="1371600"/>
+            <a:off x="8146204" y="1204426"/>
+            <a:ext cx="914400" cy="914400"/>
           </a:xfrm>
           <a:prstGeom prst="ellipse">
             <a:avLst/>
@@ -12861,27 +13740,40 @@
           <a:p>
             <a:pPr algn="ctr"/>
             <a:r>
-              <a:rPr lang="en-US" sz="1200" dirty="0" smtClean="0"/>
-              <a:t>Loss of our way of life</a:t>
+              <a:rPr lang="en-US" sz="1000" dirty="0" smtClean="0"/>
+              <a:t>Eroding what makes America superior.</a:t>
             </a:r>
-            <a:endParaRPr lang="en-US" sz="1200" dirty="0"/>
+            <a:endParaRPr lang="en-US" sz="1000" dirty="0"/>
           </a:p>
         </p:txBody>
       </p:sp>
       <p:sp>
         <p:nvSpPr>
-          <p:cNvPr id="7" name="Rounded Rectangle 6"/>
+          <p:cNvPr id="45" name="Rounded Rectangle 44"/>
           <p:cNvSpPr/>
           <p:nvPr/>
         </p:nvSpPr>
         <p:spPr>
           <a:xfrm>
-            <a:off x="3593306" y="967255"/>
-            <a:ext cx="1843088" cy="1028700"/>
+            <a:off x="6388855" y="1204426"/>
+            <a:ext cx="1371600" cy="914400"/>
           </a:xfrm>
           <a:prstGeom prst="roundRect">
             <a:avLst/>
           </a:prstGeom>
+          <a:solidFill>
+            <a:schemeClr val="bg1">
+              <a:lumMod val="50000"/>
+            </a:schemeClr>
+          </a:solidFill>
+          <a:ln>
+            <a:solidFill>
+              <a:schemeClr val="tx1">
+                <a:lumMod val="65000"/>
+                <a:lumOff val="35000"/>
+              </a:schemeClr>
+            </a:solidFill>
+          </a:ln>
         </p:spPr>
         <p:style>
           <a:lnRef idx="2">
@@ -12905,26 +13797,26 @@
           <a:p>
             <a:pPr algn="ctr"/>
             <a:r>
-              <a:rPr lang="en-US" sz="1200" dirty="0" smtClean="0"/>
-              <a:t>Small businesses will develop the innovations that will give the U.S. the advantage</a:t>
+              <a:rPr lang="en-US" sz="1000" dirty="0" smtClean="0"/>
+              <a:t>This policy discriminates by showing favoritism to one group over all others.</a:t>
             </a:r>
-            <a:endParaRPr lang="en-US" sz="1200" dirty="0"/>
+            <a:endParaRPr lang="en-US" sz="1000" dirty="0"/>
           </a:p>
         </p:txBody>
       </p:sp>
       <p:cxnSp>
         <p:nvCxnSpPr>
-          <p:cNvPr id="9" name="Straight Arrow Connector 8"/>
+          <p:cNvPr id="46" name="Straight Arrow Connector 45"/>
           <p:cNvCxnSpPr>
-            <a:stCxn id="4" idx="6"/>
-            <a:endCxn id="7" idx="1"/>
+            <a:stCxn id="43" idx="6"/>
+            <a:endCxn id="45" idx="1"/>
           </p:cNvCxnSpPr>
           <p:nvPr/>
         </p:nvCxnSpPr>
         <p:spPr>
           <a:xfrm>
-            <a:off x="2185988" y="1481605"/>
-            <a:ext cx="1407318" cy="0"/>
+            <a:off x="6031676" y="1661626"/>
+            <a:ext cx="357179" cy="0"/>
           </a:xfrm>
           <a:prstGeom prst="straightConnector1">
             <a:avLst/>
@@ -12953,17 +13845,17 @@
       </p:cxnSp>
       <p:cxnSp>
         <p:nvCxnSpPr>
-          <p:cNvPr id="11" name="Straight Arrow Connector 10"/>
+          <p:cNvPr id="47" name="Straight Arrow Connector 46"/>
           <p:cNvCxnSpPr>
-            <a:stCxn id="7" idx="3"/>
-            <a:endCxn id="5" idx="2"/>
+            <a:stCxn id="45" idx="3"/>
+            <a:endCxn id="44" idx="2"/>
           </p:cNvCxnSpPr>
           <p:nvPr/>
         </p:nvCxnSpPr>
         <p:spPr>
           <a:xfrm>
-            <a:off x="5436394" y="1481605"/>
-            <a:ext cx="1307305" cy="0"/>
+            <a:off x="7760455" y="1661626"/>
+            <a:ext cx="385749" cy="0"/>
           </a:xfrm>
           <a:prstGeom prst="straightConnector1">
             <a:avLst/>
@@ -12992,14 +13884,110 @@
       </p:cxnSp>
       <p:sp>
         <p:nvSpPr>
-          <p:cNvPr id="12" name="Oval 11"/>
+          <p:cNvPr id="64" name="Rounded Rectangle 63"/>
           <p:cNvSpPr/>
           <p:nvPr/>
         </p:nvSpPr>
         <p:spPr>
           <a:xfrm>
-            <a:off x="357188" y="2462196"/>
-            <a:ext cx="1828800" cy="1005840"/>
+            <a:off x="6388855" y="2461713"/>
+            <a:ext cx="1371600" cy="914400"/>
+          </a:xfrm>
+          <a:prstGeom prst="roundRect">
+            <a:avLst/>
+          </a:prstGeom>
+          <a:solidFill>
+            <a:schemeClr val="bg1">
+              <a:lumMod val="50000"/>
+            </a:schemeClr>
+          </a:solidFill>
+          <a:ln>
+            <a:solidFill>
+              <a:schemeClr val="tx1">
+                <a:lumMod val="65000"/>
+                <a:lumOff val="35000"/>
+              </a:schemeClr>
+            </a:solidFill>
+          </a:ln>
+        </p:spPr>
+        <p:style>
+          <a:lnRef idx="2">
+            <a:schemeClr val="accent1">
+              <a:shade val="50000"/>
+            </a:schemeClr>
+          </a:lnRef>
+          <a:fillRef idx="1">
+            <a:schemeClr val="accent1"/>
+          </a:fillRef>
+          <a:effectRef idx="0">
+            <a:schemeClr val="accent1"/>
+          </a:effectRef>
+          <a:fontRef idx="minor">
+            <a:schemeClr val="lt1"/>
+          </a:fontRef>
+        </p:style>
+        <p:txBody>
+          <a:bodyPr rtlCol="0" anchor="ctr"/>
+          <a:lstStyle/>
+          <a:p>
+            <a:pPr algn="ctr"/>
+            <a:r>
+              <a:rPr lang="en-US" sz="1000" dirty="0" smtClean="0"/>
+              <a:t>This policy replaces a research excellence criteria with a privilege criteria.</a:t>
+            </a:r>
+            <a:endParaRPr lang="en-US" sz="1000" dirty="0"/>
+          </a:p>
+        </p:txBody>
+      </p:sp>
+      <p:cxnSp>
+        <p:nvCxnSpPr>
+          <p:cNvPr id="65" name="Straight Arrow Connector 64"/>
+          <p:cNvCxnSpPr>
+            <a:stCxn id="64" idx="3"/>
+            <a:endCxn id="44" idx="3"/>
+          </p:cNvCxnSpPr>
+          <p:nvPr/>
+        </p:nvCxnSpPr>
+        <p:spPr>
+          <a:xfrm flipV="1">
+            <a:off x="7760455" y="1984915"/>
+            <a:ext cx="519660" cy="933998"/>
+          </a:xfrm>
+          <a:prstGeom prst="straightConnector1">
+            <a:avLst/>
+          </a:prstGeom>
+          <a:ln w="50800">
+            <a:solidFill>
+              <a:schemeClr val="tx1"/>
+            </a:solidFill>
+            <a:tailEnd type="triangle" w="med" len="med"/>
+          </a:ln>
+        </p:spPr>
+        <p:style>
+          <a:lnRef idx="1">
+            <a:schemeClr val="accent1"/>
+          </a:lnRef>
+          <a:fillRef idx="0">
+            <a:schemeClr val="accent1"/>
+          </a:fillRef>
+          <a:effectRef idx="0">
+            <a:schemeClr val="accent1"/>
+          </a:effectRef>
+          <a:fontRef idx="minor">
+            <a:schemeClr val="tx1"/>
+          </a:fontRef>
+        </p:style>
+      </p:cxnSp>
+      <p:sp>
+        <p:nvSpPr>
+          <p:cNvPr id="67" name="Oval 66"/>
+          <p:cNvSpPr/>
+          <p:nvPr/>
+        </p:nvSpPr>
+        <p:spPr>
+          <a:xfrm>
+            <a:off x="4660076" y="2947505"/>
+            <a:ext cx="1371600" cy="914400"/>
           </a:xfrm>
           <a:prstGeom prst="ellipse">
             <a:avLst/>
@@ -13027,23 +14015,64 @@
           <a:p>
             <a:pPr algn="ctr"/>
             <a:r>
-              <a:rPr lang="en-US" sz="1200" dirty="0" smtClean="0"/>
-              <a:t>Contract administrators are discriminating against small businesses</a:t>
+              <a:rPr lang="en-US" sz="1000" dirty="0" smtClean="0"/>
+              <a:t>America’s research excellence is being eroded.</a:t>
             </a:r>
-            <a:endParaRPr lang="en-US" sz="1200" dirty="0"/>
+            <a:endParaRPr lang="en-US" sz="1000" dirty="0"/>
           </a:p>
         </p:txBody>
       </p:sp>
+      <p:cxnSp>
+        <p:nvCxnSpPr>
+          <p:cNvPr id="68" name="Straight Arrow Connector 67"/>
+          <p:cNvCxnSpPr>
+            <a:stCxn id="67" idx="6"/>
+            <a:endCxn id="64" idx="1"/>
+          </p:cNvCxnSpPr>
+          <p:nvPr/>
+        </p:nvCxnSpPr>
+        <p:spPr>
+          <a:xfrm flipV="1">
+            <a:off x="6031676" y="2918913"/>
+            <a:ext cx="357179" cy="485792"/>
+          </a:xfrm>
+          <a:prstGeom prst="straightConnector1">
+            <a:avLst/>
+          </a:prstGeom>
+          <a:ln w="50800">
+            <a:solidFill>
+              <a:schemeClr val="tx1"/>
+            </a:solidFill>
+            <a:tailEnd type="triangle" w="med" len="med"/>
+          </a:ln>
+        </p:spPr>
+        <p:style>
+          <a:lnRef idx="1">
+            <a:schemeClr val="accent1"/>
+          </a:lnRef>
+          <a:fillRef idx="0">
+            <a:schemeClr val="accent1"/>
+          </a:fillRef>
+          <a:effectRef idx="0">
+            <a:schemeClr val="accent1"/>
+          </a:effectRef>
+          <a:fontRef idx="minor">
+            <a:schemeClr val="tx1"/>
+          </a:fontRef>
+        </p:style>
+      </p:cxnSp>
       <p:sp>
         <p:nvSpPr>
-          <p:cNvPr id="13" name="Oval 12"/>
-          <p:cNvSpPr/>
+          <p:cNvPr id="69" name="Oval 68"/>
+          <p:cNvSpPr>
+            <a:spLocks/>
+          </p:cNvSpPr>
           <p:nvPr/>
         </p:nvSpPr>
         <p:spPr>
           <a:xfrm>
-            <a:off x="6743699" y="2279316"/>
-            <a:ext cx="1371600" cy="1371600"/>
+            <a:off x="8146204" y="2461769"/>
+            <a:ext cx="914400" cy="914400"/>
           </a:xfrm>
           <a:prstGeom prst="ellipse">
             <a:avLst/>
@@ -13071,27 +14100,79 @@
           <a:p>
             <a:pPr algn="ctr"/>
             <a:r>
-              <a:rPr lang="en-US" sz="1200" dirty="0" smtClean="0"/>
-              <a:t>Loss of global dominance and economic opportunities</a:t>
+              <a:rPr lang="en-US" sz="1000" dirty="0" smtClean="0"/>
+              <a:t>Loss of global dominance.</a:t>
             </a:r>
-            <a:endParaRPr lang="en-US" sz="1200" dirty="0"/>
+            <a:endParaRPr lang="en-US" sz="1000" dirty="0"/>
           </a:p>
         </p:txBody>
       </p:sp>
+      <p:cxnSp>
+        <p:nvCxnSpPr>
+          <p:cNvPr id="74" name="Straight Arrow Connector 73"/>
+          <p:cNvCxnSpPr>
+            <a:stCxn id="64" idx="3"/>
+            <a:endCxn id="69" idx="2"/>
+          </p:cNvCxnSpPr>
+          <p:nvPr/>
+        </p:nvCxnSpPr>
+        <p:spPr>
+          <a:xfrm>
+            <a:off x="7760455" y="2918913"/>
+            <a:ext cx="385749" cy="56"/>
+          </a:xfrm>
+          <a:prstGeom prst="straightConnector1">
+            <a:avLst/>
+          </a:prstGeom>
+          <a:ln w="50800">
+            <a:solidFill>
+              <a:schemeClr val="tx1"/>
+            </a:solidFill>
+            <a:tailEnd type="triangle" w="med" len="med"/>
+          </a:ln>
+        </p:spPr>
+        <p:style>
+          <a:lnRef idx="1">
+            <a:schemeClr val="accent1"/>
+          </a:lnRef>
+          <a:fillRef idx="0">
+            <a:schemeClr val="accent1"/>
+          </a:fillRef>
+          <a:effectRef idx="0">
+            <a:schemeClr val="accent1"/>
+          </a:effectRef>
+          <a:fontRef idx="minor">
+            <a:schemeClr val="tx1"/>
+          </a:fontRef>
+        </p:style>
+      </p:cxnSp>
       <p:sp>
         <p:nvSpPr>
-          <p:cNvPr id="14" name="Rounded Rectangle 13"/>
+          <p:cNvPr id="79" name="Rounded Rectangle 78"/>
           <p:cNvSpPr/>
           <p:nvPr/>
         </p:nvSpPr>
         <p:spPr>
           <a:xfrm>
-            <a:off x="3593306" y="2450766"/>
-            <a:ext cx="1843088" cy="1028700"/>
+            <a:off x="6388855" y="3480039"/>
+            <a:ext cx="1371600" cy="914400"/>
           </a:xfrm>
           <a:prstGeom prst="roundRect">
             <a:avLst/>
           </a:prstGeom>
+          <a:solidFill>
+            <a:schemeClr val="bg1">
+              <a:lumMod val="50000"/>
+            </a:schemeClr>
+          </a:solidFill>
+          <a:ln>
+            <a:solidFill>
+              <a:schemeClr val="tx1">
+                <a:lumMod val="65000"/>
+                <a:lumOff val="35000"/>
+              </a:schemeClr>
+            </a:solidFill>
+          </a:ln>
         </p:spPr>
         <p:style>
           <a:lnRef idx="2">
@@ -13115,26 +14196,26 @@
           <a:p>
             <a:pPr algn="ctr"/>
             <a:r>
-              <a:rPr lang="en-US" sz="1200" dirty="0" smtClean="0"/>
-              <a:t>The country can’t benefit from the innovativeness of small businesses.</a:t>
+              <a:rPr lang="en-US" sz="1000" dirty="0" smtClean="0"/>
+              <a:t>This policy will result in sub-par research and development.</a:t>
             </a:r>
-            <a:endParaRPr lang="en-US" sz="1200" dirty="0"/>
+            <a:endParaRPr lang="en-US" sz="1000" dirty="0"/>
           </a:p>
         </p:txBody>
       </p:sp>
       <p:cxnSp>
         <p:nvCxnSpPr>
-          <p:cNvPr id="15" name="Straight Arrow Connector 14"/>
+          <p:cNvPr id="81" name="Straight Arrow Connector 80"/>
           <p:cNvCxnSpPr>
-            <a:stCxn id="12" idx="6"/>
-            <a:endCxn id="14" idx="1"/>
+            <a:stCxn id="67" idx="6"/>
+            <a:endCxn id="79" idx="1"/>
           </p:cNvCxnSpPr>
           <p:nvPr/>
         </p:nvCxnSpPr>
         <p:spPr>
           <a:xfrm>
-            <a:off x="2185988" y="2965116"/>
-            <a:ext cx="1407318" cy="0"/>
+            <a:off x="6031676" y="3404705"/>
+            <a:ext cx="357179" cy="532534"/>
           </a:xfrm>
           <a:prstGeom prst="straightConnector1">
             <a:avLst/>
@@ -13163,17 +14244,17 @@
       </p:cxnSp>
       <p:cxnSp>
         <p:nvCxnSpPr>
-          <p:cNvPr id="16" name="Straight Arrow Connector 15"/>
+          <p:cNvPr id="82" name="Straight Arrow Connector 81"/>
           <p:cNvCxnSpPr>
-            <a:stCxn id="14" idx="3"/>
-            <a:endCxn id="13" idx="2"/>
+            <a:stCxn id="79" idx="3"/>
+            <a:endCxn id="69" idx="3"/>
           </p:cNvCxnSpPr>
           <p:nvPr/>
         </p:nvCxnSpPr>
         <p:spPr>
-          <a:xfrm>
-            <a:off x="5436394" y="2965116"/>
-            <a:ext cx="1307305" cy="0"/>
+          <a:xfrm flipV="1">
+            <a:off x="7760455" y="3242258"/>
+            <a:ext cx="519660" cy="694981"/>
           </a:xfrm>
           <a:prstGeom prst="straightConnector1">
             <a:avLst/>
@@ -13200,10 +14281,1090 @@
           </a:fontRef>
         </p:style>
       </p:cxnSp>
+      <p:sp>
+        <p:nvSpPr>
+          <p:cNvPr id="87" name="TextBox 86"/>
+          <p:cNvSpPr txBox="1"/>
+          <p:nvPr/>
+        </p:nvSpPr>
+        <p:spPr>
+          <a:xfrm>
+            <a:off x="1066800" y="740569"/>
+            <a:ext cx="1828800" cy="365760"/>
+          </a:xfrm>
+          <a:prstGeom prst="rect">
+            <a:avLst/>
+          </a:prstGeom>
+          <a:noFill/>
+        </p:spPr>
+        <p:txBody>
+          <a:bodyPr wrap="square" rtlCol="0">
+            <a:spAutoFit/>
+          </a:bodyPr>
+          <a:lstStyle/>
+          <a:p>
+            <a:pPr algn="ctr"/>
+            <a:r>
+              <a:rPr lang="en-US" i="1" u="sng" dirty="0" smtClean="0"/>
+              <a:t>Proponents</a:t>
+            </a:r>
+            <a:endParaRPr lang="en-US" i="1" u="sng" dirty="0"/>
+          </a:p>
+        </p:txBody>
+      </p:sp>
+      <p:sp>
+        <p:nvSpPr>
+          <p:cNvPr id="88" name="TextBox 87"/>
+          <p:cNvSpPr txBox="1"/>
+          <p:nvPr/>
+        </p:nvSpPr>
+        <p:spPr>
+          <a:xfrm>
+            <a:off x="6096000" y="740569"/>
+            <a:ext cx="1828800" cy="365760"/>
+          </a:xfrm>
+          <a:prstGeom prst="rect">
+            <a:avLst/>
+          </a:prstGeom>
+          <a:noFill/>
+        </p:spPr>
+        <p:txBody>
+          <a:bodyPr wrap="square" rtlCol="0">
+            <a:spAutoFit/>
+          </a:bodyPr>
+          <a:lstStyle/>
+          <a:p>
+            <a:pPr algn="ctr"/>
+            <a:r>
+              <a:rPr lang="en-US" i="1" u="sng" dirty="0" smtClean="0"/>
+              <a:t>Opponents</a:t>
+            </a:r>
+            <a:endParaRPr lang="en-US" i="1" u="sng" dirty="0"/>
+          </a:p>
+        </p:txBody>
+      </p:sp>
     </p:spTree>
     <p:extLst>
       <p:ext uri="{BB962C8B-B14F-4D97-AF65-F5344CB8AC3E}">
         <p14:creationId xmlns:p14="http://schemas.microsoft.com/office/powerpoint/2010/main" val="2729307286"/>
+      </p:ext>
+    </p:extLst>
+  </p:cSld>
+  <p:clrMapOvr>
+    <a:masterClrMapping/>
+  </p:clrMapOvr>
+</p:sld>
+</file>
+
+<file path=ppt/slides/slide4.xml><?xml version="1.0" encoding="utf-8"?>
+<p:sld xmlns:a="http://schemas.openxmlformats.org/drawingml/2006/main" xmlns:r="http://schemas.openxmlformats.org/officeDocument/2006/relationships" xmlns:p="http://schemas.openxmlformats.org/presentationml/2006/main">
+  <p:cSld>
+    <p:spTree>
+      <p:nvGrpSpPr>
+        <p:cNvPr id="1" name=""/>
+        <p:cNvGrpSpPr/>
+        <p:nvPr/>
+      </p:nvGrpSpPr>
+      <p:grpSpPr>
+        <a:xfrm>
+          <a:off x="0" y="0"/>
+          <a:ext cx="0" cy="0"/>
+          <a:chOff x="0" y="0"/>
+          <a:chExt cx="0" cy="0"/>
+        </a:xfrm>
+      </p:grpSpPr>
+      <p:sp>
+        <p:nvSpPr>
+          <p:cNvPr id="2" name="TextBox 1"/>
+          <p:cNvSpPr txBox="1"/>
+          <p:nvPr/>
+        </p:nvSpPr>
+        <p:spPr>
+          <a:xfrm>
+            <a:off x="914400" y="64292"/>
+            <a:ext cx="7315200" cy="461665"/>
+          </a:xfrm>
+          <a:prstGeom prst="rect">
+            <a:avLst/>
+          </a:prstGeom>
+          <a:noFill/>
+        </p:spPr>
+        <p:txBody>
+          <a:bodyPr wrap="square" rtlCol="0">
+            <a:spAutoFit/>
+          </a:bodyPr>
+          <a:lstStyle/>
+          <a:p>
+            <a:pPr algn="ctr"/>
+            <a:r>
+              <a:rPr lang="en-US" sz="2400" b="1" dirty="0" err="1" smtClean="0"/>
+              <a:t>Pub.L</a:t>
+            </a:r>
+            <a:r>
+              <a:rPr lang="en-US" sz="2400" b="1" dirty="0" smtClean="0"/>
+              <a:t>. 97-219 Small Business Innovation Act of 1982</a:t>
+            </a:r>
+          </a:p>
+        </p:txBody>
+      </p:sp>
+      <p:sp>
+        <p:nvSpPr>
+          <p:cNvPr id="3" name="TextBox 2"/>
+          <p:cNvSpPr txBox="1"/>
+          <p:nvPr/>
+        </p:nvSpPr>
+        <p:spPr>
+          <a:xfrm>
+            <a:off x="2286000" y="419100"/>
+            <a:ext cx="4572000" cy="369332"/>
+          </a:xfrm>
+          <a:prstGeom prst="rect">
+            <a:avLst/>
+          </a:prstGeom>
+          <a:noFill/>
+        </p:spPr>
+        <p:txBody>
+          <a:bodyPr wrap="square" rtlCol="0">
+            <a:spAutoFit/>
+          </a:bodyPr>
+          <a:lstStyle/>
+          <a:p>
+            <a:pPr algn="ctr"/>
+            <a:r>
+              <a:rPr lang="en-US" dirty="0" smtClean="0"/>
+              <a:t>Policy and Political Implications </a:t>
+            </a:r>
+            <a:r>
+              <a:rPr lang="en-US" dirty="0" smtClean="0"/>
+              <a:t>Flow (Cont’d)</a:t>
+            </a:r>
+            <a:endParaRPr lang="en-US" dirty="0"/>
+          </a:p>
+        </p:txBody>
+      </p:sp>
+      <p:grpSp>
+        <p:nvGrpSpPr>
+          <p:cNvPr id="32" name="Group 31"/>
+          <p:cNvGrpSpPr/>
+          <p:nvPr/>
+        </p:nvGrpSpPr>
+        <p:grpSpPr>
+          <a:xfrm>
+            <a:off x="4660076" y="1181673"/>
+            <a:ext cx="4400528" cy="2845158"/>
+            <a:chOff x="4660076" y="904378"/>
+            <a:chExt cx="4400528" cy="2845158"/>
+          </a:xfrm>
+        </p:grpSpPr>
+        <p:sp>
+          <p:nvSpPr>
+            <p:cNvPr id="4" name="Oval 3"/>
+            <p:cNvSpPr/>
+            <p:nvPr/>
+          </p:nvSpPr>
+          <p:spPr>
+            <a:xfrm>
+              <a:off x="4660076" y="1868818"/>
+              <a:ext cx="1371600" cy="914400"/>
+            </a:xfrm>
+            <a:prstGeom prst="ellipse">
+              <a:avLst/>
+            </a:prstGeom>
+          </p:spPr>
+          <p:style>
+            <a:lnRef idx="2">
+              <a:schemeClr val="accent2">
+                <a:shade val="50000"/>
+              </a:schemeClr>
+            </a:lnRef>
+            <a:fillRef idx="1">
+              <a:schemeClr val="accent2"/>
+            </a:fillRef>
+            <a:effectRef idx="0">
+              <a:schemeClr val="accent2"/>
+            </a:effectRef>
+            <a:fontRef idx="minor">
+              <a:schemeClr val="lt1"/>
+            </a:fontRef>
+          </p:style>
+          <p:txBody>
+            <a:bodyPr lIns="9144" rIns="9144" rtlCol="0" anchor="ctr"/>
+            <a:lstStyle/>
+            <a:p>
+              <a:pPr algn="ctr"/>
+              <a:r>
+                <a:rPr lang="en-US" sz="1000" dirty="0" smtClean="0"/>
+                <a:t>Talented researchers with innovative ideas are being denied opportunities.</a:t>
+              </a:r>
+              <a:endParaRPr lang="en-US" sz="1000" dirty="0"/>
+            </a:p>
+          </p:txBody>
+        </p:sp>
+        <p:sp>
+          <p:nvSpPr>
+            <p:cNvPr id="5" name="Oval 4"/>
+            <p:cNvSpPr>
+              <a:spLocks/>
+            </p:cNvSpPr>
+            <p:nvPr/>
+          </p:nvSpPr>
+          <p:spPr>
+            <a:xfrm>
+              <a:off x="8146204" y="904378"/>
+              <a:ext cx="914400" cy="914400"/>
+            </a:xfrm>
+            <a:prstGeom prst="ellipse">
+              <a:avLst/>
+            </a:prstGeom>
+          </p:spPr>
+          <p:style>
+            <a:lnRef idx="2">
+              <a:schemeClr val="accent2">
+                <a:shade val="50000"/>
+              </a:schemeClr>
+            </a:lnRef>
+            <a:fillRef idx="1">
+              <a:schemeClr val="accent2"/>
+            </a:fillRef>
+            <a:effectRef idx="0">
+              <a:schemeClr val="accent2"/>
+            </a:effectRef>
+            <a:fontRef idx="minor">
+              <a:schemeClr val="lt1"/>
+            </a:fontRef>
+          </p:style>
+          <p:txBody>
+            <a:bodyPr lIns="9144" rIns="9144" rtlCol="0" anchor="ctr"/>
+            <a:lstStyle/>
+            <a:p>
+              <a:pPr algn="ctr"/>
+              <a:r>
+                <a:rPr lang="en-US" sz="1000" dirty="0" smtClean="0"/>
+                <a:t>Eroding what makes America superior.</a:t>
+              </a:r>
+              <a:endParaRPr lang="en-US" sz="1000" dirty="0"/>
+            </a:p>
+          </p:txBody>
+        </p:sp>
+        <p:sp>
+          <p:nvSpPr>
+            <p:cNvPr id="6" name="Rounded Rectangle 5"/>
+            <p:cNvSpPr/>
+            <p:nvPr/>
+          </p:nvSpPr>
+          <p:spPr>
+            <a:xfrm>
+              <a:off x="6388855" y="1868818"/>
+              <a:ext cx="1371600" cy="914400"/>
+            </a:xfrm>
+            <a:prstGeom prst="roundRect">
+              <a:avLst/>
+            </a:prstGeom>
+            <a:solidFill>
+              <a:schemeClr val="bg1">
+                <a:lumMod val="50000"/>
+              </a:schemeClr>
+            </a:solidFill>
+            <a:ln>
+              <a:solidFill>
+                <a:schemeClr val="tx1">
+                  <a:lumMod val="65000"/>
+                  <a:lumOff val="35000"/>
+                </a:schemeClr>
+              </a:solidFill>
+            </a:ln>
+          </p:spPr>
+          <p:style>
+            <a:lnRef idx="2">
+              <a:schemeClr val="accent1">
+                <a:shade val="50000"/>
+              </a:schemeClr>
+            </a:lnRef>
+            <a:fillRef idx="1">
+              <a:schemeClr val="accent1"/>
+            </a:fillRef>
+            <a:effectRef idx="0">
+              <a:schemeClr val="accent1"/>
+            </a:effectRef>
+            <a:fontRef idx="minor">
+              <a:schemeClr val="lt1"/>
+            </a:fontRef>
+          </p:style>
+          <p:txBody>
+            <a:bodyPr rtlCol="0" anchor="ctr"/>
+            <a:lstStyle/>
+            <a:p>
+              <a:pPr algn="ctr"/>
+              <a:r>
+                <a:rPr lang="en-US" sz="1000" dirty="0" smtClean="0"/>
+                <a:t>Researchers at larger institutions are being punished simply because of where they work.</a:t>
+              </a:r>
+              <a:endParaRPr lang="en-US" sz="1000" dirty="0"/>
+            </a:p>
+          </p:txBody>
+        </p:sp>
+        <p:cxnSp>
+          <p:nvCxnSpPr>
+            <p:cNvPr id="7" name="Straight Arrow Connector 6"/>
+            <p:cNvCxnSpPr>
+              <a:stCxn id="4" idx="6"/>
+              <a:endCxn id="6" idx="1"/>
+            </p:cNvCxnSpPr>
+            <p:nvPr/>
+          </p:nvCxnSpPr>
+          <p:spPr>
+            <a:xfrm>
+              <a:off x="6031676" y="2326018"/>
+              <a:ext cx="357179" cy="0"/>
+            </a:xfrm>
+            <a:prstGeom prst="straightConnector1">
+              <a:avLst/>
+            </a:prstGeom>
+            <a:ln w="50800">
+              <a:solidFill>
+                <a:schemeClr val="tx1"/>
+              </a:solidFill>
+              <a:tailEnd type="triangle" w="med" len="med"/>
+            </a:ln>
+          </p:spPr>
+          <p:style>
+            <a:lnRef idx="1">
+              <a:schemeClr val="accent1"/>
+            </a:lnRef>
+            <a:fillRef idx="0">
+              <a:schemeClr val="accent1"/>
+            </a:fillRef>
+            <a:effectRef idx="0">
+              <a:schemeClr val="accent1"/>
+            </a:effectRef>
+            <a:fontRef idx="minor">
+              <a:schemeClr val="tx1"/>
+            </a:fontRef>
+          </p:style>
+        </p:cxnSp>
+        <p:cxnSp>
+          <p:nvCxnSpPr>
+            <p:cNvPr id="8" name="Straight Arrow Connector 7"/>
+            <p:cNvCxnSpPr>
+              <a:stCxn id="6" idx="3"/>
+              <a:endCxn id="5" idx="3"/>
+            </p:cNvCxnSpPr>
+            <p:nvPr/>
+          </p:nvCxnSpPr>
+          <p:spPr>
+            <a:xfrm flipV="1">
+              <a:off x="7760455" y="1684867"/>
+              <a:ext cx="519660" cy="641151"/>
+            </a:xfrm>
+            <a:prstGeom prst="straightConnector1">
+              <a:avLst/>
+            </a:prstGeom>
+            <a:ln w="50800">
+              <a:solidFill>
+                <a:schemeClr val="tx1"/>
+              </a:solidFill>
+              <a:tailEnd type="triangle" w="med" len="med"/>
+            </a:ln>
+          </p:spPr>
+          <p:style>
+            <a:lnRef idx="1">
+              <a:schemeClr val="accent1"/>
+            </a:lnRef>
+            <a:fillRef idx="0">
+              <a:schemeClr val="accent1"/>
+            </a:fillRef>
+            <a:effectRef idx="0">
+              <a:schemeClr val="accent1"/>
+            </a:effectRef>
+            <a:fontRef idx="minor">
+              <a:schemeClr val="tx1"/>
+            </a:fontRef>
+          </p:style>
+        </p:cxnSp>
+        <p:cxnSp>
+          <p:nvCxnSpPr>
+            <p:cNvPr id="10" name="Straight Arrow Connector 9"/>
+            <p:cNvCxnSpPr>
+              <a:stCxn id="6" idx="3"/>
+              <a:endCxn id="11" idx="2"/>
+            </p:cNvCxnSpPr>
+            <p:nvPr/>
+          </p:nvCxnSpPr>
+          <p:spPr>
+            <a:xfrm flipV="1">
+              <a:off x="7760455" y="2326017"/>
+              <a:ext cx="385749" cy="1"/>
+            </a:xfrm>
+            <a:prstGeom prst="straightConnector1">
+              <a:avLst/>
+            </a:prstGeom>
+            <a:ln w="50800">
+              <a:solidFill>
+                <a:schemeClr val="tx1"/>
+              </a:solidFill>
+              <a:tailEnd type="triangle" w="med" len="med"/>
+            </a:ln>
+          </p:spPr>
+          <p:style>
+            <a:lnRef idx="1">
+              <a:schemeClr val="accent1"/>
+            </a:lnRef>
+            <a:fillRef idx="0">
+              <a:schemeClr val="accent1"/>
+            </a:fillRef>
+            <a:effectRef idx="0">
+              <a:schemeClr val="accent1"/>
+            </a:effectRef>
+            <a:fontRef idx="minor">
+              <a:schemeClr val="tx1"/>
+            </a:fontRef>
+          </p:style>
+        </p:cxnSp>
+        <p:sp>
+          <p:nvSpPr>
+            <p:cNvPr id="11" name="Oval 10"/>
+            <p:cNvSpPr>
+              <a:spLocks/>
+            </p:cNvSpPr>
+            <p:nvPr/>
+          </p:nvSpPr>
+          <p:spPr>
+            <a:xfrm>
+              <a:off x="8146204" y="1868817"/>
+              <a:ext cx="914400" cy="914400"/>
+            </a:xfrm>
+            <a:prstGeom prst="ellipse">
+              <a:avLst/>
+            </a:prstGeom>
+          </p:spPr>
+          <p:style>
+            <a:lnRef idx="2">
+              <a:schemeClr val="accent2">
+                <a:shade val="50000"/>
+              </a:schemeClr>
+            </a:lnRef>
+            <a:fillRef idx="1">
+              <a:schemeClr val="accent2"/>
+            </a:fillRef>
+            <a:effectRef idx="0">
+              <a:schemeClr val="accent2"/>
+            </a:effectRef>
+            <a:fontRef idx="minor">
+              <a:schemeClr val="lt1"/>
+            </a:fontRef>
+          </p:style>
+          <p:txBody>
+            <a:bodyPr lIns="9144" rIns="9144" rtlCol="0" anchor="ctr"/>
+            <a:lstStyle/>
+            <a:p>
+              <a:pPr algn="ctr"/>
+              <a:r>
+                <a:rPr lang="en-US" sz="1000" dirty="0" smtClean="0"/>
+                <a:t>Reduction of  innovation.</a:t>
+              </a:r>
+              <a:endParaRPr lang="en-US" sz="1000" dirty="0"/>
+            </a:p>
+          </p:txBody>
+        </p:sp>
+        <p:sp>
+          <p:nvSpPr>
+            <p:cNvPr id="12" name="Oval 11"/>
+            <p:cNvSpPr>
+              <a:spLocks/>
+            </p:cNvSpPr>
+            <p:nvPr/>
+          </p:nvSpPr>
+          <p:spPr>
+            <a:xfrm>
+              <a:off x="8146204" y="2835136"/>
+              <a:ext cx="914400" cy="914400"/>
+            </a:xfrm>
+            <a:prstGeom prst="ellipse">
+              <a:avLst/>
+            </a:prstGeom>
+          </p:spPr>
+          <p:style>
+            <a:lnRef idx="2">
+              <a:schemeClr val="accent2">
+                <a:shade val="50000"/>
+              </a:schemeClr>
+            </a:lnRef>
+            <a:fillRef idx="1">
+              <a:schemeClr val="accent2"/>
+            </a:fillRef>
+            <a:effectRef idx="0">
+              <a:schemeClr val="accent2"/>
+            </a:effectRef>
+            <a:fontRef idx="minor">
+              <a:schemeClr val="lt1"/>
+            </a:fontRef>
+          </p:style>
+          <p:txBody>
+            <a:bodyPr lIns="9144" rIns="9144" rtlCol="0" anchor="ctr"/>
+            <a:lstStyle/>
+            <a:p>
+              <a:pPr algn="ctr"/>
+              <a:r>
+                <a:rPr lang="en-US" sz="1000" dirty="0" smtClean="0"/>
+                <a:t>Loss of global dominance.</a:t>
+              </a:r>
+              <a:endParaRPr lang="en-US" sz="1000" dirty="0"/>
+            </a:p>
+          </p:txBody>
+        </p:sp>
+        <p:cxnSp>
+          <p:nvCxnSpPr>
+            <p:cNvPr id="18" name="Straight Arrow Connector 17"/>
+            <p:cNvCxnSpPr>
+              <a:stCxn id="6" idx="3"/>
+              <a:endCxn id="12" idx="1"/>
+            </p:cNvCxnSpPr>
+            <p:nvPr/>
+          </p:nvCxnSpPr>
+          <p:spPr>
+            <a:xfrm>
+              <a:off x="7760455" y="2326018"/>
+              <a:ext cx="519660" cy="643029"/>
+            </a:xfrm>
+            <a:prstGeom prst="straightConnector1">
+              <a:avLst/>
+            </a:prstGeom>
+            <a:ln w="50800">
+              <a:solidFill>
+                <a:schemeClr val="tx1"/>
+              </a:solidFill>
+              <a:tailEnd type="triangle" w="med" len="med"/>
+            </a:ln>
+          </p:spPr>
+          <p:style>
+            <a:lnRef idx="1">
+              <a:schemeClr val="accent1"/>
+            </a:lnRef>
+            <a:fillRef idx="0">
+              <a:schemeClr val="accent1"/>
+            </a:fillRef>
+            <a:effectRef idx="0">
+              <a:schemeClr val="accent1"/>
+            </a:effectRef>
+            <a:fontRef idx="minor">
+              <a:schemeClr val="tx1"/>
+            </a:fontRef>
+          </p:style>
+        </p:cxnSp>
+      </p:grpSp>
+      <p:grpSp>
+        <p:nvGrpSpPr>
+          <p:cNvPr id="22" name="Group 21"/>
+          <p:cNvGrpSpPr/>
+          <p:nvPr/>
+        </p:nvGrpSpPr>
+        <p:grpSpPr>
+          <a:xfrm>
+            <a:off x="95220" y="1184327"/>
+            <a:ext cx="4400528" cy="2839850"/>
+            <a:chOff x="4660076" y="2763209"/>
+            <a:chExt cx="4400528" cy="2839850"/>
+          </a:xfrm>
+        </p:grpSpPr>
+        <p:sp>
+          <p:nvSpPr>
+            <p:cNvPr id="23" name="Oval 22"/>
+            <p:cNvSpPr/>
+            <p:nvPr/>
+          </p:nvSpPr>
+          <p:spPr>
+            <a:xfrm>
+              <a:off x="4660076" y="3724214"/>
+              <a:ext cx="1371600" cy="914400"/>
+            </a:xfrm>
+            <a:prstGeom prst="ellipse">
+              <a:avLst/>
+            </a:prstGeom>
+          </p:spPr>
+          <p:style>
+            <a:lnRef idx="2">
+              <a:schemeClr val="accent3">
+                <a:shade val="50000"/>
+              </a:schemeClr>
+            </a:lnRef>
+            <a:fillRef idx="1">
+              <a:schemeClr val="accent3"/>
+            </a:fillRef>
+            <a:effectRef idx="0">
+              <a:schemeClr val="accent3"/>
+            </a:effectRef>
+            <a:fontRef idx="minor">
+              <a:schemeClr val="lt1"/>
+            </a:fontRef>
+          </p:style>
+          <p:txBody>
+            <a:bodyPr lIns="9144" rIns="9144" rtlCol="0" anchor="ctr"/>
+            <a:lstStyle/>
+            <a:p>
+              <a:pPr algn="ctr"/>
+              <a:r>
+                <a:rPr lang="en-US" sz="1000" dirty="0" smtClean="0"/>
+                <a:t>Small businesses are more efficient innovators.</a:t>
+              </a:r>
+              <a:endParaRPr lang="en-US" sz="1000" dirty="0"/>
+            </a:p>
+          </p:txBody>
+        </p:sp>
+        <p:sp>
+          <p:nvSpPr>
+            <p:cNvPr id="24" name="Oval 23"/>
+            <p:cNvSpPr>
+              <a:spLocks/>
+            </p:cNvSpPr>
+            <p:nvPr/>
+          </p:nvSpPr>
+          <p:spPr>
+            <a:xfrm>
+              <a:off x="8146204" y="3724214"/>
+              <a:ext cx="914400" cy="914400"/>
+            </a:xfrm>
+            <a:prstGeom prst="ellipse">
+              <a:avLst/>
+            </a:prstGeom>
+          </p:spPr>
+          <p:style>
+            <a:lnRef idx="2">
+              <a:schemeClr val="accent3">
+                <a:shade val="50000"/>
+              </a:schemeClr>
+            </a:lnRef>
+            <a:fillRef idx="1">
+              <a:schemeClr val="accent3"/>
+            </a:fillRef>
+            <a:effectRef idx="0">
+              <a:schemeClr val="accent3"/>
+            </a:effectRef>
+            <a:fontRef idx="minor">
+              <a:schemeClr val="lt1"/>
+            </a:fontRef>
+          </p:style>
+          <p:txBody>
+            <a:bodyPr lIns="9144" rIns="9144" rtlCol="0" anchor="ctr"/>
+            <a:lstStyle/>
+            <a:p>
+              <a:pPr algn="ctr"/>
+              <a:r>
+                <a:rPr lang="en-US" sz="1000" dirty="0" smtClean="0"/>
+                <a:t>Maintain global dominance</a:t>
+              </a:r>
+              <a:endParaRPr lang="en-US" sz="1000" dirty="0"/>
+            </a:p>
+          </p:txBody>
+        </p:sp>
+        <p:sp>
+          <p:nvSpPr>
+            <p:cNvPr id="25" name="Rounded Rectangle 24"/>
+            <p:cNvSpPr/>
+            <p:nvPr/>
+          </p:nvSpPr>
+          <p:spPr>
+            <a:xfrm>
+              <a:off x="6388855" y="3724214"/>
+              <a:ext cx="1371600" cy="914400"/>
+            </a:xfrm>
+            <a:prstGeom prst="roundRect">
+              <a:avLst/>
+            </a:prstGeom>
+            <a:solidFill>
+              <a:schemeClr val="bg1">
+                <a:lumMod val="50000"/>
+              </a:schemeClr>
+            </a:solidFill>
+            <a:ln>
+              <a:solidFill>
+                <a:schemeClr val="tx1">
+                  <a:lumMod val="65000"/>
+                  <a:lumOff val="35000"/>
+                </a:schemeClr>
+              </a:solidFill>
+            </a:ln>
+          </p:spPr>
+          <p:style>
+            <a:lnRef idx="2">
+              <a:schemeClr val="accent1">
+                <a:shade val="50000"/>
+              </a:schemeClr>
+            </a:lnRef>
+            <a:fillRef idx="1">
+              <a:schemeClr val="accent1"/>
+            </a:fillRef>
+            <a:effectRef idx="0">
+              <a:schemeClr val="accent1"/>
+            </a:effectRef>
+            <a:fontRef idx="minor">
+              <a:schemeClr val="lt1"/>
+            </a:fontRef>
+          </p:style>
+          <p:txBody>
+            <a:bodyPr rtlCol="0" anchor="ctr"/>
+            <a:lstStyle/>
+            <a:p>
+              <a:pPr algn="ctr"/>
+              <a:r>
+                <a:rPr lang="en-US" sz="1000" dirty="0" smtClean="0"/>
+                <a:t>Smal</a:t>
+              </a:r>
+              <a:r>
+                <a:rPr lang="en-US" sz="1000" dirty="0" smtClean="0"/>
+                <a:t>l businesses will create significant technological innovations if given a fair chance.</a:t>
+              </a:r>
+              <a:endParaRPr lang="en-US" sz="1000" dirty="0"/>
+            </a:p>
+          </p:txBody>
+        </p:sp>
+        <p:cxnSp>
+          <p:nvCxnSpPr>
+            <p:cNvPr id="26" name="Straight Arrow Connector 25"/>
+            <p:cNvCxnSpPr>
+              <a:stCxn id="23" idx="6"/>
+              <a:endCxn id="25" idx="1"/>
+            </p:cNvCxnSpPr>
+            <p:nvPr/>
+          </p:nvCxnSpPr>
+          <p:spPr>
+            <a:xfrm>
+              <a:off x="6031676" y="4181414"/>
+              <a:ext cx="357179" cy="0"/>
+            </a:xfrm>
+            <a:prstGeom prst="straightConnector1">
+              <a:avLst/>
+            </a:prstGeom>
+            <a:ln w="50800">
+              <a:solidFill>
+                <a:schemeClr val="tx1"/>
+              </a:solidFill>
+              <a:tailEnd type="triangle" w="med" len="med"/>
+            </a:ln>
+          </p:spPr>
+          <p:style>
+            <a:lnRef idx="1">
+              <a:schemeClr val="accent1"/>
+            </a:lnRef>
+            <a:fillRef idx="0">
+              <a:schemeClr val="accent1"/>
+            </a:fillRef>
+            <a:effectRef idx="0">
+              <a:schemeClr val="accent1"/>
+            </a:effectRef>
+            <a:fontRef idx="minor">
+              <a:schemeClr val="tx1"/>
+            </a:fontRef>
+          </p:style>
+        </p:cxnSp>
+        <p:cxnSp>
+          <p:nvCxnSpPr>
+            <p:cNvPr id="27" name="Straight Arrow Connector 26"/>
+            <p:cNvCxnSpPr>
+              <a:stCxn id="25" idx="3"/>
+              <a:endCxn id="24" idx="2"/>
+            </p:cNvCxnSpPr>
+            <p:nvPr/>
+          </p:nvCxnSpPr>
+          <p:spPr>
+            <a:xfrm>
+              <a:off x="7760455" y="4181414"/>
+              <a:ext cx="385749" cy="0"/>
+            </a:xfrm>
+            <a:prstGeom prst="straightConnector1">
+              <a:avLst/>
+            </a:prstGeom>
+            <a:ln w="50800">
+              <a:solidFill>
+                <a:schemeClr val="tx1"/>
+              </a:solidFill>
+              <a:tailEnd type="triangle" w="med" len="med"/>
+            </a:ln>
+          </p:spPr>
+          <p:style>
+            <a:lnRef idx="1">
+              <a:schemeClr val="accent1"/>
+            </a:lnRef>
+            <a:fillRef idx="0">
+              <a:schemeClr val="accent1"/>
+            </a:fillRef>
+            <a:effectRef idx="0">
+              <a:schemeClr val="accent1"/>
+            </a:effectRef>
+            <a:fontRef idx="minor">
+              <a:schemeClr val="tx1"/>
+            </a:fontRef>
+          </p:style>
+        </p:cxnSp>
+        <p:sp>
+          <p:nvSpPr>
+            <p:cNvPr id="28" name="Oval 27"/>
+            <p:cNvSpPr>
+              <a:spLocks/>
+            </p:cNvSpPr>
+            <p:nvPr/>
+          </p:nvSpPr>
+          <p:spPr>
+            <a:xfrm>
+              <a:off x="8146204" y="2763209"/>
+              <a:ext cx="914400" cy="914400"/>
+            </a:xfrm>
+            <a:prstGeom prst="ellipse">
+              <a:avLst/>
+            </a:prstGeom>
+          </p:spPr>
+          <p:style>
+            <a:lnRef idx="2">
+              <a:schemeClr val="accent3">
+                <a:shade val="50000"/>
+              </a:schemeClr>
+            </a:lnRef>
+            <a:fillRef idx="1">
+              <a:schemeClr val="accent3"/>
+            </a:fillRef>
+            <a:effectRef idx="0">
+              <a:schemeClr val="accent3"/>
+            </a:effectRef>
+            <a:fontRef idx="minor">
+              <a:schemeClr val="lt1"/>
+            </a:fontRef>
+          </p:style>
+          <p:txBody>
+            <a:bodyPr lIns="9144" rIns="9144" rtlCol="0" anchor="ctr"/>
+            <a:lstStyle/>
+            <a:p>
+              <a:pPr algn="ctr"/>
+              <a:r>
+                <a:rPr lang="en-US" sz="1000" dirty="0" smtClean="0"/>
+                <a:t>Maintain our way of life</a:t>
+              </a:r>
+              <a:endParaRPr lang="en-US" sz="1000" dirty="0"/>
+            </a:p>
+          </p:txBody>
+        </p:sp>
+        <p:sp>
+          <p:nvSpPr>
+            <p:cNvPr id="29" name="Oval 28"/>
+            <p:cNvSpPr>
+              <a:spLocks/>
+            </p:cNvSpPr>
+            <p:nvPr/>
+          </p:nvSpPr>
+          <p:spPr>
+            <a:xfrm>
+              <a:off x="8146204" y="4688659"/>
+              <a:ext cx="914400" cy="914400"/>
+            </a:xfrm>
+            <a:prstGeom prst="ellipse">
+              <a:avLst/>
+            </a:prstGeom>
+          </p:spPr>
+          <p:style>
+            <a:lnRef idx="2">
+              <a:schemeClr val="accent3">
+                <a:shade val="50000"/>
+              </a:schemeClr>
+            </a:lnRef>
+            <a:fillRef idx="1">
+              <a:schemeClr val="accent3"/>
+            </a:fillRef>
+            <a:effectRef idx="0">
+              <a:schemeClr val="accent3"/>
+            </a:effectRef>
+            <a:fontRef idx="minor">
+              <a:schemeClr val="lt1"/>
+            </a:fontRef>
+          </p:style>
+          <p:txBody>
+            <a:bodyPr lIns="9144" rIns="9144" rtlCol="0" anchor="ctr"/>
+            <a:lstStyle/>
+            <a:p>
+              <a:pPr algn="ctr"/>
+              <a:r>
+                <a:rPr lang="en-US" sz="1000" dirty="0" smtClean="0"/>
+                <a:t>Generate economic prosperity</a:t>
+              </a:r>
+              <a:endParaRPr lang="en-US" sz="1000" dirty="0"/>
+            </a:p>
+          </p:txBody>
+        </p:sp>
+        <p:cxnSp>
+          <p:nvCxnSpPr>
+            <p:cNvPr id="30" name="Straight Arrow Connector 29"/>
+            <p:cNvCxnSpPr>
+              <a:stCxn id="25" idx="3"/>
+              <a:endCxn id="28" idx="3"/>
+            </p:cNvCxnSpPr>
+            <p:nvPr/>
+          </p:nvCxnSpPr>
+          <p:spPr>
+            <a:xfrm flipV="1">
+              <a:off x="7760455" y="3543698"/>
+              <a:ext cx="519660" cy="637716"/>
+            </a:xfrm>
+            <a:prstGeom prst="straightConnector1">
+              <a:avLst/>
+            </a:prstGeom>
+            <a:ln w="50800">
+              <a:solidFill>
+                <a:schemeClr val="tx1"/>
+              </a:solidFill>
+              <a:tailEnd type="triangle" w="med" len="med"/>
+            </a:ln>
+          </p:spPr>
+          <p:style>
+            <a:lnRef idx="1">
+              <a:schemeClr val="accent1"/>
+            </a:lnRef>
+            <a:fillRef idx="0">
+              <a:schemeClr val="accent1"/>
+            </a:fillRef>
+            <a:effectRef idx="0">
+              <a:schemeClr val="accent1"/>
+            </a:effectRef>
+            <a:fontRef idx="minor">
+              <a:schemeClr val="tx1"/>
+            </a:fontRef>
+          </p:style>
+        </p:cxnSp>
+        <p:cxnSp>
+          <p:nvCxnSpPr>
+            <p:cNvPr id="31" name="Straight Arrow Connector 30"/>
+            <p:cNvCxnSpPr>
+              <a:stCxn id="25" idx="3"/>
+              <a:endCxn id="29" idx="1"/>
+            </p:cNvCxnSpPr>
+            <p:nvPr/>
+          </p:nvCxnSpPr>
+          <p:spPr>
+            <a:xfrm>
+              <a:off x="7760455" y="4181414"/>
+              <a:ext cx="519660" cy="641156"/>
+            </a:xfrm>
+            <a:prstGeom prst="straightConnector1">
+              <a:avLst/>
+            </a:prstGeom>
+            <a:ln w="50800">
+              <a:solidFill>
+                <a:schemeClr val="tx1"/>
+              </a:solidFill>
+              <a:tailEnd type="triangle" w="med" len="med"/>
+            </a:ln>
+          </p:spPr>
+          <p:style>
+            <a:lnRef idx="1">
+              <a:schemeClr val="accent1"/>
+            </a:lnRef>
+            <a:fillRef idx="0">
+              <a:schemeClr val="accent1"/>
+            </a:fillRef>
+            <a:effectRef idx="0">
+              <a:schemeClr val="accent1"/>
+            </a:effectRef>
+            <a:fontRef idx="minor">
+              <a:schemeClr val="tx1"/>
+            </a:fontRef>
+          </p:style>
+        </p:cxnSp>
+      </p:grpSp>
+      <p:cxnSp>
+        <p:nvCxnSpPr>
+          <p:cNvPr id="33" name="Straight Connector 32"/>
+          <p:cNvCxnSpPr/>
+          <p:nvPr/>
+        </p:nvCxnSpPr>
+        <p:spPr>
+          <a:xfrm>
+            <a:off x="4572000" y="786831"/>
+            <a:ext cx="0" cy="4572000"/>
+          </a:xfrm>
+          <a:prstGeom prst="line">
+            <a:avLst/>
+          </a:prstGeom>
+          <a:ln w="19050">
+            <a:prstDash val="sysDash"/>
+          </a:ln>
+        </p:spPr>
+        <p:style>
+          <a:lnRef idx="1">
+            <a:schemeClr val="accent1"/>
+          </a:lnRef>
+          <a:fillRef idx="0">
+            <a:schemeClr val="accent1"/>
+          </a:fillRef>
+          <a:effectRef idx="0">
+            <a:schemeClr val="accent1"/>
+          </a:effectRef>
+          <a:fontRef idx="minor">
+            <a:schemeClr val="tx1"/>
+          </a:fontRef>
+        </p:style>
+      </p:cxnSp>
+      <p:sp>
+        <p:nvSpPr>
+          <p:cNvPr id="34" name="TextBox 33"/>
+          <p:cNvSpPr txBox="1"/>
+          <p:nvPr/>
+        </p:nvSpPr>
+        <p:spPr>
+          <a:xfrm>
+            <a:off x="1066800" y="740569"/>
+            <a:ext cx="1828800" cy="365760"/>
+          </a:xfrm>
+          <a:prstGeom prst="rect">
+            <a:avLst/>
+          </a:prstGeom>
+          <a:noFill/>
+        </p:spPr>
+        <p:txBody>
+          <a:bodyPr wrap="square" rtlCol="0">
+            <a:spAutoFit/>
+          </a:bodyPr>
+          <a:lstStyle/>
+          <a:p>
+            <a:pPr algn="ctr"/>
+            <a:r>
+              <a:rPr lang="en-US" i="1" u="sng" dirty="0" smtClean="0"/>
+              <a:t>Proponents</a:t>
+            </a:r>
+            <a:endParaRPr lang="en-US" i="1" u="sng" dirty="0"/>
+          </a:p>
+        </p:txBody>
+      </p:sp>
+      <p:sp>
+        <p:nvSpPr>
+          <p:cNvPr id="35" name="TextBox 34"/>
+          <p:cNvSpPr txBox="1"/>
+          <p:nvPr/>
+        </p:nvSpPr>
+        <p:spPr>
+          <a:xfrm>
+            <a:off x="6096000" y="740569"/>
+            <a:ext cx="1828800" cy="365760"/>
+          </a:xfrm>
+          <a:prstGeom prst="rect">
+            <a:avLst/>
+          </a:prstGeom>
+          <a:noFill/>
+        </p:spPr>
+        <p:txBody>
+          <a:bodyPr wrap="square" rtlCol="0">
+            <a:spAutoFit/>
+          </a:bodyPr>
+          <a:lstStyle/>
+          <a:p>
+            <a:pPr algn="ctr"/>
+            <a:r>
+              <a:rPr lang="en-US" i="1" u="sng" dirty="0" smtClean="0"/>
+              <a:t>Opponents</a:t>
+            </a:r>
+            <a:endParaRPr lang="en-US" i="1" u="sng" dirty="0"/>
+          </a:p>
+        </p:txBody>
+      </p:sp>
+    </p:spTree>
+    <p:extLst>
+      <p:ext uri="{BB962C8B-B14F-4D97-AF65-F5344CB8AC3E}">
+        <p14:creationId xmlns:p14="http://schemas.microsoft.com/office/powerpoint/2010/main" val="3238076870"/>
       </p:ext>
     </p:extLst>
   </p:cSld>

</xml_diff>

<commit_message>
Completed draft of slides for Assignment 01
</commit_message>
<xml_diff>
--- a/Assignments/Townes_POLS6310_Spring2019_Assignment01.pptx
+++ b/Assignments/Townes_POLS6310_Spring2019_Assignment01.pptx
@@ -1627,7 +1627,11 @@
         <a:p>
           <a:r>
             <a:rPr lang="en-US" sz="1000" dirty="0" smtClean="0"/>
-            <a:t>Change Narrative</a:t>
+            <a:t>Decline </a:t>
+          </a:r>
+          <a:r>
+            <a:rPr lang="en-US" sz="1000" dirty="0" smtClean="0"/>
+            <a:t>Narrative</a:t>
           </a:r>
           <a:endParaRPr lang="en-US" sz="1000" dirty="0"/>
         </a:p>
@@ -1927,7 +1931,7 @@
         <a:p>
           <a:r>
             <a:rPr lang="en-US" sz="1000" dirty="0" smtClean="0"/>
-            <a:t>Stakeholder</a:t>
+            <a:t>Administrator of the U.S. Small Business Administration</a:t>
           </a:r>
           <a:endParaRPr lang="en-US" sz="1000" dirty="0"/>
         </a:p>
@@ -1964,7 +1968,7 @@
         <a:p>
           <a:r>
             <a:rPr lang="en-US" sz="1000" dirty="0" smtClean="0"/>
-            <a:t>Stakeholder</a:t>
+            <a:t>Small business advocacy organizations</a:t>
           </a:r>
           <a:endParaRPr lang="en-US" sz="1000" dirty="0"/>
         </a:p>
@@ -2001,7 +2005,7 @@
         <a:p>
           <a:r>
             <a:rPr lang="en-US" sz="1000" dirty="0" smtClean="0"/>
-            <a:t>Stakeholder</a:t>
+            <a:t>Executives of large businesses</a:t>
           </a:r>
           <a:endParaRPr lang="en-US" sz="1000" dirty="0"/>
         </a:p>
@@ -2029,43 +2033,6 @@
         </a:p>
       </dgm:t>
     </dgm:pt>
-    <dgm:pt modelId="{C9FC25FD-4E5C-4A64-AFF0-7D16F6FBC7AA}">
-      <dgm:prSet phldrT="[Text]" custT="1"/>
-      <dgm:spPr/>
-      <dgm:t>
-        <a:bodyPr/>
-        <a:lstStyle/>
-        <a:p>
-          <a:r>
-            <a:rPr lang="en-US" sz="1000" dirty="0" smtClean="0"/>
-            <a:t>Stakeholder</a:t>
-          </a:r>
-          <a:endParaRPr lang="en-US" sz="1000" dirty="0"/>
-        </a:p>
-      </dgm:t>
-    </dgm:pt>
-    <dgm:pt modelId="{F9793D06-E836-466C-83D6-58F72B9C8CB4}" type="parTrans" cxnId="{092A9CEB-5EFE-4BCC-90CE-2FB92ECEC62E}">
-      <dgm:prSet/>
-      <dgm:spPr/>
-      <dgm:t>
-        <a:bodyPr/>
-        <a:lstStyle/>
-        <a:p>
-          <a:endParaRPr lang="en-US"/>
-        </a:p>
-      </dgm:t>
-    </dgm:pt>
-    <dgm:pt modelId="{ED1FB57D-D2B1-48EC-8B8D-C19F6680A4CF}" type="sibTrans" cxnId="{092A9CEB-5EFE-4BCC-90CE-2FB92ECEC62E}">
-      <dgm:prSet/>
-      <dgm:spPr/>
-      <dgm:t>
-        <a:bodyPr/>
-        <a:lstStyle/>
-        <a:p>
-          <a:endParaRPr lang="en-US"/>
-        </a:p>
-      </dgm:t>
-    </dgm:pt>
     <dgm:pt modelId="{19EF64AF-D0D9-429E-86D3-4CE7A62D9930}">
       <dgm:prSet phldrT="[Text]" custT="1"/>
       <dgm:spPr/>
@@ -2112,7 +2079,19 @@
         <a:p>
           <a:r>
             <a:rPr lang="en-US" sz="1000" dirty="0" smtClean="0"/>
-            <a:t>Contract specialists are  making things as easy as possible for themselves by discriminating against small businesses.</a:t>
+            <a:t>Contract </a:t>
+          </a:r>
+          <a:r>
+            <a:rPr lang="en-US" sz="1000" dirty="0" smtClean="0"/>
+            <a:t>administrators are discriminating </a:t>
+          </a:r>
+          <a:r>
+            <a:rPr lang="en-US" sz="1000" dirty="0" smtClean="0"/>
+            <a:t>against small </a:t>
+          </a:r>
+          <a:r>
+            <a:rPr lang="en-US" sz="1000" dirty="0" smtClean="0"/>
+            <a:t>businesses to make things easier for themselves.</a:t>
           </a:r>
           <a:endParaRPr lang="en-US" sz="1000" dirty="0"/>
         </a:p>
@@ -2186,7 +2165,7 @@
         <a:p>
           <a:r>
             <a:rPr lang="en-US" sz="1000" dirty="0" smtClean="0"/>
-            <a:t>Stakeholder</a:t>
+            <a:t>Executives of large businesses</a:t>
           </a:r>
           <a:endParaRPr lang="en-US" sz="1000" dirty="0"/>
         </a:p>
@@ -2204,6 +2183,80 @@
       </dgm:t>
     </dgm:pt>
     <dgm:pt modelId="{EE9BAB10-D308-456A-ADB5-78C6FFFB97E6}" type="sibTrans" cxnId="{5B81B842-285D-4C21-BC2F-2555AB323F47}">
+      <dgm:prSet/>
+      <dgm:spPr/>
+      <dgm:t>
+        <a:bodyPr/>
+        <a:lstStyle/>
+        <a:p>
+          <a:endParaRPr lang="en-US"/>
+        </a:p>
+      </dgm:t>
+    </dgm:pt>
+    <dgm:pt modelId="{FE62CC10-8CF2-4881-99D7-957FE196BC91}">
+      <dgm:prSet phldrT="[Text]" custT="1"/>
+      <dgm:spPr/>
+      <dgm:t>
+        <a:bodyPr/>
+        <a:lstStyle/>
+        <a:p>
+          <a:r>
+            <a:rPr lang="en-US" sz="1000" dirty="0" smtClean="0"/>
+            <a:t>Administrator of the U.S. Small Business Administration</a:t>
+          </a:r>
+          <a:endParaRPr lang="en-US" sz="1000" dirty="0"/>
+        </a:p>
+      </dgm:t>
+    </dgm:pt>
+    <dgm:pt modelId="{663733EB-EE34-440A-A1A1-32F6187E79F6}" type="parTrans" cxnId="{6DFC3B4A-AE77-45DF-92CA-03D88A6F4B39}">
+      <dgm:prSet/>
+      <dgm:spPr/>
+      <dgm:t>
+        <a:bodyPr/>
+        <a:lstStyle/>
+        <a:p>
+          <a:endParaRPr lang="en-US"/>
+        </a:p>
+      </dgm:t>
+    </dgm:pt>
+    <dgm:pt modelId="{0EB8362C-5677-4DB9-8AEE-75EF1BC8AFEA}" type="sibTrans" cxnId="{6DFC3B4A-AE77-45DF-92CA-03D88A6F4B39}">
+      <dgm:prSet/>
+      <dgm:spPr/>
+      <dgm:t>
+        <a:bodyPr/>
+        <a:lstStyle/>
+        <a:p>
+          <a:endParaRPr lang="en-US"/>
+        </a:p>
+      </dgm:t>
+    </dgm:pt>
+    <dgm:pt modelId="{8CC0DFC7-02D3-4E2B-A09C-639E1EB660BE}">
+      <dgm:prSet phldrT="[Text]" custT="1"/>
+      <dgm:spPr/>
+      <dgm:t>
+        <a:bodyPr/>
+        <a:lstStyle/>
+        <a:p>
+          <a:r>
+            <a:rPr lang="en-US" sz="1000" dirty="0" smtClean="0"/>
+            <a:t>Small business owners</a:t>
+          </a:r>
+          <a:endParaRPr lang="en-US" sz="1000" dirty="0"/>
+        </a:p>
+      </dgm:t>
+    </dgm:pt>
+    <dgm:pt modelId="{184C5872-A51E-4037-98AE-375A39854346}" type="parTrans" cxnId="{9EB38AA7-D723-4187-9208-62A7F8A3B892}">
+      <dgm:prSet/>
+      <dgm:spPr/>
+      <dgm:t>
+        <a:bodyPr/>
+        <a:lstStyle/>
+        <a:p>
+          <a:endParaRPr lang="en-US"/>
+        </a:p>
+      </dgm:t>
+    </dgm:pt>
+    <dgm:pt modelId="{50B24518-EB28-459F-9B5C-B92C72C093D4}" type="sibTrans" cxnId="{9EB38AA7-D723-4187-9208-62A7F8A3B892}">
       <dgm:prSet/>
       <dgm:spPr/>
       <dgm:t>
@@ -2483,12 +2536,12 @@
     </dgm:pt>
   </dgm:ptLst>
   <dgm:cxnLst>
+    <dgm:cxn modelId="{833478DE-D7B3-4BA6-A758-56ABFF8D546A}" type="presOf" srcId="{8CC0DFC7-02D3-4E2B-A09C-639E1EB660BE}" destId="{ABD9F4AA-584A-4C32-8AC6-1F842D5E3471}" srcOrd="0" destOrd="0" presId="urn:microsoft.com/office/officeart/2011/layout/TabList"/>
     <dgm:cxn modelId="{E35350BB-BDDC-40B8-8B06-6BD0C23E1079}" srcId="{DCB77698-D8A7-43AE-8C12-88D22546D4E0}" destId="{DF89817A-F481-4972-86A6-4FC93177785A}" srcOrd="2" destOrd="0" parTransId="{87806EBA-732D-4B48-A8D1-FFAEC4A46986}" sibTransId="{06202192-C6B3-4A73-B569-80A15FAB58D4}"/>
     <dgm:cxn modelId="{4E02CDDC-86FC-4830-8F12-CCC739F4C38E}" type="presOf" srcId="{D4A5DE5E-27AD-4B23-B1EC-53CFB1739A11}" destId="{2874E84B-9605-494F-B813-85A702BFCF0F}" srcOrd="0" destOrd="0" presId="urn:microsoft.com/office/officeart/2011/layout/TabList"/>
     <dgm:cxn modelId="{E50B4537-4222-4FA6-86D6-900B232A905B}" srcId="{84789903-61AF-4F8F-9430-490306DDBEA0}" destId="{DCB77698-D8A7-43AE-8C12-88D22546D4E0}" srcOrd="3" destOrd="0" parTransId="{0256383B-FBF2-49F0-935C-E17EB2C4D7C4}" sibTransId="{866D160B-DB4E-4FF6-BF8A-FD0216203DA1}"/>
     <dgm:cxn modelId="{B0EC7BCC-A43F-44E9-812F-46898A32FCCB}" type="presOf" srcId="{84789903-61AF-4F8F-9430-490306DDBEA0}" destId="{8937854E-C94A-470E-AB4D-2D1BF4D6EC0A}" srcOrd="0" destOrd="0" presId="urn:microsoft.com/office/officeart/2011/layout/TabList"/>
     <dgm:cxn modelId="{5B81B842-285D-4C21-BC2F-2555AB323F47}" srcId="{19EF64AF-D0D9-429E-86D3-4CE7A62D9930}" destId="{14D29AC4-9FA0-444D-8EE4-E85DEB5E57A2}" srcOrd="2" destOrd="0" parTransId="{8F845681-B05B-4E32-AD5D-21295FC02A07}" sibTransId="{EE9BAB10-D308-456A-ADB5-78C6FFFB97E6}"/>
-    <dgm:cxn modelId="{B5E64274-24E3-4CD1-9F45-A1AFC9369C77}" type="presOf" srcId="{C9FC25FD-4E5C-4A64-AFF0-7D16F6FBC7AA}" destId="{ABD9F4AA-584A-4C32-8AC6-1F842D5E3471}" srcOrd="0" destOrd="1" presId="urn:microsoft.com/office/officeart/2011/layout/TabList"/>
     <dgm:cxn modelId="{96A20728-4B71-426D-8207-8D974A3F5B06}" srcId="{84789903-61AF-4F8F-9430-490306DDBEA0}" destId="{6B0EF60D-A0B1-46C5-9677-4BEA810977D2}" srcOrd="2" destOrd="0" parTransId="{DF3844A8-4E17-463F-BAAD-4ACB2C215D90}" sibTransId="{9DADB796-DA90-4478-BCA3-5929CA4ED0C6}"/>
     <dgm:cxn modelId="{6207E934-C0CE-47B8-95DE-554217624972}" type="presOf" srcId="{F6CCDE68-20A3-48C9-9929-36D9326E50C7}" destId="{269C0782-BA35-4C3A-B295-D76ACD031E2B}" srcOrd="0" destOrd="0" presId="urn:microsoft.com/office/officeart/2011/layout/TabList"/>
     <dgm:cxn modelId="{5F094A65-8D03-4DE2-90BC-845E0B1DF3F3}" srcId="{2F4105CE-F831-4489-A38E-EA308F965E1A}" destId="{8B2750EB-B434-41DC-A189-8424894B839C}" srcOrd="0" destOrd="0" parTransId="{FFC1F60D-411F-463B-80BE-8626FCEE6E20}" sibTransId="{1C68FAD9-F9C9-4D4A-9B81-2E6FECE526EB}"/>
@@ -2499,19 +2552,21 @@
     <dgm:cxn modelId="{A993A3EF-AF47-4DBB-90D8-CF06FBF70E61}" srcId="{19EF64AF-D0D9-429E-86D3-4CE7A62D9930}" destId="{D4A5DE5E-27AD-4B23-B1EC-53CFB1739A11}" srcOrd="1" destOrd="0" parTransId="{C42F195C-72E6-4357-8789-A7DF85FC0BFF}" sibTransId="{D861C33F-DAAB-4018-91B9-D602CB0B9349}"/>
     <dgm:cxn modelId="{EF6CFBB7-9C8E-48BF-AA7B-F1AFB3D29272}" type="presOf" srcId="{FCB9211A-ECAF-4092-9AF3-4A80464FEEEF}" destId="{76F4CE38-89D0-4EAB-9E94-FD08C47879E4}" srcOrd="0" destOrd="0" presId="urn:microsoft.com/office/officeart/2011/layout/TabList"/>
     <dgm:cxn modelId="{8145D6F8-74F3-4E1B-ADA9-BFF34757123F}" type="presOf" srcId="{6B0EF60D-A0B1-46C5-9677-4BEA810977D2}" destId="{79569B4D-C26F-4F14-9A58-54D0240E4532}" srcOrd="0" destOrd="0" presId="urn:microsoft.com/office/officeart/2011/layout/TabList"/>
+    <dgm:cxn modelId="{6DFC3B4A-AE77-45DF-92CA-03D88A6F4B39}" srcId="{6B0EF60D-A0B1-46C5-9677-4BEA810977D2}" destId="{FE62CC10-8CF2-4881-99D7-957FE196BC91}" srcOrd="3" destOrd="0" parTransId="{663733EB-EE34-440A-A1A1-32F6187E79F6}" sibTransId="{0EB8362C-5677-4DB9-8AEE-75EF1BC8AFEA}"/>
     <dgm:cxn modelId="{BC8D3C2F-C842-4AEF-9163-91FCF0A63C32}" srcId="{84789903-61AF-4F8F-9430-490306DDBEA0}" destId="{19EF64AF-D0D9-429E-86D3-4CE7A62D9930}" srcOrd="1" destOrd="0" parTransId="{65F72764-603C-4BEA-9757-C2D922CDE6E7}" sibTransId="{A59A006A-971D-4A33-AB31-4CEE6264B4C5}"/>
+    <dgm:cxn modelId="{9EB38AA7-D723-4187-9208-62A7F8A3B892}" srcId="{2F4105CE-F831-4489-A38E-EA308F965E1A}" destId="{8CC0DFC7-02D3-4E2B-A09C-639E1EB660BE}" srcOrd="1" destOrd="0" parTransId="{184C5872-A51E-4037-98AE-375A39854346}" sibTransId="{50B24518-EB28-459F-9B5C-B92C72C093D4}"/>
     <dgm:cxn modelId="{272F4F47-B6F0-44E6-BE53-1E568010F73F}" srcId="{6B0EF60D-A0B1-46C5-9677-4BEA810977D2}" destId="{432382F3-03DD-4963-A6A5-C32D1C07F990}" srcOrd="1" destOrd="0" parTransId="{428261C4-B743-4CC1-8298-2B59764B7274}" sibTransId="{19522E25-3C1D-4596-9D61-BE8AA7854562}"/>
     <dgm:cxn modelId="{6AEA36B3-723E-4C26-991B-32293EC4977D}" srcId="{DCB77698-D8A7-43AE-8C12-88D22546D4E0}" destId="{F6CCDE68-20A3-48C9-9929-36D9326E50C7}" srcOrd="1" destOrd="0" parTransId="{6D777BDB-A14B-4CB9-848E-609F2B89797D}" sibTransId="{E73E6EC1-A77B-4806-AF59-F300788A17A6}"/>
     <dgm:cxn modelId="{EB996E2F-C94D-4853-8FF4-11C5E13D7817}" type="presOf" srcId="{432382F3-03DD-4963-A6A5-C32D1C07F990}" destId="{F2E5F12B-CEBA-404F-BC59-D0A75B115C1F}" srcOrd="0" destOrd="0" presId="urn:microsoft.com/office/officeart/2011/layout/TabList"/>
-    <dgm:cxn modelId="{21B482AC-91FC-4870-8398-7ED99CCC1767}" type="presOf" srcId="{A990AE2A-665D-4A90-91E6-8CAE69B9C799}" destId="{ABD9F4AA-584A-4C32-8AC6-1F842D5E3471}" srcOrd="0" destOrd="0" presId="urn:microsoft.com/office/officeart/2011/layout/TabList"/>
+    <dgm:cxn modelId="{21B482AC-91FC-4870-8398-7ED99CCC1767}" type="presOf" srcId="{A990AE2A-665D-4A90-91E6-8CAE69B9C799}" destId="{ABD9F4AA-584A-4C32-8AC6-1F842D5E3471}" srcOrd="0" destOrd="1" presId="urn:microsoft.com/office/officeart/2011/layout/TabList"/>
     <dgm:cxn modelId="{1FA0C560-A1F8-445E-A5C6-3D03DA8F8F3B}" type="presOf" srcId="{6992769E-C929-46E1-B5DC-0D224D6E5340}" destId="{F82F5449-D542-4810-B467-43A5C2614DD5}" srcOrd="0" destOrd="0" presId="urn:microsoft.com/office/officeart/2011/layout/TabList"/>
     <dgm:cxn modelId="{003050E9-D243-4501-BA27-030513B9DE1F}" type="presOf" srcId="{DF89817A-F481-4972-86A6-4FC93177785A}" destId="{269C0782-BA35-4C3A-B295-D76ACD031E2B}" srcOrd="0" destOrd="1" presId="urn:microsoft.com/office/officeart/2011/layout/TabList"/>
+    <dgm:cxn modelId="{3CB9FD32-A72F-4B76-8E28-C0A42EAAB2D0}" type="presOf" srcId="{FE62CC10-8CF2-4881-99D7-957FE196BC91}" destId="{F2E5F12B-CEBA-404F-BC59-D0A75B115C1F}" srcOrd="0" destOrd="2" presId="urn:microsoft.com/office/officeart/2011/layout/TabList"/>
     <dgm:cxn modelId="{FEABCB08-E69B-4C87-9978-6789EF9A8B1F}" type="presOf" srcId="{DCB77698-D8A7-43AE-8C12-88D22546D4E0}" destId="{9059B661-BA02-491A-9141-4597C2088440}" srcOrd="0" destOrd="0" presId="urn:microsoft.com/office/officeart/2011/layout/TabList"/>
     <dgm:cxn modelId="{9A234CF7-EE90-4B18-BE13-D588C511C444}" type="presOf" srcId="{19EF64AF-D0D9-429E-86D3-4CE7A62D9930}" destId="{B06197F1-B041-4747-A702-99E72A52C66D}" srcOrd="0" destOrd="0" presId="urn:microsoft.com/office/officeart/2011/layout/TabList"/>
     <dgm:cxn modelId="{2896DAC6-E607-42B4-9D8E-740D71F49BEA}" srcId="{DCB77698-D8A7-43AE-8C12-88D22546D4E0}" destId="{54C77FC2-06D5-494F-88FF-639A9A2ADF2B}" srcOrd="0" destOrd="0" parTransId="{59058AE7-0BCA-42FD-8DA7-9E303C2F3598}" sibTransId="{DD5B0AF5-4F1F-4F54-9327-3F9C5FD2ADF5}"/>
     <dgm:cxn modelId="{49173052-4FC5-40D9-9ED3-0EF33A503348}" type="presOf" srcId="{07DB5E9F-F9E2-4866-A92E-0046A90428A8}" destId="{F2E5F12B-CEBA-404F-BC59-D0A75B115C1F}" srcOrd="0" destOrd="1" presId="urn:microsoft.com/office/officeart/2011/layout/TabList"/>
-    <dgm:cxn modelId="{C40B86E0-D802-4C2B-9B30-FF087E46B20A}" srcId="{2F4105CE-F831-4489-A38E-EA308F965E1A}" destId="{A990AE2A-665D-4A90-91E6-8CAE69B9C799}" srcOrd="1" destOrd="0" parTransId="{C4D8ABC1-84E3-45E5-AE1D-9D540D360E76}" sibTransId="{6B7AAB65-DFF8-472A-BB24-DFEC163070BA}"/>
-    <dgm:cxn modelId="{092A9CEB-5EFE-4BCC-90CE-2FB92ECEC62E}" srcId="{2F4105CE-F831-4489-A38E-EA308F965E1A}" destId="{C9FC25FD-4E5C-4A64-AFF0-7D16F6FBC7AA}" srcOrd="2" destOrd="0" parTransId="{F9793D06-E836-466C-83D6-58F72B9C8CB4}" sibTransId="{ED1FB57D-D2B1-48EC-8B8D-C19F6680A4CF}"/>
+    <dgm:cxn modelId="{C40B86E0-D802-4C2B-9B30-FF087E46B20A}" srcId="{2F4105CE-F831-4489-A38E-EA308F965E1A}" destId="{A990AE2A-665D-4A90-91E6-8CAE69B9C799}" srcOrd="2" destOrd="0" parTransId="{C4D8ABC1-84E3-45E5-AE1D-9D540D360E76}" sibTransId="{6B7AAB65-DFF8-472A-BB24-DFEC163070BA}"/>
     <dgm:cxn modelId="{CB6E97D5-8936-4147-BBD3-8E560E42AC7B}" type="presOf" srcId="{8B2750EB-B434-41DC-A189-8424894B839C}" destId="{89B6103A-0012-428D-9057-99CB1F4B4519}" srcOrd="0" destOrd="0" presId="urn:microsoft.com/office/officeart/2011/layout/TabList"/>
     <dgm:cxn modelId="{70A0944B-25EA-40CB-AB0F-6CD0C085FBBF}" type="presOf" srcId="{54C77FC2-06D5-494F-88FF-639A9A2ADF2B}" destId="{BDDE8257-E413-4550-9DF4-ACE5D4DAF407}" srcOrd="0" destOrd="0" presId="urn:microsoft.com/office/officeart/2011/layout/TabList"/>
     <dgm:cxn modelId="{963A8710-1BD9-46BF-BF1C-8F40A4A66057}" type="presOf" srcId="{2F4105CE-F831-4489-A38E-EA308F965E1A}" destId="{8DF5D93B-DC31-4D2E-91E9-BD58313DDF36}" srcOrd="0" destOrd="0" presId="urn:microsoft.com/office/officeart/2011/layout/TabList"/>
@@ -2573,7 +2628,11 @@
         <a:p>
           <a:r>
             <a:rPr lang="en-US" sz="1000" dirty="0" smtClean="0"/>
-            <a:t>Change Narrative</a:t>
+            <a:t>Decline </a:t>
+          </a:r>
+          <a:r>
+            <a:rPr lang="en-US" sz="1000" dirty="0" smtClean="0"/>
+            <a:t>Narrative</a:t>
           </a:r>
           <a:endParaRPr lang="en-US" sz="1000" dirty="0"/>
         </a:p>
@@ -2647,7 +2706,7 @@
         <a:p>
           <a:r>
             <a:rPr lang="en-US" sz="1000" dirty="0" smtClean="0"/>
-            <a:t>Stakeholder</a:t>
+            <a:t>Leaders and faculty of research universities</a:t>
           </a:r>
           <a:endParaRPr lang="en-US" sz="1000" dirty="0"/>
         </a:p>
@@ -2758,9 +2817,8 @@
         <a:p>
           <a:r>
             <a:rPr lang="en-US" sz="1000" dirty="0" smtClean="0"/>
-            <a:t>Stakeholder</a:t>
+            <a:t>Leaders and faculty of research universities</a:t>
           </a:r>
-          <a:endParaRPr lang="en-US" sz="1000" dirty="0"/>
         </a:p>
       </dgm:t>
     </dgm:pt>
@@ -2795,7 +2853,11 @@
         <a:p>
           <a:r>
             <a:rPr lang="en-US" sz="1000" dirty="0" smtClean="0"/>
-            <a:t>Change Narrative</a:t>
+            <a:t>Decline </a:t>
+          </a:r>
+          <a:r>
+            <a:rPr lang="en-US" sz="1000" dirty="0" smtClean="0"/>
+            <a:t>Narrative</a:t>
           </a:r>
           <a:endParaRPr lang="en-US" sz="1000" dirty="0"/>
         </a:p>
@@ -2869,7 +2931,7 @@
         <a:p>
           <a:r>
             <a:rPr lang="en-US" sz="1000" dirty="0" smtClean="0"/>
-            <a:t>Stakeholder</a:t>
+            <a:t>Leaders and faculty of research universities</a:t>
           </a:r>
           <a:endParaRPr lang="en-US" sz="1000" dirty="0"/>
         </a:p>
@@ -2897,117 +2959,6 @@
         </a:p>
       </dgm:t>
     </dgm:pt>
-    <dgm:pt modelId="{07DB5E9F-F9E2-4866-A92E-0046A90428A8}">
-      <dgm:prSet phldrT="[Text]" custT="1"/>
-      <dgm:spPr/>
-      <dgm:t>
-        <a:bodyPr/>
-        <a:lstStyle/>
-        <a:p>
-          <a:r>
-            <a:rPr lang="en-US" sz="1000" dirty="0" smtClean="0"/>
-            <a:t>Stakeholder</a:t>
-          </a:r>
-          <a:endParaRPr lang="en-US" sz="1000" dirty="0"/>
-        </a:p>
-      </dgm:t>
-    </dgm:pt>
-    <dgm:pt modelId="{5F3A5809-A99D-4946-9529-2713AD09E5EA}" type="parTrans" cxnId="{2694D95A-2CBA-4FD2-B966-932CA25C4405}">
-      <dgm:prSet/>
-      <dgm:spPr/>
-      <dgm:t>
-        <a:bodyPr/>
-        <a:lstStyle/>
-        <a:p>
-          <a:endParaRPr lang="en-US"/>
-        </a:p>
-      </dgm:t>
-    </dgm:pt>
-    <dgm:pt modelId="{9CAE03CD-36E6-4523-A376-CDA7F2B72A17}" type="sibTrans" cxnId="{2694D95A-2CBA-4FD2-B966-932CA25C4405}">
-      <dgm:prSet/>
-      <dgm:spPr/>
-      <dgm:t>
-        <a:bodyPr/>
-        <a:lstStyle/>
-        <a:p>
-          <a:endParaRPr lang="en-US"/>
-        </a:p>
-      </dgm:t>
-    </dgm:pt>
-    <dgm:pt modelId="{DF89817A-F481-4972-86A6-4FC93177785A}">
-      <dgm:prSet phldrT="[Text]" custT="1"/>
-      <dgm:spPr/>
-      <dgm:t>
-        <a:bodyPr/>
-        <a:lstStyle/>
-        <a:p>
-          <a:r>
-            <a:rPr lang="en-US" sz="1000" dirty="0" smtClean="0"/>
-            <a:t>Stakeholder</a:t>
-          </a:r>
-          <a:endParaRPr lang="en-US" sz="1000" dirty="0"/>
-        </a:p>
-      </dgm:t>
-    </dgm:pt>
-    <dgm:pt modelId="{87806EBA-732D-4B48-A8D1-FFAEC4A46986}" type="parTrans" cxnId="{E35350BB-BDDC-40B8-8B06-6BD0C23E1079}">
-      <dgm:prSet/>
-      <dgm:spPr/>
-      <dgm:t>
-        <a:bodyPr/>
-        <a:lstStyle/>
-        <a:p>
-          <a:endParaRPr lang="en-US"/>
-        </a:p>
-      </dgm:t>
-    </dgm:pt>
-    <dgm:pt modelId="{06202192-C6B3-4A73-B569-80A15FAB58D4}" type="sibTrans" cxnId="{E35350BB-BDDC-40B8-8B06-6BD0C23E1079}">
-      <dgm:prSet/>
-      <dgm:spPr/>
-      <dgm:t>
-        <a:bodyPr/>
-        <a:lstStyle/>
-        <a:p>
-          <a:endParaRPr lang="en-US"/>
-        </a:p>
-      </dgm:t>
-    </dgm:pt>
-    <dgm:pt modelId="{C9FC25FD-4E5C-4A64-AFF0-7D16F6FBC7AA}">
-      <dgm:prSet phldrT="[Text]" custT="1"/>
-      <dgm:spPr/>
-      <dgm:t>
-        <a:bodyPr/>
-        <a:lstStyle/>
-        <a:p>
-          <a:r>
-            <a:rPr lang="en-US" sz="1000" dirty="0" smtClean="0"/>
-            <a:t>Stakeholder</a:t>
-          </a:r>
-          <a:endParaRPr lang="en-US" sz="1000" dirty="0"/>
-        </a:p>
-      </dgm:t>
-    </dgm:pt>
-    <dgm:pt modelId="{F9793D06-E836-466C-83D6-58F72B9C8CB4}" type="parTrans" cxnId="{092A9CEB-5EFE-4BCC-90CE-2FB92ECEC62E}">
-      <dgm:prSet/>
-      <dgm:spPr/>
-      <dgm:t>
-        <a:bodyPr/>
-        <a:lstStyle/>
-        <a:p>
-          <a:endParaRPr lang="en-US"/>
-        </a:p>
-      </dgm:t>
-    </dgm:pt>
-    <dgm:pt modelId="{ED1FB57D-D2B1-48EC-8B8D-C19F6680A4CF}" type="sibTrans" cxnId="{092A9CEB-5EFE-4BCC-90CE-2FB92ECEC62E}">
-      <dgm:prSet/>
-      <dgm:spPr/>
-      <dgm:t>
-        <a:bodyPr/>
-        <a:lstStyle/>
-        <a:p>
-          <a:endParaRPr lang="en-US"/>
-        </a:p>
-      </dgm:t>
-    </dgm:pt>
     <dgm:pt modelId="{19EF64AF-D0D9-429E-86D3-4CE7A62D9930}">
       <dgm:prSet phldrT="[Text]" custT="1"/>
       <dgm:spPr/>
@@ -3091,7 +3042,7 @@
         <a:p>
           <a:r>
             <a:rPr lang="en-US" sz="1000" dirty="0" smtClean="0"/>
-            <a:t>Stakeholder</a:t>
+            <a:t>Leaders of research hospitals</a:t>
           </a:r>
           <a:endParaRPr lang="en-US" sz="1000" dirty="0"/>
         </a:p>
@@ -3128,7 +3079,7 @@
         <a:p>
           <a:r>
             <a:rPr lang="en-US" sz="1000" dirty="0" smtClean="0"/>
-            <a:t>Stakeholder</a:t>
+            <a:t>Leadership of the American Medical College Association</a:t>
           </a:r>
           <a:endParaRPr lang="en-US" sz="1000" dirty="0"/>
         </a:p>
@@ -3146,6 +3097,267 @@
       </dgm:t>
     </dgm:pt>
     <dgm:pt modelId="{EE9BAB10-D308-456A-ADB5-78C6FFFB97E6}" type="sibTrans" cxnId="{5B81B842-285D-4C21-BC2F-2555AB323F47}">
+      <dgm:prSet/>
+      <dgm:spPr/>
+      <dgm:t>
+        <a:bodyPr/>
+        <a:lstStyle/>
+        <a:p>
+          <a:endParaRPr lang="en-US"/>
+        </a:p>
+      </dgm:t>
+    </dgm:pt>
+    <dgm:pt modelId="{EB3A3517-BC08-4AB8-AB32-CAA355AEBBAA}">
+      <dgm:prSet phldrT="[Text]" custT="1"/>
+      <dgm:spPr/>
+      <dgm:t>
+        <a:bodyPr/>
+        <a:lstStyle/>
+        <a:p>
+          <a:r>
+            <a:rPr lang="en-US" sz="1000" dirty="0" smtClean="0"/>
+            <a:t>Leaders and faculty of research universities</a:t>
+          </a:r>
+          <a:endParaRPr lang="en-US" sz="1000" dirty="0"/>
+        </a:p>
+      </dgm:t>
+    </dgm:pt>
+    <dgm:pt modelId="{B734E8AD-9F0E-4587-9C1F-9483C3D89D69}" type="parTrans" cxnId="{2657FA28-A895-46D4-90D1-07F9A903CBBC}">
+      <dgm:prSet/>
+      <dgm:spPr/>
+      <dgm:t>
+        <a:bodyPr/>
+        <a:lstStyle/>
+        <a:p>
+          <a:endParaRPr lang="en-US"/>
+        </a:p>
+      </dgm:t>
+    </dgm:pt>
+    <dgm:pt modelId="{6388FC91-51F0-4583-AFC8-08BE7A667D2D}" type="sibTrans" cxnId="{2657FA28-A895-46D4-90D1-07F9A903CBBC}">
+      <dgm:prSet/>
+      <dgm:spPr/>
+      <dgm:t>
+        <a:bodyPr/>
+        <a:lstStyle/>
+        <a:p>
+          <a:endParaRPr lang="en-US"/>
+        </a:p>
+      </dgm:t>
+    </dgm:pt>
+    <dgm:pt modelId="{ADA4DD4E-A13B-4B3A-BF0B-6A9868DD9270}">
+      <dgm:prSet phldrT="[Text]" custT="1"/>
+      <dgm:spPr/>
+      <dgm:t>
+        <a:bodyPr/>
+        <a:lstStyle/>
+        <a:p>
+          <a:r>
+            <a:rPr lang="en-US" sz="1000" dirty="0" smtClean="0"/>
+            <a:t>Leaders of research hospitals</a:t>
+          </a:r>
+        </a:p>
+      </dgm:t>
+    </dgm:pt>
+    <dgm:pt modelId="{A69BEB30-D4D0-4373-A980-FBE1B2210F40}" type="parTrans" cxnId="{C53AA40F-C7B5-48B1-9833-6AADD820240F}">
+      <dgm:prSet/>
+      <dgm:spPr/>
+      <dgm:t>
+        <a:bodyPr/>
+        <a:lstStyle/>
+        <a:p>
+          <a:endParaRPr lang="en-US"/>
+        </a:p>
+      </dgm:t>
+    </dgm:pt>
+    <dgm:pt modelId="{31FC63FF-B7FD-42AA-95A2-FED2E149343F}" type="sibTrans" cxnId="{C53AA40F-C7B5-48B1-9833-6AADD820240F}">
+      <dgm:prSet/>
+      <dgm:spPr/>
+      <dgm:t>
+        <a:bodyPr/>
+        <a:lstStyle/>
+        <a:p>
+          <a:endParaRPr lang="en-US"/>
+        </a:p>
+      </dgm:t>
+    </dgm:pt>
+    <dgm:pt modelId="{711738C3-3AA4-4805-BDB1-417DABF886EF}">
+      <dgm:prSet phldrT="[Text]" custT="1"/>
+      <dgm:spPr/>
+      <dgm:t>
+        <a:bodyPr/>
+        <a:lstStyle/>
+        <a:p>
+          <a:r>
+            <a:rPr lang="en-US" sz="1000" dirty="0" smtClean="0"/>
+            <a:t>Leadership of the American Medical College Association</a:t>
+          </a:r>
+        </a:p>
+      </dgm:t>
+    </dgm:pt>
+    <dgm:pt modelId="{1C77D557-D7BA-4CA0-9ACF-21BA020B74A4}" type="parTrans" cxnId="{2A33E819-8BC0-4207-B650-7F5E09F345C6}">
+      <dgm:prSet/>
+      <dgm:spPr/>
+      <dgm:t>
+        <a:bodyPr/>
+        <a:lstStyle/>
+        <a:p>
+          <a:endParaRPr lang="en-US"/>
+        </a:p>
+      </dgm:t>
+    </dgm:pt>
+    <dgm:pt modelId="{5556CC35-A5A0-404A-80E1-20A32FCADDA5}" type="sibTrans" cxnId="{2A33E819-8BC0-4207-B650-7F5E09F345C6}">
+      <dgm:prSet/>
+      <dgm:spPr/>
+      <dgm:t>
+        <a:bodyPr/>
+        <a:lstStyle/>
+        <a:p>
+          <a:endParaRPr lang="en-US"/>
+        </a:p>
+      </dgm:t>
+    </dgm:pt>
+    <dgm:pt modelId="{03E9865A-20D2-4CF6-AA88-EF74E4A16F4A}">
+      <dgm:prSet phldrT="[Text]" custT="1"/>
+      <dgm:spPr/>
+      <dgm:t>
+        <a:bodyPr/>
+        <a:lstStyle/>
+        <a:p>
+          <a:r>
+            <a:rPr lang="en-US" sz="1000" dirty="0" smtClean="0"/>
+            <a:t>Leaders of research hospitals</a:t>
+          </a:r>
+          <a:endParaRPr lang="en-US" sz="1000" dirty="0"/>
+        </a:p>
+      </dgm:t>
+    </dgm:pt>
+    <dgm:pt modelId="{8248E5BD-5697-4B1E-BCB4-ABC0B2D8E72E}" type="parTrans" cxnId="{3DB12D0E-B496-47AC-B9D8-B8B2B6369FEF}">
+      <dgm:prSet/>
+      <dgm:spPr/>
+      <dgm:t>
+        <a:bodyPr/>
+        <a:lstStyle/>
+        <a:p>
+          <a:endParaRPr lang="en-US"/>
+        </a:p>
+      </dgm:t>
+    </dgm:pt>
+    <dgm:pt modelId="{EEBE7D8C-BEE1-4AE3-A6A1-B72D470C50D8}" type="sibTrans" cxnId="{3DB12D0E-B496-47AC-B9D8-B8B2B6369FEF}">
+      <dgm:prSet/>
+      <dgm:spPr/>
+      <dgm:t>
+        <a:bodyPr/>
+        <a:lstStyle/>
+        <a:p>
+          <a:endParaRPr lang="en-US"/>
+        </a:p>
+      </dgm:t>
+    </dgm:pt>
+    <dgm:pt modelId="{48BF764E-F495-4A56-AE96-47376DC45472}">
+      <dgm:prSet phldrT="[Text]" custT="1"/>
+      <dgm:spPr/>
+      <dgm:t>
+        <a:bodyPr/>
+        <a:lstStyle/>
+        <a:p>
+          <a:r>
+            <a:rPr lang="en-US" sz="1000" dirty="0" smtClean="0"/>
+            <a:t>Leadership of the American Medical College Association</a:t>
+          </a:r>
+        </a:p>
+        <a:p>
+          <a:endParaRPr lang="en-US" sz="1000" dirty="0"/>
+        </a:p>
+      </dgm:t>
+    </dgm:pt>
+    <dgm:pt modelId="{CED2C589-1478-4EE9-8864-36B6C00D583D}" type="parTrans" cxnId="{C33B3223-996C-4204-9B9A-61F80D001862}">
+      <dgm:prSet/>
+      <dgm:spPr/>
+      <dgm:t>
+        <a:bodyPr/>
+        <a:lstStyle/>
+        <a:p>
+          <a:endParaRPr lang="en-US"/>
+        </a:p>
+      </dgm:t>
+    </dgm:pt>
+    <dgm:pt modelId="{D6B20742-473A-4B9F-A0CC-85E95BE0720F}" type="sibTrans" cxnId="{C33B3223-996C-4204-9B9A-61F80D001862}">
+      <dgm:prSet/>
+      <dgm:spPr/>
+      <dgm:t>
+        <a:bodyPr/>
+        <a:lstStyle/>
+        <a:p>
+          <a:endParaRPr lang="en-US"/>
+        </a:p>
+      </dgm:t>
+    </dgm:pt>
+    <dgm:pt modelId="{28A4433D-892C-4392-A0C9-31AA297B23D1}">
+      <dgm:prSet phldrT="[Text]" custT="1"/>
+      <dgm:spPr/>
+      <dgm:t>
+        <a:bodyPr/>
+        <a:lstStyle/>
+        <a:p>
+          <a:r>
+            <a:rPr lang="en-US" sz="1000" dirty="0" smtClean="0"/>
+            <a:t>Leaders of research hospitals</a:t>
+          </a:r>
+          <a:endParaRPr lang="en-US" sz="1000" dirty="0"/>
+        </a:p>
+      </dgm:t>
+    </dgm:pt>
+    <dgm:pt modelId="{38F9BBF9-BEAA-4EF2-A10C-767F24A70094}" type="parTrans" cxnId="{9C741026-5DFA-48E0-BCB8-618D95B45615}">
+      <dgm:prSet/>
+      <dgm:spPr/>
+      <dgm:t>
+        <a:bodyPr/>
+        <a:lstStyle/>
+        <a:p>
+          <a:endParaRPr lang="en-US"/>
+        </a:p>
+      </dgm:t>
+    </dgm:pt>
+    <dgm:pt modelId="{FF662DDE-5536-4F81-B4BD-F479E8E272D8}" type="sibTrans" cxnId="{9C741026-5DFA-48E0-BCB8-618D95B45615}">
+      <dgm:prSet/>
+      <dgm:spPr/>
+      <dgm:t>
+        <a:bodyPr/>
+        <a:lstStyle/>
+        <a:p>
+          <a:endParaRPr lang="en-US"/>
+        </a:p>
+      </dgm:t>
+    </dgm:pt>
+    <dgm:pt modelId="{E2EDF958-A636-4721-91E2-1009161BE1BC}">
+      <dgm:prSet phldrT="[Text]" custT="1"/>
+      <dgm:spPr/>
+      <dgm:t>
+        <a:bodyPr/>
+        <a:lstStyle/>
+        <a:p>
+          <a:r>
+            <a:rPr lang="en-US" sz="1000" dirty="0" smtClean="0"/>
+            <a:t>Leadership of the American Medical College Association</a:t>
+          </a:r>
+        </a:p>
+        <a:p>
+          <a:endParaRPr lang="en-US" sz="1000" dirty="0"/>
+        </a:p>
+      </dgm:t>
+    </dgm:pt>
+    <dgm:pt modelId="{56017F76-3EE4-4B10-980E-2962F4DDFEEC}" type="parTrans" cxnId="{576B1C0C-BC74-4AB0-84AC-D638255D8C52}">
+      <dgm:prSet/>
+      <dgm:spPr/>
+      <dgm:t>
+        <a:bodyPr/>
+        <a:lstStyle/>
+        <a:p>
+          <a:endParaRPr lang="en-US"/>
+        </a:p>
+      </dgm:t>
+    </dgm:pt>
+    <dgm:pt modelId="{D4D47A36-D2AE-41C2-A545-1538EA1F1179}" type="sibTrans" cxnId="{576B1C0C-BC74-4AB0-84AC-D638255D8C52}">
       <dgm:prSet/>
       <dgm:spPr/>
       <dgm:t>
@@ -3425,39 +3637,47 @@
     </dgm:pt>
   </dgm:ptLst>
   <dgm:cxnLst>
-    <dgm:cxn modelId="{E35350BB-BDDC-40B8-8B06-6BD0C23E1079}" srcId="{DCB77698-D8A7-43AE-8C12-88D22546D4E0}" destId="{DF89817A-F481-4972-86A6-4FC93177785A}" srcOrd="2" destOrd="0" parTransId="{87806EBA-732D-4B48-A8D1-FFAEC4A46986}" sibTransId="{06202192-C6B3-4A73-B569-80A15FAB58D4}"/>
-    <dgm:cxn modelId="{B2124052-34AB-4435-8CBA-D34AF146A189}" type="presOf" srcId="{14D29AC4-9FA0-444D-8EE4-E85DEB5E57A2}" destId="{2874E84B-9605-494F-B813-85A702BFCF0F}" srcOrd="0" destOrd="1" presId="urn:microsoft.com/office/officeart/2011/layout/TabList"/>
+    <dgm:cxn modelId="{0EB99273-E40B-4BA4-A24F-424DEB53EF5D}" type="presOf" srcId="{A990AE2A-665D-4A90-91E6-8CAE69B9C799}" destId="{ABD9F4AA-584A-4C32-8AC6-1F842D5E3471}" srcOrd="0" destOrd="0" presId="urn:microsoft.com/office/officeart/2011/layout/TabList"/>
+    <dgm:cxn modelId="{4AEC2818-9C22-4CEF-8878-5915FF4711B6}" type="presOf" srcId="{E2EDF958-A636-4721-91E2-1009161BE1BC}" destId="{ABD9F4AA-584A-4C32-8AC6-1F842D5E3471}" srcOrd="0" destOrd="2" presId="urn:microsoft.com/office/officeart/2011/layout/TabList"/>
+    <dgm:cxn modelId="{EC26D4FA-8D0A-4965-860E-E576DA3FE7C2}" srcId="{84789903-61AF-4F8F-9430-490306DDBEA0}" destId="{2F4105CE-F831-4489-A38E-EA308F965E1A}" srcOrd="1" destOrd="0" parTransId="{B2367E5B-DF6B-423A-8C73-6C51AA905F42}" sibTransId="{42FAF69B-DD6C-4C4C-A008-7959F807FCD6}"/>
+    <dgm:cxn modelId="{E50B4537-4222-4FA6-86D6-900B232A905B}" srcId="{84789903-61AF-4F8F-9430-490306DDBEA0}" destId="{DCB77698-D8A7-43AE-8C12-88D22546D4E0}" srcOrd="3" destOrd="0" parTransId="{0256383B-FBF2-49F0-935C-E17EB2C4D7C4}" sibTransId="{866D160B-DB4E-4FF6-BF8A-FD0216203DA1}"/>
+    <dgm:cxn modelId="{A993A3EF-AF47-4DBB-90D8-CF06FBF70E61}" srcId="{19EF64AF-D0D9-429E-86D3-4CE7A62D9930}" destId="{D4A5DE5E-27AD-4B23-B1EC-53CFB1739A11}" srcOrd="2" destOrd="0" parTransId="{C42F195C-72E6-4357-8789-A7DF85FC0BFF}" sibTransId="{D861C33F-DAAB-4018-91B9-D602CB0B9349}"/>
+    <dgm:cxn modelId="{3F79F1C5-5A6B-4B5D-ABE8-486E8727C12D}" type="presOf" srcId="{48BF764E-F495-4A56-AE96-47376DC45472}" destId="{F2E5F12B-CEBA-404F-BC59-D0A75B115C1F}" srcOrd="0" destOrd="2" presId="urn:microsoft.com/office/officeart/2011/layout/TabList"/>
+    <dgm:cxn modelId="{9C741026-5DFA-48E0-BCB8-618D95B45615}" srcId="{2F4105CE-F831-4489-A38E-EA308F965E1A}" destId="{28A4433D-892C-4392-A0C9-31AA297B23D1}" srcOrd="2" destOrd="0" parTransId="{38F9BBF9-BEAA-4EF2-A10C-767F24A70094}" sibTransId="{FF662DDE-5536-4F81-B4BD-F479E8E272D8}"/>
+    <dgm:cxn modelId="{6AEA36B3-723E-4C26-991B-32293EC4977D}" srcId="{DCB77698-D8A7-43AE-8C12-88D22546D4E0}" destId="{F6CCDE68-20A3-48C9-9929-36D9326E50C7}" srcOrd="1" destOrd="0" parTransId="{6D777BDB-A14B-4CB9-848E-609F2B89797D}" sibTransId="{E73E6EC1-A77B-4806-AF59-F300788A17A6}"/>
+    <dgm:cxn modelId="{AD10BF23-1E69-4909-B6FA-24F65C0F2B83}" type="presOf" srcId="{28A4433D-892C-4392-A0C9-31AA297B23D1}" destId="{ABD9F4AA-584A-4C32-8AC6-1F842D5E3471}" srcOrd="0" destOrd="1" presId="urn:microsoft.com/office/officeart/2011/layout/TabList"/>
+    <dgm:cxn modelId="{EA29C83E-1DCA-4FBB-975D-0E40E46D2194}" type="presOf" srcId="{432382F3-03DD-4963-A6A5-C32D1C07F990}" destId="{F2E5F12B-CEBA-404F-BC59-D0A75B115C1F}" srcOrd="0" destOrd="0" presId="urn:microsoft.com/office/officeart/2011/layout/TabList"/>
+    <dgm:cxn modelId="{42EE89B5-C132-45F6-89DF-FAA355D8AB66}" type="presOf" srcId="{84789903-61AF-4F8F-9430-490306DDBEA0}" destId="{8937854E-C94A-470E-AB4D-2D1BF4D6EC0A}" srcOrd="0" destOrd="0" presId="urn:microsoft.com/office/officeart/2011/layout/TabList"/>
+    <dgm:cxn modelId="{2367FF4F-D248-4F58-A0D9-784D3549B7D2}" type="presOf" srcId="{F6CCDE68-20A3-48C9-9929-36D9326E50C7}" destId="{269C0782-BA35-4C3A-B295-D76ACD031E2B}" srcOrd="0" destOrd="0" presId="urn:microsoft.com/office/officeart/2011/layout/TabList"/>
+    <dgm:cxn modelId="{9E0BBC12-F01A-46AF-A765-697A5062C11D}" type="presOf" srcId="{54C77FC2-06D5-494F-88FF-639A9A2ADF2B}" destId="{BDDE8257-E413-4550-9DF4-ACE5D4DAF407}" srcOrd="0" destOrd="0" presId="urn:microsoft.com/office/officeart/2011/layout/TabList"/>
+    <dgm:cxn modelId="{FB51F38E-5F9F-4D3E-BF90-82BB4C1D2DB9}" type="presOf" srcId="{6992769E-C929-46E1-B5DC-0D224D6E5340}" destId="{F82F5449-D542-4810-B467-43A5C2614DD5}" srcOrd="0" destOrd="0" presId="urn:microsoft.com/office/officeart/2011/layout/TabList"/>
+    <dgm:cxn modelId="{6FBD327E-F3DD-4D5F-892E-365E295EB833}" type="presOf" srcId="{DCB77698-D8A7-43AE-8C12-88D22546D4E0}" destId="{9059B661-BA02-491A-9141-4597C2088440}" srcOrd="0" destOrd="0" presId="urn:microsoft.com/office/officeart/2011/layout/TabList"/>
+    <dgm:cxn modelId="{0536D819-2399-475C-9A09-D2166C361830}" type="presOf" srcId="{03E9865A-20D2-4CF6-AA88-EF74E4A16F4A}" destId="{F2E5F12B-CEBA-404F-BC59-D0A75B115C1F}" srcOrd="0" destOrd="1" presId="urn:microsoft.com/office/officeart/2011/layout/TabList"/>
+    <dgm:cxn modelId="{2A33E819-8BC0-4207-B650-7F5E09F345C6}" srcId="{DCB77698-D8A7-43AE-8C12-88D22546D4E0}" destId="{711738C3-3AA4-4805-BDB1-417DABF886EF}" srcOrd="3" destOrd="0" parTransId="{1C77D557-D7BA-4CA0-9ACF-21BA020B74A4}" sibTransId="{5556CC35-A5A0-404A-80E1-20A32FCADDA5}"/>
+    <dgm:cxn modelId="{2657FA28-A895-46D4-90D1-07F9A903CBBC}" srcId="{19EF64AF-D0D9-429E-86D3-4CE7A62D9930}" destId="{EB3A3517-BC08-4AB8-AB32-CAA355AEBBAA}" srcOrd="1" destOrd="0" parTransId="{B734E8AD-9F0E-4587-9C1F-9483C3D89D69}" sibTransId="{6388FC91-51F0-4583-AFC8-08BE7A667D2D}"/>
+    <dgm:cxn modelId="{5F094A65-8D03-4DE2-90BC-845E0B1DF3F3}" srcId="{2F4105CE-F831-4489-A38E-EA308F965E1A}" destId="{8B2750EB-B434-41DC-A189-8424894B839C}" srcOrd="0" destOrd="0" parTransId="{FFC1F60D-411F-463B-80BE-8626FCEE6E20}" sibTransId="{1C68FAD9-F9C9-4D4A-9B81-2E6FECE526EB}"/>
+    <dgm:cxn modelId="{E2B364F3-498C-4868-BFEB-56E8969D7655}" type="presOf" srcId="{EB3A3517-BC08-4AB8-AB32-CAA355AEBBAA}" destId="{2874E84B-9605-494F-B813-85A702BFCF0F}" srcOrd="0" destOrd="0" presId="urn:microsoft.com/office/officeart/2011/layout/TabList"/>
+    <dgm:cxn modelId="{96A20728-4B71-426D-8207-8D974A3F5B06}" srcId="{84789903-61AF-4F8F-9430-490306DDBEA0}" destId="{6B0EF60D-A0B1-46C5-9677-4BEA810977D2}" srcOrd="2" destOrd="0" parTransId="{DF3844A8-4E17-463F-BAAD-4ACB2C215D90}" sibTransId="{9DADB796-DA90-4478-BCA3-5929CA4ED0C6}"/>
+    <dgm:cxn modelId="{272F4F47-B6F0-44E6-BE53-1E568010F73F}" srcId="{6B0EF60D-A0B1-46C5-9677-4BEA810977D2}" destId="{432382F3-03DD-4963-A6A5-C32D1C07F990}" srcOrd="1" destOrd="0" parTransId="{428261C4-B743-4CC1-8298-2B59764B7274}" sibTransId="{19522E25-3C1D-4596-9D61-BE8AA7854562}"/>
+    <dgm:cxn modelId="{59C1BA7D-4D40-4BB3-8566-6C1139A98E64}" srcId="{19EF64AF-D0D9-429E-86D3-4CE7A62D9930}" destId="{6992769E-C929-46E1-B5DC-0D224D6E5340}" srcOrd="0" destOrd="0" parTransId="{37B9B495-CA51-4955-9418-9A2A7D83A101}" sibTransId="{025A960F-A828-4BA1-B49F-B19476EFF631}"/>
+    <dgm:cxn modelId="{A9F942E9-1197-421A-8955-236A83F08879}" type="presOf" srcId="{6B0EF60D-A0B1-46C5-9677-4BEA810977D2}" destId="{79569B4D-C26F-4F14-9A58-54D0240E4532}" srcOrd="0" destOrd="0" presId="urn:microsoft.com/office/officeart/2011/layout/TabList"/>
+    <dgm:cxn modelId="{C40B86E0-D802-4C2B-9B30-FF087E46B20A}" srcId="{2F4105CE-F831-4489-A38E-EA308F965E1A}" destId="{A990AE2A-665D-4A90-91E6-8CAE69B9C799}" srcOrd="1" destOrd="0" parTransId="{C4D8ABC1-84E3-45E5-AE1D-9D540D360E76}" sibTransId="{6B7AAB65-DFF8-472A-BB24-DFEC163070BA}"/>
+    <dgm:cxn modelId="{C4A37B3B-A8FF-45D1-9762-4D05571ABF6A}" type="presOf" srcId="{711738C3-3AA4-4805-BDB1-417DABF886EF}" destId="{269C0782-BA35-4C3A-B295-D76ACD031E2B}" srcOrd="0" destOrd="2" presId="urn:microsoft.com/office/officeart/2011/layout/TabList"/>
+    <dgm:cxn modelId="{64A82602-28B8-46E2-8A9C-588C292914B6}" type="presOf" srcId="{2F4105CE-F831-4489-A38E-EA308F965E1A}" destId="{8DF5D93B-DC31-4D2E-91E9-BD58313DDF36}" srcOrd="0" destOrd="0" presId="urn:microsoft.com/office/officeart/2011/layout/TabList"/>
+    <dgm:cxn modelId="{C53AA40F-C7B5-48B1-9833-6AADD820240F}" srcId="{DCB77698-D8A7-43AE-8C12-88D22546D4E0}" destId="{ADA4DD4E-A13B-4B3A-BF0B-6A9868DD9270}" srcOrd="2" destOrd="0" parTransId="{A69BEB30-D4D0-4373-A980-FBE1B2210F40}" sibTransId="{31FC63FF-B7FD-42AA-95A2-FED2E149343F}"/>
+    <dgm:cxn modelId="{F1C43613-B926-4646-87FA-D992BF0A7796}" type="presOf" srcId="{8B2750EB-B434-41DC-A189-8424894B839C}" destId="{89B6103A-0012-428D-9057-99CB1F4B4519}" srcOrd="0" destOrd="0" presId="urn:microsoft.com/office/officeart/2011/layout/TabList"/>
+    <dgm:cxn modelId="{08D37855-A906-4ED9-B03D-BFDBE60EF8C7}" srcId="{6B0EF60D-A0B1-46C5-9677-4BEA810977D2}" destId="{FCB9211A-ECAF-4092-9AF3-4A80464FEEEF}" srcOrd="0" destOrd="0" parTransId="{96E2E2CF-28EB-47BD-B8D8-43FB5B4BBC76}" sibTransId="{80A46D5D-E138-4619-973A-52836DB4B626}"/>
+    <dgm:cxn modelId="{D9904F38-9A5D-48F4-991F-91A4A57053FD}" type="presOf" srcId="{19EF64AF-D0D9-429E-86D3-4CE7A62D9930}" destId="{B06197F1-B041-4747-A702-99E72A52C66D}" srcOrd="0" destOrd="0" presId="urn:microsoft.com/office/officeart/2011/layout/TabList"/>
+    <dgm:cxn modelId="{2896DAC6-E607-42B4-9D8E-740D71F49BEA}" srcId="{DCB77698-D8A7-43AE-8C12-88D22546D4E0}" destId="{54C77FC2-06D5-494F-88FF-639A9A2ADF2B}" srcOrd="0" destOrd="0" parTransId="{59058AE7-0BCA-42FD-8DA7-9E303C2F3598}" sibTransId="{DD5B0AF5-4F1F-4F54-9327-3F9C5FD2ADF5}"/>
     <dgm:cxn modelId="{9139EE07-F69A-425D-9FD3-917AD48F4A26}" type="presOf" srcId="{FCB9211A-ECAF-4092-9AF3-4A80464FEEEF}" destId="{76F4CE38-89D0-4EAB-9E94-FD08C47879E4}" srcOrd="0" destOrd="0" presId="urn:microsoft.com/office/officeart/2011/layout/TabList"/>
-    <dgm:cxn modelId="{3ED3457C-8F8C-48E4-8B93-70F0D5B68315}" type="presOf" srcId="{C9FC25FD-4E5C-4A64-AFF0-7D16F6FBC7AA}" destId="{ABD9F4AA-584A-4C32-8AC6-1F842D5E3471}" srcOrd="0" destOrd="1" presId="urn:microsoft.com/office/officeart/2011/layout/TabList"/>
-    <dgm:cxn modelId="{E50B4537-4222-4FA6-86D6-900B232A905B}" srcId="{84789903-61AF-4F8F-9430-490306DDBEA0}" destId="{DCB77698-D8A7-43AE-8C12-88D22546D4E0}" srcOrd="3" destOrd="0" parTransId="{0256383B-FBF2-49F0-935C-E17EB2C4D7C4}" sibTransId="{866D160B-DB4E-4FF6-BF8A-FD0216203DA1}"/>
-    <dgm:cxn modelId="{F1C43613-B926-4646-87FA-D992BF0A7796}" type="presOf" srcId="{8B2750EB-B434-41DC-A189-8424894B839C}" destId="{89B6103A-0012-428D-9057-99CB1F4B4519}" srcOrd="0" destOrd="0" presId="urn:microsoft.com/office/officeart/2011/layout/TabList"/>
-    <dgm:cxn modelId="{5B81B842-285D-4C21-BC2F-2555AB323F47}" srcId="{19EF64AF-D0D9-429E-86D3-4CE7A62D9930}" destId="{14D29AC4-9FA0-444D-8EE4-E85DEB5E57A2}" srcOrd="2" destOrd="0" parTransId="{8F845681-B05B-4E32-AD5D-21295FC02A07}" sibTransId="{EE9BAB10-D308-456A-ADB5-78C6FFFB97E6}"/>
-    <dgm:cxn modelId="{96A20728-4B71-426D-8207-8D974A3F5B06}" srcId="{84789903-61AF-4F8F-9430-490306DDBEA0}" destId="{6B0EF60D-A0B1-46C5-9677-4BEA810977D2}" srcOrd="2" destOrd="0" parTransId="{DF3844A8-4E17-463F-BAAD-4ACB2C215D90}" sibTransId="{9DADB796-DA90-4478-BCA3-5929CA4ED0C6}"/>
-    <dgm:cxn modelId="{41421F25-7829-4153-A1EA-52109D6052B7}" type="presOf" srcId="{DF89817A-F481-4972-86A6-4FC93177785A}" destId="{269C0782-BA35-4C3A-B295-D76ACD031E2B}" srcOrd="0" destOrd="1" presId="urn:microsoft.com/office/officeart/2011/layout/TabList"/>
-    <dgm:cxn modelId="{5F094A65-8D03-4DE2-90BC-845E0B1DF3F3}" srcId="{2F4105CE-F831-4489-A38E-EA308F965E1A}" destId="{8B2750EB-B434-41DC-A189-8424894B839C}" srcOrd="0" destOrd="0" parTransId="{FFC1F60D-411F-463B-80BE-8626FCEE6E20}" sibTransId="{1C68FAD9-F9C9-4D4A-9B81-2E6FECE526EB}"/>
-    <dgm:cxn modelId="{59C1BA7D-4D40-4BB3-8566-6C1139A98E64}" srcId="{19EF64AF-D0D9-429E-86D3-4CE7A62D9930}" destId="{6992769E-C929-46E1-B5DC-0D224D6E5340}" srcOrd="0" destOrd="0" parTransId="{37B9B495-CA51-4955-9418-9A2A7D83A101}" sibTransId="{025A960F-A828-4BA1-B49F-B19476EFF631}"/>
-    <dgm:cxn modelId="{0EB99273-E40B-4BA4-A24F-424DEB53EF5D}" type="presOf" srcId="{A990AE2A-665D-4A90-91E6-8CAE69B9C799}" destId="{ABD9F4AA-584A-4C32-8AC6-1F842D5E3471}" srcOrd="0" destOrd="0" presId="urn:microsoft.com/office/officeart/2011/layout/TabList"/>
-    <dgm:cxn modelId="{EC26D4FA-8D0A-4965-860E-E576DA3FE7C2}" srcId="{84789903-61AF-4F8F-9430-490306DDBEA0}" destId="{2F4105CE-F831-4489-A38E-EA308F965E1A}" srcOrd="1" destOrd="0" parTransId="{B2367E5B-DF6B-423A-8C73-6C51AA905F42}" sibTransId="{42FAF69B-DD6C-4C4C-A008-7959F807FCD6}"/>
-    <dgm:cxn modelId="{08D37855-A906-4ED9-B03D-BFDBE60EF8C7}" srcId="{6B0EF60D-A0B1-46C5-9677-4BEA810977D2}" destId="{FCB9211A-ECAF-4092-9AF3-4A80464FEEEF}" srcOrd="0" destOrd="0" parTransId="{96E2E2CF-28EB-47BD-B8D8-43FB5B4BBC76}" sibTransId="{80A46D5D-E138-4619-973A-52836DB4B626}"/>
-    <dgm:cxn modelId="{A993A3EF-AF47-4DBB-90D8-CF06FBF70E61}" srcId="{19EF64AF-D0D9-429E-86D3-4CE7A62D9930}" destId="{D4A5DE5E-27AD-4B23-B1EC-53CFB1739A11}" srcOrd="1" destOrd="0" parTransId="{C42F195C-72E6-4357-8789-A7DF85FC0BFF}" sibTransId="{D861C33F-DAAB-4018-91B9-D602CB0B9349}"/>
-    <dgm:cxn modelId="{2367FF4F-D248-4F58-A0D9-784D3549B7D2}" type="presOf" srcId="{F6CCDE68-20A3-48C9-9929-36D9326E50C7}" destId="{269C0782-BA35-4C3A-B295-D76ACD031E2B}" srcOrd="0" destOrd="0" presId="urn:microsoft.com/office/officeart/2011/layout/TabList"/>
-    <dgm:cxn modelId="{42EE89B5-C132-45F6-89DF-FAA355D8AB66}" type="presOf" srcId="{84789903-61AF-4F8F-9430-490306DDBEA0}" destId="{8937854E-C94A-470E-AB4D-2D1BF4D6EC0A}" srcOrd="0" destOrd="0" presId="urn:microsoft.com/office/officeart/2011/layout/TabList"/>
-    <dgm:cxn modelId="{7D69F646-A998-4599-B542-8A82E0A16C62}" type="presOf" srcId="{07DB5E9F-F9E2-4866-A92E-0046A90428A8}" destId="{F2E5F12B-CEBA-404F-BC59-D0A75B115C1F}" srcOrd="0" destOrd="1" presId="urn:microsoft.com/office/officeart/2011/layout/TabList"/>
+    <dgm:cxn modelId="{C33B3223-996C-4204-9B9A-61F80D001862}" srcId="{6B0EF60D-A0B1-46C5-9677-4BEA810977D2}" destId="{48BF764E-F495-4A56-AE96-47376DC45472}" srcOrd="3" destOrd="0" parTransId="{CED2C589-1478-4EE9-8864-36B6C00D583D}" sibTransId="{D6B20742-473A-4B9F-A0CC-85E95BE0720F}"/>
     <dgm:cxn modelId="{BC8D3C2F-C842-4AEF-9163-91FCF0A63C32}" srcId="{84789903-61AF-4F8F-9430-490306DDBEA0}" destId="{19EF64AF-D0D9-429E-86D3-4CE7A62D9930}" srcOrd="0" destOrd="0" parTransId="{65F72764-603C-4BEA-9757-C2D922CDE6E7}" sibTransId="{A59A006A-971D-4A33-AB31-4CEE6264B4C5}"/>
-    <dgm:cxn modelId="{D1EABC93-08A9-4A6F-84B0-B428BA9969D7}" type="presOf" srcId="{D4A5DE5E-27AD-4B23-B1EC-53CFB1739A11}" destId="{2874E84B-9605-494F-B813-85A702BFCF0F}" srcOrd="0" destOrd="0" presId="urn:microsoft.com/office/officeart/2011/layout/TabList"/>
-    <dgm:cxn modelId="{FB51F38E-5F9F-4D3E-BF90-82BB4C1D2DB9}" type="presOf" srcId="{6992769E-C929-46E1-B5DC-0D224D6E5340}" destId="{F82F5449-D542-4810-B467-43A5C2614DD5}" srcOrd="0" destOrd="0" presId="urn:microsoft.com/office/officeart/2011/layout/TabList"/>
-    <dgm:cxn modelId="{9E0BBC12-F01A-46AF-A765-697A5062C11D}" type="presOf" srcId="{54C77FC2-06D5-494F-88FF-639A9A2ADF2B}" destId="{BDDE8257-E413-4550-9DF4-ACE5D4DAF407}" srcOrd="0" destOrd="0" presId="urn:microsoft.com/office/officeart/2011/layout/TabList"/>
-    <dgm:cxn modelId="{272F4F47-B6F0-44E6-BE53-1E568010F73F}" srcId="{6B0EF60D-A0B1-46C5-9677-4BEA810977D2}" destId="{432382F3-03DD-4963-A6A5-C32D1C07F990}" srcOrd="1" destOrd="0" parTransId="{428261C4-B743-4CC1-8298-2B59764B7274}" sibTransId="{19522E25-3C1D-4596-9D61-BE8AA7854562}"/>
-    <dgm:cxn modelId="{6AEA36B3-723E-4C26-991B-32293EC4977D}" srcId="{DCB77698-D8A7-43AE-8C12-88D22546D4E0}" destId="{F6CCDE68-20A3-48C9-9929-36D9326E50C7}" srcOrd="1" destOrd="0" parTransId="{6D777BDB-A14B-4CB9-848E-609F2B89797D}" sibTransId="{E73E6EC1-A77B-4806-AF59-F300788A17A6}"/>
-    <dgm:cxn modelId="{6FBD327E-F3DD-4D5F-892E-365E295EB833}" type="presOf" srcId="{DCB77698-D8A7-43AE-8C12-88D22546D4E0}" destId="{9059B661-BA02-491A-9141-4597C2088440}" srcOrd="0" destOrd="0" presId="urn:microsoft.com/office/officeart/2011/layout/TabList"/>
-    <dgm:cxn modelId="{A9F942E9-1197-421A-8955-236A83F08879}" type="presOf" srcId="{6B0EF60D-A0B1-46C5-9677-4BEA810977D2}" destId="{79569B4D-C26F-4F14-9A58-54D0240E4532}" srcOrd="0" destOrd="0" presId="urn:microsoft.com/office/officeart/2011/layout/TabList"/>
-    <dgm:cxn modelId="{2896DAC6-E607-42B4-9D8E-740D71F49BEA}" srcId="{DCB77698-D8A7-43AE-8C12-88D22546D4E0}" destId="{54C77FC2-06D5-494F-88FF-639A9A2ADF2B}" srcOrd="0" destOrd="0" parTransId="{59058AE7-0BCA-42FD-8DA7-9E303C2F3598}" sibTransId="{DD5B0AF5-4F1F-4F54-9327-3F9C5FD2ADF5}"/>
-    <dgm:cxn modelId="{64A82602-28B8-46E2-8A9C-588C292914B6}" type="presOf" srcId="{2F4105CE-F831-4489-A38E-EA308F965E1A}" destId="{8DF5D93B-DC31-4D2E-91E9-BD58313DDF36}" srcOrd="0" destOrd="0" presId="urn:microsoft.com/office/officeart/2011/layout/TabList"/>
-    <dgm:cxn modelId="{EA29C83E-1DCA-4FBB-975D-0E40E46D2194}" type="presOf" srcId="{432382F3-03DD-4963-A6A5-C32D1C07F990}" destId="{F2E5F12B-CEBA-404F-BC59-D0A75B115C1F}" srcOrd="0" destOrd="0" presId="urn:microsoft.com/office/officeart/2011/layout/TabList"/>
-    <dgm:cxn modelId="{C40B86E0-D802-4C2B-9B30-FF087E46B20A}" srcId="{2F4105CE-F831-4489-A38E-EA308F965E1A}" destId="{A990AE2A-665D-4A90-91E6-8CAE69B9C799}" srcOrd="1" destOrd="0" parTransId="{C4D8ABC1-84E3-45E5-AE1D-9D540D360E76}" sibTransId="{6B7AAB65-DFF8-472A-BB24-DFEC163070BA}"/>
-    <dgm:cxn modelId="{092A9CEB-5EFE-4BCC-90CE-2FB92ECEC62E}" srcId="{2F4105CE-F831-4489-A38E-EA308F965E1A}" destId="{C9FC25FD-4E5C-4A64-AFF0-7D16F6FBC7AA}" srcOrd="2" destOrd="0" parTransId="{F9793D06-E836-466C-83D6-58F72B9C8CB4}" sibTransId="{ED1FB57D-D2B1-48EC-8B8D-C19F6680A4CF}"/>
-    <dgm:cxn modelId="{D9904F38-9A5D-48F4-991F-91A4A57053FD}" type="presOf" srcId="{19EF64AF-D0D9-429E-86D3-4CE7A62D9930}" destId="{B06197F1-B041-4747-A702-99E72A52C66D}" srcOrd="0" destOrd="0" presId="urn:microsoft.com/office/officeart/2011/layout/TabList"/>
-    <dgm:cxn modelId="{2694D95A-2CBA-4FD2-B966-932CA25C4405}" srcId="{6B0EF60D-A0B1-46C5-9677-4BEA810977D2}" destId="{07DB5E9F-F9E2-4866-A92E-0046A90428A8}" srcOrd="2" destOrd="0" parTransId="{5F3A5809-A99D-4946-9529-2713AD09E5EA}" sibTransId="{9CAE03CD-36E6-4523-A376-CDA7F2B72A17}"/>
+    <dgm:cxn modelId="{B2124052-34AB-4435-8CBA-D34AF146A189}" type="presOf" srcId="{14D29AC4-9FA0-444D-8EE4-E85DEB5E57A2}" destId="{2874E84B-9605-494F-B813-85A702BFCF0F}" srcOrd="0" destOrd="2" presId="urn:microsoft.com/office/officeart/2011/layout/TabList"/>
+    <dgm:cxn modelId="{D1EABC93-08A9-4A6F-84B0-B428BA9969D7}" type="presOf" srcId="{D4A5DE5E-27AD-4B23-B1EC-53CFB1739A11}" destId="{2874E84B-9605-494F-B813-85A702BFCF0F}" srcOrd="0" destOrd="1" presId="urn:microsoft.com/office/officeart/2011/layout/TabList"/>
+    <dgm:cxn modelId="{576B1C0C-BC74-4AB0-84AC-D638255D8C52}" srcId="{2F4105CE-F831-4489-A38E-EA308F965E1A}" destId="{E2EDF958-A636-4721-91E2-1009161BE1BC}" srcOrd="3" destOrd="0" parTransId="{56017F76-3EE4-4B10-980E-2962F4DDFEEC}" sibTransId="{D4D47A36-D2AE-41C2-A545-1538EA1F1179}"/>
+    <dgm:cxn modelId="{3DB12D0E-B496-47AC-B9D8-B8B2B6369FEF}" srcId="{6B0EF60D-A0B1-46C5-9677-4BEA810977D2}" destId="{03E9865A-20D2-4CF6-AA88-EF74E4A16F4A}" srcOrd="2" destOrd="0" parTransId="{8248E5BD-5697-4B1E-BCB4-ABC0B2D8E72E}" sibTransId="{EEBE7D8C-BEE1-4AE3-A6A1-B72D470C50D8}"/>
+    <dgm:cxn modelId="{6546E246-748E-4D89-8B27-C6C10AA3AC70}" type="presOf" srcId="{ADA4DD4E-A13B-4B3A-BF0B-6A9868DD9270}" destId="{269C0782-BA35-4C3A-B295-D76ACD031E2B}" srcOrd="0" destOrd="1" presId="urn:microsoft.com/office/officeart/2011/layout/TabList"/>
+    <dgm:cxn modelId="{5B81B842-285D-4C21-BC2F-2555AB323F47}" srcId="{19EF64AF-D0D9-429E-86D3-4CE7A62D9930}" destId="{14D29AC4-9FA0-444D-8EE4-E85DEB5E57A2}" srcOrd="3" destOrd="0" parTransId="{8F845681-B05B-4E32-AD5D-21295FC02A07}" sibTransId="{EE9BAB10-D308-456A-ADB5-78C6FFFB97E6}"/>
     <dgm:cxn modelId="{2F47F51D-5D99-460D-A41A-7BA1B38FCB61}" type="presParOf" srcId="{8937854E-C94A-470E-AB4D-2D1BF4D6EC0A}" destId="{63CF07DF-294E-4215-9B6C-5C3BCCC45688}" srcOrd="0" destOrd="0" presId="urn:microsoft.com/office/officeart/2011/layout/TabList"/>
     <dgm:cxn modelId="{01393574-0C7D-4580-B867-B93CADED6C7E}" type="presParOf" srcId="{63CF07DF-294E-4215-9B6C-5C3BCCC45688}" destId="{F82F5449-D542-4810-B467-43A5C2614DD5}" srcOrd="0" destOrd="0" presId="urn:microsoft.com/office/officeart/2011/layout/TabList"/>
     <dgm:cxn modelId="{2A2C2DA9-9F74-4E94-9167-80C01FF3DC10}" type="presParOf" srcId="{63CF07DF-294E-4215-9B6C-5C3BCCC45688}" destId="{B06197F1-B041-4747-A702-99E72A52C66D}" srcOrd="1" destOrd="0" presId="urn:microsoft.com/office/officeart/2011/layout/TabList"/>
@@ -3859,7 +4079,7 @@
           </a:pPr>
           <a:r>
             <a:rPr lang="en-US" sz="1000" kern="1200" dirty="0" smtClean="0"/>
-            <a:t>Stakeholder</a:t>
+            <a:t>Small business owners</a:t>
           </a:r>
           <a:endParaRPr lang="en-US" sz="1000" kern="1200" dirty="0"/>
         </a:p>
@@ -3878,7 +4098,7 @@
           </a:pPr>
           <a:r>
             <a:rPr lang="en-US" sz="1000" kern="1200" dirty="0" smtClean="0"/>
-            <a:t>Stakeholder</a:t>
+            <a:t>Administrator of the U.S. Small Business Administration</a:t>
           </a:r>
           <a:endParaRPr lang="en-US" sz="1000" kern="1200" dirty="0"/>
         </a:p>
@@ -3938,7 +4158,19 @@
           </a:pPr>
           <a:r>
             <a:rPr lang="en-US" sz="1000" kern="1200" dirty="0" smtClean="0"/>
-            <a:t>Contract specialists are  making things as easy as possible for themselves by discriminating against small businesses.</a:t>
+            <a:t>Contract </a:t>
+          </a:r>
+          <a:r>
+            <a:rPr lang="en-US" sz="1000" kern="1200" dirty="0" smtClean="0"/>
+            <a:t>administrators are discriminating </a:t>
+          </a:r>
+          <a:r>
+            <a:rPr lang="en-US" sz="1000" kern="1200" dirty="0" smtClean="0"/>
+            <a:t>against small </a:t>
+          </a:r>
+          <a:r>
+            <a:rPr lang="en-US" sz="1000" kern="1200" dirty="0" smtClean="0"/>
+            <a:t>businesses to make things easier for themselves.</a:t>
           </a:r>
           <a:endParaRPr lang="en-US" sz="1000" kern="1200" dirty="0"/>
         </a:p>
@@ -4098,7 +4330,7 @@
           </a:pPr>
           <a:r>
             <a:rPr lang="en-US" sz="1000" kern="1200" dirty="0" smtClean="0"/>
-            <a:t>Stakeholder</a:t>
+            <a:t>Executives of large businesses</a:t>
           </a:r>
           <a:endParaRPr lang="en-US" sz="1000" kern="1200" dirty="0"/>
         </a:p>
@@ -4238,7 +4470,11 @@
           </a:pPr>
           <a:r>
             <a:rPr lang="en-US" sz="1000" kern="1200" dirty="0" smtClean="0"/>
-            <a:t>Change Narrative</a:t>
+            <a:t>Decline </a:t>
+          </a:r>
+          <a:r>
+            <a:rPr lang="en-US" sz="1000" kern="1200" dirty="0" smtClean="0"/>
+            <a:t>Narrative</a:t>
           </a:r>
           <a:endParaRPr lang="en-US" sz="1000" kern="1200" dirty="0"/>
         </a:p>
@@ -4318,7 +4554,26 @@
           </a:pPr>
           <a:r>
             <a:rPr lang="en-US" sz="1000" kern="1200" dirty="0" smtClean="0"/>
-            <a:t>Stakeholder</a:t>
+            <a:t>Small business advocacy organizations</a:t>
+          </a:r>
+          <a:endParaRPr lang="en-US" sz="1000" kern="1200" dirty="0"/>
+        </a:p>
+        <a:p>
+          <a:pPr marL="57150" lvl="1" indent="-57150" algn="l" defTabSz="444500">
+            <a:lnSpc>
+              <a:spcPct val="90000"/>
+            </a:lnSpc>
+            <a:spcBef>
+              <a:spcPct val="0"/>
+            </a:spcBef>
+            <a:spcAft>
+              <a:spcPct val="15000"/>
+            </a:spcAft>
+            <a:buChar char="••"/>
+          </a:pPr>
+          <a:r>
+            <a:rPr lang="en-US" sz="1000" kern="1200" dirty="0" smtClean="0"/>
+            <a:t>Administrator of the U.S. Small Business Administration</a:t>
           </a:r>
           <a:endParaRPr lang="en-US" sz="1000" kern="1200" dirty="0"/>
         </a:p>
@@ -4538,7 +4793,7 @@
           </a:pPr>
           <a:r>
             <a:rPr lang="en-US" sz="1000" kern="1200" dirty="0" smtClean="0"/>
-            <a:t>Stakeholder</a:t>
+            <a:t>Executives of large businesses</a:t>
           </a:r>
           <a:endParaRPr lang="en-US" sz="1000" kern="1200" dirty="0"/>
         </a:p>
@@ -4915,7 +5170,7 @@
           </a:pPr>
           <a:r>
             <a:rPr lang="en-US" sz="1000" kern="1200" dirty="0" smtClean="0"/>
-            <a:t>Stakeholder</a:t>
+            <a:t>Leaders and faculty of research universities</a:t>
           </a:r>
           <a:endParaRPr lang="en-US" sz="1000" kern="1200" dirty="0"/>
         </a:p>
@@ -4934,7 +5189,26 @@
           </a:pPr>
           <a:r>
             <a:rPr lang="en-US" sz="1000" kern="1200" dirty="0" smtClean="0"/>
-            <a:t>Stakeholder</a:t>
+            <a:t>Leaders of research hospitals</a:t>
+          </a:r>
+          <a:endParaRPr lang="en-US" sz="1000" kern="1200" dirty="0"/>
+        </a:p>
+        <a:p>
+          <a:pPr marL="57150" lvl="1" indent="-57150" algn="l" defTabSz="444500">
+            <a:lnSpc>
+              <a:spcPct val="90000"/>
+            </a:lnSpc>
+            <a:spcBef>
+              <a:spcPct val="0"/>
+            </a:spcBef>
+            <a:spcAft>
+              <a:spcPct val="15000"/>
+            </a:spcAft>
+            <a:buChar char="••"/>
+          </a:pPr>
+          <a:r>
+            <a:rPr lang="en-US" sz="1000" kern="1200" dirty="0" smtClean="0"/>
+            <a:t>Leadership of the American Medical College Association</a:t>
           </a:r>
           <a:endParaRPr lang="en-US" sz="1000" kern="1200" dirty="0"/>
         </a:p>
@@ -5074,7 +5348,11 @@
           </a:pPr>
           <a:r>
             <a:rPr lang="en-US" sz="1000" kern="1200" dirty="0" smtClean="0"/>
-            <a:t>Change Narrative</a:t>
+            <a:t>Decline </a:t>
+          </a:r>
+          <a:r>
+            <a:rPr lang="en-US" sz="1000" kern="1200" dirty="0" smtClean="0"/>
+            <a:t>Narrative</a:t>
           </a:r>
           <a:endParaRPr lang="en-US" sz="1000" kern="1200" dirty="0"/>
         </a:p>
@@ -5135,7 +5413,7 @@
           </a:pPr>
           <a:r>
             <a:rPr lang="en-US" sz="1000" kern="1200" dirty="0" smtClean="0"/>
-            <a:t>Stakeholder</a:t>
+            <a:t>Leaders and faculty of research universities</a:t>
           </a:r>
           <a:endParaRPr lang="en-US" sz="1000" kern="1200" dirty="0"/>
         </a:p>
@@ -5154,8 +5432,41 @@
           </a:pPr>
           <a:r>
             <a:rPr lang="en-US" sz="1000" kern="1200" dirty="0" smtClean="0"/>
-            <a:t>Stakeholder</a:t>
+            <a:t>Leaders of research hospitals</a:t>
           </a:r>
+          <a:endParaRPr lang="en-US" sz="1000" kern="1200" dirty="0"/>
+        </a:p>
+        <a:p>
+          <a:pPr marL="57150" lvl="1" indent="-57150" algn="l" defTabSz="444500">
+            <a:lnSpc>
+              <a:spcPct val="90000"/>
+            </a:lnSpc>
+            <a:spcBef>
+              <a:spcPct val="0"/>
+            </a:spcBef>
+            <a:spcAft>
+              <a:spcPct val="15000"/>
+            </a:spcAft>
+            <a:buChar char="••"/>
+          </a:pPr>
+          <a:r>
+            <a:rPr lang="en-US" sz="1000" kern="1200" dirty="0" smtClean="0"/>
+            <a:t>Leadership of the American Medical College Association</a:t>
+          </a:r>
+        </a:p>
+        <a:p>
+          <a:pPr marL="57150" lvl="1" indent="-57150" algn="l" defTabSz="444500">
+            <a:lnSpc>
+              <a:spcPct val="90000"/>
+            </a:lnSpc>
+            <a:spcBef>
+              <a:spcPct val="0"/>
+            </a:spcBef>
+            <a:spcAft>
+              <a:spcPct val="15000"/>
+            </a:spcAft>
+            <a:buChar char="••"/>
+          </a:pPr>
           <a:endParaRPr lang="en-US" sz="1000" kern="1200" dirty="0"/>
         </a:p>
       </dsp:txBody>
@@ -5294,7 +5605,11 @@
           </a:pPr>
           <a:r>
             <a:rPr lang="en-US" sz="1000" kern="1200" dirty="0" smtClean="0"/>
-            <a:t>Change Narrative</a:t>
+            <a:t>Decline </a:t>
+          </a:r>
+          <a:r>
+            <a:rPr lang="en-US" sz="1000" kern="1200" dirty="0" smtClean="0"/>
+            <a:t>Narrative</a:t>
           </a:r>
           <a:endParaRPr lang="en-US" sz="1000" kern="1200" dirty="0"/>
         </a:p>
@@ -5355,7 +5670,7 @@
           </a:pPr>
           <a:r>
             <a:rPr lang="en-US" sz="1000" kern="1200" dirty="0" smtClean="0"/>
-            <a:t>Stakeholder</a:t>
+            <a:t>Leaders and faculty of research universities</a:t>
           </a:r>
           <a:endParaRPr lang="en-US" sz="1000" kern="1200" dirty="0"/>
         </a:p>
@@ -5374,8 +5689,41 @@
           </a:pPr>
           <a:r>
             <a:rPr lang="en-US" sz="1000" kern="1200" dirty="0" smtClean="0"/>
-            <a:t>Stakeholder</a:t>
+            <a:t>Leaders of research hospitals</a:t>
           </a:r>
+          <a:endParaRPr lang="en-US" sz="1000" kern="1200" dirty="0"/>
+        </a:p>
+        <a:p>
+          <a:pPr marL="57150" lvl="1" indent="-57150" algn="l" defTabSz="444500">
+            <a:lnSpc>
+              <a:spcPct val="90000"/>
+            </a:lnSpc>
+            <a:spcBef>
+              <a:spcPct val="0"/>
+            </a:spcBef>
+            <a:spcAft>
+              <a:spcPct val="15000"/>
+            </a:spcAft>
+            <a:buChar char="••"/>
+          </a:pPr>
+          <a:r>
+            <a:rPr lang="en-US" sz="1000" kern="1200" dirty="0" smtClean="0"/>
+            <a:t>Leadership of the American Medical College Association</a:t>
+          </a:r>
+        </a:p>
+        <a:p>
+          <a:pPr marL="57150" lvl="1" indent="-57150" algn="l" defTabSz="444500">
+            <a:lnSpc>
+              <a:spcPct val="90000"/>
+            </a:lnSpc>
+            <a:spcBef>
+              <a:spcPct val="0"/>
+            </a:spcBef>
+            <a:spcAft>
+              <a:spcPct val="15000"/>
+            </a:spcAft>
+            <a:buChar char="••"/>
+          </a:pPr>
           <a:endParaRPr lang="en-US" sz="1000" kern="1200" dirty="0"/>
         </a:p>
       </dsp:txBody>
@@ -5575,9 +5923,8 @@
           </a:pPr>
           <a:r>
             <a:rPr lang="en-US" sz="1000" kern="1200" dirty="0" smtClean="0"/>
-            <a:t>Stakeholder</a:t>
+            <a:t>Leaders and faculty of research universities</a:t>
           </a:r>
-          <a:endParaRPr lang="en-US" sz="1000" kern="1200" dirty="0"/>
         </a:p>
         <a:p>
           <a:pPr marL="57150" lvl="1" indent="-57150" algn="l" defTabSz="444500">
@@ -5594,9 +5941,26 @@
           </a:pPr>
           <a:r>
             <a:rPr lang="en-US" sz="1000" kern="1200" dirty="0" smtClean="0"/>
-            <a:t>Stakeholder</a:t>
+            <a:t>Leaders of research hospitals</a:t>
           </a:r>
-          <a:endParaRPr lang="en-US" sz="1000" kern="1200" dirty="0"/>
+        </a:p>
+        <a:p>
+          <a:pPr marL="57150" lvl="1" indent="-57150" algn="l" defTabSz="444500">
+            <a:lnSpc>
+              <a:spcPct val="90000"/>
+            </a:lnSpc>
+            <a:spcBef>
+              <a:spcPct val="0"/>
+            </a:spcBef>
+            <a:spcAft>
+              <a:spcPct val="15000"/>
+            </a:spcAft>
+            <a:buChar char="••"/>
+          </a:pPr>
+          <a:r>
+            <a:rPr lang="en-US" sz="1000" kern="1200" dirty="0" smtClean="0"/>
+            <a:t>Leadership of the American Medical College Association</a:t>
+          </a:r>
         </a:p>
       </dsp:txBody>
       <dsp:txXfrm>
@@ -8473,7 +8837,7 @@
           <a:p>
             <a:fld id="{38350BF8-A4DA-458D-AEA8-6A7F2699BE48}" type="datetimeFigureOut">
               <a:rPr lang="en-US" smtClean="0"/>
-              <a:t>02/28/2019</a:t>
+              <a:t>2/28/2019</a:t>
             </a:fld>
             <a:endParaRPr lang="en-US"/>
           </a:p>
@@ -8643,7 +9007,7 @@
           <a:p>
             <a:fld id="{38350BF8-A4DA-458D-AEA8-6A7F2699BE48}" type="datetimeFigureOut">
               <a:rPr lang="en-US" smtClean="0"/>
-              <a:t>02/28/2019</a:t>
+              <a:t>2/28/2019</a:t>
             </a:fld>
             <a:endParaRPr lang="en-US"/>
           </a:p>
@@ -8823,7 +9187,7 @@
           <a:p>
             <a:fld id="{38350BF8-A4DA-458D-AEA8-6A7F2699BE48}" type="datetimeFigureOut">
               <a:rPr lang="en-US" smtClean="0"/>
-              <a:t>02/28/2019</a:t>
+              <a:t>2/28/2019</a:t>
             </a:fld>
             <a:endParaRPr lang="en-US"/>
           </a:p>
@@ -8993,7 +9357,7 @@
           <a:p>
             <a:fld id="{38350BF8-A4DA-458D-AEA8-6A7F2699BE48}" type="datetimeFigureOut">
               <a:rPr lang="en-US" smtClean="0"/>
-              <a:t>02/28/2019</a:t>
+              <a:t>2/28/2019</a:t>
             </a:fld>
             <a:endParaRPr lang="en-US"/>
           </a:p>
@@ -9239,7 +9603,7 @@
           <a:p>
             <a:fld id="{38350BF8-A4DA-458D-AEA8-6A7F2699BE48}" type="datetimeFigureOut">
               <a:rPr lang="en-US" smtClean="0"/>
-              <a:t>02/28/2019</a:t>
+              <a:t>2/28/2019</a:t>
             </a:fld>
             <a:endParaRPr lang="en-US"/>
           </a:p>
@@ -9527,7 +9891,7 @@
           <a:p>
             <a:fld id="{38350BF8-A4DA-458D-AEA8-6A7F2699BE48}" type="datetimeFigureOut">
               <a:rPr lang="en-US" smtClean="0"/>
-              <a:t>02/28/2019</a:t>
+              <a:t>2/28/2019</a:t>
             </a:fld>
             <a:endParaRPr lang="en-US"/>
           </a:p>
@@ -9949,7 +10313,7 @@
           <a:p>
             <a:fld id="{38350BF8-A4DA-458D-AEA8-6A7F2699BE48}" type="datetimeFigureOut">
               <a:rPr lang="en-US" smtClean="0"/>
-              <a:t>02/28/2019</a:t>
+              <a:t>2/28/2019</a:t>
             </a:fld>
             <a:endParaRPr lang="en-US"/>
           </a:p>
@@ -10067,7 +10431,7 @@
           <a:p>
             <a:fld id="{38350BF8-A4DA-458D-AEA8-6A7F2699BE48}" type="datetimeFigureOut">
               <a:rPr lang="en-US" smtClean="0"/>
-              <a:t>02/28/2019</a:t>
+              <a:t>2/28/2019</a:t>
             </a:fld>
             <a:endParaRPr lang="en-US"/>
           </a:p>
@@ -10162,7 +10526,7 @@
           <a:p>
             <a:fld id="{38350BF8-A4DA-458D-AEA8-6A7F2699BE48}" type="datetimeFigureOut">
               <a:rPr lang="en-US" smtClean="0"/>
-              <a:t>02/28/2019</a:t>
+              <a:t>2/28/2019</a:t>
             </a:fld>
             <a:endParaRPr lang="en-US"/>
           </a:p>
@@ -10439,7 +10803,7 @@
           <a:p>
             <a:fld id="{38350BF8-A4DA-458D-AEA8-6A7F2699BE48}" type="datetimeFigureOut">
               <a:rPr lang="en-US" smtClean="0"/>
-              <a:t>02/28/2019</a:t>
+              <a:t>2/28/2019</a:t>
             </a:fld>
             <a:endParaRPr lang="en-US"/>
           </a:p>
@@ -10692,7 +11056,7 @@
           <a:p>
             <a:fld id="{38350BF8-A4DA-458D-AEA8-6A7F2699BE48}" type="datetimeFigureOut">
               <a:rPr lang="en-US" smtClean="0"/>
-              <a:t>02/28/2019</a:t>
+              <a:t>2/28/2019</a:t>
             </a:fld>
             <a:endParaRPr lang="en-US"/>
           </a:p>
@@ -10905,7 +11269,7 @@
           <a:p>
             <a:fld id="{38350BF8-A4DA-458D-AEA8-6A7F2699BE48}" type="datetimeFigureOut">
               <a:rPr lang="en-US" smtClean="0"/>
-              <a:t>02/28/2019</a:t>
+              <a:t>2/28/2019</a:t>
             </a:fld>
             <a:endParaRPr lang="en-US"/>
           </a:p>
@@ -11439,7 +11803,7 @@
       </p:sp>
       <p:sp>
         <p:nvSpPr>
-          <p:cNvPr id="9" name="Oval 8"/>
+          <p:cNvPr id="12" name="Oval 11"/>
           <p:cNvSpPr>
             <a:spLocks noChangeAspect="1"/>
           </p:cNvSpPr>
@@ -11447,115 +11811,7 @@
         </p:nvSpPr>
         <p:spPr>
           <a:xfrm>
-            <a:off x="3537104" y="4701540"/>
-            <a:ext cx="822960" cy="822960"/>
-          </a:xfrm>
-          <a:prstGeom prst="ellipse">
-            <a:avLst/>
-          </a:prstGeom>
-        </p:spPr>
-        <p:style>
-          <a:lnRef idx="2">
-            <a:schemeClr val="accent1">
-              <a:shade val="50000"/>
-            </a:schemeClr>
-          </a:lnRef>
-          <a:fillRef idx="1">
-            <a:schemeClr val="accent1"/>
-          </a:fillRef>
-          <a:effectRef idx="0">
-            <a:schemeClr val="accent1"/>
-          </a:effectRef>
-          <a:fontRef idx="minor">
-            <a:schemeClr val="lt1"/>
-          </a:fontRef>
-        </p:style>
-        <p:txBody>
-          <a:bodyPr lIns="0" rIns="0" rtlCol="0" anchor="ctr"/>
-          <a:lstStyle/>
-          <a:p>
-            <a:pPr algn="ctr"/>
-            <a:r>
-              <a:rPr lang="en-US" sz="900" dirty="0" smtClean="0"/>
-              <a:t>House </a:t>
-            </a:r>
-            <a:r>
-              <a:rPr lang="en-US" sz="900" dirty="0" err="1" smtClean="0"/>
-              <a:t>Cmte</a:t>
-            </a:r>
-            <a:r>
-              <a:rPr lang="en-US" sz="900" dirty="0" smtClean="0"/>
-              <a:t> on [TBD]</a:t>
-            </a:r>
-            <a:endParaRPr lang="en-US" sz="900" dirty="0"/>
-          </a:p>
-        </p:txBody>
-      </p:sp>
-      <p:sp>
-        <p:nvSpPr>
-          <p:cNvPr id="10" name="Oval 9"/>
-          <p:cNvSpPr>
-            <a:spLocks noChangeAspect="1"/>
-          </p:cNvSpPr>
-          <p:nvPr/>
-        </p:nvSpPr>
-        <p:spPr>
-          <a:xfrm>
-            <a:off x="4857752" y="4701540"/>
-            <a:ext cx="822960" cy="822960"/>
-          </a:xfrm>
-          <a:prstGeom prst="ellipse">
-            <a:avLst/>
-          </a:prstGeom>
-        </p:spPr>
-        <p:style>
-          <a:lnRef idx="2">
-            <a:schemeClr val="accent1">
-              <a:shade val="50000"/>
-            </a:schemeClr>
-          </a:lnRef>
-          <a:fillRef idx="1">
-            <a:schemeClr val="accent1"/>
-          </a:fillRef>
-          <a:effectRef idx="0">
-            <a:schemeClr val="accent1"/>
-          </a:effectRef>
-          <a:fontRef idx="minor">
-            <a:schemeClr val="lt1"/>
-          </a:fontRef>
-        </p:style>
-        <p:txBody>
-          <a:bodyPr lIns="0" rIns="0" rtlCol="0" anchor="ctr"/>
-          <a:lstStyle/>
-          <a:p>
-            <a:pPr algn="ctr"/>
-            <a:r>
-              <a:rPr lang="en-US" sz="900" dirty="0" smtClean="0"/>
-              <a:t>House </a:t>
-            </a:r>
-            <a:r>
-              <a:rPr lang="en-US" sz="900" dirty="0" err="1" smtClean="0"/>
-              <a:t>Cmte</a:t>
-            </a:r>
-            <a:r>
-              <a:rPr lang="en-US" sz="900" dirty="0" smtClean="0"/>
-              <a:t> on [TBD]</a:t>
-            </a:r>
-            <a:endParaRPr lang="en-US" sz="900" dirty="0"/>
-          </a:p>
-        </p:txBody>
-      </p:sp>
-      <p:sp>
-        <p:nvSpPr>
-          <p:cNvPr id="11" name="Oval 10"/>
-          <p:cNvSpPr>
-            <a:spLocks noChangeAspect="1"/>
-          </p:cNvSpPr>
-          <p:nvPr/>
-        </p:nvSpPr>
-        <p:spPr>
-          <a:xfrm>
-            <a:off x="3581400" y="906780"/>
+            <a:off x="4175760" y="796737"/>
             <a:ext cx="822960" cy="822960"/>
           </a:xfrm>
           <a:prstGeom prst="ellipse">
@@ -11588,66 +11844,16 @@
               <a:t>Senate </a:t>
             </a:r>
             <a:r>
-              <a:rPr lang="en-US" sz="900" dirty="0" err="1" smtClean="0"/>
-              <a:t>Cmte</a:t>
+              <a:rPr lang="en-US" sz="900" dirty="0" smtClean="0"/>
+              <a:t>Committee </a:t>
             </a:r>
             <a:r>
               <a:rPr lang="en-US" sz="900" dirty="0" smtClean="0"/>
-              <a:t> on [TBD]</a:t>
-            </a:r>
-            <a:endParaRPr lang="en-US" sz="900" dirty="0"/>
-          </a:p>
-        </p:txBody>
-      </p:sp>
-      <p:sp>
-        <p:nvSpPr>
-          <p:cNvPr id="12" name="Oval 11"/>
-          <p:cNvSpPr>
-            <a:spLocks noChangeAspect="1"/>
-          </p:cNvSpPr>
-          <p:nvPr/>
-        </p:nvSpPr>
-        <p:spPr>
-          <a:xfrm>
-            <a:off x="4776902" y="906780"/>
-            <a:ext cx="822960" cy="822960"/>
-          </a:xfrm>
-          <a:prstGeom prst="ellipse">
-            <a:avLst/>
-          </a:prstGeom>
-        </p:spPr>
-        <p:style>
-          <a:lnRef idx="2">
-            <a:schemeClr val="accent1">
-              <a:shade val="50000"/>
-            </a:schemeClr>
-          </a:lnRef>
-          <a:fillRef idx="1">
-            <a:schemeClr val="accent1"/>
-          </a:fillRef>
-          <a:effectRef idx="0">
-            <a:schemeClr val="accent1"/>
-          </a:effectRef>
-          <a:fontRef idx="minor">
-            <a:schemeClr val="lt1"/>
-          </a:fontRef>
-        </p:style>
-        <p:txBody>
-          <a:bodyPr lIns="0" rIns="0" rtlCol="0" anchor="ctr"/>
-          <a:lstStyle/>
-          <a:p>
-            <a:pPr algn="ctr"/>
-            <a:r>
-              <a:rPr lang="en-US" sz="900" dirty="0" smtClean="0"/>
-              <a:t>Senate </a:t>
-            </a:r>
-            <a:r>
-              <a:rPr lang="en-US" sz="900" dirty="0" err="1" smtClean="0"/>
-              <a:t>Cmte</a:t>
+              <a:t>on </a:t>
             </a:r>
             <a:r>
               <a:rPr lang="en-US" sz="900" dirty="0" smtClean="0"/>
-              <a:t> on [TBD]</a:t>
+              <a:t>Small Business</a:t>
             </a:r>
             <a:endParaRPr lang="en-US" sz="900" dirty="0"/>
           </a:p>
@@ -11661,7 +11867,7 @@
         </p:nvSpPr>
         <p:spPr>
           <a:xfrm>
-            <a:off x="304800" y="2423636"/>
+            <a:off x="304800" y="2349500"/>
             <a:ext cx="1097280" cy="914400"/>
           </a:xfrm>
           <a:prstGeom prst="roundRect">
@@ -11712,7 +11918,7 @@
         </p:nvSpPr>
         <p:spPr>
           <a:xfrm>
-            <a:off x="7848600" y="2423636"/>
+            <a:off x="7680960" y="2349500"/>
             <a:ext cx="1097280" cy="914400"/>
           </a:xfrm>
           <a:prstGeom prst="roundRect">
@@ -11756,7 +11962,7 @@
         </p:nvSpPr>
         <p:spPr>
           <a:xfrm>
-            <a:off x="533400" y="3634740"/>
+            <a:off x="533400" y="4655820"/>
             <a:ext cx="1097280" cy="914400"/>
           </a:xfrm>
           <a:prstGeom prst="roundRect">
@@ -11786,7 +11992,7 @@
             <a:pPr algn="ctr"/>
             <a:r>
               <a:rPr lang="en-US" sz="1000" dirty="0" smtClean="0"/>
-              <a:t>Stakeholder</a:t>
+              <a:t>Executives of large businesses (i.e., businesses with greater than 1,000 employees)</a:t>
             </a:r>
             <a:endParaRPr lang="en-US" sz="1000" dirty="0"/>
           </a:p>
@@ -11830,7 +12036,7 @@
             <a:pPr algn="ctr"/>
             <a:r>
               <a:rPr lang="en-US" sz="1000" dirty="0" smtClean="0"/>
-              <a:t>Stakeholder</a:t>
+              <a:t>Administrator of the Small Business Administration</a:t>
             </a:r>
             <a:endParaRPr lang="en-US" sz="1000" dirty="0"/>
           </a:p>
@@ -11874,7 +12080,7 @@
             <a:pPr algn="ctr"/>
             <a:r>
               <a:rPr lang="en-US" sz="1000" dirty="0" smtClean="0"/>
-              <a:t>Stakeholder</a:t>
+              <a:t>Leaders of research hospitals</a:t>
             </a:r>
             <a:endParaRPr lang="en-US" sz="1000" dirty="0"/>
           </a:p>
@@ -11888,7 +12094,7 @@
         </p:nvSpPr>
         <p:spPr>
           <a:xfrm>
-            <a:off x="7391400" y="3634740"/>
+            <a:off x="7563928" y="3502660"/>
             <a:ext cx="1097280" cy="914400"/>
           </a:xfrm>
           <a:prstGeom prst="roundRect">
@@ -11918,7 +12124,7 @@
             <a:pPr algn="ctr"/>
             <a:r>
               <a:rPr lang="en-US" sz="1000" dirty="0" smtClean="0"/>
-              <a:t>Stakeholder</a:t>
+              <a:t>Leadership of the American Medical Colleges Association</a:t>
             </a:r>
             <a:endParaRPr lang="en-US" sz="1000" dirty="0"/>
           </a:p>
@@ -11988,134 +12194,17 @@
       </p:sp>
       <p:cxnSp>
         <p:nvCxnSpPr>
-          <p:cNvPr id="25" name="Straight Arrow Connector 24"/>
+          <p:cNvPr id="27" name="Straight Arrow Connector 26"/>
           <p:cNvCxnSpPr>
-            <a:stCxn id="11" idx="4"/>
-            <a:endCxn id="6" idx="1"/>
+            <a:stCxn id="12" idx="4"/>
+            <a:endCxn id="6" idx="0"/>
           </p:cNvCxnSpPr>
           <p:nvPr/>
         </p:nvCxnSpPr>
         <p:spPr>
           <a:xfrm>
-            <a:off x="3992880" y="1729740"/>
-            <a:ext cx="174084" cy="280764"/>
-          </a:xfrm>
-          <a:prstGeom prst="straightConnector1">
-            <a:avLst/>
-          </a:prstGeom>
-          <a:ln w="25400">
-            <a:solidFill>
-              <a:schemeClr val="tx1"/>
-            </a:solidFill>
-            <a:tailEnd type="triangle"/>
-          </a:ln>
-        </p:spPr>
-        <p:style>
-          <a:lnRef idx="1">
-            <a:schemeClr val="accent1"/>
-          </a:lnRef>
-          <a:fillRef idx="0">
-            <a:schemeClr val="accent1"/>
-          </a:fillRef>
-          <a:effectRef idx="0">
-            <a:schemeClr val="accent1"/>
-          </a:effectRef>
-          <a:fontRef idx="minor">
-            <a:schemeClr val="tx1"/>
-          </a:fontRef>
-        </p:style>
-      </p:cxnSp>
-      <p:cxnSp>
-        <p:nvCxnSpPr>
-          <p:cNvPr id="27" name="Straight Arrow Connector 26"/>
-          <p:cNvCxnSpPr>
-            <a:stCxn id="12" idx="4"/>
-            <a:endCxn id="6" idx="7"/>
-          </p:cNvCxnSpPr>
-          <p:nvPr/>
-        </p:nvCxnSpPr>
-        <p:spPr>
-          <a:xfrm flipH="1">
-            <a:off x="5007516" y="1729740"/>
-            <a:ext cx="180866" cy="280764"/>
-          </a:xfrm>
-          <a:prstGeom prst="straightConnector1">
-            <a:avLst/>
-          </a:prstGeom>
-          <a:ln w="25400">
-            <a:solidFill>
-              <a:schemeClr val="tx1"/>
-            </a:solidFill>
-            <a:tailEnd type="triangle"/>
-          </a:ln>
-        </p:spPr>
-        <p:style>
-          <a:lnRef idx="1">
-            <a:schemeClr val="accent1"/>
-          </a:lnRef>
-          <a:fillRef idx="0">
-            <a:schemeClr val="accent1"/>
-          </a:fillRef>
-          <a:effectRef idx="0">
-            <a:schemeClr val="accent1"/>
-          </a:effectRef>
-          <a:fontRef idx="minor">
-            <a:schemeClr val="tx1"/>
-          </a:fontRef>
-        </p:style>
-      </p:cxnSp>
-      <p:cxnSp>
-        <p:nvCxnSpPr>
-          <p:cNvPr id="29" name="Straight Arrow Connector 28"/>
-          <p:cNvCxnSpPr>
-            <a:stCxn id="9" idx="0"/>
-            <a:endCxn id="7" idx="3"/>
-          </p:cNvCxnSpPr>
-          <p:nvPr/>
-        </p:nvCxnSpPr>
-        <p:spPr>
-          <a:xfrm flipV="1">
-            <a:off x="3948584" y="4386968"/>
-            <a:ext cx="218380" cy="314572"/>
-          </a:xfrm>
-          <a:prstGeom prst="straightConnector1">
-            <a:avLst/>
-          </a:prstGeom>
-          <a:ln w="25400">
-            <a:solidFill>
-              <a:schemeClr val="tx1"/>
-            </a:solidFill>
-            <a:tailEnd type="triangle"/>
-          </a:ln>
-        </p:spPr>
-        <p:style>
-          <a:lnRef idx="1">
-            <a:schemeClr val="accent1"/>
-          </a:lnRef>
-          <a:fillRef idx="0">
-            <a:schemeClr val="accent1"/>
-          </a:fillRef>
-          <a:effectRef idx="0">
-            <a:schemeClr val="accent1"/>
-          </a:effectRef>
-          <a:fontRef idx="minor">
-            <a:schemeClr val="tx1"/>
-          </a:fontRef>
-        </p:style>
-      </p:cxnSp>
-      <p:cxnSp>
-        <p:nvCxnSpPr>
-          <p:cNvPr id="31" name="Straight Arrow Connector 30"/>
-          <p:cNvCxnSpPr>
-            <a:stCxn id="10" idx="0"/>
-            <a:endCxn id="7" idx="5"/>
-          </p:cNvCxnSpPr>
-          <p:nvPr/>
-        </p:nvCxnSpPr>
-        <p:spPr>
-          <a:xfrm flipH="1" flipV="1">
-            <a:off x="5007516" y="4386968"/>
-            <a:ext cx="261716" cy="314572"/>
+            <a:off x="4587240" y="1619697"/>
+            <a:ext cx="0" cy="216723"/>
           </a:xfrm>
           <a:prstGeom prst="straightConnector1">
             <a:avLst/>
@@ -12147,14 +12236,14 @@
           <p:cNvPr id="34" name="Straight Arrow Connector 33"/>
           <p:cNvCxnSpPr>
             <a:stCxn id="18" idx="1"/>
-            <a:endCxn id="10" idx="6"/>
+            <a:endCxn id="7" idx="6"/>
           </p:cNvCxnSpPr>
           <p:nvPr/>
         </p:nvCxnSpPr>
         <p:spPr>
           <a:xfrm flipH="1">
-            <a:off x="5680712" y="4091940"/>
-            <a:ext cx="1710688" cy="1021080"/>
+            <a:off x="5181600" y="3959860"/>
+            <a:ext cx="2382328" cy="6832"/>
           </a:xfrm>
           <a:prstGeom prst="straightConnector1">
             <a:avLst/>
@@ -12164,46 +12253,8 @@
               <a:schemeClr val="accent2"/>
             </a:solidFill>
             <a:prstDash val="sysDot"/>
-            <a:tailEnd type="triangle"/>
-          </a:ln>
-        </p:spPr>
-        <p:style>
-          <a:lnRef idx="1">
-            <a:schemeClr val="accent1"/>
-          </a:lnRef>
-          <a:fillRef idx="0">
-            <a:schemeClr val="accent1"/>
-          </a:fillRef>
-          <a:effectRef idx="0">
-            <a:schemeClr val="accent1"/>
-          </a:effectRef>
-          <a:fontRef idx="minor">
-            <a:schemeClr val="tx1"/>
-          </a:fontRef>
-        </p:style>
-      </p:cxnSp>
-      <p:cxnSp>
-        <p:nvCxnSpPr>
-          <p:cNvPr id="36" name="Straight Arrow Connector 35"/>
-          <p:cNvCxnSpPr>
-            <a:endCxn id="9" idx="7"/>
-          </p:cNvCxnSpPr>
-          <p:nvPr/>
-        </p:nvCxnSpPr>
-        <p:spPr>
-          <a:xfrm flipH="1">
-            <a:off x="4239544" y="4091940"/>
-            <a:ext cx="3182808" cy="730120"/>
-          </a:xfrm>
-          <a:prstGeom prst="straightConnector1">
-            <a:avLst/>
-          </a:prstGeom>
-          <a:ln w="25400">
-            <a:solidFill>
-              <a:schemeClr val="accent2"/>
-            </a:solidFill>
-            <a:prstDash val="sysDot"/>
-            <a:tailEnd type="triangle"/>
+            <a:headEnd w="lg" len="lg"/>
+            <a:tailEnd type="triangle" w="lg" len="lg"/>
           </a:ln>
         </p:spPr>
         <p:style>
@@ -12226,14 +12277,14 @@
           <p:cNvPr id="38" name="Straight Arrow Connector 37"/>
           <p:cNvCxnSpPr>
             <a:stCxn id="14" idx="1"/>
-            <a:endCxn id="10" idx="7"/>
+            <a:endCxn id="7" idx="7"/>
           </p:cNvCxnSpPr>
           <p:nvPr/>
         </p:nvCxnSpPr>
         <p:spPr>
           <a:xfrm flipH="1">
-            <a:off x="5560192" y="2880836"/>
-            <a:ext cx="2288408" cy="1941224"/>
+            <a:off x="5007516" y="2806700"/>
+            <a:ext cx="2673444" cy="739716"/>
           </a:xfrm>
           <a:prstGeom prst="straightConnector1">
             <a:avLst/>
@@ -12242,7 +12293,8 @@
             <a:solidFill>
               <a:schemeClr val="accent2"/>
             </a:solidFill>
-            <a:tailEnd type="triangle"/>
+            <a:headEnd w="lg" len="lg"/>
+            <a:tailEnd type="triangle" w="lg" len="lg"/>
           </a:ln>
         </p:spPr>
         <p:style>
@@ -12260,104 +12312,19 @@
           </a:fontRef>
         </p:style>
       </p:cxnSp>
-      <p:sp>
-        <p:nvSpPr>
-          <p:cNvPr id="42" name="Freeform 41"/>
-          <p:cNvSpPr/>
-          <p:nvPr/>
-        </p:nvSpPr>
-        <p:spPr>
-          <a:xfrm>
-            <a:off x="4229100" y="2878931"/>
-            <a:ext cx="3600450" cy="1921669"/>
-          </a:xfrm>
-          <a:custGeom>
-            <a:avLst/>
-            <a:gdLst>
-              <a:gd name="connsiteX0" fmla="*/ 3536156 w 3536156"/>
-              <a:gd name="connsiteY0" fmla="*/ 0 h 1935957"/>
-              <a:gd name="connsiteX1" fmla="*/ 1878806 w 3536156"/>
-              <a:gd name="connsiteY1" fmla="*/ 1200150 h 1935957"/>
-              <a:gd name="connsiteX2" fmla="*/ 0 w 3536156"/>
-              <a:gd name="connsiteY2" fmla="*/ 1935957 h 1935957"/>
-            </a:gdLst>
-            <a:ahLst/>
-            <a:cxnLst>
-              <a:cxn ang="0">
-                <a:pos x="connsiteX0" y="connsiteY0"/>
-              </a:cxn>
-              <a:cxn ang="0">
-                <a:pos x="connsiteX1" y="connsiteY1"/>
-              </a:cxn>
-              <a:cxn ang="0">
-                <a:pos x="connsiteX2" y="connsiteY2"/>
-              </a:cxn>
-            </a:cxnLst>
-            <a:rect l="l" t="t" r="r" b="b"/>
-            <a:pathLst>
-              <a:path w="3536156" h="1935957">
-                <a:moveTo>
-                  <a:pt x="3536156" y="0"/>
-                </a:moveTo>
-                <a:cubicBezTo>
-                  <a:pt x="3002160" y="438745"/>
-                  <a:pt x="2468165" y="877491"/>
-                  <a:pt x="1878806" y="1200150"/>
-                </a:cubicBezTo>
-                <a:cubicBezTo>
-                  <a:pt x="1289447" y="1522809"/>
-                  <a:pt x="644723" y="1729383"/>
-                  <a:pt x="0" y="1935957"/>
-                </a:cubicBezTo>
-              </a:path>
-            </a:pathLst>
-          </a:custGeom>
-          <a:noFill/>
-          <a:ln>
-            <a:solidFill>
-              <a:schemeClr val="accent2"/>
-            </a:solidFill>
-            <a:tailEnd type="triangle"/>
-          </a:ln>
-        </p:spPr>
-        <p:style>
-          <a:lnRef idx="2">
-            <a:schemeClr val="accent1">
-              <a:shade val="50000"/>
-            </a:schemeClr>
-          </a:lnRef>
-          <a:fillRef idx="1">
-            <a:schemeClr val="accent1"/>
-          </a:fillRef>
-          <a:effectRef idx="0">
-            <a:schemeClr val="accent1"/>
-          </a:effectRef>
-          <a:fontRef idx="minor">
-            <a:schemeClr val="lt1"/>
-          </a:fontRef>
-        </p:style>
-        <p:txBody>
-          <a:bodyPr rtlCol="0" anchor="ctr"/>
-          <a:lstStyle/>
-          <a:p>
-            <a:pPr algn="ctr"/>
-            <a:endParaRPr lang="en-US"/>
-          </a:p>
-        </p:txBody>
-      </p:sp>
       <p:cxnSp>
         <p:nvCxnSpPr>
           <p:cNvPr id="51" name="Straight Arrow Connector 50"/>
           <p:cNvCxnSpPr>
             <a:stCxn id="17" idx="1"/>
-            <a:endCxn id="10" idx="0"/>
+            <a:endCxn id="7" idx="7"/>
           </p:cNvCxnSpPr>
           <p:nvPr/>
         </p:nvCxnSpPr>
         <p:spPr>
           <a:xfrm flipH="1">
-            <a:off x="5269232" y="1653540"/>
-            <a:ext cx="2122168" cy="3048000"/>
+            <a:off x="5007516" y="1653540"/>
+            <a:ext cx="2383884" cy="1892876"/>
           </a:xfrm>
           <a:prstGeom prst="straightConnector1">
             <a:avLst/>
@@ -12367,7 +12334,8 @@
               <a:schemeClr val="accent2"/>
             </a:solidFill>
             <a:prstDash val="dash"/>
-            <a:tailEnd type="triangle"/>
+            <a:headEnd w="lg" len="lg"/>
+            <a:tailEnd type="triangle" w="lg" len="lg"/>
           </a:ln>
         </p:spPr>
         <p:style>
@@ -12385,92 +12353,6 @@
           </a:fontRef>
         </p:style>
       </p:cxnSp>
-      <p:sp>
-        <p:nvSpPr>
-          <p:cNvPr id="53" name="Freeform 52"/>
-          <p:cNvSpPr/>
-          <p:nvPr/>
-        </p:nvSpPr>
-        <p:spPr>
-          <a:xfrm>
-            <a:off x="4360065" y="1643063"/>
-            <a:ext cx="3005142" cy="3314700"/>
-          </a:xfrm>
-          <a:custGeom>
-            <a:avLst/>
-            <a:gdLst>
-              <a:gd name="connsiteX0" fmla="*/ 2986087 w 2986087"/>
-              <a:gd name="connsiteY0" fmla="*/ 0 h 3314700"/>
-              <a:gd name="connsiteX1" fmla="*/ 1014412 w 2986087"/>
-              <a:gd name="connsiteY1" fmla="*/ 2571750 h 3314700"/>
-              <a:gd name="connsiteX2" fmla="*/ 0 w 2986087"/>
-              <a:gd name="connsiteY2" fmla="*/ 3314700 h 3314700"/>
-            </a:gdLst>
-            <a:ahLst/>
-            <a:cxnLst>
-              <a:cxn ang="0">
-                <a:pos x="connsiteX0" y="connsiteY0"/>
-              </a:cxn>
-              <a:cxn ang="0">
-                <a:pos x="connsiteX1" y="connsiteY1"/>
-              </a:cxn>
-              <a:cxn ang="0">
-                <a:pos x="connsiteX2" y="connsiteY2"/>
-              </a:cxn>
-            </a:cxnLst>
-            <a:rect l="l" t="t" r="r" b="b"/>
-            <a:pathLst>
-              <a:path w="2986087" h="3314700">
-                <a:moveTo>
-                  <a:pt x="2986087" y="0"/>
-                </a:moveTo>
-                <a:cubicBezTo>
-                  <a:pt x="2249090" y="1009650"/>
-                  <a:pt x="1512093" y="2019300"/>
-                  <a:pt x="1014412" y="2571750"/>
-                </a:cubicBezTo>
-                <a:cubicBezTo>
-                  <a:pt x="516731" y="3124200"/>
-                  <a:pt x="258365" y="3219450"/>
-                  <a:pt x="0" y="3314700"/>
-                </a:cubicBezTo>
-              </a:path>
-            </a:pathLst>
-          </a:custGeom>
-          <a:noFill/>
-          <a:ln>
-            <a:solidFill>
-              <a:schemeClr val="accent2"/>
-            </a:solidFill>
-            <a:prstDash val="dash"/>
-            <a:tailEnd type="triangle"/>
-          </a:ln>
-        </p:spPr>
-        <p:style>
-          <a:lnRef idx="2">
-            <a:schemeClr val="accent1">
-              <a:shade val="50000"/>
-            </a:schemeClr>
-          </a:lnRef>
-          <a:fillRef idx="1">
-            <a:schemeClr val="accent1"/>
-          </a:fillRef>
-          <a:effectRef idx="0">
-            <a:schemeClr val="accent1"/>
-          </a:effectRef>
-          <a:fontRef idx="minor">
-            <a:schemeClr val="lt1"/>
-          </a:fontRef>
-        </p:style>
-        <p:txBody>
-          <a:bodyPr rtlCol="0" anchor="ctr"/>
-          <a:lstStyle/>
-          <a:p>
-            <a:pPr algn="ctr"/>
-            <a:endParaRPr lang="en-US"/>
-          </a:p>
-        </p:txBody>
-      </p:sp>
       <p:cxnSp>
         <p:nvCxnSpPr>
           <p:cNvPr id="3" name="Straight Arrow Connector 2"/>
@@ -12494,6 +12376,497 @@
             </a:solidFill>
             <a:headEnd type="triangle" w="med" len="med"/>
             <a:tailEnd type="triangle" w="med" len="med"/>
+          </a:ln>
+        </p:spPr>
+        <p:style>
+          <a:lnRef idx="1">
+            <a:schemeClr val="accent1"/>
+          </a:lnRef>
+          <a:fillRef idx="0">
+            <a:schemeClr val="accent1"/>
+          </a:fillRef>
+          <a:effectRef idx="0">
+            <a:schemeClr val="accent1"/>
+          </a:effectRef>
+          <a:fontRef idx="minor">
+            <a:schemeClr val="tx1"/>
+          </a:fontRef>
+        </p:style>
+      </p:cxnSp>
+      <p:sp>
+        <p:nvSpPr>
+          <p:cNvPr id="30" name="Rounded Rectangle 29"/>
+          <p:cNvSpPr/>
+          <p:nvPr/>
+        </p:nvSpPr>
+        <p:spPr>
+          <a:xfrm>
+            <a:off x="304800" y="3502660"/>
+            <a:ext cx="1097280" cy="914400"/>
+          </a:xfrm>
+          <a:prstGeom prst="roundRect">
+            <a:avLst/>
+          </a:prstGeom>
+        </p:spPr>
+        <p:style>
+          <a:lnRef idx="2">
+            <a:schemeClr val="accent3">
+              <a:shade val="50000"/>
+            </a:schemeClr>
+          </a:lnRef>
+          <a:fillRef idx="1">
+            <a:schemeClr val="accent3"/>
+          </a:fillRef>
+          <a:effectRef idx="0">
+            <a:schemeClr val="accent3"/>
+          </a:effectRef>
+          <a:fontRef idx="minor">
+            <a:schemeClr val="lt1"/>
+          </a:fontRef>
+        </p:style>
+        <p:txBody>
+          <a:bodyPr lIns="9144" rIns="9144" rtlCol="0" anchor="ctr"/>
+          <a:lstStyle/>
+          <a:p>
+            <a:pPr algn="ctr"/>
+            <a:r>
+              <a:rPr lang="en-US" sz="1000" dirty="0" smtClean="0"/>
+              <a:t>Small business advocacy organizations</a:t>
+            </a:r>
+            <a:endParaRPr lang="en-US" sz="1000" dirty="0"/>
+          </a:p>
+        </p:txBody>
+      </p:sp>
+      <p:cxnSp>
+        <p:nvCxnSpPr>
+          <p:cNvPr id="39" name="Straight Arrow Connector 38"/>
+          <p:cNvCxnSpPr>
+            <a:stCxn id="17" idx="1"/>
+            <a:endCxn id="12" idx="6"/>
+          </p:cNvCxnSpPr>
+          <p:nvPr/>
+        </p:nvCxnSpPr>
+        <p:spPr>
+          <a:xfrm flipH="1" flipV="1">
+            <a:off x="4998720" y="1208217"/>
+            <a:ext cx="2392680" cy="445323"/>
+          </a:xfrm>
+          <a:prstGeom prst="straightConnector1">
+            <a:avLst/>
+          </a:prstGeom>
+          <a:ln w="25400">
+            <a:solidFill>
+              <a:schemeClr val="accent2"/>
+            </a:solidFill>
+            <a:prstDash val="dash"/>
+            <a:headEnd w="lg" len="lg"/>
+            <a:tailEnd type="triangle" w="lg" len="lg"/>
+          </a:ln>
+        </p:spPr>
+        <p:style>
+          <a:lnRef idx="1">
+            <a:schemeClr val="accent1"/>
+          </a:lnRef>
+          <a:fillRef idx="0">
+            <a:schemeClr val="accent1"/>
+          </a:fillRef>
+          <a:effectRef idx="0">
+            <a:schemeClr val="accent1"/>
+          </a:effectRef>
+          <a:fontRef idx="minor">
+            <a:schemeClr val="tx1"/>
+          </a:fontRef>
+        </p:style>
+      </p:cxnSp>
+      <p:cxnSp>
+        <p:nvCxnSpPr>
+          <p:cNvPr id="41" name="Straight Arrow Connector 40"/>
+          <p:cNvCxnSpPr>
+            <a:stCxn id="14" idx="1"/>
+            <a:endCxn id="12" idx="6"/>
+          </p:cNvCxnSpPr>
+          <p:nvPr/>
+        </p:nvCxnSpPr>
+        <p:spPr>
+          <a:xfrm flipH="1" flipV="1">
+            <a:off x="4998720" y="1208217"/>
+            <a:ext cx="2682240" cy="1598483"/>
+          </a:xfrm>
+          <a:prstGeom prst="straightConnector1">
+            <a:avLst/>
+          </a:prstGeom>
+          <a:ln w="25400">
+            <a:solidFill>
+              <a:schemeClr val="accent2"/>
+            </a:solidFill>
+            <a:headEnd w="lg" len="lg"/>
+            <a:tailEnd type="triangle" w="lg" len="lg"/>
+          </a:ln>
+        </p:spPr>
+        <p:style>
+          <a:lnRef idx="1">
+            <a:schemeClr val="accent1"/>
+          </a:lnRef>
+          <a:fillRef idx="0">
+            <a:schemeClr val="accent1"/>
+          </a:fillRef>
+          <a:effectRef idx="0">
+            <a:schemeClr val="accent1"/>
+          </a:effectRef>
+          <a:fontRef idx="minor">
+            <a:schemeClr val="tx1"/>
+          </a:fontRef>
+        </p:style>
+      </p:cxnSp>
+      <p:cxnSp>
+        <p:nvCxnSpPr>
+          <p:cNvPr id="44" name="Straight Arrow Connector 43"/>
+          <p:cNvCxnSpPr>
+            <a:stCxn id="18" idx="1"/>
+            <a:endCxn id="12" idx="6"/>
+          </p:cNvCxnSpPr>
+          <p:nvPr/>
+        </p:nvCxnSpPr>
+        <p:spPr>
+          <a:xfrm flipH="1" flipV="1">
+            <a:off x="4998720" y="1208217"/>
+            <a:ext cx="2565208" cy="2751643"/>
+          </a:xfrm>
+          <a:prstGeom prst="straightConnector1">
+            <a:avLst/>
+          </a:prstGeom>
+          <a:ln w="25400">
+            <a:solidFill>
+              <a:schemeClr val="accent2"/>
+            </a:solidFill>
+            <a:prstDash val="sysDot"/>
+            <a:headEnd w="lg" len="lg"/>
+            <a:tailEnd type="triangle" w="lg" len="lg"/>
+          </a:ln>
+        </p:spPr>
+        <p:style>
+          <a:lnRef idx="1">
+            <a:schemeClr val="accent1"/>
+          </a:lnRef>
+          <a:fillRef idx="0">
+            <a:schemeClr val="accent1"/>
+          </a:fillRef>
+          <a:effectRef idx="0">
+            <a:schemeClr val="accent1"/>
+          </a:effectRef>
+          <a:fontRef idx="minor">
+            <a:schemeClr val="tx1"/>
+          </a:fontRef>
+        </p:style>
+      </p:cxnSp>
+      <p:cxnSp>
+        <p:nvCxnSpPr>
+          <p:cNvPr id="47" name="Straight Arrow Connector 46"/>
+          <p:cNvCxnSpPr>
+            <a:stCxn id="13" idx="3"/>
+            <a:endCxn id="12" idx="2"/>
+          </p:cNvCxnSpPr>
+          <p:nvPr/>
+        </p:nvCxnSpPr>
+        <p:spPr>
+          <a:xfrm flipV="1">
+            <a:off x="1402080" y="1208217"/>
+            <a:ext cx="2773680" cy="1598483"/>
+          </a:xfrm>
+          <a:prstGeom prst="straightConnector1">
+            <a:avLst/>
+          </a:prstGeom>
+          <a:ln w="25400">
+            <a:solidFill>
+              <a:schemeClr val="accent3"/>
+            </a:solidFill>
+            <a:headEnd w="lg" len="lg"/>
+            <a:tailEnd type="triangle" w="lg" len="lg"/>
+          </a:ln>
+        </p:spPr>
+        <p:style>
+          <a:lnRef idx="1">
+            <a:schemeClr val="accent1"/>
+          </a:lnRef>
+          <a:fillRef idx="0">
+            <a:schemeClr val="accent1"/>
+          </a:fillRef>
+          <a:effectRef idx="0">
+            <a:schemeClr val="accent1"/>
+          </a:effectRef>
+          <a:fontRef idx="minor">
+            <a:schemeClr val="tx1"/>
+          </a:fontRef>
+        </p:style>
+      </p:cxnSp>
+      <p:cxnSp>
+        <p:nvCxnSpPr>
+          <p:cNvPr id="50" name="Straight Arrow Connector 49"/>
+          <p:cNvCxnSpPr>
+            <a:stCxn id="16" idx="3"/>
+            <a:endCxn id="12" idx="2"/>
+          </p:cNvCxnSpPr>
+          <p:nvPr/>
+        </p:nvCxnSpPr>
+        <p:spPr>
+          <a:xfrm flipV="1">
+            <a:off x="1630680" y="1208217"/>
+            <a:ext cx="2545080" cy="445323"/>
+          </a:xfrm>
+          <a:prstGeom prst="straightConnector1">
+            <a:avLst/>
+          </a:prstGeom>
+          <a:ln w="25400">
+            <a:solidFill>
+              <a:schemeClr val="accent3"/>
+            </a:solidFill>
+            <a:prstDash val="dash"/>
+            <a:headEnd w="lg" len="lg"/>
+            <a:tailEnd type="triangle" w="lg" len="lg"/>
+          </a:ln>
+        </p:spPr>
+        <p:style>
+          <a:lnRef idx="1">
+            <a:schemeClr val="accent1"/>
+          </a:lnRef>
+          <a:fillRef idx="0">
+            <a:schemeClr val="accent1"/>
+          </a:fillRef>
+          <a:effectRef idx="0">
+            <a:schemeClr val="accent1"/>
+          </a:effectRef>
+          <a:fontRef idx="minor">
+            <a:schemeClr val="tx1"/>
+          </a:fontRef>
+        </p:style>
+      </p:cxnSp>
+      <p:cxnSp>
+        <p:nvCxnSpPr>
+          <p:cNvPr id="54" name="Straight Arrow Connector 53"/>
+          <p:cNvCxnSpPr>
+            <a:stCxn id="30" idx="3"/>
+            <a:endCxn id="12" idx="3"/>
+          </p:cNvCxnSpPr>
+          <p:nvPr/>
+        </p:nvCxnSpPr>
+        <p:spPr>
+          <a:xfrm flipV="1">
+            <a:off x="1402080" y="1499177"/>
+            <a:ext cx="2894200" cy="2460683"/>
+          </a:xfrm>
+          <a:prstGeom prst="straightConnector1">
+            <a:avLst/>
+          </a:prstGeom>
+          <a:ln w="25400">
+            <a:solidFill>
+              <a:schemeClr val="accent3"/>
+            </a:solidFill>
+            <a:prstDash val="sysDot"/>
+            <a:headEnd w="lg" len="lg"/>
+            <a:tailEnd type="triangle" w="lg" len="lg"/>
+          </a:ln>
+        </p:spPr>
+        <p:style>
+          <a:lnRef idx="1">
+            <a:schemeClr val="accent1"/>
+          </a:lnRef>
+          <a:fillRef idx="0">
+            <a:schemeClr val="accent1"/>
+          </a:fillRef>
+          <a:effectRef idx="0">
+            <a:schemeClr val="accent1"/>
+          </a:effectRef>
+          <a:fontRef idx="minor">
+            <a:schemeClr val="tx1"/>
+          </a:fontRef>
+        </p:style>
+      </p:cxnSp>
+      <p:cxnSp>
+        <p:nvCxnSpPr>
+          <p:cNvPr id="56" name="Straight Arrow Connector 55"/>
+          <p:cNvCxnSpPr>
+            <a:stCxn id="15" idx="3"/>
+            <a:endCxn id="12" idx="3"/>
+          </p:cNvCxnSpPr>
+          <p:nvPr/>
+        </p:nvCxnSpPr>
+        <p:spPr>
+          <a:xfrm flipV="1">
+            <a:off x="1630680" y="1499177"/>
+            <a:ext cx="2665600" cy="3613843"/>
+          </a:xfrm>
+          <a:prstGeom prst="straightConnector1">
+            <a:avLst/>
+          </a:prstGeom>
+          <a:ln w="25400" cmpd="sng">
+            <a:solidFill>
+              <a:schemeClr val="accent3"/>
+            </a:solidFill>
+            <a:prstDash val="lgDashDot"/>
+            <a:headEnd w="lg" len="lg"/>
+            <a:tailEnd type="triangle" w="lg" len="lg"/>
+          </a:ln>
+        </p:spPr>
+        <p:style>
+          <a:lnRef idx="1">
+            <a:schemeClr val="accent1"/>
+          </a:lnRef>
+          <a:fillRef idx="0">
+            <a:schemeClr val="accent1"/>
+          </a:fillRef>
+          <a:effectRef idx="0">
+            <a:schemeClr val="accent1"/>
+          </a:effectRef>
+          <a:fontRef idx="minor">
+            <a:schemeClr val="tx1"/>
+          </a:fontRef>
+        </p:style>
+      </p:cxnSp>
+      <p:cxnSp>
+        <p:nvCxnSpPr>
+          <p:cNvPr id="63" name="Straight Arrow Connector 62"/>
+          <p:cNvCxnSpPr>
+            <a:stCxn id="15" idx="3"/>
+            <a:endCxn id="7" idx="3"/>
+          </p:cNvCxnSpPr>
+          <p:nvPr/>
+        </p:nvCxnSpPr>
+        <p:spPr>
+          <a:xfrm flipV="1">
+            <a:off x="1630680" y="4386968"/>
+            <a:ext cx="2536284" cy="726052"/>
+          </a:xfrm>
+          <a:prstGeom prst="straightConnector1">
+            <a:avLst/>
+          </a:prstGeom>
+          <a:ln w="25400" cmpd="sng">
+            <a:solidFill>
+              <a:schemeClr val="accent3"/>
+            </a:solidFill>
+            <a:prstDash val="lgDashDot"/>
+            <a:headEnd w="lg" len="lg"/>
+            <a:tailEnd type="triangle" w="lg" len="lg"/>
+          </a:ln>
+        </p:spPr>
+        <p:style>
+          <a:lnRef idx="1">
+            <a:schemeClr val="accent1"/>
+          </a:lnRef>
+          <a:fillRef idx="0">
+            <a:schemeClr val="accent1"/>
+          </a:fillRef>
+          <a:effectRef idx="0">
+            <a:schemeClr val="accent1"/>
+          </a:effectRef>
+          <a:fontRef idx="minor">
+            <a:schemeClr val="tx1"/>
+          </a:fontRef>
+        </p:style>
+      </p:cxnSp>
+      <p:cxnSp>
+        <p:nvCxnSpPr>
+          <p:cNvPr id="66" name="Straight Arrow Connector 65"/>
+          <p:cNvCxnSpPr>
+            <a:endCxn id="7" idx="2"/>
+          </p:cNvCxnSpPr>
+          <p:nvPr/>
+        </p:nvCxnSpPr>
+        <p:spPr>
+          <a:xfrm>
+            <a:off x="1476375" y="3966692"/>
+            <a:ext cx="2516505" cy="0"/>
+          </a:xfrm>
+          <a:prstGeom prst="straightConnector1">
+            <a:avLst/>
+          </a:prstGeom>
+          <a:ln w="25400">
+            <a:solidFill>
+              <a:schemeClr val="accent3"/>
+            </a:solidFill>
+            <a:prstDash val="sysDot"/>
+            <a:headEnd w="lg" len="lg"/>
+            <a:tailEnd type="triangle" w="lg" len="lg"/>
+          </a:ln>
+        </p:spPr>
+        <p:style>
+          <a:lnRef idx="1">
+            <a:schemeClr val="accent1"/>
+          </a:lnRef>
+          <a:fillRef idx="0">
+            <a:schemeClr val="accent1"/>
+          </a:fillRef>
+          <a:effectRef idx="0">
+            <a:schemeClr val="accent1"/>
+          </a:effectRef>
+          <a:fontRef idx="minor">
+            <a:schemeClr val="tx1"/>
+          </a:fontRef>
+        </p:style>
+      </p:cxnSp>
+      <p:cxnSp>
+        <p:nvCxnSpPr>
+          <p:cNvPr id="69" name="Straight Arrow Connector 68"/>
+          <p:cNvCxnSpPr>
+            <a:stCxn id="13" idx="3"/>
+            <a:endCxn id="7" idx="2"/>
+          </p:cNvCxnSpPr>
+          <p:nvPr/>
+        </p:nvCxnSpPr>
+        <p:spPr>
+          <a:xfrm>
+            <a:off x="1402080" y="2806700"/>
+            <a:ext cx="2590800" cy="1159992"/>
+          </a:xfrm>
+          <a:prstGeom prst="straightConnector1">
+            <a:avLst/>
+          </a:prstGeom>
+          <a:ln w="25400">
+            <a:solidFill>
+              <a:schemeClr val="accent3"/>
+            </a:solidFill>
+            <a:headEnd w="lg" len="lg"/>
+            <a:tailEnd type="triangle" w="lg" len="lg"/>
+          </a:ln>
+        </p:spPr>
+        <p:style>
+          <a:lnRef idx="1">
+            <a:schemeClr val="accent1"/>
+          </a:lnRef>
+          <a:fillRef idx="0">
+            <a:schemeClr val="accent1"/>
+          </a:fillRef>
+          <a:effectRef idx="0">
+            <a:schemeClr val="accent1"/>
+          </a:effectRef>
+          <a:fontRef idx="minor">
+            <a:schemeClr val="tx1"/>
+          </a:fontRef>
+        </p:style>
+      </p:cxnSp>
+      <p:cxnSp>
+        <p:nvCxnSpPr>
+          <p:cNvPr id="72" name="Straight Arrow Connector 71"/>
+          <p:cNvCxnSpPr>
+            <a:stCxn id="16" idx="3"/>
+            <a:endCxn id="7" idx="1"/>
+          </p:cNvCxnSpPr>
+          <p:nvPr/>
+        </p:nvCxnSpPr>
+        <p:spPr>
+          <a:xfrm>
+            <a:off x="1630680" y="1653540"/>
+            <a:ext cx="2536284" cy="1892876"/>
+          </a:xfrm>
+          <a:prstGeom prst="straightConnector1">
+            <a:avLst/>
+          </a:prstGeom>
+          <a:ln w="25400">
+            <a:solidFill>
+              <a:schemeClr val="accent3"/>
+            </a:solidFill>
+            <a:prstDash val="dash"/>
+            <a:headEnd w="lg" len="lg"/>
+            <a:tailEnd type="triangle" w="lg" len="lg"/>
           </a:ln>
         </p:spPr>
         <p:style>
@@ -12675,7 +13048,7 @@
           <p:nvPr>
             <p:extLst>
               <p:ext uri="{D42A27DB-BD31-4B8C-83A1-F6EECF244321}">
-                <p14:modId xmlns:p14="http://schemas.microsoft.com/office/powerpoint/2010/main" val="1209684022"/>
+                <p14:modId xmlns:p14="http://schemas.microsoft.com/office/powerpoint/2010/main" val="4133603787"/>
               </p:ext>
             </p:extLst>
           </p:nvPr>
@@ -12697,7 +13070,7 @@
           <p:nvPr>
             <p:extLst>
               <p:ext uri="{D42A27DB-BD31-4B8C-83A1-F6EECF244321}">
-                <p14:modId xmlns:p14="http://schemas.microsoft.com/office/powerpoint/2010/main" val="3044711488"/>
+                <p14:modId xmlns:p14="http://schemas.microsoft.com/office/powerpoint/2010/main" val="1993760368"/>
               </p:ext>
             </p:extLst>
           </p:nvPr>
@@ -13099,11 +13472,7 @@
               <a:pPr algn="ctr"/>
               <a:r>
                 <a:rPr lang="en-US" sz="1000" dirty="0" smtClean="0"/>
-                <a:t>Contract administrators are discriminating against small </a:t>
-              </a:r>
-              <a:r>
-                <a:rPr lang="en-US" sz="1000" dirty="0" smtClean="0"/>
-                <a:t>businesses.</a:t>
+                <a:t>Contract administrators are discriminating against small businesses.</a:t>
               </a:r>
               <a:endParaRPr lang="en-US" sz="1000" dirty="0"/>
             </a:p>
@@ -13147,11 +13516,7 @@
               <a:pPr algn="ctr"/>
               <a:r>
                 <a:rPr lang="en-US" sz="1000" dirty="0" smtClean="0"/>
-                <a:t>Loss of global </a:t>
-              </a:r>
-              <a:r>
-                <a:rPr lang="en-US" sz="1000" dirty="0" smtClean="0"/>
-                <a:t>dominance</a:t>
+                <a:t>Loss of global dominance</a:t>
               </a:r>
               <a:endParaRPr lang="en-US" sz="1000" dirty="0"/>
             </a:p>
@@ -13330,11 +13695,7 @@
               <a:pPr algn="ctr"/>
               <a:r>
                 <a:rPr lang="en-US" sz="1000" dirty="0" smtClean="0"/>
-                <a:t>Loss of </a:t>
-              </a:r>
-              <a:r>
-                <a:rPr lang="en-US" sz="1000" dirty="0" smtClean="0"/>
-                <a:t>economic prosperity</a:t>
+                <a:t>Loss of economic prosperity</a:t>
               </a:r>
               <a:endParaRPr lang="en-US" sz="1000" dirty="0"/>
             </a:p>
@@ -13478,11 +13839,7 @@
               <a:pPr algn="ctr"/>
               <a:r>
                 <a:rPr lang="en-US" sz="1000" dirty="0" smtClean="0"/>
-                <a:t>Loss of </a:t>
-              </a:r>
-              <a:r>
-                <a:rPr lang="en-US" sz="1000" dirty="0" smtClean="0"/>
-                <a:t>economic prosperity</a:t>
+                <a:t>Loss of economic prosperity</a:t>
               </a:r>
               <a:endParaRPr lang="en-US" sz="1000" dirty="0"/>
             </a:p>
@@ -13741,7 +14098,11 @@
             <a:pPr algn="ctr"/>
             <a:r>
               <a:rPr lang="en-US" sz="1000" dirty="0" smtClean="0"/>
-              <a:t>Eroding what makes America superior.</a:t>
+              <a:t>Erode what </a:t>
+            </a:r>
+            <a:r>
+              <a:rPr lang="en-US" sz="1000" dirty="0" smtClean="0"/>
+              <a:t>makes America superior.</a:t>
             </a:r>
             <a:endParaRPr lang="en-US" sz="1000" dirty="0"/>
           </a:p>
@@ -14432,11 +14793,7 @@
             <a:pPr algn="ctr"/>
             <a:r>
               <a:rPr lang="en-US" dirty="0" smtClean="0"/>
-              <a:t>Policy and Political Implications </a:t>
-            </a:r>
-            <a:r>
-              <a:rPr lang="en-US" dirty="0" smtClean="0"/>
-              <a:t>Flow (Cont’d)</a:t>
+              <a:t>Policy and Political Implications Flow (Cont’d)</a:t>
             </a:r>
             <a:endParaRPr lang="en-US" dirty="0"/>
           </a:p>
@@ -14540,7 +14897,11 @@
               <a:pPr algn="ctr"/>
               <a:r>
                 <a:rPr lang="en-US" sz="1000" dirty="0" smtClean="0"/>
-                <a:t>Eroding what makes America superior.</a:t>
+                <a:t>Erode </a:t>
+              </a:r>
+              <a:r>
+                <a:rPr lang="en-US" sz="1000" dirty="0" smtClean="0"/>
+                <a:t>what makes America superior.</a:t>
               </a:r>
               <a:endParaRPr lang="en-US" sz="1000" dirty="0"/>
             </a:p>
@@ -14760,7 +15121,11 @@
               <a:pPr algn="ctr"/>
               <a:r>
                 <a:rPr lang="en-US" sz="1000" dirty="0" smtClean="0"/>
-                <a:t>Reduction of  innovation.</a:t>
+                <a:t>Reduce  </a:t>
+              </a:r>
+              <a:r>
+                <a:rPr lang="en-US" sz="1000" dirty="0" smtClean="0"/>
+                <a:t>innovation.</a:t>
               </a:r>
               <a:endParaRPr lang="en-US" sz="1000" dirty="0"/>
             </a:p>
@@ -15007,11 +15372,7 @@
               <a:pPr algn="ctr"/>
               <a:r>
                 <a:rPr lang="en-US" sz="1000" dirty="0" smtClean="0"/>
-                <a:t>Smal</a:t>
-              </a:r>
-              <a:r>
-                <a:rPr lang="en-US" sz="1000" dirty="0" smtClean="0"/>
-                <a:t>l businesses will create significant technological innovations if given a fair chance.</a:t>
+                <a:t>Small businesses will create significant technological innovations if given a fair chance.</a:t>
               </a:r>
               <a:endParaRPr lang="en-US" sz="1000" dirty="0"/>
             </a:p>

</xml_diff>

<commit_message>
Updated slides for Assignment 01
</commit_message>
<xml_diff>
--- a/Assignments/Townes_POLS6310_Spring2019_Assignment01.pptx
+++ b/Assignments/Townes_POLS6310_Spring2019_Assignment01.pptx
@@ -1627,11 +1627,7 @@
         <a:p>
           <a:r>
             <a:rPr lang="en-US" sz="1000" dirty="0" smtClean="0"/>
-            <a:t>Decline </a:t>
-          </a:r>
-          <a:r>
-            <a:rPr lang="en-US" sz="1000" dirty="0" smtClean="0"/>
-            <a:t>Narrative</a:t>
+            <a:t>Decline Narrative</a:t>
           </a:r>
           <a:endParaRPr lang="en-US" sz="1000" dirty="0"/>
         </a:p>
@@ -2079,19 +2075,7 @@
         <a:p>
           <a:r>
             <a:rPr lang="en-US" sz="1000" dirty="0" smtClean="0"/>
-            <a:t>Contract </a:t>
-          </a:r>
-          <a:r>
-            <a:rPr lang="en-US" sz="1000" dirty="0" smtClean="0"/>
-            <a:t>administrators are discriminating </a:t>
-          </a:r>
-          <a:r>
-            <a:rPr lang="en-US" sz="1000" dirty="0" smtClean="0"/>
-            <a:t>against small </a:t>
-          </a:r>
-          <a:r>
-            <a:rPr lang="en-US" sz="1000" dirty="0" smtClean="0"/>
-            <a:t>businesses to make things easier for themselves.</a:t>
+            <a:t>Contract administrators are discriminating against small businesses to make things easier for themselves.</a:t>
           </a:r>
           <a:endParaRPr lang="en-US" sz="1000" dirty="0"/>
         </a:p>
@@ -2628,11 +2612,7 @@
         <a:p>
           <a:r>
             <a:rPr lang="en-US" sz="1000" dirty="0" smtClean="0"/>
-            <a:t>Decline </a:t>
-          </a:r>
-          <a:r>
-            <a:rPr lang="en-US" sz="1000" dirty="0" smtClean="0"/>
-            <a:t>Narrative</a:t>
+            <a:t>Decline Narrative</a:t>
           </a:r>
           <a:endParaRPr lang="en-US" sz="1000" dirty="0"/>
         </a:p>
@@ -2853,11 +2833,7 @@
         <a:p>
           <a:r>
             <a:rPr lang="en-US" sz="1000" dirty="0" smtClean="0"/>
-            <a:t>Decline </a:t>
-          </a:r>
-          <a:r>
-            <a:rPr lang="en-US" sz="1000" dirty="0" smtClean="0"/>
-            <a:t>Narrative</a:t>
+            <a:t>Decline Narrative</a:t>
           </a:r>
           <a:endParaRPr lang="en-US" sz="1000" dirty="0"/>
         </a:p>
@@ -3637,47 +3613,47 @@
     </dgm:pt>
   </dgm:ptLst>
   <dgm:cxnLst>
-    <dgm:cxn modelId="{0EB99273-E40B-4BA4-A24F-424DEB53EF5D}" type="presOf" srcId="{A990AE2A-665D-4A90-91E6-8CAE69B9C799}" destId="{ABD9F4AA-584A-4C32-8AC6-1F842D5E3471}" srcOrd="0" destOrd="0" presId="urn:microsoft.com/office/officeart/2011/layout/TabList"/>
+    <dgm:cxn modelId="{A993A3EF-AF47-4DBB-90D8-CF06FBF70E61}" srcId="{19EF64AF-D0D9-429E-86D3-4CE7A62D9930}" destId="{D4A5DE5E-27AD-4B23-B1EC-53CFB1739A11}" srcOrd="2" destOrd="0" parTransId="{C42F195C-72E6-4357-8789-A7DF85FC0BFF}" sibTransId="{D861C33F-DAAB-4018-91B9-D602CB0B9349}"/>
+    <dgm:cxn modelId="{3DB12D0E-B496-47AC-B9D8-B8B2B6369FEF}" srcId="{6B0EF60D-A0B1-46C5-9677-4BEA810977D2}" destId="{03E9865A-20D2-4CF6-AA88-EF74E4A16F4A}" srcOrd="2" destOrd="0" parTransId="{8248E5BD-5697-4B1E-BCB4-ABC0B2D8E72E}" sibTransId="{EEBE7D8C-BEE1-4AE3-A6A1-B72D470C50D8}"/>
+    <dgm:cxn modelId="{BC8D3C2F-C842-4AEF-9163-91FCF0A63C32}" srcId="{84789903-61AF-4F8F-9430-490306DDBEA0}" destId="{19EF64AF-D0D9-429E-86D3-4CE7A62D9930}" srcOrd="0" destOrd="0" parTransId="{65F72764-603C-4BEA-9757-C2D922CDE6E7}" sibTransId="{A59A006A-971D-4A33-AB31-4CEE6264B4C5}"/>
+    <dgm:cxn modelId="{E2B364F3-498C-4868-BFEB-56E8969D7655}" type="presOf" srcId="{EB3A3517-BC08-4AB8-AB32-CAA355AEBBAA}" destId="{2874E84B-9605-494F-B813-85A702BFCF0F}" srcOrd="0" destOrd="0" presId="urn:microsoft.com/office/officeart/2011/layout/TabList"/>
+    <dgm:cxn modelId="{9139EE07-F69A-425D-9FD3-917AD48F4A26}" type="presOf" srcId="{FCB9211A-ECAF-4092-9AF3-4A80464FEEEF}" destId="{76F4CE38-89D0-4EAB-9E94-FD08C47879E4}" srcOrd="0" destOrd="0" presId="urn:microsoft.com/office/officeart/2011/layout/TabList"/>
+    <dgm:cxn modelId="{42EE89B5-C132-45F6-89DF-FAA355D8AB66}" type="presOf" srcId="{84789903-61AF-4F8F-9430-490306DDBEA0}" destId="{8937854E-C94A-470E-AB4D-2D1BF4D6EC0A}" srcOrd="0" destOrd="0" presId="urn:microsoft.com/office/officeart/2011/layout/TabList"/>
+    <dgm:cxn modelId="{0536D819-2399-475C-9A09-D2166C361830}" type="presOf" srcId="{03E9865A-20D2-4CF6-AA88-EF74E4A16F4A}" destId="{F2E5F12B-CEBA-404F-BC59-D0A75B115C1F}" srcOrd="0" destOrd="1" presId="urn:microsoft.com/office/officeart/2011/layout/TabList"/>
+    <dgm:cxn modelId="{B2124052-34AB-4435-8CBA-D34AF146A189}" type="presOf" srcId="{14D29AC4-9FA0-444D-8EE4-E85DEB5E57A2}" destId="{2874E84B-9605-494F-B813-85A702BFCF0F}" srcOrd="0" destOrd="2" presId="urn:microsoft.com/office/officeart/2011/layout/TabList"/>
+    <dgm:cxn modelId="{64A82602-28B8-46E2-8A9C-588C292914B6}" type="presOf" srcId="{2F4105CE-F831-4489-A38E-EA308F965E1A}" destId="{8DF5D93B-DC31-4D2E-91E9-BD58313DDF36}" srcOrd="0" destOrd="0" presId="urn:microsoft.com/office/officeart/2011/layout/TabList"/>
+    <dgm:cxn modelId="{F1C43613-B926-4646-87FA-D992BF0A7796}" type="presOf" srcId="{8B2750EB-B434-41DC-A189-8424894B839C}" destId="{89B6103A-0012-428D-9057-99CB1F4B4519}" srcOrd="0" destOrd="0" presId="urn:microsoft.com/office/officeart/2011/layout/TabList"/>
+    <dgm:cxn modelId="{3F79F1C5-5A6B-4B5D-ABE8-486E8727C12D}" type="presOf" srcId="{48BF764E-F495-4A56-AE96-47376DC45472}" destId="{F2E5F12B-CEBA-404F-BC59-D0A75B115C1F}" srcOrd="0" destOrd="2" presId="urn:microsoft.com/office/officeart/2011/layout/TabList"/>
+    <dgm:cxn modelId="{6546E246-748E-4D89-8B27-C6C10AA3AC70}" type="presOf" srcId="{ADA4DD4E-A13B-4B3A-BF0B-6A9868DD9270}" destId="{269C0782-BA35-4C3A-B295-D76ACD031E2B}" srcOrd="0" destOrd="1" presId="urn:microsoft.com/office/officeart/2011/layout/TabList"/>
     <dgm:cxn modelId="{4AEC2818-9C22-4CEF-8878-5915FF4711B6}" type="presOf" srcId="{E2EDF958-A636-4721-91E2-1009161BE1BC}" destId="{ABD9F4AA-584A-4C32-8AC6-1F842D5E3471}" srcOrd="0" destOrd="2" presId="urn:microsoft.com/office/officeart/2011/layout/TabList"/>
-    <dgm:cxn modelId="{EC26D4FA-8D0A-4965-860E-E576DA3FE7C2}" srcId="{84789903-61AF-4F8F-9430-490306DDBEA0}" destId="{2F4105CE-F831-4489-A38E-EA308F965E1A}" srcOrd="1" destOrd="0" parTransId="{B2367E5B-DF6B-423A-8C73-6C51AA905F42}" sibTransId="{42FAF69B-DD6C-4C4C-A008-7959F807FCD6}"/>
-    <dgm:cxn modelId="{E50B4537-4222-4FA6-86D6-900B232A905B}" srcId="{84789903-61AF-4F8F-9430-490306DDBEA0}" destId="{DCB77698-D8A7-43AE-8C12-88D22546D4E0}" srcOrd="3" destOrd="0" parTransId="{0256383B-FBF2-49F0-935C-E17EB2C4D7C4}" sibTransId="{866D160B-DB4E-4FF6-BF8A-FD0216203DA1}"/>
-    <dgm:cxn modelId="{A993A3EF-AF47-4DBB-90D8-CF06FBF70E61}" srcId="{19EF64AF-D0D9-429E-86D3-4CE7A62D9930}" destId="{D4A5DE5E-27AD-4B23-B1EC-53CFB1739A11}" srcOrd="2" destOrd="0" parTransId="{C42F195C-72E6-4357-8789-A7DF85FC0BFF}" sibTransId="{D861C33F-DAAB-4018-91B9-D602CB0B9349}"/>
-    <dgm:cxn modelId="{3F79F1C5-5A6B-4B5D-ABE8-486E8727C12D}" type="presOf" srcId="{48BF764E-F495-4A56-AE96-47376DC45472}" destId="{F2E5F12B-CEBA-404F-BC59-D0A75B115C1F}" srcOrd="0" destOrd="2" presId="urn:microsoft.com/office/officeart/2011/layout/TabList"/>
-    <dgm:cxn modelId="{9C741026-5DFA-48E0-BCB8-618D95B45615}" srcId="{2F4105CE-F831-4489-A38E-EA308F965E1A}" destId="{28A4433D-892C-4392-A0C9-31AA297B23D1}" srcOrd="2" destOrd="0" parTransId="{38F9BBF9-BEAA-4EF2-A10C-767F24A70094}" sibTransId="{FF662DDE-5536-4F81-B4BD-F479E8E272D8}"/>
-    <dgm:cxn modelId="{6AEA36B3-723E-4C26-991B-32293EC4977D}" srcId="{DCB77698-D8A7-43AE-8C12-88D22546D4E0}" destId="{F6CCDE68-20A3-48C9-9929-36D9326E50C7}" srcOrd="1" destOrd="0" parTransId="{6D777BDB-A14B-4CB9-848E-609F2B89797D}" sibTransId="{E73E6EC1-A77B-4806-AF59-F300788A17A6}"/>
-    <dgm:cxn modelId="{AD10BF23-1E69-4909-B6FA-24F65C0F2B83}" type="presOf" srcId="{28A4433D-892C-4392-A0C9-31AA297B23D1}" destId="{ABD9F4AA-584A-4C32-8AC6-1F842D5E3471}" srcOrd="0" destOrd="1" presId="urn:microsoft.com/office/officeart/2011/layout/TabList"/>
-    <dgm:cxn modelId="{EA29C83E-1DCA-4FBB-975D-0E40E46D2194}" type="presOf" srcId="{432382F3-03DD-4963-A6A5-C32D1C07F990}" destId="{F2E5F12B-CEBA-404F-BC59-D0A75B115C1F}" srcOrd="0" destOrd="0" presId="urn:microsoft.com/office/officeart/2011/layout/TabList"/>
-    <dgm:cxn modelId="{42EE89B5-C132-45F6-89DF-FAA355D8AB66}" type="presOf" srcId="{84789903-61AF-4F8F-9430-490306DDBEA0}" destId="{8937854E-C94A-470E-AB4D-2D1BF4D6EC0A}" srcOrd="0" destOrd="0" presId="urn:microsoft.com/office/officeart/2011/layout/TabList"/>
-    <dgm:cxn modelId="{2367FF4F-D248-4F58-A0D9-784D3549B7D2}" type="presOf" srcId="{F6CCDE68-20A3-48C9-9929-36D9326E50C7}" destId="{269C0782-BA35-4C3A-B295-D76ACD031E2B}" srcOrd="0" destOrd="0" presId="urn:microsoft.com/office/officeart/2011/layout/TabList"/>
-    <dgm:cxn modelId="{9E0BBC12-F01A-46AF-A765-697A5062C11D}" type="presOf" srcId="{54C77FC2-06D5-494F-88FF-639A9A2ADF2B}" destId="{BDDE8257-E413-4550-9DF4-ACE5D4DAF407}" srcOrd="0" destOrd="0" presId="urn:microsoft.com/office/officeart/2011/layout/TabList"/>
-    <dgm:cxn modelId="{FB51F38E-5F9F-4D3E-BF90-82BB4C1D2DB9}" type="presOf" srcId="{6992769E-C929-46E1-B5DC-0D224D6E5340}" destId="{F82F5449-D542-4810-B467-43A5C2614DD5}" srcOrd="0" destOrd="0" presId="urn:microsoft.com/office/officeart/2011/layout/TabList"/>
-    <dgm:cxn modelId="{6FBD327E-F3DD-4D5F-892E-365E295EB833}" type="presOf" srcId="{DCB77698-D8A7-43AE-8C12-88D22546D4E0}" destId="{9059B661-BA02-491A-9141-4597C2088440}" srcOrd="0" destOrd="0" presId="urn:microsoft.com/office/officeart/2011/layout/TabList"/>
-    <dgm:cxn modelId="{0536D819-2399-475C-9A09-D2166C361830}" type="presOf" srcId="{03E9865A-20D2-4CF6-AA88-EF74E4A16F4A}" destId="{F2E5F12B-CEBA-404F-BC59-D0A75B115C1F}" srcOrd="0" destOrd="1" presId="urn:microsoft.com/office/officeart/2011/layout/TabList"/>
-    <dgm:cxn modelId="{2A33E819-8BC0-4207-B650-7F5E09F345C6}" srcId="{DCB77698-D8A7-43AE-8C12-88D22546D4E0}" destId="{711738C3-3AA4-4805-BDB1-417DABF886EF}" srcOrd="3" destOrd="0" parTransId="{1C77D557-D7BA-4CA0-9ACF-21BA020B74A4}" sibTransId="{5556CC35-A5A0-404A-80E1-20A32FCADDA5}"/>
-    <dgm:cxn modelId="{2657FA28-A895-46D4-90D1-07F9A903CBBC}" srcId="{19EF64AF-D0D9-429E-86D3-4CE7A62D9930}" destId="{EB3A3517-BC08-4AB8-AB32-CAA355AEBBAA}" srcOrd="1" destOrd="0" parTransId="{B734E8AD-9F0E-4587-9C1F-9483C3D89D69}" sibTransId="{6388FC91-51F0-4583-AFC8-08BE7A667D2D}"/>
-    <dgm:cxn modelId="{5F094A65-8D03-4DE2-90BC-845E0B1DF3F3}" srcId="{2F4105CE-F831-4489-A38E-EA308F965E1A}" destId="{8B2750EB-B434-41DC-A189-8424894B839C}" srcOrd="0" destOrd="0" parTransId="{FFC1F60D-411F-463B-80BE-8626FCEE6E20}" sibTransId="{1C68FAD9-F9C9-4D4A-9B81-2E6FECE526EB}"/>
-    <dgm:cxn modelId="{E2B364F3-498C-4868-BFEB-56E8969D7655}" type="presOf" srcId="{EB3A3517-BC08-4AB8-AB32-CAA355AEBBAA}" destId="{2874E84B-9605-494F-B813-85A702BFCF0F}" srcOrd="0" destOrd="0" presId="urn:microsoft.com/office/officeart/2011/layout/TabList"/>
-    <dgm:cxn modelId="{96A20728-4B71-426D-8207-8D974A3F5B06}" srcId="{84789903-61AF-4F8F-9430-490306DDBEA0}" destId="{6B0EF60D-A0B1-46C5-9677-4BEA810977D2}" srcOrd="2" destOrd="0" parTransId="{DF3844A8-4E17-463F-BAAD-4ACB2C215D90}" sibTransId="{9DADB796-DA90-4478-BCA3-5929CA4ED0C6}"/>
-    <dgm:cxn modelId="{272F4F47-B6F0-44E6-BE53-1E568010F73F}" srcId="{6B0EF60D-A0B1-46C5-9677-4BEA810977D2}" destId="{432382F3-03DD-4963-A6A5-C32D1C07F990}" srcOrd="1" destOrd="0" parTransId="{428261C4-B743-4CC1-8298-2B59764B7274}" sibTransId="{19522E25-3C1D-4596-9D61-BE8AA7854562}"/>
-    <dgm:cxn modelId="{59C1BA7D-4D40-4BB3-8566-6C1139A98E64}" srcId="{19EF64AF-D0D9-429E-86D3-4CE7A62D9930}" destId="{6992769E-C929-46E1-B5DC-0D224D6E5340}" srcOrd="0" destOrd="0" parTransId="{37B9B495-CA51-4955-9418-9A2A7D83A101}" sibTransId="{025A960F-A828-4BA1-B49F-B19476EFF631}"/>
-    <dgm:cxn modelId="{A9F942E9-1197-421A-8955-236A83F08879}" type="presOf" srcId="{6B0EF60D-A0B1-46C5-9677-4BEA810977D2}" destId="{79569B4D-C26F-4F14-9A58-54D0240E4532}" srcOrd="0" destOrd="0" presId="urn:microsoft.com/office/officeart/2011/layout/TabList"/>
-    <dgm:cxn modelId="{C40B86E0-D802-4C2B-9B30-FF087E46B20A}" srcId="{2F4105CE-F831-4489-A38E-EA308F965E1A}" destId="{A990AE2A-665D-4A90-91E6-8CAE69B9C799}" srcOrd="1" destOrd="0" parTransId="{C4D8ABC1-84E3-45E5-AE1D-9D540D360E76}" sibTransId="{6B7AAB65-DFF8-472A-BB24-DFEC163070BA}"/>
-    <dgm:cxn modelId="{C4A37B3B-A8FF-45D1-9762-4D05571ABF6A}" type="presOf" srcId="{711738C3-3AA4-4805-BDB1-417DABF886EF}" destId="{269C0782-BA35-4C3A-B295-D76ACD031E2B}" srcOrd="0" destOrd="2" presId="urn:microsoft.com/office/officeart/2011/layout/TabList"/>
-    <dgm:cxn modelId="{64A82602-28B8-46E2-8A9C-588C292914B6}" type="presOf" srcId="{2F4105CE-F831-4489-A38E-EA308F965E1A}" destId="{8DF5D93B-DC31-4D2E-91E9-BD58313DDF36}" srcOrd="0" destOrd="0" presId="urn:microsoft.com/office/officeart/2011/layout/TabList"/>
-    <dgm:cxn modelId="{C53AA40F-C7B5-48B1-9833-6AADD820240F}" srcId="{DCB77698-D8A7-43AE-8C12-88D22546D4E0}" destId="{ADA4DD4E-A13B-4B3A-BF0B-6A9868DD9270}" srcOrd="2" destOrd="0" parTransId="{A69BEB30-D4D0-4373-A980-FBE1B2210F40}" sibTransId="{31FC63FF-B7FD-42AA-95A2-FED2E149343F}"/>
-    <dgm:cxn modelId="{F1C43613-B926-4646-87FA-D992BF0A7796}" type="presOf" srcId="{8B2750EB-B434-41DC-A189-8424894B839C}" destId="{89B6103A-0012-428D-9057-99CB1F4B4519}" srcOrd="0" destOrd="0" presId="urn:microsoft.com/office/officeart/2011/layout/TabList"/>
-    <dgm:cxn modelId="{08D37855-A906-4ED9-B03D-BFDBE60EF8C7}" srcId="{6B0EF60D-A0B1-46C5-9677-4BEA810977D2}" destId="{FCB9211A-ECAF-4092-9AF3-4A80464FEEEF}" srcOrd="0" destOrd="0" parTransId="{96E2E2CF-28EB-47BD-B8D8-43FB5B4BBC76}" sibTransId="{80A46D5D-E138-4619-973A-52836DB4B626}"/>
     <dgm:cxn modelId="{D9904F38-9A5D-48F4-991F-91A4A57053FD}" type="presOf" srcId="{19EF64AF-D0D9-429E-86D3-4CE7A62D9930}" destId="{B06197F1-B041-4747-A702-99E72A52C66D}" srcOrd="0" destOrd="0" presId="urn:microsoft.com/office/officeart/2011/layout/TabList"/>
     <dgm:cxn modelId="{2896DAC6-E607-42B4-9D8E-740D71F49BEA}" srcId="{DCB77698-D8A7-43AE-8C12-88D22546D4E0}" destId="{54C77FC2-06D5-494F-88FF-639A9A2ADF2B}" srcOrd="0" destOrd="0" parTransId="{59058AE7-0BCA-42FD-8DA7-9E303C2F3598}" sibTransId="{DD5B0AF5-4F1F-4F54-9327-3F9C5FD2ADF5}"/>
-    <dgm:cxn modelId="{9139EE07-F69A-425D-9FD3-917AD48F4A26}" type="presOf" srcId="{FCB9211A-ECAF-4092-9AF3-4A80464FEEEF}" destId="{76F4CE38-89D0-4EAB-9E94-FD08C47879E4}" srcOrd="0" destOrd="0" presId="urn:microsoft.com/office/officeart/2011/layout/TabList"/>
+    <dgm:cxn modelId="{D1EABC93-08A9-4A6F-84B0-B428BA9969D7}" type="presOf" srcId="{D4A5DE5E-27AD-4B23-B1EC-53CFB1739A11}" destId="{2874E84B-9605-494F-B813-85A702BFCF0F}" srcOrd="0" destOrd="1" presId="urn:microsoft.com/office/officeart/2011/layout/TabList"/>
+    <dgm:cxn modelId="{5F094A65-8D03-4DE2-90BC-845E0B1DF3F3}" srcId="{2F4105CE-F831-4489-A38E-EA308F965E1A}" destId="{8B2750EB-B434-41DC-A189-8424894B839C}" srcOrd="0" destOrd="0" parTransId="{FFC1F60D-411F-463B-80BE-8626FCEE6E20}" sibTransId="{1C68FAD9-F9C9-4D4A-9B81-2E6FECE526EB}"/>
+    <dgm:cxn modelId="{576B1C0C-BC74-4AB0-84AC-D638255D8C52}" srcId="{2F4105CE-F831-4489-A38E-EA308F965E1A}" destId="{E2EDF958-A636-4721-91E2-1009161BE1BC}" srcOrd="3" destOrd="0" parTransId="{56017F76-3EE4-4B10-980E-2962F4DDFEEC}" sibTransId="{D4D47A36-D2AE-41C2-A545-1538EA1F1179}"/>
+    <dgm:cxn modelId="{C4A37B3B-A8FF-45D1-9762-4D05571ABF6A}" type="presOf" srcId="{711738C3-3AA4-4805-BDB1-417DABF886EF}" destId="{269C0782-BA35-4C3A-B295-D76ACD031E2B}" srcOrd="0" destOrd="2" presId="urn:microsoft.com/office/officeart/2011/layout/TabList"/>
+    <dgm:cxn modelId="{5B81B842-285D-4C21-BC2F-2555AB323F47}" srcId="{19EF64AF-D0D9-429E-86D3-4CE7A62D9930}" destId="{14D29AC4-9FA0-444D-8EE4-E85DEB5E57A2}" srcOrd="3" destOrd="0" parTransId="{8F845681-B05B-4E32-AD5D-21295FC02A07}" sibTransId="{EE9BAB10-D308-456A-ADB5-78C6FFFB97E6}"/>
+    <dgm:cxn modelId="{2657FA28-A895-46D4-90D1-07F9A903CBBC}" srcId="{19EF64AF-D0D9-429E-86D3-4CE7A62D9930}" destId="{EB3A3517-BC08-4AB8-AB32-CAA355AEBBAA}" srcOrd="1" destOrd="0" parTransId="{B734E8AD-9F0E-4587-9C1F-9483C3D89D69}" sibTransId="{6388FC91-51F0-4583-AFC8-08BE7A667D2D}"/>
+    <dgm:cxn modelId="{0EB99273-E40B-4BA4-A24F-424DEB53EF5D}" type="presOf" srcId="{A990AE2A-665D-4A90-91E6-8CAE69B9C799}" destId="{ABD9F4AA-584A-4C32-8AC6-1F842D5E3471}" srcOrd="0" destOrd="0" presId="urn:microsoft.com/office/officeart/2011/layout/TabList"/>
+    <dgm:cxn modelId="{59C1BA7D-4D40-4BB3-8566-6C1139A98E64}" srcId="{19EF64AF-D0D9-429E-86D3-4CE7A62D9930}" destId="{6992769E-C929-46E1-B5DC-0D224D6E5340}" srcOrd="0" destOrd="0" parTransId="{37B9B495-CA51-4955-9418-9A2A7D83A101}" sibTransId="{025A960F-A828-4BA1-B49F-B19476EFF631}"/>
     <dgm:cxn modelId="{C33B3223-996C-4204-9B9A-61F80D001862}" srcId="{6B0EF60D-A0B1-46C5-9677-4BEA810977D2}" destId="{48BF764E-F495-4A56-AE96-47376DC45472}" srcOrd="3" destOrd="0" parTransId="{CED2C589-1478-4EE9-8864-36B6C00D583D}" sibTransId="{D6B20742-473A-4B9F-A0CC-85E95BE0720F}"/>
-    <dgm:cxn modelId="{BC8D3C2F-C842-4AEF-9163-91FCF0A63C32}" srcId="{84789903-61AF-4F8F-9430-490306DDBEA0}" destId="{19EF64AF-D0D9-429E-86D3-4CE7A62D9930}" srcOrd="0" destOrd="0" parTransId="{65F72764-603C-4BEA-9757-C2D922CDE6E7}" sibTransId="{A59A006A-971D-4A33-AB31-4CEE6264B4C5}"/>
-    <dgm:cxn modelId="{B2124052-34AB-4435-8CBA-D34AF146A189}" type="presOf" srcId="{14D29AC4-9FA0-444D-8EE4-E85DEB5E57A2}" destId="{2874E84B-9605-494F-B813-85A702BFCF0F}" srcOrd="0" destOrd="2" presId="urn:microsoft.com/office/officeart/2011/layout/TabList"/>
-    <dgm:cxn modelId="{D1EABC93-08A9-4A6F-84B0-B428BA9969D7}" type="presOf" srcId="{D4A5DE5E-27AD-4B23-B1EC-53CFB1739A11}" destId="{2874E84B-9605-494F-B813-85A702BFCF0F}" srcOrd="0" destOrd="1" presId="urn:microsoft.com/office/officeart/2011/layout/TabList"/>
-    <dgm:cxn modelId="{576B1C0C-BC74-4AB0-84AC-D638255D8C52}" srcId="{2F4105CE-F831-4489-A38E-EA308F965E1A}" destId="{E2EDF958-A636-4721-91E2-1009161BE1BC}" srcOrd="3" destOrd="0" parTransId="{56017F76-3EE4-4B10-980E-2962F4DDFEEC}" sibTransId="{D4D47A36-D2AE-41C2-A545-1538EA1F1179}"/>
-    <dgm:cxn modelId="{3DB12D0E-B496-47AC-B9D8-B8B2B6369FEF}" srcId="{6B0EF60D-A0B1-46C5-9677-4BEA810977D2}" destId="{03E9865A-20D2-4CF6-AA88-EF74E4A16F4A}" srcOrd="2" destOrd="0" parTransId="{8248E5BD-5697-4B1E-BCB4-ABC0B2D8E72E}" sibTransId="{EEBE7D8C-BEE1-4AE3-A6A1-B72D470C50D8}"/>
-    <dgm:cxn modelId="{6546E246-748E-4D89-8B27-C6C10AA3AC70}" type="presOf" srcId="{ADA4DD4E-A13B-4B3A-BF0B-6A9868DD9270}" destId="{269C0782-BA35-4C3A-B295-D76ACD031E2B}" srcOrd="0" destOrd="1" presId="urn:microsoft.com/office/officeart/2011/layout/TabList"/>
-    <dgm:cxn modelId="{5B81B842-285D-4C21-BC2F-2555AB323F47}" srcId="{19EF64AF-D0D9-429E-86D3-4CE7A62D9930}" destId="{14D29AC4-9FA0-444D-8EE4-E85DEB5E57A2}" srcOrd="3" destOrd="0" parTransId="{8F845681-B05B-4E32-AD5D-21295FC02A07}" sibTransId="{EE9BAB10-D308-456A-ADB5-78C6FFFB97E6}"/>
+    <dgm:cxn modelId="{C40B86E0-D802-4C2B-9B30-FF087E46B20A}" srcId="{2F4105CE-F831-4489-A38E-EA308F965E1A}" destId="{A990AE2A-665D-4A90-91E6-8CAE69B9C799}" srcOrd="1" destOrd="0" parTransId="{C4D8ABC1-84E3-45E5-AE1D-9D540D360E76}" sibTransId="{6B7AAB65-DFF8-472A-BB24-DFEC163070BA}"/>
+    <dgm:cxn modelId="{6FBD327E-F3DD-4D5F-892E-365E295EB833}" type="presOf" srcId="{DCB77698-D8A7-43AE-8C12-88D22546D4E0}" destId="{9059B661-BA02-491A-9141-4597C2088440}" srcOrd="0" destOrd="0" presId="urn:microsoft.com/office/officeart/2011/layout/TabList"/>
+    <dgm:cxn modelId="{A9F942E9-1197-421A-8955-236A83F08879}" type="presOf" srcId="{6B0EF60D-A0B1-46C5-9677-4BEA810977D2}" destId="{79569B4D-C26F-4F14-9A58-54D0240E4532}" srcOrd="0" destOrd="0" presId="urn:microsoft.com/office/officeart/2011/layout/TabList"/>
+    <dgm:cxn modelId="{9E0BBC12-F01A-46AF-A765-697A5062C11D}" type="presOf" srcId="{54C77FC2-06D5-494F-88FF-639A9A2ADF2B}" destId="{BDDE8257-E413-4550-9DF4-ACE5D4DAF407}" srcOrd="0" destOrd="0" presId="urn:microsoft.com/office/officeart/2011/layout/TabList"/>
+    <dgm:cxn modelId="{08D37855-A906-4ED9-B03D-BFDBE60EF8C7}" srcId="{6B0EF60D-A0B1-46C5-9677-4BEA810977D2}" destId="{FCB9211A-ECAF-4092-9AF3-4A80464FEEEF}" srcOrd="0" destOrd="0" parTransId="{96E2E2CF-28EB-47BD-B8D8-43FB5B4BBC76}" sibTransId="{80A46D5D-E138-4619-973A-52836DB4B626}"/>
+    <dgm:cxn modelId="{2A33E819-8BC0-4207-B650-7F5E09F345C6}" srcId="{DCB77698-D8A7-43AE-8C12-88D22546D4E0}" destId="{711738C3-3AA4-4805-BDB1-417DABF886EF}" srcOrd="3" destOrd="0" parTransId="{1C77D557-D7BA-4CA0-9ACF-21BA020B74A4}" sibTransId="{5556CC35-A5A0-404A-80E1-20A32FCADDA5}"/>
+    <dgm:cxn modelId="{272F4F47-B6F0-44E6-BE53-1E568010F73F}" srcId="{6B0EF60D-A0B1-46C5-9677-4BEA810977D2}" destId="{432382F3-03DD-4963-A6A5-C32D1C07F990}" srcOrd="1" destOrd="0" parTransId="{428261C4-B743-4CC1-8298-2B59764B7274}" sibTransId="{19522E25-3C1D-4596-9D61-BE8AA7854562}"/>
+    <dgm:cxn modelId="{6AEA36B3-723E-4C26-991B-32293EC4977D}" srcId="{DCB77698-D8A7-43AE-8C12-88D22546D4E0}" destId="{F6CCDE68-20A3-48C9-9929-36D9326E50C7}" srcOrd="1" destOrd="0" parTransId="{6D777BDB-A14B-4CB9-848E-609F2B89797D}" sibTransId="{E73E6EC1-A77B-4806-AF59-F300788A17A6}"/>
+    <dgm:cxn modelId="{9C741026-5DFA-48E0-BCB8-618D95B45615}" srcId="{2F4105CE-F831-4489-A38E-EA308F965E1A}" destId="{28A4433D-892C-4392-A0C9-31AA297B23D1}" srcOrd="2" destOrd="0" parTransId="{38F9BBF9-BEAA-4EF2-A10C-767F24A70094}" sibTransId="{FF662DDE-5536-4F81-B4BD-F479E8E272D8}"/>
+    <dgm:cxn modelId="{C53AA40F-C7B5-48B1-9833-6AADD820240F}" srcId="{DCB77698-D8A7-43AE-8C12-88D22546D4E0}" destId="{ADA4DD4E-A13B-4B3A-BF0B-6A9868DD9270}" srcOrd="2" destOrd="0" parTransId="{A69BEB30-D4D0-4373-A980-FBE1B2210F40}" sibTransId="{31FC63FF-B7FD-42AA-95A2-FED2E149343F}"/>
+    <dgm:cxn modelId="{EA29C83E-1DCA-4FBB-975D-0E40E46D2194}" type="presOf" srcId="{432382F3-03DD-4963-A6A5-C32D1C07F990}" destId="{F2E5F12B-CEBA-404F-BC59-D0A75B115C1F}" srcOrd="0" destOrd="0" presId="urn:microsoft.com/office/officeart/2011/layout/TabList"/>
+    <dgm:cxn modelId="{2367FF4F-D248-4F58-A0D9-784D3549B7D2}" type="presOf" srcId="{F6CCDE68-20A3-48C9-9929-36D9326E50C7}" destId="{269C0782-BA35-4C3A-B295-D76ACD031E2B}" srcOrd="0" destOrd="0" presId="urn:microsoft.com/office/officeart/2011/layout/TabList"/>
+    <dgm:cxn modelId="{AD10BF23-1E69-4909-B6FA-24F65C0F2B83}" type="presOf" srcId="{28A4433D-892C-4392-A0C9-31AA297B23D1}" destId="{ABD9F4AA-584A-4C32-8AC6-1F842D5E3471}" srcOrd="0" destOrd="1" presId="urn:microsoft.com/office/officeart/2011/layout/TabList"/>
+    <dgm:cxn modelId="{96A20728-4B71-426D-8207-8D974A3F5B06}" srcId="{84789903-61AF-4F8F-9430-490306DDBEA0}" destId="{6B0EF60D-A0B1-46C5-9677-4BEA810977D2}" srcOrd="2" destOrd="0" parTransId="{DF3844A8-4E17-463F-BAAD-4ACB2C215D90}" sibTransId="{9DADB796-DA90-4478-BCA3-5929CA4ED0C6}"/>
+    <dgm:cxn modelId="{FB51F38E-5F9F-4D3E-BF90-82BB4C1D2DB9}" type="presOf" srcId="{6992769E-C929-46E1-B5DC-0D224D6E5340}" destId="{F82F5449-D542-4810-B467-43A5C2614DD5}" srcOrd="0" destOrd="0" presId="urn:microsoft.com/office/officeart/2011/layout/TabList"/>
+    <dgm:cxn modelId="{E50B4537-4222-4FA6-86D6-900B232A905B}" srcId="{84789903-61AF-4F8F-9430-490306DDBEA0}" destId="{DCB77698-D8A7-43AE-8C12-88D22546D4E0}" srcOrd="3" destOrd="0" parTransId="{0256383B-FBF2-49F0-935C-E17EB2C4D7C4}" sibTransId="{866D160B-DB4E-4FF6-BF8A-FD0216203DA1}"/>
+    <dgm:cxn modelId="{EC26D4FA-8D0A-4965-860E-E576DA3FE7C2}" srcId="{84789903-61AF-4F8F-9430-490306DDBEA0}" destId="{2F4105CE-F831-4489-A38E-EA308F965E1A}" srcOrd="1" destOrd="0" parTransId="{B2367E5B-DF6B-423A-8C73-6C51AA905F42}" sibTransId="{42FAF69B-DD6C-4C4C-A008-7959F807FCD6}"/>
     <dgm:cxn modelId="{2F47F51D-5D99-460D-A41A-7BA1B38FCB61}" type="presParOf" srcId="{8937854E-C94A-470E-AB4D-2D1BF4D6EC0A}" destId="{63CF07DF-294E-4215-9B6C-5C3BCCC45688}" srcOrd="0" destOrd="0" presId="urn:microsoft.com/office/officeart/2011/layout/TabList"/>
     <dgm:cxn modelId="{01393574-0C7D-4580-B867-B93CADED6C7E}" type="presParOf" srcId="{63CF07DF-294E-4215-9B6C-5C3BCCC45688}" destId="{F82F5449-D542-4810-B467-43A5C2614DD5}" srcOrd="0" destOrd="0" presId="urn:microsoft.com/office/officeart/2011/layout/TabList"/>
     <dgm:cxn modelId="{2A2C2DA9-9F74-4E94-9167-80C01FF3DC10}" type="presParOf" srcId="{63CF07DF-294E-4215-9B6C-5C3BCCC45688}" destId="{B06197F1-B041-4747-A702-99E72A52C66D}" srcOrd="1" destOrd="0" presId="urn:microsoft.com/office/officeart/2011/layout/TabList"/>
@@ -4158,19 +4134,7 @@
           </a:pPr>
           <a:r>
             <a:rPr lang="en-US" sz="1000" kern="1200" dirty="0" smtClean="0"/>
-            <a:t>Contract </a:t>
-          </a:r>
-          <a:r>
-            <a:rPr lang="en-US" sz="1000" kern="1200" dirty="0" smtClean="0"/>
-            <a:t>administrators are discriminating </a:t>
-          </a:r>
-          <a:r>
-            <a:rPr lang="en-US" sz="1000" kern="1200" dirty="0" smtClean="0"/>
-            <a:t>against small </a:t>
-          </a:r>
-          <a:r>
-            <a:rPr lang="en-US" sz="1000" kern="1200" dirty="0" smtClean="0"/>
-            <a:t>businesses to make things easier for themselves.</a:t>
+            <a:t>Contract administrators are discriminating against small businesses to make things easier for themselves.</a:t>
           </a:r>
           <a:endParaRPr lang="en-US" sz="1000" kern="1200" dirty="0"/>
         </a:p>
@@ -4470,11 +4434,7 @@
           </a:pPr>
           <a:r>
             <a:rPr lang="en-US" sz="1000" kern="1200" dirty="0" smtClean="0"/>
-            <a:t>Decline </a:t>
-          </a:r>
-          <a:r>
-            <a:rPr lang="en-US" sz="1000" kern="1200" dirty="0" smtClean="0"/>
-            <a:t>Narrative</a:t>
+            <a:t>Decline Narrative</a:t>
           </a:r>
           <a:endParaRPr lang="en-US" sz="1000" kern="1200" dirty="0"/>
         </a:p>
@@ -5348,11 +5308,7 @@
           </a:pPr>
           <a:r>
             <a:rPr lang="en-US" sz="1000" kern="1200" dirty="0" smtClean="0"/>
-            <a:t>Decline </a:t>
-          </a:r>
-          <a:r>
-            <a:rPr lang="en-US" sz="1000" kern="1200" dirty="0" smtClean="0"/>
-            <a:t>Narrative</a:t>
+            <a:t>Decline Narrative</a:t>
           </a:r>
           <a:endParaRPr lang="en-US" sz="1000" kern="1200" dirty="0"/>
         </a:p>
@@ -5605,11 +5561,7 @@
           </a:pPr>
           <a:r>
             <a:rPr lang="en-US" sz="1000" kern="1200" dirty="0" smtClean="0"/>
-            <a:t>Decline </a:t>
-          </a:r>
-          <a:r>
-            <a:rPr lang="en-US" sz="1000" kern="1200" dirty="0" smtClean="0"/>
-            <a:t>Narrative</a:t>
+            <a:t>Decline Narrative</a:t>
           </a:r>
           <a:endParaRPr lang="en-US" sz="1000" kern="1200" dirty="0"/>
         </a:p>
@@ -11841,19 +11793,7 @@
             <a:pPr algn="ctr"/>
             <a:r>
               <a:rPr lang="en-US" sz="900" dirty="0" smtClean="0"/>
-              <a:t>Senate </a:t>
-            </a:r>
-            <a:r>
-              <a:rPr lang="en-US" sz="900" dirty="0" smtClean="0"/>
-              <a:t>Committee </a:t>
-            </a:r>
-            <a:r>
-              <a:rPr lang="en-US" sz="900" dirty="0" smtClean="0"/>
-              <a:t>on </a:t>
-            </a:r>
-            <a:r>
-              <a:rPr lang="en-US" sz="900" dirty="0" smtClean="0"/>
-              <a:t>Small Business</a:t>
+              <a:t>Senate Committee on Small Business</a:t>
             </a:r>
             <a:endParaRPr lang="en-US" sz="900" dirty="0"/>
           </a:p>
@@ -12973,7 +12913,11 @@
             <a:pPr algn="ctr"/>
             <a:r>
               <a:rPr lang="en-US" dirty="0" smtClean="0"/>
-              <a:t>Frames Comparison</a:t>
+              <a:t>Policy Framing </a:t>
+            </a:r>
+            <a:r>
+              <a:rPr lang="en-US" dirty="0" smtClean="0"/>
+              <a:t>Comparison</a:t>
             </a:r>
             <a:endParaRPr lang="en-US" dirty="0"/>
           </a:p>
@@ -13157,8 +13101,8 @@
         </p:nvSpPr>
         <p:spPr>
           <a:xfrm>
-            <a:off x="2286000" y="419100"/>
-            <a:ext cx="4572000" cy="369332"/>
+            <a:off x="1600200" y="419100"/>
+            <a:ext cx="5943600" cy="369332"/>
           </a:xfrm>
           <a:prstGeom prst="rect">
             <a:avLst/>
@@ -13174,7 +13118,11 @@
             <a:pPr algn="ctr"/>
             <a:r>
               <a:rPr lang="en-US" dirty="0" smtClean="0"/>
-              <a:t>Policy and Political Implications Flow</a:t>
+              <a:t>Policy and Political Implications </a:t>
+            </a:r>
+            <a:r>
+              <a:rPr lang="en-US" dirty="0" smtClean="0"/>
+              <a:t>Flow Diagram</a:t>
             </a:r>
             <a:endParaRPr lang="en-US" dirty="0"/>
           </a:p>
@@ -13257,15 +13205,15 @@
           </p:spPr>
           <p:style>
             <a:lnRef idx="2">
-              <a:schemeClr val="accent2">
+              <a:schemeClr val="accent3">
                 <a:shade val="50000"/>
               </a:schemeClr>
             </a:lnRef>
             <a:fillRef idx="1">
-              <a:schemeClr val="accent2"/>
+              <a:schemeClr val="accent3"/>
             </a:fillRef>
             <a:effectRef idx="0">
-              <a:schemeClr val="accent2"/>
+              <a:schemeClr val="accent3"/>
             </a:effectRef>
             <a:fontRef idx="minor">
               <a:schemeClr val="lt1"/>
@@ -13278,7 +13226,11 @@
               <a:pPr algn="ctr"/>
               <a:r>
                 <a:rPr lang="en-US" sz="1000" dirty="0" smtClean="0"/>
-                <a:t>Loss of our way of life</a:t>
+                <a:t>Protect our </a:t>
+              </a:r>
+              <a:r>
+                <a:rPr lang="en-US" sz="1000" dirty="0" smtClean="0"/>
+                <a:t>way of life</a:t>
               </a:r>
               <a:endParaRPr lang="en-US" sz="1000" dirty="0"/>
             </a:p>
@@ -13335,7 +13287,11 @@
               <a:pPr algn="ctr"/>
               <a:r>
                 <a:rPr lang="en-US" sz="1000" dirty="0" smtClean="0"/>
-                <a:t>America is losing it’s technological advantages that helps us protect ourselves from those that would harm us.</a:t>
+                <a:t>This policy stops and reverses th</a:t>
+              </a:r>
+              <a:r>
+                <a:rPr lang="en-US" sz="1000" dirty="0" smtClean="0"/>
+                <a:t>e current trends of economic loss and lack of innovation.</a:t>
               </a:r>
               <a:endParaRPr lang="en-US" sz="1000" dirty="0"/>
             </a:p>
@@ -13420,609 +13376,15 @@
           </p:style>
         </p:cxnSp>
       </p:grpSp>
-      <p:grpSp>
-        <p:nvGrpSpPr>
-          <p:cNvPr id="62" name="Group 61"/>
-          <p:cNvGrpSpPr/>
-          <p:nvPr/>
-        </p:nvGrpSpPr>
-        <p:grpSpPr>
-          <a:xfrm>
-            <a:off x="107148" y="2497932"/>
-            <a:ext cx="4400528" cy="1896507"/>
-            <a:chOff x="107148" y="1854972"/>
-            <a:chExt cx="4400528" cy="1896507"/>
-          </a:xfrm>
-        </p:grpSpPr>
-        <p:sp>
-          <p:nvSpPr>
-            <p:cNvPr id="12" name="Oval 11"/>
-            <p:cNvSpPr/>
-            <p:nvPr/>
-          </p:nvSpPr>
-          <p:spPr>
-            <a:xfrm>
-              <a:off x="107148" y="2290740"/>
-              <a:ext cx="1371600" cy="914400"/>
-            </a:xfrm>
-            <a:prstGeom prst="ellipse">
-              <a:avLst/>
-            </a:prstGeom>
-          </p:spPr>
-          <p:style>
-            <a:lnRef idx="2">
-              <a:schemeClr val="accent2">
-                <a:shade val="50000"/>
-              </a:schemeClr>
-            </a:lnRef>
-            <a:fillRef idx="1">
-              <a:schemeClr val="accent2"/>
-            </a:fillRef>
-            <a:effectRef idx="0">
-              <a:schemeClr val="accent2"/>
-            </a:effectRef>
-            <a:fontRef idx="minor">
-              <a:schemeClr val="lt1"/>
-            </a:fontRef>
-          </p:style>
-          <p:txBody>
-            <a:bodyPr lIns="9144" rIns="9144" rtlCol="0" anchor="ctr"/>
-            <a:lstStyle/>
-            <a:p>
-              <a:pPr algn="ctr"/>
-              <a:r>
-                <a:rPr lang="en-US" sz="1000" dirty="0" smtClean="0"/>
-                <a:t>Contract administrators are discriminating against small businesses.</a:t>
-              </a:r>
-              <a:endParaRPr lang="en-US" sz="1000" dirty="0"/>
-            </a:p>
-          </p:txBody>
-        </p:sp>
-        <p:sp>
-          <p:nvSpPr>
-            <p:cNvPr id="13" name="Oval 12"/>
-            <p:cNvSpPr/>
-            <p:nvPr/>
-          </p:nvSpPr>
-          <p:spPr>
-            <a:xfrm>
-              <a:off x="3593276" y="1854972"/>
-              <a:ext cx="914400" cy="914400"/>
-            </a:xfrm>
-            <a:prstGeom prst="ellipse">
-              <a:avLst/>
-            </a:prstGeom>
-          </p:spPr>
-          <p:style>
-            <a:lnRef idx="2">
-              <a:schemeClr val="accent2">
-                <a:shade val="50000"/>
-              </a:schemeClr>
-            </a:lnRef>
-            <a:fillRef idx="1">
-              <a:schemeClr val="accent2"/>
-            </a:fillRef>
-            <a:effectRef idx="0">
-              <a:schemeClr val="accent2"/>
-            </a:effectRef>
-            <a:fontRef idx="minor">
-              <a:schemeClr val="lt1"/>
-            </a:fontRef>
-          </p:style>
-          <p:txBody>
-            <a:bodyPr lIns="9144" rIns="9144" rtlCol="0" anchor="ctr"/>
-            <a:lstStyle/>
-            <a:p>
-              <a:pPr algn="ctr"/>
-              <a:r>
-                <a:rPr lang="en-US" sz="1000" dirty="0" smtClean="0"/>
-                <a:t>Loss of global dominance</a:t>
-              </a:r>
-              <a:endParaRPr lang="en-US" sz="1000" dirty="0"/>
-            </a:p>
-          </p:txBody>
-        </p:sp>
-        <p:sp>
-          <p:nvSpPr>
-            <p:cNvPr id="14" name="Rounded Rectangle 13"/>
-            <p:cNvSpPr/>
-            <p:nvPr/>
-          </p:nvSpPr>
-          <p:spPr>
-            <a:xfrm>
-              <a:off x="1835927" y="2290740"/>
-              <a:ext cx="1371600" cy="914400"/>
-            </a:xfrm>
-            <a:prstGeom prst="roundRect">
-              <a:avLst/>
-            </a:prstGeom>
-            <a:solidFill>
-              <a:schemeClr val="bg1">
-                <a:lumMod val="50000"/>
-              </a:schemeClr>
-            </a:solidFill>
-            <a:ln>
-              <a:solidFill>
-                <a:schemeClr val="tx1">
-                  <a:lumMod val="65000"/>
-                  <a:lumOff val="35000"/>
-                </a:schemeClr>
-              </a:solidFill>
-            </a:ln>
-          </p:spPr>
-          <p:style>
-            <a:lnRef idx="2">
-              <a:schemeClr val="accent1">
-                <a:shade val="50000"/>
-              </a:schemeClr>
-            </a:lnRef>
-            <a:fillRef idx="1">
-              <a:schemeClr val="accent1"/>
-            </a:fillRef>
-            <a:effectRef idx="0">
-              <a:schemeClr val="accent1"/>
-            </a:effectRef>
-            <a:fontRef idx="minor">
-              <a:schemeClr val="lt1"/>
-            </a:fontRef>
-          </p:style>
-          <p:txBody>
-            <a:bodyPr rtlCol="0" anchor="ctr"/>
-            <a:lstStyle/>
-            <a:p>
-              <a:pPr algn="ctr"/>
-              <a:r>
-                <a:rPr lang="en-US" sz="1000" dirty="0" smtClean="0"/>
-                <a:t>The country can’t benefit from the innovativeness of small businesses.</a:t>
-              </a:r>
-              <a:endParaRPr lang="en-US" sz="1000" dirty="0"/>
-            </a:p>
-          </p:txBody>
-        </p:sp>
-        <p:cxnSp>
-          <p:nvCxnSpPr>
-            <p:cNvPr id="15" name="Straight Arrow Connector 14"/>
-            <p:cNvCxnSpPr>
-              <a:stCxn id="12" idx="6"/>
-              <a:endCxn id="14" idx="1"/>
-            </p:cNvCxnSpPr>
-            <p:nvPr/>
-          </p:nvCxnSpPr>
-          <p:spPr>
-            <a:xfrm>
-              <a:off x="1478748" y="2747940"/>
-              <a:ext cx="357179" cy="0"/>
-            </a:xfrm>
-            <a:prstGeom prst="straightConnector1">
-              <a:avLst/>
-            </a:prstGeom>
-            <a:ln w="50800">
-              <a:solidFill>
-                <a:schemeClr val="tx1"/>
-              </a:solidFill>
-              <a:tailEnd type="triangle" w="med" len="med"/>
-            </a:ln>
-          </p:spPr>
-          <p:style>
-            <a:lnRef idx="1">
-              <a:schemeClr val="accent1"/>
-            </a:lnRef>
-            <a:fillRef idx="0">
-              <a:schemeClr val="accent1"/>
-            </a:fillRef>
-            <a:effectRef idx="0">
-              <a:schemeClr val="accent1"/>
-            </a:effectRef>
-            <a:fontRef idx="minor">
-              <a:schemeClr val="tx1"/>
-            </a:fontRef>
-          </p:style>
-        </p:cxnSp>
-        <p:cxnSp>
-          <p:nvCxnSpPr>
-            <p:cNvPr id="16" name="Straight Arrow Connector 15"/>
-            <p:cNvCxnSpPr>
-              <a:stCxn id="14" idx="3"/>
-              <a:endCxn id="13" idx="3"/>
-            </p:cNvCxnSpPr>
-            <p:nvPr/>
-          </p:nvCxnSpPr>
-          <p:spPr>
-            <a:xfrm flipV="1">
-              <a:off x="3207527" y="2635461"/>
-              <a:ext cx="519660" cy="112479"/>
-            </a:xfrm>
-            <a:prstGeom prst="straightConnector1">
-              <a:avLst/>
-            </a:prstGeom>
-            <a:ln w="50800">
-              <a:solidFill>
-                <a:schemeClr val="tx1"/>
-              </a:solidFill>
-              <a:tailEnd type="triangle" w="med" len="med"/>
-            </a:ln>
-          </p:spPr>
-          <p:style>
-            <a:lnRef idx="1">
-              <a:schemeClr val="accent1"/>
-            </a:lnRef>
-            <a:fillRef idx="0">
-              <a:schemeClr val="accent1"/>
-            </a:fillRef>
-            <a:effectRef idx="0">
-              <a:schemeClr val="accent1"/>
-            </a:effectRef>
-            <a:fontRef idx="minor">
-              <a:schemeClr val="tx1"/>
-            </a:fontRef>
-          </p:style>
-        </p:cxnSp>
-        <p:sp>
-          <p:nvSpPr>
-            <p:cNvPr id="17" name="Oval 16"/>
-            <p:cNvSpPr/>
-            <p:nvPr/>
-          </p:nvSpPr>
-          <p:spPr>
-            <a:xfrm>
-              <a:off x="3593276" y="2837079"/>
-              <a:ext cx="914400" cy="914400"/>
-            </a:xfrm>
-            <a:prstGeom prst="ellipse">
-              <a:avLst/>
-            </a:prstGeom>
-          </p:spPr>
-          <p:style>
-            <a:lnRef idx="2">
-              <a:schemeClr val="accent2">
-                <a:shade val="50000"/>
-              </a:schemeClr>
-            </a:lnRef>
-            <a:fillRef idx="1">
-              <a:schemeClr val="accent2"/>
-            </a:fillRef>
-            <a:effectRef idx="0">
-              <a:schemeClr val="accent2"/>
-            </a:effectRef>
-            <a:fontRef idx="minor">
-              <a:schemeClr val="lt1"/>
-            </a:fontRef>
-          </p:style>
-          <p:txBody>
-            <a:bodyPr lIns="9144" rIns="9144" rtlCol="0" anchor="ctr"/>
-            <a:lstStyle/>
-            <a:p>
-              <a:pPr algn="ctr"/>
-              <a:r>
-                <a:rPr lang="en-US" sz="1000" dirty="0" smtClean="0"/>
-                <a:t>Loss of economic prosperity</a:t>
-              </a:r>
-              <a:endParaRPr lang="en-US" sz="1000" dirty="0"/>
-            </a:p>
-          </p:txBody>
-        </p:sp>
-        <p:cxnSp>
-          <p:nvCxnSpPr>
-            <p:cNvPr id="22" name="Straight Arrow Connector 21"/>
-            <p:cNvCxnSpPr>
-              <a:stCxn id="14" idx="3"/>
-              <a:endCxn id="17" idx="1"/>
-            </p:cNvCxnSpPr>
-            <p:nvPr/>
-          </p:nvCxnSpPr>
-          <p:spPr>
-            <a:xfrm>
-              <a:off x="3207527" y="2747940"/>
-              <a:ext cx="519660" cy="223050"/>
-            </a:xfrm>
-            <a:prstGeom prst="straightConnector1">
-              <a:avLst/>
-            </a:prstGeom>
-            <a:ln w="50800">
-              <a:solidFill>
-                <a:schemeClr val="tx1"/>
-              </a:solidFill>
-              <a:tailEnd type="triangle" w="med" len="med"/>
-            </a:ln>
-          </p:spPr>
-          <p:style>
-            <a:lnRef idx="1">
-              <a:schemeClr val="accent1"/>
-            </a:lnRef>
-            <a:fillRef idx="0">
-              <a:schemeClr val="accent1"/>
-            </a:fillRef>
-            <a:effectRef idx="0">
-              <a:schemeClr val="accent1"/>
-            </a:effectRef>
-            <a:fontRef idx="minor">
-              <a:schemeClr val="tx1"/>
-            </a:fontRef>
-          </p:style>
-        </p:cxnSp>
-      </p:grpSp>
-      <p:grpSp>
-        <p:nvGrpSpPr>
-          <p:cNvPr id="63" name="Group 62"/>
-          <p:cNvGrpSpPr/>
-          <p:nvPr/>
-        </p:nvGrpSpPr>
-        <p:grpSpPr>
-          <a:xfrm>
-            <a:off x="107148" y="4645827"/>
-            <a:ext cx="4400528" cy="914400"/>
-            <a:chOff x="107148" y="3809979"/>
-            <a:chExt cx="4400528" cy="914400"/>
-          </a:xfrm>
-        </p:grpSpPr>
-        <p:sp>
-          <p:nvSpPr>
-            <p:cNvPr id="27" name="Oval 26"/>
-            <p:cNvSpPr/>
-            <p:nvPr/>
-          </p:nvSpPr>
-          <p:spPr>
-            <a:xfrm>
-              <a:off x="107148" y="3809979"/>
-              <a:ext cx="1371600" cy="914400"/>
-            </a:xfrm>
-            <a:prstGeom prst="ellipse">
-              <a:avLst/>
-            </a:prstGeom>
-          </p:spPr>
-          <p:style>
-            <a:lnRef idx="2">
-              <a:schemeClr val="accent2">
-                <a:shade val="50000"/>
-              </a:schemeClr>
-            </a:lnRef>
-            <a:fillRef idx="1">
-              <a:schemeClr val="accent2"/>
-            </a:fillRef>
-            <a:effectRef idx="0">
-              <a:schemeClr val="accent2"/>
-            </a:effectRef>
-            <a:fontRef idx="minor">
-              <a:schemeClr val="lt1"/>
-            </a:fontRef>
-          </p:style>
-          <p:txBody>
-            <a:bodyPr lIns="9144" rIns="9144" rtlCol="0" anchor="ctr"/>
-            <a:lstStyle/>
-            <a:p>
-              <a:pPr algn="ctr"/>
-              <a:r>
-                <a:rPr lang="en-US" sz="1000" dirty="0" smtClean="0"/>
-                <a:t>America’s used to have a growing economy and global dominance.</a:t>
-              </a:r>
-              <a:endParaRPr lang="en-US" sz="1000" dirty="0"/>
-            </a:p>
-          </p:txBody>
-        </p:sp>
-        <p:sp>
-          <p:nvSpPr>
-            <p:cNvPr id="28" name="Oval 27"/>
-            <p:cNvSpPr>
-              <a:spLocks/>
-            </p:cNvSpPr>
-            <p:nvPr/>
-          </p:nvSpPr>
-          <p:spPr>
-            <a:xfrm>
-              <a:off x="3593276" y="3809979"/>
-              <a:ext cx="914400" cy="914400"/>
-            </a:xfrm>
-            <a:prstGeom prst="ellipse">
-              <a:avLst/>
-            </a:prstGeom>
-          </p:spPr>
-          <p:style>
-            <a:lnRef idx="2">
-              <a:schemeClr val="accent2">
-                <a:shade val="50000"/>
-              </a:schemeClr>
-            </a:lnRef>
-            <a:fillRef idx="1">
-              <a:schemeClr val="accent2"/>
-            </a:fillRef>
-            <a:effectRef idx="0">
-              <a:schemeClr val="accent2"/>
-            </a:effectRef>
-            <a:fontRef idx="minor">
-              <a:schemeClr val="lt1"/>
-            </a:fontRef>
-          </p:style>
-          <p:txBody>
-            <a:bodyPr lIns="9144" rIns="9144" rtlCol="0" anchor="ctr"/>
-            <a:lstStyle/>
-            <a:p>
-              <a:pPr algn="ctr"/>
-              <a:r>
-                <a:rPr lang="en-US" sz="1000" dirty="0" smtClean="0"/>
-                <a:t>Loss of economic prosperity</a:t>
-              </a:r>
-              <a:endParaRPr lang="en-US" sz="1000" dirty="0"/>
-            </a:p>
-          </p:txBody>
-        </p:sp>
-        <p:sp>
-          <p:nvSpPr>
-            <p:cNvPr id="29" name="Rounded Rectangle 28"/>
-            <p:cNvSpPr/>
-            <p:nvPr/>
-          </p:nvSpPr>
-          <p:spPr>
-            <a:xfrm>
-              <a:off x="1835927" y="3809979"/>
-              <a:ext cx="1371600" cy="914400"/>
-            </a:xfrm>
-            <a:prstGeom prst="roundRect">
-              <a:avLst/>
-            </a:prstGeom>
-            <a:solidFill>
-              <a:schemeClr val="bg1">
-                <a:lumMod val="50000"/>
-              </a:schemeClr>
-            </a:solidFill>
-            <a:ln>
-              <a:solidFill>
-                <a:schemeClr val="tx1">
-                  <a:lumMod val="65000"/>
-                  <a:lumOff val="35000"/>
-                </a:schemeClr>
-              </a:solidFill>
-            </a:ln>
-          </p:spPr>
-          <p:style>
-            <a:lnRef idx="2">
-              <a:schemeClr val="accent1">
-                <a:shade val="50000"/>
-              </a:schemeClr>
-            </a:lnRef>
-            <a:fillRef idx="1">
-              <a:schemeClr val="accent1"/>
-            </a:fillRef>
-            <a:effectRef idx="0">
-              <a:schemeClr val="accent1"/>
-            </a:effectRef>
-            <a:fontRef idx="minor">
-              <a:schemeClr val="lt1"/>
-            </a:fontRef>
-          </p:style>
-          <p:txBody>
-            <a:bodyPr rtlCol="0" anchor="ctr"/>
-            <a:lstStyle/>
-            <a:p>
-              <a:pPr algn="ctr"/>
-              <a:r>
-                <a:rPr lang="en-US" sz="1000" dirty="0" smtClean="0"/>
-                <a:t>America is not producing technological innovation necessary to generate economic prosperity.</a:t>
-              </a:r>
-              <a:endParaRPr lang="en-US" sz="1000" dirty="0"/>
-            </a:p>
-          </p:txBody>
-        </p:sp>
-        <p:cxnSp>
-          <p:nvCxnSpPr>
-            <p:cNvPr id="30" name="Straight Arrow Connector 29"/>
-            <p:cNvCxnSpPr>
-              <a:stCxn id="27" idx="6"/>
-              <a:endCxn id="29" idx="1"/>
-            </p:cNvCxnSpPr>
-            <p:nvPr/>
-          </p:nvCxnSpPr>
-          <p:spPr>
-            <a:xfrm>
-              <a:off x="1478748" y="4267179"/>
-              <a:ext cx="357179" cy="0"/>
-            </a:xfrm>
-            <a:prstGeom prst="straightConnector1">
-              <a:avLst/>
-            </a:prstGeom>
-            <a:ln w="50800">
-              <a:solidFill>
-                <a:schemeClr val="tx1"/>
-              </a:solidFill>
-              <a:tailEnd type="triangle" w="med" len="med"/>
-            </a:ln>
-          </p:spPr>
-          <p:style>
-            <a:lnRef idx="1">
-              <a:schemeClr val="accent1"/>
-            </a:lnRef>
-            <a:fillRef idx="0">
-              <a:schemeClr val="accent1"/>
-            </a:fillRef>
-            <a:effectRef idx="0">
-              <a:schemeClr val="accent1"/>
-            </a:effectRef>
-            <a:fontRef idx="minor">
-              <a:schemeClr val="tx1"/>
-            </a:fontRef>
-          </p:style>
-        </p:cxnSp>
-        <p:cxnSp>
-          <p:nvCxnSpPr>
-            <p:cNvPr id="31" name="Straight Arrow Connector 30"/>
-            <p:cNvCxnSpPr>
-              <a:stCxn id="29" idx="3"/>
-              <a:endCxn id="28" idx="2"/>
-            </p:cNvCxnSpPr>
-            <p:nvPr/>
-          </p:nvCxnSpPr>
-          <p:spPr>
-            <a:xfrm>
-              <a:off x="3207527" y="4267179"/>
-              <a:ext cx="385749" cy="0"/>
-            </a:xfrm>
-            <a:prstGeom prst="straightConnector1">
-              <a:avLst/>
-            </a:prstGeom>
-            <a:ln w="50800">
-              <a:solidFill>
-                <a:schemeClr val="tx1"/>
-              </a:solidFill>
-              <a:tailEnd type="triangle" w="med" len="med"/>
-            </a:ln>
-          </p:spPr>
-          <p:style>
-            <a:lnRef idx="1">
-              <a:schemeClr val="accent1"/>
-            </a:lnRef>
-            <a:fillRef idx="0">
-              <a:schemeClr val="accent1"/>
-            </a:fillRef>
-            <a:effectRef idx="0">
-              <a:schemeClr val="accent1"/>
-            </a:effectRef>
-            <a:fontRef idx="minor">
-              <a:schemeClr val="tx1"/>
-            </a:fontRef>
-          </p:style>
-        </p:cxnSp>
-      </p:grpSp>
-      <p:cxnSp>
-        <p:nvCxnSpPr>
-          <p:cNvPr id="42" name="Straight Connector 41"/>
-          <p:cNvCxnSpPr/>
-          <p:nvPr/>
-        </p:nvCxnSpPr>
-        <p:spPr>
-          <a:xfrm>
-            <a:off x="4572000" y="1122599"/>
-            <a:ext cx="0" cy="4572000"/>
-          </a:xfrm>
-          <a:prstGeom prst="line">
-            <a:avLst/>
-          </a:prstGeom>
-          <a:ln w="19050">
-            <a:prstDash val="sysDash"/>
-          </a:ln>
-        </p:spPr>
-        <p:style>
-          <a:lnRef idx="1">
-            <a:schemeClr val="accent1"/>
-          </a:lnRef>
-          <a:fillRef idx="0">
-            <a:schemeClr val="accent1"/>
-          </a:fillRef>
-          <a:effectRef idx="0">
-            <a:schemeClr val="accent1"/>
-          </a:effectRef>
-          <a:fontRef idx="minor">
-            <a:schemeClr val="tx1"/>
-          </a:fontRef>
-        </p:style>
-      </p:cxnSp>
       <p:sp>
         <p:nvSpPr>
-          <p:cNvPr id="43" name="Oval 42"/>
+          <p:cNvPr id="12" name="Oval 11"/>
           <p:cNvSpPr/>
           <p:nvPr/>
         </p:nvSpPr>
         <p:spPr>
           <a:xfrm>
-            <a:off x="4660076" y="1204426"/>
+            <a:off x="107148" y="2933700"/>
             <a:ext cx="1371600" cy="914400"/>
           </a:xfrm>
           <a:prstGeom prst="ellipse">
@@ -14052,7 +13414,7 @@
             <a:pPr algn="ctr"/>
             <a:r>
               <a:rPr lang="en-US" sz="1000" dirty="0" smtClean="0"/>
-              <a:t>America is straying from our guiding aspirational principles.</a:t>
+              <a:t>Contract administrators are discriminating against small businesses.</a:t>
             </a:r>
             <a:endParaRPr lang="en-US" sz="1000" dirty="0"/>
           </a:p>
@@ -14060,15 +13422,13 @@
       </p:sp>
       <p:sp>
         <p:nvSpPr>
-          <p:cNvPr id="44" name="Oval 43"/>
-          <p:cNvSpPr>
-            <a:spLocks/>
-          </p:cNvSpPr>
+          <p:cNvPr id="13" name="Oval 12"/>
+          <p:cNvSpPr/>
           <p:nvPr/>
         </p:nvSpPr>
         <p:spPr>
           <a:xfrm>
-            <a:off x="8146204" y="1204426"/>
+            <a:off x="3593276" y="3476168"/>
             <a:ext cx="914400" cy="914400"/>
           </a:xfrm>
           <a:prstGeom prst="ellipse">
@@ -14077,15 +13437,15 @@
         </p:spPr>
         <p:style>
           <a:lnRef idx="2">
-            <a:schemeClr val="accent2">
+            <a:schemeClr val="accent3">
               <a:shade val="50000"/>
             </a:schemeClr>
           </a:lnRef>
           <a:fillRef idx="1">
-            <a:schemeClr val="accent2"/>
+            <a:schemeClr val="accent3"/>
           </a:fillRef>
           <a:effectRef idx="0">
-            <a:schemeClr val="accent2"/>
+            <a:schemeClr val="accent3"/>
           </a:effectRef>
           <a:fontRef idx="minor">
             <a:schemeClr val="lt1"/>
@@ -14098,11 +13458,11 @@
             <a:pPr algn="ctr"/>
             <a:r>
               <a:rPr lang="en-US" sz="1000" dirty="0" smtClean="0"/>
-              <a:t>Erode what </a:t>
+              <a:t>Maintain global </a:t>
             </a:r>
             <a:r>
               <a:rPr lang="en-US" sz="1000" dirty="0" smtClean="0"/>
-              <a:t>makes America superior.</a:t>
+              <a:t>dominance</a:t>
             </a:r>
             <a:endParaRPr lang="en-US" sz="1000" dirty="0"/>
           </a:p>
@@ -14110,13 +13470,13 @@
       </p:sp>
       <p:sp>
         <p:nvSpPr>
-          <p:cNvPr id="45" name="Rounded Rectangle 44"/>
+          <p:cNvPr id="14" name="Rounded Rectangle 13"/>
           <p:cNvSpPr/>
           <p:nvPr/>
         </p:nvSpPr>
         <p:spPr>
           <a:xfrm>
-            <a:off x="6388855" y="1204426"/>
+            <a:off x="1835927" y="2933700"/>
             <a:ext cx="1371600" cy="914400"/>
           </a:xfrm>
           <a:prstGeom prst="roundRect">
@@ -14159,7 +13519,11 @@
             <a:pPr algn="ctr"/>
             <a:r>
               <a:rPr lang="en-US" sz="1000" dirty="0" smtClean="0"/>
-              <a:t>This policy discriminates by showing favoritism to one group over all others.</a:t>
+              <a:t>This policy enables the country to benefit </a:t>
+            </a:r>
+            <a:r>
+              <a:rPr lang="en-US" sz="1000" dirty="0" smtClean="0"/>
+              <a:t>from the innovativeness of small businesses.</a:t>
             </a:r>
             <a:endParaRPr lang="en-US" sz="1000" dirty="0"/>
           </a:p>
@@ -14167,16 +13531,16 @@
       </p:sp>
       <p:cxnSp>
         <p:nvCxnSpPr>
-          <p:cNvPr id="46" name="Straight Arrow Connector 45"/>
+          <p:cNvPr id="15" name="Straight Arrow Connector 14"/>
           <p:cNvCxnSpPr>
-            <a:stCxn id="43" idx="6"/>
-            <a:endCxn id="45" idx="1"/>
+            <a:stCxn id="12" idx="6"/>
+            <a:endCxn id="14" idx="1"/>
           </p:cNvCxnSpPr>
           <p:nvPr/>
         </p:nvCxnSpPr>
         <p:spPr>
           <a:xfrm>
-            <a:off x="6031676" y="1661626"/>
+            <a:off x="1478748" y="3390900"/>
             <a:ext cx="357179" cy="0"/>
           </a:xfrm>
           <a:prstGeom prst="straightConnector1">
@@ -14206,17 +13570,17 @@
       </p:cxnSp>
       <p:cxnSp>
         <p:nvCxnSpPr>
-          <p:cNvPr id="47" name="Straight Arrow Connector 46"/>
+          <p:cNvPr id="16" name="Straight Arrow Connector 15"/>
           <p:cNvCxnSpPr>
-            <a:stCxn id="45" idx="3"/>
-            <a:endCxn id="44" idx="2"/>
+            <a:stCxn id="14" idx="3"/>
+            <a:endCxn id="13" idx="2"/>
           </p:cNvCxnSpPr>
           <p:nvPr/>
         </p:nvCxnSpPr>
         <p:spPr>
           <a:xfrm>
-            <a:off x="7760455" y="1661626"/>
-            <a:ext cx="385749" cy="0"/>
+            <a:off x="3207527" y="3390900"/>
+            <a:ext cx="385749" cy="542468"/>
           </a:xfrm>
           <a:prstGeom prst="straightConnector1">
             <a:avLst/>
@@ -14245,110 +13609,14 @@
       </p:cxnSp>
       <p:sp>
         <p:nvSpPr>
-          <p:cNvPr id="64" name="Rounded Rectangle 63"/>
+          <p:cNvPr id="17" name="Oval 16"/>
           <p:cNvSpPr/>
           <p:nvPr/>
         </p:nvSpPr>
         <p:spPr>
           <a:xfrm>
-            <a:off x="6388855" y="2461713"/>
-            <a:ext cx="1371600" cy="914400"/>
-          </a:xfrm>
-          <a:prstGeom prst="roundRect">
-            <a:avLst/>
-          </a:prstGeom>
-          <a:solidFill>
-            <a:schemeClr val="bg1">
-              <a:lumMod val="50000"/>
-            </a:schemeClr>
-          </a:solidFill>
-          <a:ln>
-            <a:solidFill>
-              <a:schemeClr val="tx1">
-                <a:lumMod val="65000"/>
-                <a:lumOff val="35000"/>
-              </a:schemeClr>
-            </a:solidFill>
-          </a:ln>
-        </p:spPr>
-        <p:style>
-          <a:lnRef idx="2">
-            <a:schemeClr val="accent1">
-              <a:shade val="50000"/>
-            </a:schemeClr>
-          </a:lnRef>
-          <a:fillRef idx="1">
-            <a:schemeClr val="accent1"/>
-          </a:fillRef>
-          <a:effectRef idx="0">
-            <a:schemeClr val="accent1"/>
-          </a:effectRef>
-          <a:fontRef idx="minor">
-            <a:schemeClr val="lt1"/>
-          </a:fontRef>
-        </p:style>
-        <p:txBody>
-          <a:bodyPr rtlCol="0" anchor="ctr"/>
-          <a:lstStyle/>
-          <a:p>
-            <a:pPr algn="ctr"/>
-            <a:r>
-              <a:rPr lang="en-US" sz="1000" dirty="0" smtClean="0"/>
-              <a:t>This policy replaces a research excellence criteria with a privilege criteria.</a:t>
-            </a:r>
-            <a:endParaRPr lang="en-US" sz="1000" dirty="0"/>
-          </a:p>
-        </p:txBody>
-      </p:sp>
-      <p:cxnSp>
-        <p:nvCxnSpPr>
-          <p:cNvPr id="65" name="Straight Arrow Connector 64"/>
-          <p:cNvCxnSpPr>
-            <a:stCxn id="64" idx="3"/>
-            <a:endCxn id="44" idx="3"/>
-          </p:cNvCxnSpPr>
-          <p:nvPr/>
-        </p:nvCxnSpPr>
-        <p:spPr>
-          <a:xfrm flipV="1">
-            <a:off x="7760455" y="1984915"/>
-            <a:ext cx="519660" cy="933998"/>
-          </a:xfrm>
-          <a:prstGeom prst="straightConnector1">
-            <a:avLst/>
-          </a:prstGeom>
-          <a:ln w="50800">
-            <a:solidFill>
-              <a:schemeClr val="tx1"/>
-            </a:solidFill>
-            <a:tailEnd type="triangle" w="med" len="med"/>
-          </a:ln>
-        </p:spPr>
-        <p:style>
-          <a:lnRef idx="1">
-            <a:schemeClr val="accent1"/>
-          </a:lnRef>
-          <a:fillRef idx="0">
-            <a:schemeClr val="accent1"/>
-          </a:fillRef>
-          <a:effectRef idx="0">
-            <a:schemeClr val="accent1"/>
-          </a:effectRef>
-          <a:fontRef idx="minor">
-            <a:schemeClr val="tx1"/>
-          </a:fontRef>
-        </p:style>
-      </p:cxnSp>
-      <p:sp>
-        <p:nvSpPr>
-          <p:cNvPr id="67" name="Oval 66"/>
-          <p:cNvSpPr/>
-          <p:nvPr/>
-        </p:nvSpPr>
-        <p:spPr>
-          <a:xfrm>
-            <a:off x="4660076" y="2947505"/>
-            <a:ext cx="1371600" cy="914400"/>
+            <a:off x="3593276" y="2491170"/>
+            <a:ext cx="914400" cy="914400"/>
           </a:xfrm>
           <a:prstGeom prst="ellipse">
             <a:avLst/>
@@ -14356,15 +13624,15 @@
         </p:spPr>
         <p:style>
           <a:lnRef idx="2">
-            <a:schemeClr val="accent2">
+            <a:schemeClr val="accent3">
               <a:shade val="50000"/>
             </a:schemeClr>
           </a:lnRef>
           <a:fillRef idx="1">
-            <a:schemeClr val="accent2"/>
+            <a:schemeClr val="accent3"/>
           </a:fillRef>
           <a:effectRef idx="0">
-            <a:schemeClr val="accent2"/>
+            <a:schemeClr val="accent3"/>
           </a:effectRef>
           <a:fontRef idx="minor">
             <a:schemeClr val="lt1"/>
@@ -14377,7 +13645,15 @@
             <a:pPr algn="ctr"/>
             <a:r>
               <a:rPr lang="en-US" sz="1000" dirty="0" smtClean="0"/>
-              <a:t>America’s research excellence is being eroded.</a:t>
+              <a:t>Generate </a:t>
+            </a:r>
+            <a:r>
+              <a:rPr lang="en-US" sz="1000" dirty="0" smtClean="0"/>
+              <a:t>economic </a:t>
+            </a:r>
+            <a:r>
+              <a:rPr lang="en-US" sz="1000" dirty="0" smtClean="0"/>
+              <a:t>prosperity</a:t>
             </a:r>
             <a:endParaRPr lang="en-US" sz="1000" dirty="0"/>
           </a:p>
@@ -14385,237 +13661,17 @@
       </p:sp>
       <p:cxnSp>
         <p:nvCxnSpPr>
-          <p:cNvPr id="68" name="Straight Arrow Connector 67"/>
+          <p:cNvPr id="22" name="Straight Arrow Connector 21"/>
           <p:cNvCxnSpPr>
-            <a:stCxn id="67" idx="6"/>
-            <a:endCxn id="64" idx="1"/>
+            <a:stCxn id="14" idx="3"/>
+            <a:endCxn id="17" idx="2"/>
           </p:cNvCxnSpPr>
           <p:nvPr/>
         </p:nvCxnSpPr>
         <p:spPr>
           <a:xfrm flipV="1">
-            <a:off x="6031676" y="2918913"/>
-            <a:ext cx="357179" cy="485792"/>
-          </a:xfrm>
-          <a:prstGeom prst="straightConnector1">
-            <a:avLst/>
-          </a:prstGeom>
-          <a:ln w="50800">
-            <a:solidFill>
-              <a:schemeClr val="tx1"/>
-            </a:solidFill>
-            <a:tailEnd type="triangle" w="med" len="med"/>
-          </a:ln>
-        </p:spPr>
-        <p:style>
-          <a:lnRef idx="1">
-            <a:schemeClr val="accent1"/>
-          </a:lnRef>
-          <a:fillRef idx="0">
-            <a:schemeClr val="accent1"/>
-          </a:fillRef>
-          <a:effectRef idx="0">
-            <a:schemeClr val="accent1"/>
-          </a:effectRef>
-          <a:fontRef idx="minor">
-            <a:schemeClr val="tx1"/>
-          </a:fontRef>
-        </p:style>
-      </p:cxnSp>
-      <p:sp>
-        <p:nvSpPr>
-          <p:cNvPr id="69" name="Oval 68"/>
-          <p:cNvSpPr>
-            <a:spLocks/>
-          </p:cNvSpPr>
-          <p:nvPr/>
-        </p:nvSpPr>
-        <p:spPr>
-          <a:xfrm>
-            <a:off x="8146204" y="2461769"/>
-            <a:ext cx="914400" cy="914400"/>
-          </a:xfrm>
-          <a:prstGeom prst="ellipse">
-            <a:avLst/>
-          </a:prstGeom>
-        </p:spPr>
-        <p:style>
-          <a:lnRef idx="2">
-            <a:schemeClr val="accent2">
-              <a:shade val="50000"/>
-            </a:schemeClr>
-          </a:lnRef>
-          <a:fillRef idx="1">
-            <a:schemeClr val="accent2"/>
-          </a:fillRef>
-          <a:effectRef idx="0">
-            <a:schemeClr val="accent2"/>
-          </a:effectRef>
-          <a:fontRef idx="minor">
-            <a:schemeClr val="lt1"/>
-          </a:fontRef>
-        </p:style>
-        <p:txBody>
-          <a:bodyPr lIns="9144" rIns="9144" rtlCol="0" anchor="ctr"/>
-          <a:lstStyle/>
-          <a:p>
-            <a:pPr algn="ctr"/>
-            <a:r>
-              <a:rPr lang="en-US" sz="1000" dirty="0" smtClean="0"/>
-              <a:t>Loss of global dominance.</a:t>
-            </a:r>
-            <a:endParaRPr lang="en-US" sz="1000" dirty="0"/>
-          </a:p>
-        </p:txBody>
-      </p:sp>
-      <p:cxnSp>
-        <p:nvCxnSpPr>
-          <p:cNvPr id="74" name="Straight Arrow Connector 73"/>
-          <p:cNvCxnSpPr>
-            <a:stCxn id="64" idx="3"/>
-            <a:endCxn id="69" idx="2"/>
-          </p:cNvCxnSpPr>
-          <p:nvPr/>
-        </p:nvCxnSpPr>
-        <p:spPr>
-          <a:xfrm>
-            <a:off x="7760455" y="2918913"/>
-            <a:ext cx="385749" cy="56"/>
-          </a:xfrm>
-          <a:prstGeom prst="straightConnector1">
-            <a:avLst/>
-          </a:prstGeom>
-          <a:ln w="50800">
-            <a:solidFill>
-              <a:schemeClr val="tx1"/>
-            </a:solidFill>
-            <a:tailEnd type="triangle" w="med" len="med"/>
-          </a:ln>
-        </p:spPr>
-        <p:style>
-          <a:lnRef idx="1">
-            <a:schemeClr val="accent1"/>
-          </a:lnRef>
-          <a:fillRef idx="0">
-            <a:schemeClr val="accent1"/>
-          </a:fillRef>
-          <a:effectRef idx="0">
-            <a:schemeClr val="accent1"/>
-          </a:effectRef>
-          <a:fontRef idx="minor">
-            <a:schemeClr val="tx1"/>
-          </a:fontRef>
-        </p:style>
-      </p:cxnSp>
-      <p:sp>
-        <p:nvSpPr>
-          <p:cNvPr id="79" name="Rounded Rectangle 78"/>
-          <p:cNvSpPr/>
-          <p:nvPr/>
-        </p:nvSpPr>
-        <p:spPr>
-          <a:xfrm>
-            <a:off x="6388855" y="3480039"/>
-            <a:ext cx="1371600" cy="914400"/>
-          </a:xfrm>
-          <a:prstGeom prst="roundRect">
-            <a:avLst/>
-          </a:prstGeom>
-          <a:solidFill>
-            <a:schemeClr val="bg1">
-              <a:lumMod val="50000"/>
-            </a:schemeClr>
-          </a:solidFill>
-          <a:ln>
-            <a:solidFill>
-              <a:schemeClr val="tx1">
-                <a:lumMod val="65000"/>
-                <a:lumOff val="35000"/>
-              </a:schemeClr>
-            </a:solidFill>
-          </a:ln>
-        </p:spPr>
-        <p:style>
-          <a:lnRef idx="2">
-            <a:schemeClr val="accent1">
-              <a:shade val="50000"/>
-            </a:schemeClr>
-          </a:lnRef>
-          <a:fillRef idx="1">
-            <a:schemeClr val="accent1"/>
-          </a:fillRef>
-          <a:effectRef idx="0">
-            <a:schemeClr val="accent1"/>
-          </a:effectRef>
-          <a:fontRef idx="minor">
-            <a:schemeClr val="lt1"/>
-          </a:fontRef>
-        </p:style>
-        <p:txBody>
-          <a:bodyPr rtlCol="0" anchor="ctr"/>
-          <a:lstStyle/>
-          <a:p>
-            <a:pPr algn="ctr"/>
-            <a:r>
-              <a:rPr lang="en-US" sz="1000" dirty="0" smtClean="0"/>
-              <a:t>This policy will result in sub-par research and development.</a:t>
-            </a:r>
-            <a:endParaRPr lang="en-US" sz="1000" dirty="0"/>
-          </a:p>
-        </p:txBody>
-      </p:sp>
-      <p:cxnSp>
-        <p:nvCxnSpPr>
-          <p:cNvPr id="81" name="Straight Arrow Connector 80"/>
-          <p:cNvCxnSpPr>
-            <a:stCxn id="67" idx="6"/>
-            <a:endCxn id="79" idx="1"/>
-          </p:cNvCxnSpPr>
-          <p:nvPr/>
-        </p:nvCxnSpPr>
-        <p:spPr>
-          <a:xfrm>
-            <a:off x="6031676" y="3404705"/>
-            <a:ext cx="357179" cy="532534"/>
-          </a:xfrm>
-          <a:prstGeom prst="straightConnector1">
-            <a:avLst/>
-          </a:prstGeom>
-          <a:ln w="50800">
-            <a:solidFill>
-              <a:schemeClr val="tx1"/>
-            </a:solidFill>
-            <a:tailEnd type="triangle" w="med" len="med"/>
-          </a:ln>
-        </p:spPr>
-        <p:style>
-          <a:lnRef idx="1">
-            <a:schemeClr val="accent1"/>
-          </a:lnRef>
-          <a:fillRef idx="0">
-            <a:schemeClr val="accent1"/>
-          </a:fillRef>
-          <a:effectRef idx="0">
-            <a:schemeClr val="accent1"/>
-          </a:effectRef>
-          <a:fontRef idx="minor">
-            <a:schemeClr val="tx1"/>
-          </a:fontRef>
-        </p:style>
-      </p:cxnSp>
-      <p:cxnSp>
-        <p:nvCxnSpPr>
-          <p:cNvPr id="82" name="Straight Arrow Connector 81"/>
-          <p:cNvCxnSpPr>
-            <a:stCxn id="79" idx="3"/>
-            <a:endCxn id="69" idx="3"/>
-          </p:cNvCxnSpPr>
-          <p:nvPr/>
-        </p:nvCxnSpPr>
-        <p:spPr>
-          <a:xfrm flipV="1">
-            <a:off x="7760455" y="3242258"/>
-            <a:ext cx="519660" cy="694981"/>
+            <a:off x="3207527" y="2948370"/>
+            <a:ext cx="385749" cy="442530"/>
           </a:xfrm>
           <a:prstGeom prst="straightConnector1">
             <a:avLst/>
@@ -14704,6 +13760,1045 @@
           </a:p>
         </p:txBody>
       </p:sp>
+      <p:grpSp>
+        <p:nvGrpSpPr>
+          <p:cNvPr id="23" name="Group 22"/>
+          <p:cNvGrpSpPr/>
+          <p:nvPr/>
+        </p:nvGrpSpPr>
+        <p:grpSpPr>
+          <a:xfrm>
+            <a:off x="107148" y="4256657"/>
+            <a:ext cx="4400528" cy="1303570"/>
+            <a:chOff x="107148" y="4256657"/>
+            <a:chExt cx="4400528" cy="1303570"/>
+          </a:xfrm>
+        </p:grpSpPr>
+        <p:sp>
+          <p:nvSpPr>
+            <p:cNvPr id="27" name="Oval 26"/>
+            <p:cNvSpPr/>
+            <p:nvPr/>
+          </p:nvSpPr>
+          <p:spPr>
+            <a:xfrm>
+              <a:off x="107148" y="4645827"/>
+              <a:ext cx="1371600" cy="914400"/>
+            </a:xfrm>
+            <a:prstGeom prst="ellipse">
+              <a:avLst/>
+            </a:prstGeom>
+          </p:spPr>
+          <p:style>
+            <a:lnRef idx="2">
+              <a:schemeClr val="accent2">
+                <a:shade val="50000"/>
+              </a:schemeClr>
+            </a:lnRef>
+            <a:fillRef idx="1">
+              <a:schemeClr val="accent2"/>
+            </a:fillRef>
+            <a:effectRef idx="0">
+              <a:schemeClr val="accent2"/>
+            </a:effectRef>
+            <a:fontRef idx="minor">
+              <a:schemeClr val="lt1"/>
+            </a:fontRef>
+          </p:style>
+          <p:txBody>
+            <a:bodyPr lIns="9144" rIns="9144" rtlCol="0" anchor="ctr"/>
+            <a:lstStyle/>
+            <a:p>
+              <a:pPr algn="ctr"/>
+              <a:r>
+                <a:rPr lang="en-US" sz="1000" dirty="0" smtClean="0"/>
+                <a:t>America’s used to have a growing economy and global dominance.</a:t>
+              </a:r>
+              <a:endParaRPr lang="en-US" sz="1000" dirty="0"/>
+            </a:p>
+          </p:txBody>
+        </p:sp>
+        <p:sp>
+          <p:nvSpPr>
+            <p:cNvPr id="28" name="Oval 27"/>
+            <p:cNvSpPr>
+              <a:spLocks/>
+            </p:cNvSpPr>
+            <p:nvPr/>
+          </p:nvSpPr>
+          <p:spPr>
+            <a:xfrm>
+              <a:off x="3593276" y="4645827"/>
+              <a:ext cx="914400" cy="914400"/>
+            </a:xfrm>
+            <a:prstGeom prst="ellipse">
+              <a:avLst/>
+            </a:prstGeom>
+          </p:spPr>
+          <p:style>
+            <a:lnRef idx="2">
+              <a:schemeClr val="accent3">
+                <a:shade val="50000"/>
+              </a:schemeClr>
+            </a:lnRef>
+            <a:fillRef idx="1">
+              <a:schemeClr val="accent3"/>
+            </a:fillRef>
+            <a:effectRef idx="0">
+              <a:schemeClr val="accent3"/>
+            </a:effectRef>
+            <a:fontRef idx="minor">
+              <a:schemeClr val="lt1"/>
+            </a:fontRef>
+          </p:style>
+          <p:txBody>
+            <a:bodyPr lIns="9144" rIns="9144" rtlCol="0" anchor="ctr"/>
+            <a:lstStyle/>
+            <a:p>
+              <a:pPr algn="ctr"/>
+              <a:r>
+                <a:rPr lang="en-US" sz="1000" dirty="0" smtClean="0"/>
+                <a:t>Generate economic </a:t>
+              </a:r>
+              <a:r>
+                <a:rPr lang="en-US" sz="1000" dirty="0" smtClean="0"/>
+                <a:t>prosperity</a:t>
+              </a:r>
+              <a:endParaRPr lang="en-US" sz="1000" dirty="0"/>
+            </a:p>
+          </p:txBody>
+        </p:sp>
+        <p:sp>
+          <p:nvSpPr>
+            <p:cNvPr id="29" name="Rounded Rectangle 28"/>
+            <p:cNvSpPr/>
+            <p:nvPr/>
+          </p:nvSpPr>
+          <p:spPr>
+            <a:xfrm>
+              <a:off x="1835927" y="4645827"/>
+              <a:ext cx="1371600" cy="914400"/>
+            </a:xfrm>
+            <a:prstGeom prst="roundRect">
+              <a:avLst/>
+            </a:prstGeom>
+            <a:solidFill>
+              <a:schemeClr val="bg1">
+                <a:lumMod val="50000"/>
+              </a:schemeClr>
+            </a:solidFill>
+            <a:ln>
+              <a:solidFill>
+                <a:schemeClr val="tx1">
+                  <a:lumMod val="65000"/>
+                  <a:lumOff val="35000"/>
+                </a:schemeClr>
+              </a:solidFill>
+            </a:ln>
+          </p:spPr>
+          <p:style>
+            <a:lnRef idx="2">
+              <a:schemeClr val="accent1">
+                <a:shade val="50000"/>
+              </a:schemeClr>
+            </a:lnRef>
+            <a:fillRef idx="1">
+              <a:schemeClr val="accent1"/>
+            </a:fillRef>
+            <a:effectRef idx="0">
+              <a:schemeClr val="accent1"/>
+            </a:effectRef>
+            <a:fontRef idx="minor">
+              <a:schemeClr val="lt1"/>
+            </a:fontRef>
+          </p:style>
+          <p:txBody>
+            <a:bodyPr rtlCol="0" anchor="ctr"/>
+            <a:lstStyle/>
+            <a:p>
+              <a:pPr algn="ctr"/>
+              <a:r>
+                <a:rPr lang="en-US" sz="1000" dirty="0" smtClean="0"/>
+                <a:t>This policy enables America to produce the technological </a:t>
+              </a:r>
+              <a:r>
+                <a:rPr lang="en-US" sz="1000" dirty="0" smtClean="0"/>
+                <a:t>innovation necessary </a:t>
+              </a:r>
+              <a:r>
+                <a:rPr lang="en-US" sz="1000" dirty="0" smtClean="0"/>
+                <a:t>for its protection and economic growth.</a:t>
+              </a:r>
+              <a:endParaRPr lang="en-US" sz="1000" dirty="0"/>
+            </a:p>
+          </p:txBody>
+        </p:sp>
+        <p:cxnSp>
+          <p:nvCxnSpPr>
+            <p:cNvPr id="30" name="Straight Arrow Connector 29"/>
+            <p:cNvCxnSpPr>
+              <a:stCxn id="27" idx="6"/>
+              <a:endCxn id="29" idx="1"/>
+            </p:cNvCxnSpPr>
+            <p:nvPr/>
+          </p:nvCxnSpPr>
+          <p:spPr>
+            <a:xfrm>
+              <a:off x="1478748" y="5103027"/>
+              <a:ext cx="357179" cy="0"/>
+            </a:xfrm>
+            <a:prstGeom prst="straightConnector1">
+              <a:avLst/>
+            </a:prstGeom>
+            <a:ln w="50800">
+              <a:solidFill>
+                <a:schemeClr val="tx1"/>
+              </a:solidFill>
+              <a:tailEnd type="triangle" w="med" len="med"/>
+            </a:ln>
+          </p:spPr>
+          <p:style>
+            <a:lnRef idx="1">
+              <a:schemeClr val="accent1"/>
+            </a:lnRef>
+            <a:fillRef idx="0">
+              <a:schemeClr val="accent1"/>
+            </a:fillRef>
+            <a:effectRef idx="0">
+              <a:schemeClr val="accent1"/>
+            </a:effectRef>
+            <a:fontRef idx="minor">
+              <a:schemeClr val="tx1"/>
+            </a:fontRef>
+          </p:style>
+        </p:cxnSp>
+        <p:cxnSp>
+          <p:nvCxnSpPr>
+            <p:cNvPr id="31" name="Straight Arrow Connector 30"/>
+            <p:cNvCxnSpPr>
+              <a:stCxn id="29" idx="3"/>
+              <a:endCxn id="28" idx="2"/>
+            </p:cNvCxnSpPr>
+            <p:nvPr/>
+          </p:nvCxnSpPr>
+          <p:spPr>
+            <a:xfrm>
+              <a:off x="3207527" y="5103027"/>
+              <a:ext cx="385749" cy="0"/>
+            </a:xfrm>
+            <a:prstGeom prst="straightConnector1">
+              <a:avLst/>
+            </a:prstGeom>
+            <a:ln w="50800">
+              <a:solidFill>
+                <a:schemeClr val="tx1"/>
+              </a:solidFill>
+              <a:tailEnd type="triangle" w="med" len="med"/>
+            </a:ln>
+          </p:spPr>
+          <p:style>
+            <a:lnRef idx="1">
+              <a:schemeClr val="accent1"/>
+            </a:lnRef>
+            <a:fillRef idx="0">
+              <a:schemeClr val="accent1"/>
+            </a:fillRef>
+            <a:effectRef idx="0">
+              <a:schemeClr val="accent1"/>
+            </a:effectRef>
+            <a:fontRef idx="minor">
+              <a:schemeClr val="tx1"/>
+            </a:fontRef>
+          </p:style>
+        </p:cxnSp>
+        <p:cxnSp>
+          <p:nvCxnSpPr>
+            <p:cNvPr id="48" name="Straight Arrow Connector 47"/>
+            <p:cNvCxnSpPr>
+              <a:stCxn id="29" idx="3"/>
+              <a:endCxn id="13" idx="3"/>
+            </p:cNvCxnSpPr>
+            <p:nvPr/>
+          </p:nvCxnSpPr>
+          <p:spPr>
+            <a:xfrm flipV="1">
+              <a:off x="3207527" y="4256657"/>
+              <a:ext cx="519660" cy="846370"/>
+            </a:xfrm>
+            <a:prstGeom prst="straightConnector1">
+              <a:avLst/>
+            </a:prstGeom>
+            <a:ln w="50800">
+              <a:solidFill>
+                <a:schemeClr val="tx1"/>
+              </a:solidFill>
+              <a:tailEnd type="triangle" w="med" len="med"/>
+            </a:ln>
+          </p:spPr>
+          <p:style>
+            <a:lnRef idx="1">
+              <a:schemeClr val="accent1"/>
+            </a:lnRef>
+            <a:fillRef idx="0">
+              <a:schemeClr val="accent1"/>
+            </a:fillRef>
+            <a:effectRef idx="0">
+              <a:schemeClr val="accent1"/>
+            </a:effectRef>
+            <a:fontRef idx="minor">
+              <a:schemeClr val="tx1"/>
+            </a:fontRef>
+          </p:style>
+        </p:cxnSp>
+      </p:grpSp>
+      <p:grpSp>
+        <p:nvGrpSpPr>
+          <p:cNvPr id="32" name="Group 31"/>
+          <p:cNvGrpSpPr/>
+          <p:nvPr/>
+        </p:nvGrpSpPr>
+        <p:grpSpPr>
+          <a:xfrm>
+            <a:off x="4572000" y="1122599"/>
+            <a:ext cx="4488604" cy="4572000"/>
+            <a:chOff x="4572000" y="1122599"/>
+            <a:chExt cx="4488604" cy="4572000"/>
+          </a:xfrm>
+        </p:grpSpPr>
+        <p:cxnSp>
+          <p:nvCxnSpPr>
+            <p:cNvPr id="42" name="Straight Connector 41"/>
+            <p:cNvCxnSpPr/>
+            <p:nvPr/>
+          </p:nvCxnSpPr>
+          <p:spPr>
+            <a:xfrm>
+              <a:off x="4572000" y="1122599"/>
+              <a:ext cx="0" cy="4572000"/>
+            </a:xfrm>
+            <a:prstGeom prst="line">
+              <a:avLst/>
+            </a:prstGeom>
+            <a:ln w="19050">
+              <a:prstDash val="sysDash"/>
+            </a:ln>
+          </p:spPr>
+          <p:style>
+            <a:lnRef idx="1">
+              <a:schemeClr val="accent1"/>
+            </a:lnRef>
+            <a:fillRef idx="0">
+              <a:schemeClr val="accent1"/>
+            </a:fillRef>
+            <a:effectRef idx="0">
+              <a:schemeClr val="accent1"/>
+            </a:effectRef>
+            <a:fontRef idx="minor">
+              <a:schemeClr val="tx1"/>
+            </a:fontRef>
+          </p:style>
+        </p:cxnSp>
+        <p:sp>
+          <p:nvSpPr>
+            <p:cNvPr id="43" name="Oval 42"/>
+            <p:cNvSpPr/>
+            <p:nvPr/>
+          </p:nvSpPr>
+          <p:spPr>
+            <a:xfrm>
+              <a:off x="4660076" y="1204426"/>
+              <a:ext cx="1371600" cy="914400"/>
+            </a:xfrm>
+            <a:prstGeom prst="ellipse">
+              <a:avLst/>
+            </a:prstGeom>
+          </p:spPr>
+          <p:style>
+            <a:lnRef idx="2">
+              <a:schemeClr val="accent2">
+                <a:shade val="50000"/>
+              </a:schemeClr>
+            </a:lnRef>
+            <a:fillRef idx="1">
+              <a:schemeClr val="accent2"/>
+            </a:fillRef>
+            <a:effectRef idx="0">
+              <a:schemeClr val="accent2"/>
+            </a:effectRef>
+            <a:fontRef idx="minor">
+              <a:schemeClr val="lt1"/>
+            </a:fontRef>
+          </p:style>
+          <p:txBody>
+            <a:bodyPr lIns="9144" rIns="9144" rtlCol="0" anchor="ctr"/>
+            <a:lstStyle/>
+            <a:p>
+              <a:pPr algn="ctr"/>
+              <a:r>
+                <a:rPr lang="en-US" sz="1000" dirty="0" smtClean="0"/>
+                <a:t>America is straying from </a:t>
+              </a:r>
+              <a:r>
+                <a:rPr lang="en-US" sz="1000" dirty="0" smtClean="0"/>
+                <a:t>its</a:t>
+              </a:r>
+              <a:r>
+                <a:rPr lang="en-US" sz="1000" dirty="0" smtClean="0"/>
+                <a:t> </a:t>
+              </a:r>
+              <a:r>
+                <a:rPr lang="en-US" sz="1000" dirty="0" smtClean="0"/>
+                <a:t>guiding aspirational principles.</a:t>
+              </a:r>
+              <a:endParaRPr lang="en-US" sz="1000" dirty="0"/>
+            </a:p>
+          </p:txBody>
+        </p:sp>
+        <p:sp>
+          <p:nvSpPr>
+            <p:cNvPr id="44" name="Oval 43"/>
+            <p:cNvSpPr>
+              <a:spLocks/>
+            </p:cNvSpPr>
+            <p:nvPr/>
+          </p:nvSpPr>
+          <p:spPr>
+            <a:xfrm>
+              <a:off x="8146204" y="1204426"/>
+              <a:ext cx="914400" cy="914400"/>
+            </a:xfrm>
+            <a:prstGeom prst="ellipse">
+              <a:avLst/>
+            </a:prstGeom>
+          </p:spPr>
+          <p:style>
+            <a:lnRef idx="2">
+              <a:schemeClr val="accent2">
+                <a:shade val="50000"/>
+              </a:schemeClr>
+            </a:lnRef>
+            <a:fillRef idx="1">
+              <a:schemeClr val="accent2"/>
+            </a:fillRef>
+            <a:effectRef idx="0">
+              <a:schemeClr val="accent2"/>
+            </a:effectRef>
+            <a:fontRef idx="minor">
+              <a:schemeClr val="lt1"/>
+            </a:fontRef>
+          </p:style>
+          <p:txBody>
+            <a:bodyPr lIns="9144" rIns="9144" rtlCol="0" anchor="ctr"/>
+            <a:lstStyle/>
+            <a:p>
+              <a:pPr algn="ctr"/>
+              <a:r>
+                <a:rPr lang="en-US" sz="1000" dirty="0" smtClean="0"/>
+                <a:t>Erode what makes America </a:t>
+              </a:r>
+              <a:r>
+                <a:rPr lang="en-US" sz="1000" dirty="0" smtClean="0"/>
+                <a:t>superior</a:t>
+              </a:r>
+              <a:endParaRPr lang="en-US" sz="1000" dirty="0"/>
+            </a:p>
+          </p:txBody>
+        </p:sp>
+        <p:sp>
+          <p:nvSpPr>
+            <p:cNvPr id="45" name="Rounded Rectangle 44"/>
+            <p:cNvSpPr/>
+            <p:nvPr/>
+          </p:nvSpPr>
+          <p:spPr>
+            <a:xfrm>
+              <a:off x="6388855" y="1204426"/>
+              <a:ext cx="1371600" cy="914400"/>
+            </a:xfrm>
+            <a:prstGeom prst="roundRect">
+              <a:avLst/>
+            </a:prstGeom>
+            <a:solidFill>
+              <a:schemeClr val="bg1">
+                <a:lumMod val="50000"/>
+              </a:schemeClr>
+            </a:solidFill>
+            <a:ln>
+              <a:solidFill>
+                <a:schemeClr val="tx1">
+                  <a:lumMod val="65000"/>
+                  <a:lumOff val="35000"/>
+                </a:schemeClr>
+              </a:solidFill>
+            </a:ln>
+          </p:spPr>
+          <p:style>
+            <a:lnRef idx="2">
+              <a:schemeClr val="accent1">
+                <a:shade val="50000"/>
+              </a:schemeClr>
+            </a:lnRef>
+            <a:fillRef idx="1">
+              <a:schemeClr val="accent1"/>
+            </a:fillRef>
+            <a:effectRef idx="0">
+              <a:schemeClr val="accent1"/>
+            </a:effectRef>
+            <a:fontRef idx="minor">
+              <a:schemeClr val="lt1"/>
+            </a:fontRef>
+          </p:style>
+          <p:txBody>
+            <a:bodyPr rtlCol="0" anchor="ctr"/>
+            <a:lstStyle/>
+            <a:p>
+              <a:pPr algn="ctr"/>
+              <a:r>
+                <a:rPr lang="en-US" sz="1000" dirty="0" smtClean="0"/>
+                <a:t>This policy discriminates by showing favoritism to one group over all others.</a:t>
+              </a:r>
+              <a:endParaRPr lang="en-US" sz="1000" dirty="0"/>
+            </a:p>
+          </p:txBody>
+        </p:sp>
+        <p:cxnSp>
+          <p:nvCxnSpPr>
+            <p:cNvPr id="46" name="Straight Arrow Connector 45"/>
+            <p:cNvCxnSpPr>
+              <a:stCxn id="43" idx="6"/>
+              <a:endCxn id="45" idx="1"/>
+            </p:cNvCxnSpPr>
+            <p:nvPr/>
+          </p:nvCxnSpPr>
+          <p:spPr>
+            <a:xfrm>
+              <a:off x="6031676" y="1661626"/>
+              <a:ext cx="357179" cy="0"/>
+            </a:xfrm>
+            <a:prstGeom prst="straightConnector1">
+              <a:avLst/>
+            </a:prstGeom>
+            <a:ln w="50800">
+              <a:solidFill>
+                <a:schemeClr val="tx1"/>
+              </a:solidFill>
+              <a:tailEnd type="triangle" w="med" len="med"/>
+            </a:ln>
+          </p:spPr>
+          <p:style>
+            <a:lnRef idx="1">
+              <a:schemeClr val="accent1"/>
+            </a:lnRef>
+            <a:fillRef idx="0">
+              <a:schemeClr val="accent1"/>
+            </a:fillRef>
+            <a:effectRef idx="0">
+              <a:schemeClr val="accent1"/>
+            </a:effectRef>
+            <a:fontRef idx="minor">
+              <a:schemeClr val="tx1"/>
+            </a:fontRef>
+          </p:style>
+        </p:cxnSp>
+        <p:cxnSp>
+          <p:nvCxnSpPr>
+            <p:cNvPr id="47" name="Straight Arrow Connector 46"/>
+            <p:cNvCxnSpPr>
+              <a:stCxn id="45" idx="3"/>
+              <a:endCxn id="44" idx="2"/>
+            </p:cNvCxnSpPr>
+            <p:nvPr/>
+          </p:nvCxnSpPr>
+          <p:spPr>
+            <a:xfrm>
+              <a:off x="7760455" y="1661626"/>
+              <a:ext cx="385749" cy="0"/>
+            </a:xfrm>
+            <a:prstGeom prst="straightConnector1">
+              <a:avLst/>
+            </a:prstGeom>
+            <a:ln w="50800">
+              <a:solidFill>
+                <a:schemeClr val="tx1"/>
+              </a:solidFill>
+              <a:tailEnd type="triangle" w="med" len="med"/>
+            </a:ln>
+          </p:spPr>
+          <p:style>
+            <a:lnRef idx="1">
+              <a:schemeClr val="accent1"/>
+            </a:lnRef>
+            <a:fillRef idx="0">
+              <a:schemeClr val="accent1"/>
+            </a:fillRef>
+            <a:effectRef idx="0">
+              <a:schemeClr val="accent1"/>
+            </a:effectRef>
+            <a:fontRef idx="minor">
+              <a:schemeClr val="tx1"/>
+            </a:fontRef>
+          </p:style>
+        </p:cxnSp>
+        <p:sp>
+          <p:nvSpPr>
+            <p:cNvPr id="64" name="Rounded Rectangle 63"/>
+            <p:cNvSpPr/>
+            <p:nvPr/>
+          </p:nvSpPr>
+          <p:spPr>
+            <a:xfrm>
+              <a:off x="6388855" y="2461713"/>
+              <a:ext cx="1371600" cy="914400"/>
+            </a:xfrm>
+            <a:prstGeom prst="roundRect">
+              <a:avLst/>
+            </a:prstGeom>
+            <a:solidFill>
+              <a:schemeClr val="bg1">
+                <a:lumMod val="50000"/>
+              </a:schemeClr>
+            </a:solidFill>
+            <a:ln>
+              <a:solidFill>
+                <a:schemeClr val="tx1">
+                  <a:lumMod val="65000"/>
+                  <a:lumOff val="35000"/>
+                </a:schemeClr>
+              </a:solidFill>
+            </a:ln>
+          </p:spPr>
+          <p:style>
+            <a:lnRef idx="2">
+              <a:schemeClr val="accent1">
+                <a:shade val="50000"/>
+              </a:schemeClr>
+            </a:lnRef>
+            <a:fillRef idx="1">
+              <a:schemeClr val="accent1"/>
+            </a:fillRef>
+            <a:effectRef idx="0">
+              <a:schemeClr val="accent1"/>
+            </a:effectRef>
+            <a:fontRef idx="minor">
+              <a:schemeClr val="lt1"/>
+            </a:fontRef>
+          </p:style>
+          <p:txBody>
+            <a:bodyPr rtlCol="0" anchor="ctr"/>
+            <a:lstStyle/>
+            <a:p>
+              <a:pPr algn="ctr"/>
+              <a:r>
+                <a:rPr lang="en-US" sz="1000" dirty="0" smtClean="0"/>
+                <a:t>This policy replaces a research excellence criteria with a privilege criteria.</a:t>
+              </a:r>
+              <a:endParaRPr lang="en-US" sz="1000" dirty="0"/>
+            </a:p>
+          </p:txBody>
+        </p:sp>
+        <p:cxnSp>
+          <p:nvCxnSpPr>
+            <p:cNvPr id="65" name="Straight Arrow Connector 64"/>
+            <p:cNvCxnSpPr>
+              <a:stCxn id="64" idx="3"/>
+              <a:endCxn id="44" idx="3"/>
+            </p:cNvCxnSpPr>
+            <p:nvPr/>
+          </p:nvCxnSpPr>
+          <p:spPr>
+            <a:xfrm flipV="1">
+              <a:off x="7760455" y="1984915"/>
+              <a:ext cx="519660" cy="933998"/>
+            </a:xfrm>
+            <a:prstGeom prst="straightConnector1">
+              <a:avLst/>
+            </a:prstGeom>
+            <a:ln w="50800">
+              <a:solidFill>
+                <a:schemeClr val="tx1"/>
+              </a:solidFill>
+              <a:tailEnd type="triangle" w="med" len="med"/>
+            </a:ln>
+          </p:spPr>
+          <p:style>
+            <a:lnRef idx="1">
+              <a:schemeClr val="accent1"/>
+            </a:lnRef>
+            <a:fillRef idx="0">
+              <a:schemeClr val="accent1"/>
+            </a:fillRef>
+            <a:effectRef idx="0">
+              <a:schemeClr val="accent1"/>
+            </a:effectRef>
+            <a:fontRef idx="minor">
+              <a:schemeClr val="tx1"/>
+            </a:fontRef>
+          </p:style>
+        </p:cxnSp>
+        <p:sp>
+          <p:nvSpPr>
+            <p:cNvPr id="67" name="Oval 66"/>
+            <p:cNvSpPr/>
+            <p:nvPr/>
+          </p:nvSpPr>
+          <p:spPr>
+            <a:xfrm>
+              <a:off x="4660076" y="2461713"/>
+              <a:ext cx="1371600" cy="914400"/>
+            </a:xfrm>
+            <a:prstGeom prst="ellipse">
+              <a:avLst/>
+            </a:prstGeom>
+          </p:spPr>
+          <p:style>
+            <a:lnRef idx="2">
+              <a:schemeClr val="accent2">
+                <a:shade val="50000"/>
+              </a:schemeClr>
+            </a:lnRef>
+            <a:fillRef idx="1">
+              <a:schemeClr val="accent2"/>
+            </a:fillRef>
+            <a:effectRef idx="0">
+              <a:schemeClr val="accent2"/>
+            </a:effectRef>
+            <a:fontRef idx="minor">
+              <a:schemeClr val="lt1"/>
+            </a:fontRef>
+          </p:style>
+          <p:txBody>
+            <a:bodyPr lIns="9144" rIns="9144" rtlCol="0" anchor="ctr"/>
+            <a:lstStyle/>
+            <a:p>
+              <a:pPr algn="ctr"/>
+              <a:r>
+                <a:rPr lang="en-US" sz="1000" dirty="0" smtClean="0"/>
+                <a:t>Changing the  formula  for how funding is distributed is dangerous.</a:t>
+              </a:r>
+              <a:endParaRPr lang="en-US" sz="1000" dirty="0"/>
+            </a:p>
+          </p:txBody>
+        </p:sp>
+        <p:cxnSp>
+          <p:nvCxnSpPr>
+            <p:cNvPr id="68" name="Straight Arrow Connector 67"/>
+            <p:cNvCxnSpPr>
+              <a:stCxn id="67" idx="6"/>
+              <a:endCxn id="64" idx="1"/>
+            </p:cNvCxnSpPr>
+            <p:nvPr/>
+          </p:nvCxnSpPr>
+          <p:spPr>
+            <a:xfrm>
+              <a:off x="6031676" y="2918913"/>
+              <a:ext cx="357179" cy="0"/>
+            </a:xfrm>
+            <a:prstGeom prst="straightConnector1">
+              <a:avLst/>
+            </a:prstGeom>
+            <a:ln w="50800">
+              <a:solidFill>
+                <a:schemeClr val="tx1"/>
+              </a:solidFill>
+              <a:tailEnd type="triangle" w="med" len="med"/>
+            </a:ln>
+          </p:spPr>
+          <p:style>
+            <a:lnRef idx="1">
+              <a:schemeClr val="accent1"/>
+            </a:lnRef>
+            <a:fillRef idx="0">
+              <a:schemeClr val="accent1"/>
+            </a:fillRef>
+            <a:effectRef idx="0">
+              <a:schemeClr val="accent1"/>
+            </a:effectRef>
+            <a:fontRef idx="minor">
+              <a:schemeClr val="tx1"/>
+            </a:fontRef>
+          </p:style>
+        </p:cxnSp>
+        <p:sp>
+          <p:nvSpPr>
+            <p:cNvPr id="69" name="Oval 68"/>
+            <p:cNvSpPr>
+              <a:spLocks/>
+            </p:cNvSpPr>
+            <p:nvPr/>
+          </p:nvSpPr>
+          <p:spPr>
+            <a:xfrm>
+              <a:off x="8146204" y="2877460"/>
+              <a:ext cx="914400" cy="914400"/>
+            </a:xfrm>
+            <a:prstGeom prst="ellipse">
+              <a:avLst/>
+            </a:prstGeom>
+          </p:spPr>
+          <p:style>
+            <a:lnRef idx="2">
+              <a:schemeClr val="accent2">
+                <a:shade val="50000"/>
+              </a:schemeClr>
+            </a:lnRef>
+            <a:fillRef idx="1">
+              <a:schemeClr val="accent2"/>
+            </a:fillRef>
+            <a:effectRef idx="0">
+              <a:schemeClr val="accent2"/>
+            </a:effectRef>
+            <a:fontRef idx="minor">
+              <a:schemeClr val="lt1"/>
+            </a:fontRef>
+          </p:style>
+          <p:txBody>
+            <a:bodyPr lIns="9144" rIns="9144" rtlCol="0" anchor="ctr"/>
+            <a:lstStyle/>
+            <a:p>
+              <a:pPr algn="ctr"/>
+              <a:r>
+                <a:rPr lang="en-US" sz="1000" dirty="0" smtClean="0"/>
+                <a:t>Loss of global </a:t>
+              </a:r>
+              <a:r>
+                <a:rPr lang="en-US" sz="1000" dirty="0" smtClean="0"/>
+                <a:t>dominance</a:t>
+              </a:r>
+              <a:endParaRPr lang="en-US" sz="1000" dirty="0"/>
+            </a:p>
+          </p:txBody>
+        </p:sp>
+        <p:cxnSp>
+          <p:nvCxnSpPr>
+            <p:cNvPr id="74" name="Straight Arrow Connector 73"/>
+            <p:cNvCxnSpPr>
+              <a:stCxn id="64" idx="3"/>
+              <a:endCxn id="69" idx="1"/>
+            </p:cNvCxnSpPr>
+            <p:nvPr/>
+          </p:nvCxnSpPr>
+          <p:spPr>
+            <a:xfrm>
+              <a:off x="7760455" y="2918913"/>
+              <a:ext cx="519660" cy="92458"/>
+            </a:xfrm>
+            <a:prstGeom prst="straightConnector1">
+              <a:avLst/>
+            </a:prstGeom>
+            <a:ln w="50800">
+              <a:solidFill>
+                <a:schemeClr val="tx1"/>
+              </a:solidFill>
+              <a:tailEnd type="triangle" w="med" len="med"/>
+            </a:ln>
+          </p:spPr>
+          <p:style>
+            <a:lnRef idx="1">
+              <a:schemeClr val="accent1"/>
+            </a:lnRef>
+            <a:fillRef idx="0">
+              <a:schemeClr val="accent1"/>
+            </a:fillRef>
+            <a:effectRef idx="0">
+              <a:schemeClr val="accent1"/>
+            </a:effectRef>
+            <a:fontRef idx="minor">
+              <a:schemeClr val="tx1"/>
+            </a:fontRef>
+          </p:style>
+        </p:cxnSp>
+        <p:sp>
+          <p:nvSpPr>
+            <p:cNvPr id="79" name="Rounded Rectangle 78"/>
+            <p:cNvSpPr/>
+            <p:nvPr/>
+          </p:nvSpPr>
+          <p:spPr>
+            <a:xfrm>
+              <a:off x="6388855" y="3767130"/>
+              <a:ext cx="1371600" cy="914400"/>
+            </a:xfrm>
+            <a:prstGeom prst="roundRect">
+              <a:avLst/>
+            </a:prstGeom>
+            <a:solidFill>
+              <a:schemeClr val="bg1">
+                <a:lumMod val="50000"/>
+              </a:schemeClr>
+            </a:solidFill>
+            <a:ln>
+              <a:solidFill>
+                <a:schemeClr val="tx1">
+                  <a:lumMod val="65000"/>
+                  <a:lumOff val="35000"/>
+                </a:schemeClr>
+              </a:solidFill>
+            </a:ln>
+          </p:spPr>
+          <p:style>
+            <a:lnRef idx="2">
+              <a:schemeClr val="accent1">
+                <a:shade val="50000"/>
+              </a:schemeClr>
+            </a:lnRef>
+            <a:fillRef idx="1">
+              <a:schemeClr val="accent1"/>
+            </a:fillRef>
+            <a:effectRef idx="0">
+              <a:schemeClr val="accent1"/>
+            </a:effectRef>
+            <a:fontRef idx="minor">
+              <a:schemeClr val="lt1"/>
+            </a:fontRef>
+          </p:style>
+          <p:txBody>
+            <a:bodyPr rtlCol="0" anchor="ctr"/>
+            <a:lstStyle/>
+            <a:p>
+              <a:pPr algn="ctr"/>
+              <a:r>
+                <a:rPr lang="en-US" sz="1000" dirty="0" smtClean="0"/>
+                <a:t>This policy will result in sub-par research and development.</a:t>
+              </a:r>
+              <a:endParaRPr lang="en-US" sz="1000" dirty="0"/>
+            </a:p>
+          </p:txBody>
+        </p:sp>
+        <p:cxnSp>
+          <p:nvCxnSpPr>
+            <p:cNvPr id="81" name="Straight Arrow Connector 80"/>
+            <p:cNvCxnSpPr>
+              <a:stCxn id="50" idx="6"/>
+              <a:endCxn id="79" idx="1"/>
+            </p:cNvCxnSpPr>
+            <p:nvPr/>
+          </p:nvCxnSpPr>
+          <p:spPr>
+            <a:xfrm>
+              <a:off x="6031676" y="4224330"/>
+              <a:ext cx="357179" cy="0"/>
+            </a:xfrm>
+            <a:prstGeom prst="straightConnector1">
+              <a:avLst/>
+            </a:prstGeom>
+            <a:ln w="50800">
+              <a:solidFill>
+                <a:schemeClr val="tx1"/>
+              </a:solidFill>
+              <a:tailEnd type="triangle" w="med" len="med"/>
+            </a:ln>
+          </p:spPr>
+          <p:style>
+            <a:lnRef idx="1">
+              <a:schemeClr val="accent1"/>
+            </a:lnRef>
+            <a:fillRef idx="0">
+              <a:schemeClr val="accent1"/>
+            </a:fillRef>
+            <a:effectRef idx="0">
+              <a:schemeClr val="accent1"/>
+            </a:effectRef>
+            <a:fontRef idx="minor">
+              <a:schemeClr val="tx1"/>
+            </a:fontRef>
+          </p:style>
+        </p:cxnSp>
+        <p:cxnSp>
+          <p:nvCxnSpPr>
+            <p:cNvPr id="82" name="Straight Arrow Connector 81"/>
+            <p:cNvCxnSpPr>
+              <a:stCxn id="79" idx="3"/>
+              <a:endCxn id="69" idx="3"/>
+            </p:cNvCxnSpPr>
+            <p:nvPr/>
+          </p:nvCxnSpPr>
+          <p:spPr>
+            <a:xfrm flipV="1">
+              <a:off x="7760455" y="3657949"/>
+              <a:ext cx="519660" cy="566381"/>
+            </a:xfrm>
+            <a:prstGeom prst="straightConnector1">
+              <a:avLst/>
+            </a:prstGeom>
+            <a:ln w="50800">
+              <a:solidFill>
+                <a:schemeClr val="tx1"/>
+              </a:solidFill>
+              <a:tailEnd type="triangle" w="med" len="med"/>
+            </a:ln>
+          </p:spPr>
+          <p:style>
+            <a:lnRef idx="1">
+              <a:schemeClr val="accent1"/>
+            </a:lnRef>
+            <a:fillRef idx="0">
+              <a:schemeClr val="accent1"/>
+            </a:fillRef>
+            <a:effectRef idx="0">
+              <a:schemeClr val="accent1"/>
+            </a:effectRef>
+            <a:fontRef idx="minor">
+              <a:schemeClr val="tx1"/>
+            </a:fontRef>
+          </p:style>
+        </p:cxnSp>
+        <p:sp>
+          <p:nvSpPr>
+            <p:cNvPr id="50" name="Oval 49"/>
+            <p:cNvSpPr/>
+            <p:nvPr/>
+          </p:nvSpPr>
+          <p:spPr>
+            <a:xfrm>
+              <a:off x="4660076" y="3767130"/>
+              <a:ext cx="1371600" cy="914400"/>
+            </a:xfrm>
+            <a:prstGeom prst="ellipse">
+              <a:avLst/>
+            </a:prstGeom>
+          </p:spPr>
+          <p:style>
+            <a:lnRef idx="2">
+              <a:schemeClr val="accent2">
+                <a:shade val="50000"/>
+              </a:schemeClr>
+            </a:lnRef>
+            <a:fillRef idx="1">
+              <a:schemeClr val="accent2"/>
+            </a:fillRef>
+            <a:effectRef idx="0">
+              <a:schemeClr val="accent2"/>
+            </a:effectRef>
+            <a:fontRef idx="minor">
+              <a:schemeClr val="lt1"/>
+            </a:fontRef>
+          </p:style>
+          <p:txBody>
+            <a:bodyPr lIns="9144" rIns="9144" rtlCol="0" anchor="ctr"/>
+            <a:lstStyle/>
+            <a:p>
+              <a:pPr algn="ctr"/>
+              <a:r>
+                <a:rPr lang="en-US" sz="1000" dirty="0" smtClean="0"/>
+                <a:t>America’s research excellence </a:t>
+              </a:r>
+              <a:r>
+                <a:rPr lang="en-US" sz="1000" dirty="0" smtClean="0"/>
+                <a:t>will be</a:t>
+              </a:r>
+              <a:r>
+                <a:rPr lang="en-US" sz="1000" dirty="0" smtClean="0"/>
+                <a:t>  </a:t>
+              </a:r>
+              <a:r>
+                <a:rPr lang="en-US" sz="1000" dirty="0" smtClean="0"/>
+                <a:t>eroded.</a:t>
+              </a:r>
+              <a:endParaRPr lang="en-US" sz="1000" dirty="0"/>
+            </a:p>
+          </p:txBody>
+        </p:sp>
+      </p:grpSp>
     </p:spTree>
     <p:extLst>
       <p:ext uri="{BB962C8B-B14F-4D97-AF65-F5344CB8AC3E}">
@@ -14776,8 +14871,8 @@
         </p:nvSpPr>
         <p:spPr>
           <a:xfrm>
-            <a:off x="2286000" y="419100"/>
-            <a:ext cx="4572000" cy="369332"/>
+            <a:off x="1600200" y="419100"/>
+            <a:ext cx="5943600" cy="369332"/>
           </a:xfrm>
           <a:prstGeom prst="rect">
             <a:avLst/>
@@ -14793,7 +14888,15 @@
             <a:pPr algn="ctr"/>
             <a:r>
               <a:rPr lang="en-US" dirty="0" smtClean="0"/>
-              <a:t>Policy and Political Implications Flow (Cont’d)</a:t>
+              <a:t>Policy and Political Implications </a:t>
+            </a:r>
+            <a:r>
+              <a:rPr lang="en-US" dirty="0" smtClean="0"/>
+              <a:t>Flow Diagram </a:t>
+            </a:r>
+            <a:r>
+              <a:rPr lang="en-US" dirty="0" smtClean="0"/>
+              <a:t>(Cont’d)</a:t>
             </a:r>
             <a:endParaRPr lang="en-US" dirty="0"/>
           </a:p>
@@ -14897,11 +15000,11 @@
               <a:pPr algn="ctr"/>
               <a:r>
                 <a:rPr lang="en-US" sz="1000" dirty="0" smtClean="0"/>
-                <a:t>Erode </a:t>
+                <a:t>Erode what makes America </a:t>
               </a:r>
               <a:r>
                 <a:rPr lang="en-US" sz="1000" dirty="0" smtClean="0"/>
-                <a:t>what makes America superior.</a:t>
+                <a:t>superior</a:t>
               </a:r>
               <a:endParaRPr lang="en-US" sz="1000" dirty="0"/>
             </a:p>
@@ -15125,7 +15228,7 @@
               </a:r>
               <a:r>
                 <a:rPr lang="en-US" sz="1000" dirty="0" smtClean="0"/>
-                <a:t>innovation.</a:t>
+                <a:t>innovation</a:t>
               </a:r>
               <a:endParaRPr lang="en-US" sz="1000" dirty="0"/>
             </a:p>
@@ -15171,7 +15274,11 @@
               <a:pPr algn="ctr"/>
               <a:r>
                 <a:rPr lang="en-US" sz="1000" dirty="0" smtClean="0"/>
-                <a:t>Loss of global dominance.</a:t>
+                <a:t>Loss of global </a:t>
+              </a:r>
+              <a:r>
+                <a:rPr lang="en-US" sz="1000" dirty="0" smtClean="0"/>
+                <a:t>dominance</a:t>
               </a:r>
               <a:endParaRPr lang="en-US" sz="1000" dirty="0"/>
             </a:p>

</xml_diff>